<commit_message>
Creating Home Page's wireframe
</commit_message>
<xml_diff>
--- a/docs/wireframes/wireframes.pptx
+++ b/docs/wireframes/wireframes.pptx
@@ -7,6 +7,7 @@
   <p:sldIdLst>
     <p:sldId id="260" r:id="rId2"/>
     <p:sldId id="261" r:id="rId3"/>
+    <p:sldId id="262" r:id="rId4"/>
   </p:sldIdLst>
   <p:sldSz cx="12192000" cy="6858000"/>
   <p:notesSz cx="6858000" cy="9144000"/>
@@ -107,7 +108,7 @@
   </p:defaultTextStyle>
   <p:extLst>
     <p:ext uri="{EFAFB233-063F-42B5-8137-9DF3F51BA10A}">
-      <p15:sldGuideLst xmlns:p15="http://schemas.microsoft.com/office/powerpoint/2012/main"/>
+      <p15:sldGuideLst xmlns:p15="http://schemas.microsoft.com/office/powerpoint/2012/main" xmlns=""/>
     </p:ext>
   </p:extLst>
 </p:presentation>
@@ -2444,7 +2445,7 @@
           <p:cNvPr id="7" name="Picture 6">
             <a:extLst>
               <a:ext uri="{FF2B5EF4-FFF2-40B4-BE49-F238E27FC236}">
-                <a16:creationId xmlns:a16="http://schemas.microsoft.com/office/drawing/2014/main" id="{987A0DDE-E9C3-FE42-9929-DD9146A706AA}"/>
+                <a16:creationId xmlns:a16="http://schemas.microsoft.com/office/drawing/2014/main" xmlns="" id="{987A0DDE-E9C3-FE42-9929-DD9146A706AA}"/>
               </a:ext>
             </a:extLst>
           </p:cNvPr>
@@ -2474,7 +2475,7 @@
           <p:cNvPr id="8" name="Rectangle 7">
             <a:extLst>
               <a:ext uri="{FF2B5EF4-FFF2-40B4-BE49-F238E27FC236}">
-                <a16:creationId xmlns:a16="http://schemas.microsoft.com/office/drawing/2014/main" id="{81BD0B67-76E8-FD41-A66D-BE4915F50BFC}"/>
+                <a16:creationId xmlns:a16="http://schemas.microsoft.com/office/drawing/2014/main" xmlns="" id="{81BD0B67-76E8-FD41-A66D-BE4915F50BFC}"/>
               </a:ext>
             </a:extLst>
           </p:cNvPr>
@@ -2526,7 +2527,7 @@
           <p:cNvPr id="9" name="Rectangle 8">
             <a:extLst>
               <a:ext uri="{FF2B5EF4-FFF2-40B4-BE49-F238E27FC236}">
-                <a16:creationId xmlns:a16="http://schemas.microsoft.com/office/drawing/2014/main" id="{3BF477E5-BB1D-1541-B34B-AFABF28A0D14}"/>
+                <a16:creationId xmlns:a16="http://schemas.microsoft.com/office/drawing/2014/main" xmlns="" id="{3BF477E5-BB1D-1541-B34B-AFABF28A0D14}"/>
               </a:ext>
             </a:extLst>
           </p:cNvPr>
@@ -3112,7 +3113,7 @@
           <p:cNvPr id="2" name="TextBox 1">
             <a:extLst>
               <a:ext uri="{FF2B5EF4-FFF2-40B4-BE49-F238E27FC236}">
-                <a16:creationId xmlns:a16="http://schemas.microsoft.com/office/drawing/2014/main" id="{221DED5B-F56B-0F43-A308-4F2DD034B5B7}"/>
+                <a16:creationId xmlns:a16="http://schemas.microsoft.com/office/drawing/2014/main" xmlns="" id="{221DED5B-F56B-0F43-A308-4F2DD034B5B7}"/>
               </a:ext>
             </a:extLst>
           </p:cNvPr>
@@ -3152,7 +3153,7 @@
           <p:cNvPr id="7" name="TextBox 6">
             <a:extLst>
               <a:ext uri="{FF2B5EF4-FFF2-40B4-BE49-F238E27FC236}">
-                <a16:creationId xmlns:a16="http://schemas.microsoft.com/office/drawing/2014/main" id="{F3573DF9-457D-7948-8B22-DB5337292FA7}"/>
+                <a16:creationId xmlns:a16="http://schemas.microsoft.com/office/drawing/2014/main" xmlns="" id="{F3573DF9-457D-7948-8B22-DB5337292FA7}"/>
               </a:ext>
             </a:extLst>
           </p:cNvPr>
@@ -3192,7 +3193,7 @@
           <p:cNvPr id="8" name="TextBox 7">
             <a:extLst>
               <a:ext uri="{FF2B5EF4-FFF2-40B4-BE49-F238E27FC236}">
-                <a16:creationId xmlns:a16="http://schemas.microsoft.com/office/drawing/2014/main" id="{49DF0299-C639-944C-9F0E-91BE71AC7E52}"/>
+                <a16:creationId xmlns:a16="http://schemas.microsoft.com/office/drawing/2014/main" xmlns="" id="{49DF0299-C639-944C-9F0E-91BE71AC7E52}"/>
               </a:ext>
             </a:extLst>
           </p:cNvPr>
@@ -3232,7 +3233,7 @@
           <p:cNvPr id="10" name="TextBox 9">
             <a:extLst>
               <a:ext uri="{FF2B5EF4-FFF2-40B4-BE49-F238E27FC236}">
-                <a16:creationId xmlns:a16="http://schemas.microsoft.com/office/drawing/2014/main" id="{C8E10E37-1019-8D4C-BA6F-9A6E9CF0D317}"/>
+                <a16:creationId xmlns:a16="http://schemas.microsoft.com/office/drawing/2014/main" xmlns="" id="{C8E10E37-1019-8D4C-BA6F-9A6E9CF0D317}"/>
               </a:ext>
             </a:extLst>
           </p:cNvPr>
@@ -3458,7 +3459,7 @@
           <p:cNvPr id="4" name="TextBox 3">
             <a:extLst>
               <a:ext uri="{FF2B5EF4-FFF2-40B4-BE49-F238E27FC236}">
-                <a16:creationId xmlns:a16="http://schemas.microsoft.com/office/drawing/2014/main" id="{32820AB9-7CA6-8F41-A812-9F4C46331562}"/>
+                <a16:creationId xmlns:a16="http://schemas.microsoft.com/office/drawing/2014/main" xmlns="" id="{32820AB9-7CA6-8F41-A812-9F4C46331562}"/>
               </a:ext>
             </a:extLst>
           </p:cNvPr>
@@ -3501,7 +3502,7 @@
           <p:cNvPr id="11" name="TextBox 10">
             <a:extLst>
               <a:ext uri="{FF2B5EF4-FFF2-40B4-BE49-F238E27FC236}">
-                <a16:creationId xmlns:a16="http://schemas.microsoft.com/office/drawing/2014/main" id="{5880DF0C-DDBC-A243-8BC6-846ACCD4FA07}"/>
+                <a16:creationId xmlns:a16="http://schemas.microsoft.com/office/drawing/2014/main" xmlns="" id="{5880DF0C-DDBC-A243-8BC6-846ACCD4FA07}"/>
               </a:ext>
             </a:extLst>
           </p:cNvPr>
@@ -3544,7 +3545,7 @@
           <p:cNvPr id="12" name="TextBox 11">
             <a:extLst>
               <a:ext uri="{FF2B5EF4-FFF2-40B4-BE49-F238E27FC236}">
-                <a16:creationId xmlns:a16="http://schemas.microsoft.com/office/drawing/2014/main" id="{4B5CE2DA-6350-BC4D-A2FD-AD1AC0B9E0B5}"/>
+                <a16:creationId xmlns:a16="http://schemas.microsoft.com/office/drawing/2014/main" xmlns="" id="{4B5CE2DA-6350-BC4D-A2FD-AD1AC0B9E0B5}"/>
               </a:ext>
             </a:extLst>
           </p:cNvPr>
@@ -3587,7 +3588,7 @@
           <p:cNvPr id="13" name="TextBox 12">
             <a:extLst>
               <a:ext uri="{FF2B5EF4-FFF2-40B4-BE49-F238E27FC236}">
-                <a16:creationId xmlns:a16="http://schemas.microsoft.com/office/drawing/2014/main" id="{7CDBED8A-FB80-BD47-A4EA-1246C8D98E35}"/>
+                <a16:creationId xmlns:a16="http://schemas.microsoft.com/office/drawing/2014/main" xmlns="" id="{7CDBED8A-FB80-BD47-A4EA-1246C8D98E35}"/>
               </a:ext>
             </a:extLst>
           </p:cNvPr>
@@ -3630,7 +3631,7 @@
           <p:cNvPr id="14" name="TextBox 13">
             <a:extLst>
               <a:ext uri="{FF2B5EF4-FFF2-40B4-BE49-F238E27FC236}">
-                <a16:creationId xmlns:a16="http://schemas.microsoft.com/office/drawing/2014/main" id="{FE03B4FC-5EA8-DC43-8C63-28E23C611684}"/>
+                <a16:creationId xmlns:a16="http://schemas.microsoft.com/office/drawing/2014/main" xmlns="" id="{FE03B4FC-5EA8-DC43-8C63-28E23C611684}"/>
               </a:ext>
             </a:extLst>
           </p:cNvPr>
@@ -3673,7 +3674,7 @@
           <p:cNvPr id="15" name="TextBox 14">
             <a:extLst>
               <a:ext uri="{FF2B5EF4-FFF2-40B4-BE49-F238E27FC236}">
-                <a16:creationId xmlns:a16="http://schemas.microsoft.com/office/drawing/2014/main" id="{50DC85BE-E0FE-1D4B-A268-B6DD16A293AE}"/>
+                <a16:creationId xmlns:a16="http://schemas.microsoft.com/office/drawing/2014/main" xmlns="" id="{50DC85BE-E0FE-1D4B-A268-B6DD16A293AE}"/>
               </a:ext>
             </a:extLst>
           </p:cNvPr>
@@ -3716,7 +3717,7 @@
           <p:cNvPr id="5" name="Rounded Rectangle 4">
             <a:extLst>
               <a:ext uri="{FF2B5EF4-FFF2-40B4-BE49-F238E27FC236}">
-                <a16:creationId xmlns:a16="http://schemas.microsoft.com/office/drawing/2014/main" id="{1376ECFE-A6F2-6C42-A904-0E15AFF7920D}"/>
+                <a16:creationId xmlns:a16="http://schemas.microsoft.com/office/drawing/2014/main" xmlns="" id="{1376ECFE-A6F2-6C42-A904-0E15AFF7920D}"/>
               </a:ext>
             </a:extLst>
           </p:cNvPr>
@@ -3778,7 +3779,7 @@
           <p:cNvPr id="16" name="Rectangle 15">
             <a:extLst>
               <a:ext uri="{FF2B5EF4-FFF2-40B4-BE49-F238E27FC236}">
-                <a16:creationId xmlns:a16="http://schemas.microsoft.com/office/drawing/2014/main" id="{61CD5799-7FC2-F04C-ADCF-330CB97C8DA9}"/>
+                <a16:creationId xmlns:a16="http://schemas.microsoft.com/office/drawing/2014/main" xmlns="" id="{61CD5799-7FC2-F04C-ADCF-330CB97C8DA9}"/>
               </a:ext>
             </a:extLst>
           </p:cNvPr>
@@ -3837,7 +3838,7 @@
           <p:cNvPr id="17" name="Rectangle 16">
             <a:extLst>
               <a:ext uri="{FF2B5EF4-FFF2-40B4-BE49-F238E27FC236}">
-                <a16:creationId xmlns:a16="http://schemas.microsoft.com/office/drawing/2014/main" id="{6866C721-FE01-1B49-8B68-07C98D112373}"/>
+                <a16:creationId xmlns:a16="http://schemas.microsoft.com/office/drawing/2014/main" xmlns="" id="{6866C721-FE01-1B49-8B68-07C98D112373}"/>
               </a:ext>
             </a:extLst>
           </p:cNvPr>
@@ -3927,7 +3928,7 @@
           <p:cNvPr id="2" name="TextBox 1">
             <a:extLst>
               <a:ext uri="{FF2B5EF4-FFF2-40B4-BE49-F238E27FC236}">
-                <a16:creationId xmlns:a16="http://schemas.microsoft.com/office/drawing/2014/main" id="{221DED5B-F56B-0F43-A308-4F2DD034B5B7}"/>
+                <a16:creationId xmlns:a16="http://schemas.microsoft.com/office/drawing/2014/main" xmlns="" id="{221DED5B-F56B-0F43-A308-4F2DD034B5B7}"/>
               </a:ext>
             </a:extLst>
           </p:cNvPr>
@@ -3967,7 +3968,7 @@
           <p:cNvPr id="7" name="TextBox 6">
             <a:extLst>
               <a:ext uri="{FF2B5EF4-FFF2-40B4-BE49-F238E27FC236}">
-                <a16:creationId xmlns:a16="http://schemas.microsoft.com/office/drawing/2014/main" id="{F3573DF9-457D-7948-8B22-DB5337292FA7}"/>
+                <a16:creationId xmlns:a16="http://schemas.microsoft.com/office/drawing/2014/main" xmlns="" id="{F3573DF9-457D-7948-8B22-DB5337292FA7}"/>
               </a:ext>
             </a:extLst>
           </p:cNvPr>
@@ -4007,7 +4008,7 @@
           <p:cNvPr id="8" name="TextBox 7">
             <a:extLst>
               <a:ext uri="{FF2B5EF4-FFF2-40B4-BE49-F238E27FC236}">
-                <a16:creationId xmlns:a16="http://schemas.microsoft.com/office/drawing/2014/main" id="{49DF0299-C639-944C-9F0E-91BE71AC7E52}"/>
+                <a16:creationId xmlns:a16="http://schemas.microsoft.com/office/drawing/2014/main" xmlns="" id="{49DF0299-C639-944C-9F0E-91BE71AC7E52}"/>
               </a:ext>
             </a:extLst>
           </p:cNvPr>
@@ -4047,7 +4048,7 @@
           <p:cNvPr id="4" name="TextBox 3">
             <a:extLst>
               <a:ext uri="{FF2B5EF4-FFF2-40B4-BE49-F238E27FC236}">
-                <a16:creationId xmlns:a16="http://schemas.microsoft.com/office/drawing/2014/main" id="{32820AB9-7CA6-8F41-A812-9F4C46331562}"/>
+                <a16:creationId xmlns:a16="http://schemas.microsoft.com/office/drawing/2014/main" xmlns="" id="{32820AB9-7CA6-8F41-A812-9F4C46331562}"/>
               </a:ext>
             </a:extLst>
           </p:cNvPr>
@@ -4129,7 +4130,7 @@
           <p:cNvPr id="15" name="TextBox 14">
             <a:extLst>
               <a:ext uri="{FF2B5EF4-FFF2-40B4-BE49-F238E27FC236}">
-                <a16:creationId xmlns:a16="http://schemas.microsoft.com/office/drawing/2014/main" id="{50DC85BE-E0FE-1D4B-A268-B6DD16A293AE}"/>
+                <a16:creationId xmlns:a16="http://schemas.microsoft.com/office/drawing/2014/main" xmlns="" id="{50DC85BE-E0FE-1D4B-A268-B6DD16A293AE}"/>
               </a:ext>
             </a:extLst>
           </p:cNvPr>
@@ -4238,7 +4239,7 @@
           <p:cNvPr id="16" name="Rectangle 15">
             <a:extLst>
               <a:ext uri="{FF2B5EF4-FFF2-40B4-BE49-F238E27FC236}">
-                <a16:creationId xmlns:a16="http://schemas.microsoft.com/office/drawing/2014/main" id="{61CD5799-7FC2-F04C-ADCF-330CB97C8DA9}"/>
+                <a16:creationId xmlns:a16="http://schemas.microsoft.com/office/drawing/2014/main" xmlns="" id="{61CD5799-7FC2-F04C-ADCF-330CB97C8DA9}"/>
               </a:ext>
             </a:extLst>
           </p:cNvPr>
@@ -4297,7 +4298,7 @@
           <p:cNvPr id="17" name="Rectangle 16">
             <a:extLst>
               <a:ext uri="{FF2B5EF4-FFF2-40B4-BE49-F238E27FC236}">
-                <a16:creationId xmlns:a16="http://schemas.microsoft.com/office/drawing/2014/main" id="{6866C721-FE01-1B49-8B68-07C98D112373}"/>
+                <a16:creationId xmlns:a16="http://schemas.microsoft.com/office/drawing/2014/main" xmlns="" id="{6866C721-FE01-1B49-8B68-07C98D112373}"/>
               </a:ext>
             </a:extLst>
           </p:cNvPr>
@@ -4357,7 +4358,7 @@
           <p:cNvPr id="3" name="Rectangle 2">
             <a:extLst>
               <a:ext uri="{FF2B5EF4-FFF2-40B4-BE49-F238E27FC236}">
-                <a16:creationId xmlns:a16="http://schemas.microsoft.com/office/drawing/2014/main" id="{CC0D1823-74B5-5646-9898-CD48F15882BF}"/>
+                <a16:creationId xmlns:a16="http://schemas.microsoft.com/office/drawing/2014/main" xmlns="" id="{CC0D1823-74B5-5646-9898-CD48F15882BF}"/>
               </a:ext>
             </a:extLst>
           </p:cNvPr>
@@ -4406,7 +4407,7 @@
           <p:cNvPr id="20" name="TextBox 19">
             <a:extLst>
               <a:ext uri="{FF2B5EF4-FFF2-40B4-BE49-F238E27FC236}">
-                <a16:creationId xmlns:a16="http://schemas.microsoft.com/office/drawing/2014/main" id="{85F0BA12-0219-4A4C-9A23-F57F00470D4D}"/>
+                <a16:creationId xmlns:a16="http://schemas.microsoft.com/office/drawing/2014/main" xmlns="" id="{85F0BA12-0219-4A4C-9A23-F57F00470D4D}"/>
               </a:ext>
             </a:extLst>
           </p:cNvPr>
@@ -4488,7 +4489,7 @@
           <p:cNvPr id="21" name="Rectangle 20">
             <a:extLst>
               <a:ext uri="{FF2B5EF4-FFF2-40B4-BE49-F238E27FC236}">
-                <a16:creationId xmlns:a16="http://schemas.microsoft.com/office/drawing/2014/main" id="{4CAE4138-EFC2-CF46-A0D7-44C1DC22765E}"/>
+                <a16:creationId xmlns:a16="http://schemas.microsoft.com/office/drawing/2014/main" xmlns="" id="{4CAE4138-EFC2-CF46-A0D7-44C1DC22765E}"/>
               </a:ext>
             </a:extLst>
           </p:cNvPr>
@@ -4537,7 +4538,7 @@
           <p:cNvPr id="22" name="TextBox 21">
             <a:extLst>
               <a:ext uri="{FF2B5EF4-FFF2-40B4-BE49-F238E27FC236}">
-                <a16:creationId xmlns:a16="http://schemas.microsoft.com/office/drawing/2014/main" id="{F981B8C4-EA28-6948-AC1C-98FE575D3876}"/>
+                <a16:creationId xmlns:a16="http://schemas.microsoft.com/office/drawing/2014/main" xmlns="" id="{F981B8C4-EA28-6948-AC1C-98FE575D3876}"/>
               </a:ext>
             </a:extLst>
           </p:cNvPr>
@@ -4619,7 +4620,7 @@
           <p:cNvPr id="23" name="Rectangle 22">
             <a:extLst>
               <a:ext uri="{FF2B5EF4-FFF2-40B4-BE49-F238E27FC236}">
-                <a16:creationId xmlns:a16="http://schemas.microsoft.com/office/drawing/2014/main" id="{8F5D6354-EB96-A544-B9F6-AD8E466E039B}"/>
+                <a16:creationId xmlns:a16="http://schemas.microsoft.com/office/drawing/2014/main" xmlns="" id="{8F5D6354-EB96-A544-B9F6-AD8E466E039B}"/>
               </a:ext>
             </a:extLst>
           </p:cNvPr>
@@ -4668,7 +4669,7 @@
           <p:cNvPr id="24" name="TextBox 23">
             <a:extLst>
               <a:ext uri="{FF2B5EF4-FFF2-40B4-BE49-F238E27FC236}">
-                <a16:creationId xmlns:a16="http://schemas.microsoft.com/office/drawing/2014/main" id="{B8669C60-76C6-2140-B42C-6B1F4F2D42B4}"/>
+                <a16:creationId xmlns:a16="http://schemas.microsoft.com/office/drawing/2014/main" xmlns="" id="{B8669C60-76C6-2140-B42C-6B1F4F2D42B4}"/>
               </a:ext>
             </a:extLst>
           </p:cNvPr>
@@ -4750,7 +4751,7 @@
           <p:cNvPr id="25" name="Rectangle 24">
             <a:extLst>
               <a:ext uri="{FF2B5EF4-FFF2-40B4-BE49-F238E27FC236}">
-                <a16:creationId xmlns:a16="http://schemas.microsoft.com/office/drawing/2014/main" id="{0C512251-CAA5-034E-A6D4-7AC0D6A42D22}"/>
+                <a16:creationId xmlns:a16="http://schemas.microsoft.com/office/drawing/2014/main" xmlns="" id="{0C512251-CAA5-034E-A6D4-7AC0D6A42D22}"/>
               </a:ext>
             </a:extLst>
           </p:cNvPr>
@@ -4799,7 +4800,7 @@
           <p:cNvPr id="26" name="TextBox 25">
             <a:extLst>
               <a:ext uri="{FF2B5EF4-FFF2-40B4-BE49-F238E27FC236}">
-                <a16:creationId xmlns:a16="http://schemas.microsoft.com/office/drawing/2014/main" id="{2111CB14-445C-1148-A482-F6A0A40F244E}"/>
+                <a16:creationId xmlns:a16="http://schemas.microsoft.com/office/drawing/2014/main" xmlns="" id="{2111CB14-445C-1148-A482-F6A0A40F244E}"/>
               </a:ext>
             </a:extLst>
           </p:cNvPr>
@@ -4881,7 +4882,7 @@
           <p:cNvPr id="27" name="Rectangle 26">
             <a:extLst>
               <a:ext uri="{FF2B5EF4-FFF2-40B4-BE49-F238E27FC236}">
-                <a16:creationId xmlns:a16="http://schemas.microsoft.com/office/drawing/2014/main" id="{9810A590-E884-AF42-BE74-3F99FD01CCD1}"/>
+                <a16:creationId xmlns:a16="http://schemas.microsoft.com/office/drawing/2014/main" xmlns="" id="{9810A590-E884-AF42-BE74-3F99FD01CCD1}"/>
               </a:ext>
             </a:extLst>
           </p:cNvPr>
@@ -4930,7 +4931,7 @@
           <p:cNvPr id="28" name="TextBox 27">
             <a:extLst>
               <a:ext uri="{FF2B5EF4-FFF2-40B4-BE49-F238E27FC236}">
-                <a16:creationId xmlns:a16="http://schemas.microsoft.com/office/drawing/2014/main" id="{C80D794F-CECE-4842-82CD-7950608C0D33}"/>
+                <a16:creationId xmlns:a16="http://schemas.microsoft.com/office/drawing/2014/main" xmlns="" id="{C80D794F-CECE-4842-82CD-7950608C0D33}"/>
               </a:ext>
             </a:extLst>
           </p:cNvPr>
@@ -5012,7 +5013,7 @@
           <p:cNvPr id="29" name="Rectangle 28">
             <a:extLst>
               <a:ext uri="{FF2B5EF4-FFF2-40B4-BE49-F238E27FC236}">
-                <a16:creationId xmlns:a16="http://schemas.microsoft.com/office/drawing/2014/main" id="{6F105BD5-7104-B845-85CA-D6DC0CF9382F}"/>
+                <a16:creationId xmlns:a16="http://schemas.microsoft.com/office/drawing/2014/main" xmlns="" id="{6F105BD5-7104-B845-85CA-D6DC0CF9382F}"/>
               </a:ext>
             </a:extLst>
           </p:cNvPr>
@@ -5060,6 +5061,2380 @@
     <p:extLst>
       <p:ext uri="{BB962C8B-B14F-4D97-AF65-F5344CB8AC3E}">
         <p14:creationId xmlns:p14="http://schemas.microsoft.com/office/powerpoint/2010/main" val="4129143070"/>
+      </p:ext>
+    </p:extLst>
+  </p:cSld>
+  <p:clrMapOvr>
+    <a:masterClrMapping/>
+  </p:clrMapOvr>
+</p:sld>
+</file>
+
+<file path=ppt/slides/slide3.xml><?xml version="1.0" encoding="utf-8"?>
+<p:sld xmlns:a="http://schemas.openxmlformats.org/drawingml/2006/main" xmlns:r="http://schemas.openxmlformats.org/officeDocument/2006/relationships" xmlns:p="http://schemas.openxmlformats.org/presentationml/2006/main">
+  <p:cSld>
+    <p:spTree>
+      <p:nvGrpSpPr>
+        <p:cNvPr id="1" name=""/>
+        <p:cNvGrpSpPr/>
+        <p:nvPr/>
+      </p:nvGrpSpPr>
+      <p:grpSpPr>
+        <a:xfrm>
+          <a:off x="0" y="0"/>
+          <a:ext cx="0" cy="0"/>
+          <a:chOff x="0" y="0"/>
+          <a:chExt cx="0" cy="0"/>
+        </a:xfrm>
+      </p:grpSpPr>
+      <p:sp>
+        <p:nvSpPr>
+          <p:cNvPr id="2" name="TextBox 1">
+            <a:extLst>
+              <a:ext uri="{FF2B5EF4-FFF2-40B4-BE49-F238E27FC236}">
+                <a16:creationId xmlns:a16="http://schemas.microsoft.com/office/drawing/2014/main" xmlns="" id="{49DF0299-C639-944C-9F0E-91BE71AC7E52}"/>
+              </a:ext>
+            </a:extLst>
+          </p:cNvPr>
+          <p:cNvSpPr txBox="1"/>
+          <p:nvPr/>
+        </p:nvSpPr>
+        <p:spPr>
+          <a:xfrm>
+            <a:off x="2233351" y="581403"/>
+            <a:ext cx="1857875" cy="276999"/>
+          </a:xfrm>
+          <a:prstGeom prst="rect">
+            <a:avLst/>
+          </a:prstGeom>
+          <a:noFill/>
+        </p:spPr>
+        <p:txBody>
+          <a:bodyPr wrap="none" rtlCol="0">
+            <a:spAutoFit/>
+          </a:bodyPr>
+          <a:lstStyle/>
+          <a:p>
+            <a:r>
+              <a:rPr lang="en-US" sz="1200" dirty="0">
+                <a:solidFill>
+                  <a:schemeClr val="bg1"/>
+                </a:solidFill>
+                <a:latin typeface="Comic Sans MS" panose="030F0902030302020204" pitchFamily="66" charset="0"/>
+              </a:rPr>
+              <a:t>http://localhost:3000</a:t>
+            </a:r>
+            <a:r>
+              <a:rPr lang="en-US" sz="1200" dirty="0" smtClean="0">
+                <a:solidFill>
+                  <a:schemeClr val="bg1"/>
+                </a:solidFill>
+                <a:latin typeface="Comic Sans MS" panose="030F0902030302020204" pitchFamily="66" charset="0"/>
+              </a:rPr>
+              <a:t>/</a:t>
+            </a:r>
+            <a:endParaRPr lang="en-US" sz="1200" dirty="0">
+              <a:solidFill>
+                <a:schemeClr val="bg1"/>
+              </a:solidFill>
+              <a:latin typeface="Comic Sans MS" panose="030F0902030302020204" pitchFamily="66" charset="0"/>
+            </a:endParaRPr>
+          </a:p>
+        </p:txBody>
+      </p:sp>
+      <p:sp>
+        <p:nvSpPr>
+          <p:cNvPr id="5" name="TextBox 4">
+            <a:extLst>
+              <a:ext uri="{FF2B5EF4-FFF2-40B4-BE49-F238E27FC236}">
+                <a16:creationId xmlns:a16="http://schemas.microsoft.com/office/drawing/2014/main" xmlns="" id="{F3573DF9-457D-7948-8B22-DB5337292FA7}"/>
+              </a:ext>
+            </a:extLst>
+          </p:cNvPr>
+          <p:cNvSpPr txBox="1"/>
+          <p:nvPr/>
+        </p:nvSpPr>
+        <p:spPr>
+          <a:xfrm>
+            <a:off x="1784068" y="292529"/>
+            <a:ext cx="1158941" cy="276999"/>
+          </a:xfrm>
+          <a:prstGeom prst="rect">
+            <a:avLst/>
+          </a:prstGeom>
+          <a:noFill/>
+        </p:spPr>
+        <p:txBody>
+          <a:bodyPr wrap="none" rtlCol="0">
+            <a:spAutoFit/>
+          </a:bodyPr>
+          <a:lstStyle/>
+          <a:p>
+            <a:r>
+              <a:rPr lang="en-US" sz="1200" dirty="0" err="1" smtClean="0">
+                <a:solidFill>
+                  <a:schemeClr val="bg1"/>
+                </a:solidFill>
+                <a:latin typeface="Comic Sans MS" panose="030F0902030302020204" pitchFamily="66" charset="0"/>
+              </a:rPr>
+              <a:t>SellBackMart</a:t>
+            </a:r>
+            <a:endParaRPr lang="en-US" sz="1200" dirty="0">
+              <a:solidFill>
+                <a:schemeClr val="bg1"/>
+              </a:solidFill>
+              <a:latin typeface="Comic Sans MS" panose="030F0902030302020204" pitchFamily="66" charset="0"/>
+            </a:endParaRPr>
+          </a:p>
+        </p:txBody>
+      </p:sp>
+      <p:sp>
+        <p:nvSpPr>
+          <p:cNvPr id="6" name="Rectangle 5">
+            <a:extLst>
+              <a:ext uri="{FF2B5EF4-FFF2-40B4-BE49-F238E27FC236}">
+                <a16:creationId xmlns:a16="http://schemas.microsoft.com/office/drawing/2014/main" xmlns="" id="{61CD5799-7FC2-F04C-ADCF-330CB97C8DA9}"/>
+              </a:ext>
+            </a:extLst>
+          </p:cNvPr>
+          <p:cNvSpPr/>
+          <p:nvPr/>
+        </p:nvSpPr>
+        <p:spPr>
+          <a:xfrm>
+            <a:off x="1175657" y="870277"/>
+            <a:ext cx="9832769" cy="344384"/>
+          </a:xfrm>
+          <a:prstGeom prst="rect">
+            <a:avLst/>
+          </a:prstGeom>
+          <a:solidFill>
+            <a:schemeClr val="bg1"/>
+          </a:solidFill>
+          <a:ln>
+            <a:noFill/>
+          </a:ln>
+        </p:spPr>
+        <p:style>
+          <a:lnRef idx="2">
+            <a:schemeClr val="accent1">
+              <a:shade val="50000"/>
+            </a:schemeClr>
+          </a:lnRef>
+          <a:fillRef idx="1">
+            <a:schemeClr val="accent1"/>
+          </a:fillRef>
+          <a:effectRef idx="0">
+            <a:schemeClr val="accent1"/>
+          </a:effectRef>
+          <a:fontRef idx="minor">
+            <a:schemeClr val="lt1"/>
+          </a:fontRef>
+        </p:style>
+        <p:txBody>
+          <a:bodyPr rtlCol="0" anchor="ctr"/>
+          <a:lstStyle/>
+          <a:p>
+            <a:r>
+              <a:rPr lang="en-US" sz="1400" dirty="0" smtClean="0">
+                <a:solidFill>
+                  <a:schemeClr val="tx1"/>
+                </a:solidFill>
+                <a:latin typeface="Comic Sans MS" panose="030F0902030302020204" pitchFamily="66" charset="0"/>
+              </a:rPr>
+              <a:t>About</a:t>
+            </a:r>
+            <a:r>
+              <a:rPr lang="en-US" sz="1400" dirty="0" smtClean="0">
+                <a:solidFill>
+                  <a:schemeClr val="tx1"/>
+                </a:solidFill>
+                <a:latin typeface="Comic Sans MS" panose="030F0902030302020204" pitchFamily="66" charset="0"/>
+              </a:rPr>
+              <a:t> </a:t>
+            </a:r>
+            <a:r>
+              <a:rPr lang="en-US" sz="1400" dirty="0">
+                <a:solidFill>
+                  <a:schemeClr val="tx1"/>
+                </a:solidFill>
+                <a:latin typeface="Comic Sans MS" panose="030F0902030302020204" pitchFamily="66" charset="0"/>
+              </a:rPr>
+              <a:t>|  </a:t>
+            </a:r>
+            <a:r>
+              <a:rPr lang="en-US" sz="1400" dirty="0" smtClean="0">
+                <a:solidFill>
+                  <a:schemeClr val="tx1"/>
+                </a:solidFill>
+                <a:latin typeface="Comic Sans MS" panose="030F0902030302020204" pitchFamily="66" charset="0"/>
+              </a:rPr>
+              <a:t>Results</a:t>
+            </a:r>
+            <a:r>
+              <a:rPr lang="en-US" sz="1400" dirty="0" smtClean="0">
+                <a:solidFill>
+                  <a:schemeClr val="tx1"/>
+                </a:solidFill>
+                <a:latin typeface="Comic Sans MS" panose="030F0902030302020204" pitchFamily="66" charset="0"/>
+              </a:rPr>
+              <a:t> </a:t>
+            </a:r>
+            <a:r>
+              <a:rPr lang="en-US" sz="1400" dirty="0">
+                <a:solidFill>
+                  <a:schemeClr val="tx1"/>
+                </a:solidFill>
+                <a:latin typeface="Comic Sans MS" panose="030F0902030302020204" pitchFamily="66" charset="0"/>
+              </a:rPr>
+              <a:t>|  </a:t>
+            </a:r>
+            <a:r>
+              <a:rPr lang="en-US" sz="1400" dirty="0" smtClean="0">
+                <a:solidFill>
+                  <a:schemeClr val="tx1"/>
+                </a:solidFill>
+                <a:latin typeface="Comic Sans MS" panose="030F0902030302020204" pitchFamily="66" charset="0"/>
+              </a:rPr>
+              <a:t>Comments</a:t>
+            </a:r>
+            <a:endParaRPr lang="en-US" sz="1400" dirty="0">
+              <a:solidFill>
+                <a:schemeClr val="tx1"/>
+              </a:solidFill>
+              <a:latin typeface="Comic Sans MS" panose="030F0902030302020204" pitchFamily="66" charset="0"/>
+            </a:endParaRPr>
+          </a:p>
+        </p:txBody>
+      </p:sp>
+      <p:sp>
+        <p:nvSpPr>
+          <p:cNvPr id="7" name="Rectangle 6">
+            <a:extLst>
+              <a:ext uri="{FF2B5EF4-FFF2-40B4-BE49-F238E27FC236}">
+                <a16:creationId xmlns:a16="http://schemas.microsoft.com/office/drawing/2014/main" xmlns="" id="{CC0D1823-74B5-5646-9898-CD48F15882BF}"/>
+              </a:ext>
+            </a:extLst>
+          </p:cNvPr>
+          <p:cNvSpPr/>
+          <p:nvPr/>
+        </p:nvSpPr>
+        <p:spPr>
+          <a:xfrm>
+            <a:off x="1418656" y="1350997"/>
+            <a:ext cx="9336110" cy="1702257"/>
+          </a:xfrm>
+          <a:prstGeom prst="rect">
+            <a:avLst/>
+          </a:prstGeom>
+        </p:spPr>
+        <p:style>
+          <a:lnRef idx="2">
+            <a:schemeClr val="accent1">
+              <a:shade val="50000"/>
+            </a:schemeClr>
+          </a:lnRef>
+          <a:fillRef idx="1">
+            <a:schemeClr val="accent1"/>
+          </a:fillRef>
+          <a:effectRef idx="0">
+            <a:schemeClr val="accent1"/>
+          </a:effectRef>
+          <a:fontRef idx="minor">
+            <a:schemeClr val="lt1"/>
+          </a:fontRef>
+        </p:style>
+        <p:txBody>
+          <a:bodyPr rtlCol="0" anchor="ctr"/>
+          <a:lstStyle/>
+          <a:p>
+            <a:pPr algn="ctr"/>
+            <a:r>
+              <a:rPr lang="en-US" i="1" dirty="0"/>
+              <a:t>Item Picture</a:t>
+            </a:r>
+          </a:p>
+        </p:txBody>
+      </p:sp>
+      <p:sp>
+        <p:nvSpPr>
+          <p:cNvPr id="8" name="TextBox 7">
+            <a:extLst>
+              <a:ext uri="{FF2B5EF4-FFF2-40B4-BE49-F238E27FC236}">
+                <a16:creationId xmlns:a16="http://schemas.microsoft.com/office/drawing/2014/main" xmlns="" id="{32820AB9-7CA6-8F41-A812-9F4C46331562}"/>
+              </a:ext>
+            </a:extLst>
+          </p:cNvPr>
+          <p:cNvSpPr txBox="1"/>
+          <p:nvPr/>
+        </p:nvSpPr>
+        <p:spPr>
+          <a:xfrm>
+            <a:off x="1418656" y="3198480"/>
+            <a:ext cx="9336110" cy="954107"/>
+          </a:xfrm>
+          <a:prstGeom prst="rect">
+            <a:avLst/>
+          </a:prstGeom>
+          <a:noFill/>
+          <a:ln>
+            <a:solidFill>
+              <a:schemeClr val="bg1"/>
+            </a:solidFill>
+          </a:ln>
+        </p:spPr>
+        <p:txBody>
+          <a:bodyPr wrap="square" rtlCol="0">
+            <a:spAutoFit/>
+          </a:bodyPr>
+          <a:lstStyle/>
+          <a:p>
+            <a:pPr algn="l"/>
+            <a:r>
+              <a:rPr lang="en-US" sz="1400" b="1" i="1" dirty="0" smtClean="0">
+                <a:solidFill>
+                  <a:schemeClr val="bg1"/>
+                </a:solidFill>
+                <a:latin typeface="Comic Sans MS" panose="030F0902030302020204" pitchFamily="66" charset="0"/>
+              </a:rPr>
+              <a:t>ABOUT</a:t>
+            </a:r>
+          </a:p>
+          <a:p>
+            <a:pPr algn="l"/>
+            <a:r>
+              <a:rPr lang="en-US" sz="1400" i="1" dirty="0" err="1" smtClean="0">
+                <a:solidFill>
+                  <a:schemeClr val="bg1"/>
+                </a:solidFill>
+                <a:latin typeface="Comic Sans MS" panose="030F0902030302020204" pitchFamily="66" charset="0"/>
+              </a:rPr>
+              <a:t>Yueieier</a:t>
+            </a:r>
+            <a:r>
+              <a:rPr lang="en-US" sz="1400" i="1" dirty="0" smtClean="0">
+                <a:solidFill>
+                  <a:schemeClr val="bg1"/>
+                </a:solidFill>
+                <a:latin typeface="Comic Sans MS" panose="030F0902030302020204" pitchFamily="66" charset="0"/>
+              </a:rPr>
+              <a:t> </a:t>
+            </a:r>
+            <a:r>
+              <a:rPr lang="en-US" sz="1400" i="1" dirty="0" err="1" smtClean="0">
+                <a:solidFill>
+                  <a:schemeClr val="bg1"/>
+                </a:solidFill>
+                <a:latin typeface="Comic Sans MS" panose="030F0902030302020204" pitchFamily="66" charset="0"/>
+              </a:rPr>
+              <a:t>qofoqmqo</a:t>
+            </a:r>
+            <a:r>
+              <a:rPr lang="en-US" sz="1400" i="1" dirty="0" smtClean="0">
+                <a:solidFill>
+                  <a:schemeClr val="bg1"/>
+                </a:solidFill>
+                <a:latin typeface="Comic Sans MS" panose="030F0902030302020204" pitchFamily="66" charset="0"/>
+              </a:rPr>
+              <a:t> </a:t>
+            </a:r>
+            <a:r>
+              <a:rPr lang="en-US" sz="1400" i="1" dirty="0" err="1" smtClean="0">
+                <a:solidFill>
+                  <a:schemeClr val="bg1"/>
+                </a:solidFill>
+                <a:latin typeface="Comic Sans MS" panose="030F0902030302020204" pitchFamily="66" charset="0"/>
+              </a:rPr>
+              <a:t>miwmvwkvw</a:t>
+            </a:r>
+            <a:r>
+              <a:rPr lang="en-US" sz="1400" i="1" dirty="0" smtClean="0">
+                <a:solidFill>
+                  <a:schemeClr val="bg1"/>
+                </a:solidFill>
+                <a:latin typeface="Comic Sans MS" panose="030F0902030302020204" pitchFamily="66" charset="0"/>
+              </a:rPr>
+              <a:t> w </a:t>
+            </a:r>
+            <a:r>
+              <a:rPr lang="en-US" sz="1400" i="1" dirty="0" err="1" smtClean="0">
+                <a:solidFill>
+                  <a:schemeClr val="bg1"/>
+                </a:solidFill>
+                <a:latin typeface="Comic Sans MS" panose="030F0902030302020204" pitchFamily="66" charset="0"/>
+              </a:rPr>
+              <a:t>wi</a:t>
+            </a:r>
+            <a:r>
+              <a:rPr lang="en-US" sz="1400" i="1" dirty="0" smtClean="0">
+                <a:solidFill>
+                  <a:schemeClr val="bg1"/>
+                </a:solidFill>
+                <a:latin typeface="Comic Sans MS" panose="030F0902030302020204" pitchFamily="66" charset="0"/>
+              </a:rPr>
+              <a:t> </a:t>
+            </a:r>
+            <a:r>
+              <a:rPr lang="en-US" sz="1400" i="1" dirty="0" err="1" smtClean="0">
+                <a:solidFill>
+                  <a:schemeClr val="bg1"/>
+                </a:solidFill>
+                <a:latin typeface="Comic Sans MS" panose="030F0902030302020204" pitchFamily="66" charset="0"/>
+              </a:rPr>
+              <a:t>nwivnrwivwm</a:t>
+            </a:r>
+            <a:r>
+              <a:rPr lang="en-US" sz="1400" i="1" dirty="0" smtClean="0">
+                <a:solidFill>
+                  <a:schemeClr val="bg1"/>
+                </a:solidFill>
+                <a:latin typeface="Comic Sans MS" panose="030F0902030302020204" pitchFamily="66" charset="0"/>
+              </a:rPr>
+              <a:t> </a:t>
+            </a:r>
+            <a:r>
+              <a:rPr lang="en-US" sz="1400" i="1" dirty="0" err="1" smtClean="0">
+                <a:solidFill>
+                  <a:schemeClr val="bg1"/>
+                </a:solidFill>
+                <a:latin typeface="Comic Sans MS" panose="030F0902030302020204" pitchFamily="66" charset="0"/>
+              </a:rPr>
+              <a:t>iwvmwimv</a:t>
+            </a:r>
+            <a:r>
+              <a:rPr lang="en-US" sz="1400" i="1" dirty="0" smtClean="0">
+                <a:solidFill>
+                  <a:schemeClr val="bg1"/>
+                </a:solidFill>
+                <a:latin typeface="Comic Sans MS" panose="030F0902030302020204" pitchFamily="66" charset="0"/>
+              </a:rPr>
+              <a:t> </a:t>
+            </a:r>
+            <a:r>
+              <a:rPr lang="en-US" sz="1400" i="1" dirty="0" err="1" smtClean="0">
+                <a:solidFill>
+                  <a:schemeClr val="bg1"/>
+                </a:solidFill>
+                <a:latin typeface="Comic Sans MS" panose="030F0902030302020204" pitchFamily="66" charset="0"/>
+              </a:rPr>
+              <a:t>wovnrwiovnrwnvo</a:t>
+            </a:r>
+            <a:r>
+              <a:rPr lang="en-US" sz="1400" i="1" dirty="0" smtClean="0">
+                <a:solidFill>
+                  <a:schemeClr val="bg1"/>
+                </a:solidFill>
+                <a:latin typeface="Comic Sans MS" panose="030F0902030302020204" pitchFamily="66" charset="0"/>
+              </a:rPr>
+              <a:t> </a:t>
+            </a:r>
+            <a:r>
+              <a:rPr lang="en-US" sz="1400" i="1" dirty="0" err="1" smtClean="0">
+                <a:solidFill>
+                  <a:schemeClr val="bg1"/>
+                </a:solidFill>
+                <a:latin typeface="Comic Sans MS" panose="030F0902030302020204" pitchFamily="66" charset="0"/>
+              </a:rPr>
+              <a:t>nwornviorwnviorwmv</a:t>
+            </a:r>
+            <a:r>
+              <a:rPr lang="en-US" sz="1400" i="1" dirty="0" smtClean="0">
+                <a:solidFill>
+                  <a:schemeClr val="bg1"/>
+                </a:solidFill>
+                <a:latin typeface="Comic Sans MS" panose="030F0902030302020204" pitchFamily="66" charset="0"/>
+              </a:rPr>
+              <a:t> </a:t>
+            </a:r>
+            <a:r>
+              <a:rPr lang="en-US" sz="1400" i="1" dirty="0" err="1" smtClean="0">
+                <a:solidFill>
+                  <a:schemeClr val="bg1"/>
+                </a:solidFill>
+                <a:latin typeface="Comic Sans MS" panose="030F0902030302020204" pitchFamily="66" charset="0"/>
+              </a:rPr>
+              <a:t>wmdlvm</a:t>
+            </a:r>
+            <a:r>
+              <a:rPr lang="en-US" sz="1400" i="1" dirty="0" smtClean="0">
+                <a:solidFill>
+                  <a:schemeClr val="bg1"/>
+                </a:solidFill>
+                <a:latin typeface="Comic Sans MS" panose="030F0902030302020204" pitchFamily="66" charset="0"/>
+              </a:rPr>
+              <a:t> </a:t>
+            </a:r>
+            <a:r>
+              <a:rPr lang="en-US" sz="1400" i="1" dirty="0" err="1" smtClean="0">
+                <a:solidFill>
+                  <a:schemeClr val="bg1"/>
+                </a:solidFill>
+                <a:latin typeface="Comic Sans MS" panose="030F0902030302020204" pitchFamily="66" charset="0"/>
+              </a:rPr>
+              <a:t>wovmwi</a:t>
+            </a:r>
+            <a:r>
+              <a:rPr lang="en-US" sz="1400" i="1" dirty="0" smtClean="0">
+                <a:solidFill>
+                  <a:schemeClr val="bg1"/>
+                </a:solidFill>
+                <a:latin typeface="Comic Sans MS" panose="030F0902030302020204" pitchFamily="66" charset="0"/>
+              </a:rPr>
+              <a:t> </a:t>
+            </a:r>
+            <a:r>
+              <a:rPr lang="en-US" sz="1400" i="1" dirty="0" err="1" smtClean="0">
+                <a:solidFill>
+                  <a:schemeClr val="bg1"/>
+                </a:solidFill>
+                <a:latin typeface="Comic Sans MS" panose="030F0902030302020204" pitchFamily="66" charset="0"/>
+              </a:rPr>
+              <a:t>meiwvmwrmv</a:t>
+            </a:r>
+            <a:r>
+              <a:rPr lang="en-US" sz="1400" i="1" dirty="0" smtClean="0">
+                <a:solidFill>
+                  <a:schemeClr val="bg1"/>
+                </a:solidFill>
+                <a:latin typeface="Comic Sans MS" panose="030F0902030302020204" pitchFamily="66" charset="0"/>
+              </a:rPr>
+              <a:t> </a:t>
+            </a:r>
+            <a:r>
+              <a:rPr lang="en-US" sz="1400" i="1" dirty="0" err="1" smtClean="0">
+                <a:solidFill>
+                  <a:schemeClr val="bg1"/>
+                </a:solidFill>
+                <a:latin typeface="Comic Sans MS" panose="030F0902030302020204" pitchFamily="66" charset="0"/>
+              </a:rPr>
+              <a:t>wvmwvniwn</a:t>
+            </a:r>
+            <a:r>
+              <a:rPr lang="en-US" sz="1400" i="1" dirty="0" smtClean="0">
+                <a:solidFill>
+                  <a:schemeClr val="bg1"/>
+                </a:solidFill>
+                <a:latin typeface="Comic Sans MS" panose="030F0902030302020204" pitchFamily="66" charset="0"/>
+              </a:rPr>
+              <a:t> </a:t>
+            </a:r>
+            <a:r>
+              <a:rPr lang="en-US" sz="1400" i="1" dirty="0" err="1" smtClean="0">
+                <a:solidFill>
+                  <a:schemeClr val="bg1"/>
+                </a:solidFill>
+                <a:latin typeface="Comic Sans MS" panose="030F0902030302020204" pitchFamily="66" charset="0"/>
+              </a:rPr>
+              <a:t>wivrwv</a:t>
+            </a:r>
+            <a:r>
+              <a:rPr lang="en-US" sz="1400" i="1" dirty="0" smtClean="0">
+                <a:solidFill>
+                  <a:schemeClr val="bg1"/>
+                </a:solidFill>
+                <a:latin typeface="Comic Sans MS" panose="030F0902030302020204" pitchFamily="66" charset="0"/>
+              </a:rPr>
+              <a:t> </a:t>
+            </a:r>
+            <a:r>
+              <a:rPr lang="en-US" sz="1400" i="1" dirty="0" err="1" smtClean="0">
+                <a:solidFill>
+                  <a:schemeClr val="bg1"/>
+                </a:solidFill>
+                <a:latin typeface="Comic Sans MS" panose="030F0902030302020204" pitchFamily="66" charset="0"/>
+              </a:rPr>
+              <a:t>pwv</a:t>
+            </a:r>
+            <a:r>
+              <a:rPr lang="en-US" sz="1400" i="1" dirty="0" smtClean="0">
+                <a:solidFill>
+                  <a:schemeClr val="bg1"/>
+                </a:solidFill>
+                <a:latin typeface="Comic Sans MS" panose="030F0902030302020204" pitchFamily="66" charset="0"/>
+              </a:rPr>
+              <a:t> </a:t>
+            </a:r>
+            <a:r>
+              <a:rPr lang="en-US" sz="1400" i="1" dirty="0" err="1" smtClean="0">
+                <a:solidFill>
+                  <a:schemeClr val="bg1"/>
+                </a:solidFill>
+                <a:latin typeface="Comic Sans MS" panose="030F0902030302020204" pitchFamily="66" charset="0"/>
+              </a:rPr>
+              <a:t>pwvm</a:t>
+            </a:r>
+            <a:r>
+              <a:rPr lang="en-US" sz="1400" i="1" dirty="0" smtClean="0">
+                <a:solidFill>
+                  <a:schemeClr val="bg1"/>
+                </a:solidFill>
+                <a:latin typeface="Comic Sans MS" panose="030F0902030302020204" pitchFamily="66" charset="0"/>
+              </a:rPr>
+              <a:t> </a:t>
+            </a:r>
+            <a:r>
+              <a:rPr lang="en-US" sz="1400" i="1" dirty="0" err="1" smtClean="0">
+                <a:solidFill>
+                  <a:schemeClr val="bg1"/>
+                </a:solidFill>
+                <a:latin typeface="Comic Sans MS" panose="030F0902030302020204" pitchFamily="66" charset="0"/>
+              </a:rPr>
+              <a:t>pwmvwprvmprwm</a:t>
+            </a:r>
+            <a:r>
+              <a:rPr lang="en-US" sz="1400" i="1" dirty="0" smtClean="0">
+                <a:solidFill>
+                  <a:schemeClr val="bg1"/>
+                </a:solidFill>
+                <a:latin typeface="Comic Sans MS" panose="030F0902030302020204" pitchFamily="66" charset="0"/>
+              </a:rPr>
+              <a:t> </a:t>
+            </a:r>
+            <a:r>
+              <a:rPr lang="en-US" sz="1400" i="1" dirty="0" err="1" smtClean="0">
+                <a:solidFill>
+                  <a:schemeClr val="bg1"/>
+                </a:solidFill>
+                <a:latin typeface="Comic Sans MS" panose="030F0902030302020204" pitchFamily="66" charset="0"/>
+              </a:rPr>
+              <a:t>wrvmnrwnv</a:t>
+            </a:r>
+            <a:r>
+              <a:rPr lang="en-US" sz="1400" i="1" dirty="0" smtClean="0">
+                <a:solidFill>
+                  <a:schemeClr val="bg1"/>
+                </a:solidFill>
+                <a:latin typeface="Comic Sans MS" panose="030F0902030302020204" pitchFamily="66" charset="0"/>
+              </a:rPr>
+              <a:t> </a:t>
+            </a:r>
+            <a:r>
+              <a:rPr lang="en-US" sz="1400" i="1" dirty="0" err="1" smtClean="0">
+                <a:solidFill>
+                  <a:schemeClr val="bg1"/>
+                </a:solidFill>
+                <a:latin typeface="Comic Sans MS" panose="030F0902030302020204" pitchFamily="66" charset="0"/>
+              </a:rPr>
+              <a:t>rwnvirwnviw</a:t>
+            </a:r>
+            <a:r>
+              <a:rPr lang="en-US" sz="1400" i="1" dirty="0" smtClean="0">
+                <a:solidFill>
+                  <a:schemeClr val="bg1"/>
+                </a:solidFill>
+                <a:latin typeface="Comic Sans MS" panose="030F0902030302020204" pitchFamily="66" charset="0"/>
+              </a:rPr>
+              <a:t> </a:t>
+            </a:r>
+            <a:r>
+              <a:rPr lang="en-US" sz="1400" i="1" dirty="0" err="1" smtClean="0">
+                <a:solidFill>
+                  <a:schemeClr val="bg1"/>
+                </a:solidFill>
+                <a:latin typeface="Comic Sans MS" panose="030F0902030302020204" pitchFamily="66" charset="0"/>
+              </a:rPr>
+              <a:t>nviwnvior</a:t>
+            </a:r>
+            <a:r>
+              <a:rPr lang="en-US" sz="1400" i="1" dirty="0" smtClean="0">
+                <a:solidFill>
+                  <a:schemeClr val="bg1"/>
+                </a:solidFill>
+                <a:latin typeface="Comic Sans MS" panose="030F0902030302020204" pitchFamily="66" charset="0"/>
+              </a:rPr>
+              <a:t>  </a:t>
+            </a:r>
+            <a:r>
+              <a:rPr lang="en-US" sz="1400" i="1" dirty="0" err="1" smtClean="0">
+                <a:solidFill>
+                  <a:schemeClr val="bg1"/>
+                </a:solidFill>
+                <a:latin typeface="Comic Sans MS" panose="030F0902030302020204" pitchFamily="66" charset="0"/>
+              </a:rPr>
+              <a:t>wvnorwr</a:t>
+            </a:r>
+            <a:r>
+              <a:rPr lang="en-US" sz="1400" i="1" dirty="0" smtClean="0">
+                <a:solidFill>
+                  <a:schemeClr val="bg1"/>
+                </a:solidFill>
+                <a:latin typeface="Comic Sans MS" panose="030F0902030302020204" pitchFamily="66" charset="0"/>
+              </a:rPr>
+              <a:t> </a:t>
+            </a:r>
+            <a:r>
+              <a:rPr lang="en-US" sz="1400" i="1" dirty="0" err="1" smtClean="0">
+                <a:solidFill>
+                  <a:schemeClr val="bg1"/>
+                </a:solidFill>
+                <a:latin typeface="Comic Sans MS" panose="030F0902030302020204" pitchFamily="66" charset="0"/>
+              </a:rPr>
+              <a:t>vnior</a:t>
+            </a:r>
+            <a:r>
+              <a:rPr lang="en-US" sz="1400" i="1" dirty="0" smtClean="0">
+                <a:solidFill>
+                  <a:schemeClr val="bg1"/>
+                </a:solidFill>
+                <a:latin typeface="Comic Sans MS" panose="030F0902030302020204" pitchFamily="66" charset="0"/>
+              </a:rPr>
+              <a:t> </a:t>
+            </a:r>
+            <a:r>
+              <a:rPr lang="en-US" sz="1400" i="1" dirty="0" err="1" smtClean="0">
+                <a:solidFill>
+                  <a:schemeClr val="bg1"/>
+                </a:solidFill>
+                <a:latin typeface="Comic Sans MS" panose="030F0902030302020204" pitchFamily="66" charset="0"/>
+              </a:rPr>
+              <a:t>wnvwrivr</a:t>
+            </a:r>
+            <a:r>
+              <a:rPr lang="en-US" sz="1400" i="1" dirty="0" smtClean="0">
+                <a:solidFill>
+                  <a:schemeClr val="bg1"/>
+                </a:solidFill>
+                <a:latin typeface="Comic Sans MS" panose="030F0902030302020204" pitchFamily="66" charset="0"/>
+              </a:rPr>
+              <a:t> </a:t>
+            </a:r>
+            <a:r>
+              <a:rPr lang="en-US" sz="1400" i="1" dirty="0" err="1" smtClean="0">
+                <a:solidFill>
+                  <a:schemeClr val="bg1"/>
+                </a:solidFill>
+                <a:latin typeface="Comic Sans MS" panose="030F0902030302020204" pitchFamily="66" charset="0"/>
+              </a:rPr>
+              <a:t>wmvwiv</a:t>
+            </a:r>
+            <a:r>
+              <a:rPr lang="en-US" sz="1400" i="1" dirty="0" smtClean="0">
+                <a:solidFill>
+                  <a:schemeClr val="bg1"/>
+                </a:solidFill>
+                <a:latin typeface="Comic Sans MS" panose="030F0902030302020204" pitchFamily="66" charset="0"/>
+              </a:rPr>
+              <a:t> </a:t>
+            </a:r>
+            <a:r>
+              <a:rPr lang="en-US" sz="1400" i="1" dirty="0" err="1" smtClean="0">
+                <a:solidFill>
+                  <a:schemeClr val="bg1"/>
+                </a:solidFill>
+                <a:latin typeface="Comic Sans MS" panose="030F0902030302020204" pitchFamily="66" charset="0"/>
+              </a:rPr>
+              <a:t>mwek</a:t>
+            </a:r>
+            <a:r>
+              <a:rPr lang="en-US" sz="1400" i="1" dirty="0" smtClean="0">
+                <a:solidFill>
+                  <a:schemeClr val="bg1"/>
+                </a:solidFill>
+                <a:latin typeface="Comic Sans MS" panose="030F0902030302020204" pitchFamily="66" charset="0"/>
+              </a:rPr>
+              <a:t> </a:t>
+            </a:r>
+            <a:r>
+              <a:rPr lang="en-US" sz="1400" i="1" dirty="0" err="1" smtClean="0">
+                <a:solidFill>
+                  <a:schemeClr val="bg1"/>
+                </a:solidFill>
+                <a:latin typeface="Comic Sans MS" panose="030F0902030302020204" pitchFamily="66" charset="0"/>
+              </a:rPr>
+              <a:t>krekekv</a:t>
+            </a:r>
+            <a:r>
+              <a:rPr lang="en-US" sz="1400" i="1" dirty="0" smtClean="0">
+                <a:solidFill>
+                  <a:schemeClr val="bg1"/>
+                </a:solidFill>
+                <a:latin typeface="Comic Sans MS" panose="030F0902030302020204" pitchFamily="66" charset="0"/>
+              </a:rPr>
+              <a:t> </a:t>
+            </a:r>
+            <a:r>
+              <a:rPr lang="en-US" sz="1400" i="1" dirty="0" err="1" smtClean="0">
+                <a:solidFill>
+                  <a:schemeClr val="bg1"/>
+                </a:solidFill>
+                <a:latin typeface="Comic Sans MS" panose="030F0902030302020204" pitchFamily="66" charset="0"/>
+              </a:rPr>
+              <a:t>ekke</a:t>
+            </a:r>
+            <a:r>
+              <a:rPr lang="en-US" sz="1400" i="1" dirty="0" smtClean="0">
+                <a:solidFill>
+                  <a:schemeClr val="bg1"/>
+                </a:solidFill>
+                <a:latin typeface="Comic Sans MS" panose="030F0902030302020204" pitchFamily="66" charset="0"/>
+              </a:rPr>
+              <a:t> </a:t>
+            </a:r>
+            <a:r>
+              <a:rPr lang="en-US" sz="1400" i="1" dirty="0" err="1" smtClean="0">
+                <a:solidFill>
+                  <a:schemeClr val="bg1"/>
+                </a:solidFill>
+                <a:latin typeface="Comic Sans MS" panose="030F0902030302020204" pitchFamily="66" charset="0"/>
+              </a:rPr>
+              <a:t>ekvmevkevek</a:t>
+            </a:r>
+            <a:r>
+              <a:rPr lang="en-US" sz="1400" i="1" dirty="0" smtClean="0">
+                <a:solidFill>
+                  <a:schemeClr val="bg1"/>
+                </a:solidFill>
+                <a:latin typeface="Comic Sans MS" panose="030F0902030302020204" pitchFamily="66" charset="0"/>
+              </a:rPr>
+              <a:t> </a:t>
+            </a:r>
+            <a:r>
+              <a:rPr lang="en-US" sz="1400" i="1" dirty="0" err="1" smtClean="0">
+                <a:solidFill>
+                  <a:schemeClr val="bg1"/>
+                </a:solidFill>
+                <a:latin typeface="Comic Sans MS" panose="030F0902030302020204" pitchFamily="66" charset="0"/>
+              </a:rPr>
+              <a:t>ekgenbebe</a:t>
+            </a:r>
+            <a:r>
+              <a:rPr lang="en-US" sz="1400" i="1" dirty="0" smtClean="0">
+                <a:solidFill>
+                  <a:schemeClr val="bg1"/>
+                </a:solidFill>
+                <a:latin typeface="Comic Sans MS" panose="030F0902030302020204" pitchFamily="66" charset="0"/>
+              </a:rPr>
+              <a:t> </a:t>
+            </a:r>
+            <a:r>
+              <a:rPr lang="en-US" sz="1400" i="1" dirty="0" err="1" smtClean="0">
+                <a:solidFill>
+                  <a:schemeClr val="bg1"/>
+                </a:solidFill>
+                <a:latin typeface="Comic Sans MS" panose="030F0902030302020204" pitchFamily="66" charset="0"/>
+              </a:rPr>
+              <a:t>enbeobne</a:t>
+            </a:r>
+            <a:r>
+              <a:rPr lang="en-US" sz="1400" i="1" dirty="0" smtClean="0">
+                <a:solidFill>
+                  <a:schemeClr val="bg1"/>
+                </a:solidFill>
+                <a:latin typeface="Comic Sans MS" panose="030F0902030302020204" pitchFamily="66" charset="0"/>
+              </a:rPr>
+              <a:t> ne </a:t>
+            </a:r>
+            <a:r>
+              <a:rPr lang="en-US" sz="1400" i="1" dirty="0" err="1" smtClean="0">
+                <a:solidFill>
+                  <a:schemeClr val="bg1"/>
+                </a:solidFill>
+                <a:latin typeface="Comic Sans MS" panose="030F0902030302020204" pitchFamily="66" charset="0"/>
+              </a:rPr>
+              <a:t>ei</a:t>
+            </a:r>
+            <a:r>
+              <a:rPr lang="en-US" sz="1400" i="1" dirty="0" smtClean="0">
+                <a:solidFill>
+                  <a:schemeClr val="bg1"/>
+                </a:solidFill>
+                <a:latin typeface="Comic Sans MS" panose="030F0902030302020204" pitchFamily="66" charset="0"/>
+              </a:rPr>
+              <a:t> </a:t>
+            </a:r>
+            <a:r>
+              <a:rPr lang="en-US" sz="1400" i="1" dirty="0" err="1" smtClean="0">
+                <a:solidFill>
+                  <a:schemeClr val="bg1"/>
+                </a:solidFill>
+                <a:latin typeface="Comic Sans MS" panose="030F0902030302020204" pitchFamily="66" charset="0"/>
+              </a:rPr>
+              <a:t>nienvie</a:t>
+            </a:r>
+            <a:r>
+              <a:rPr lang="en-US" sz="1400" i="1" dirty="0" smtClean="0">
+                <a:solidFill>
+                  <a:schemeClr val="bg1"/>
+                </a:solidFill>
+                <a:latin typeface="Comic Sans MS" panose="030F0902030302020204" pitchFamily="66" charset="0"/>
+              </a:rPr>
+              <a:t> </a:t>
+            </a:r>
+            <a:r>
+              <a:rPr lang="en-US" sz="1400" i="1" dirty="0" err="1" smtClean="0">
+                <a:solidFill>
+                  <a:schemeClr val="bg1"/>
+                </a:solidFill>
+                <a:latin typeface="Comic Sans MS" panose="030F0902030302020204" pitchFamily="66" charset="0"/>
+              </a:rPr>
+              <a:t>eibienbie</a:t>
+            </a:r>
+            <a:endParaRPr lang="en-US" sz="1400" i="1" dirty="0">
+              <a:solidFill>
+                <a:schemeClr val="bg1"/>
+              </a:solidFill>
+              <a:latin typeface="Comic Sans MS" panose="030F0902030302020204" pitchFamily="66" charset="0"/>
+            </a:endParaRPr>
+          </a:p>
+        </p:txBody>
+      </p:sp>
+      <p:sp>
+        <p:nvSpPr>
+          <p:cNvPr id="9" name="TextBox 8">
+            <a:extLst>
+              <a:ext uri="{FF2B5EF4-FFF2-40B4-BE49-F238E27FC236}">
+                <a16:creationId xmlns:a16="http://schemas.microsoft.com/office/drawing/2014/main" xmlns="" id="{32820AB9-7CA6-8F41-A812-9F4C46331562}"/>
+              </a:ext>
+            </a:extLst>
+          </p:cNvPr>
+          <p:cNvSpPr txBox="1"/>
+          <p:nvPr/>
+        </p:nvSpPr>
+        <p:spPr>
+          <a:xfrm>
+            <a:off x="1418656" y="4274213"/>
+            <a:ext cx="9336110" cy="954107"/>
+          </a:xfrm>
+          <a:prstGeom prst="rect">
+            <a:avLst/>
+          </a:prstGeom>
+          <a:noFill/>
+          <a:ln>
+            <a:solidFill>
+              <a:schemeClr val="bg1"/>
+            </a:solidFill>
+          </a:ln>
+        </p:spPr>
+        <p:txBody>
+          <a:bodyPr wrap="square" rtlCol="0">
+            <a:spAutoFit/>
+          </a:bodyPr>
+          <a:lstStyle/>
+          <a:p>
+            <a:r>
+              <a:rPr lang="en-US" sz="1400" b="1" i="1" dirty="0" smtClean="0">
+                <a:solidFill>
+                  <a:schemeClr val="bg1"/>
+                </a:solidFill>
+                <a:latin typeface="Comic Sans MS" panose="030F0902030302020204" pitchFamily="66" charset="0"/>
+              </a:rPr>
+              <a:t>RESULTS</a:t>
+            </a:r>
+            <a:endParaRPr lang="en-US" sz="1400" b="1" i="1" dirty="0">
+              <a:solidFill>
+                <a:schemeClr val="bg1"/>
+              </a:solidFill>
+              <a:latin typeface="Comic Sans MS" panose="030F0902030302020204" pitchFamily="66" charset="0"/>
+            </a:endParaRPr>
+          </a:p>
+          <a:p>
+            <a:r>
+              <a:rPr lang="en-US" sz="1400" i="1" dirty="0" err="1">
+                <a:solidFill>
+                  <a:schemeClr val="bg1"/>
+                </a:solidFill>
+                <a:latin typeface="Comic Sans MS" panose="030F0902030302020204" pitchFamily="66" charset="0"/>
+              </a:rPr>
+              <a:t>Yueieier</a:t>
+            </a:r>
+            <a:r>
+              <a:rPr lang="en-US" sz="1400" i="1" dirty="0">
+                <a:solidFill>
+                  <a:schemeClr val="bg1"/>
+                </a:solidFill>
+                <a:latin typeface="Comic Sans MS" panose="030F0902030302020204" pitchFamily="66" charset="0"/>
+              </a:rPr>
+              <a:t> </a:t>
+            </a:r>
+            <a:r>
+              <a:rPr lang="en-US" sz="1400" i="1" dirty="0" err="1">
+                <a:solidFill>
+                  <a:schemeClr val="bg1"/>
+                </a:solidFill>
+                <a:latin typeface="Comic Sans MS" panose="030F0902030302020204" pitchFamily="66" charset="0"/>
+              </a:rPr>
+              <a:t>qofoqmqo</a:t>
+            </a:r>
+            <a:r>
+              <a:rPr lang="en-US" sz="1400" i="1" dirty="0">
+                <a:solidFill>
+                  <a:schemeClr val="bg1"/>
+                </a:solidFill>
+                <a:latin typeface="Comic Sans MS" panose="030F0902030302020204" pitchFamily="66" charset="0"/>
+              </a:rPr>
+              <a:t> </a:t>
+            </a:r>
+            <a:r>
+              <a:rPr lang="en-US" sz="1400" i="1" dirty="0" err="1">
+                <a:solidFill>
+                  <a:schemeClr val="bg1"/>
+                </a:solidFill>
+                <a:latin typeface="Comic Sans MS" panose="030F0902030302020204" pitchFamily="66" charset="0"/>
+              </a:rPr>
+              <a:t>miwmvwkvw</a:t>
+            </a:r>
+            <a:r>
+              <a:rPr lang="en-US" sz="1400" i="1" dirty="0">
+                <a:solidFill>
+                  <a:schemeClr val="bg1"/>
+                </a:solidFill>
+                <a:latin typeface="Comic Sans MS" panose="030F0902030302020204" pitchFamily="66" charset="0"/>
+              </a:rPr>
+              <a:t> w </a:t>
+            </a:r>
+            <a:r>
+              <a:rPr lang="en-US" sz="1400" i="1" dirty="0" err="1">
+                <a:solidFill>
+                  <a:schemeClr val="bg1"/>
+                </a:solidFill>
+                <a:latin typeface="Comic Sans MS" panose="030F0902030302020204" pitchFamily="66" charset="0"/>
+              </a:rPr>
+              <a:t>wi</a:t>
+            </a:r>
+            <a:r>
+              <a:rPr lang="en-US" sz="1400" i="1" dirty="0">
+                <a:solidFill>
+                  <a:schemeClr val="bg1"/>
+                </a:solidFill>
+                <a:latin typeface="Comic Sans MS" panose="030F0902030302020204" pitchFamily="66" charset="0"/>
+              </a:rPr>
+              <a:t> </a:t>
+            </a:r>
+            <a:r>
+              <a:rPr lang="en-US" sz="1400" i="1" dirty="0" err="1">
+                <a:solidFill>
+                  <a:schemeClr val="bg1"/>
+                </a:solidFill>
+                <a:latin typeface="Comic Sans MS" panose="030F0902030302020204" pitchFamily="66" charset="0"/>
+              </a:rPr>
+              <a:t>nwivnrwivwm</a:t>
+            </a:r>
+            <a:r>
+              <a:rPr lang="en-US" sz="1400" i="1" dirty="0">
+                <a:solidFill>
+                  <a:schemeClr val="bg1"/>
+                </a:solidFill>
+                <a:latin typeface="Comic Sans MS" panose="030F0902030302020204" pitchFamily="66" charset="0"/>
+              </a:rPr>
+              <a:t> </a:t>
+            </a:r>
+            <a:r>
+              <a:rPr lang="en-US" sz="1400" i="1" dirty="0" err="1">
+                <a:solidFill>
+                  <a:schemeClr val="bg1"/>
+                </a:solidFill>
+                <a:latin typeface="Comic Sans MS" panose="030F0902030302020204" pitchFamily="66" charset="0"/>
+              </a:rPr>
+              <a:t>iwvmwimv</a:t>
+            </a:r>
+            <a:r>
+              <a:rPr lang="en-US" sz="1400" i="1" dirty="0">
+                <a:solidFill>
+                  <a:schemeClr val="bg1"/>
+                </a:solidFill>
+                <a:latin typeface="Comic Sans MS" panose="030F0902030302020204" pitchFamily="66" charset="0"/>
+              </a:rPr>
+              <a:t> </a:t>
+            </a:r>
+            <a:r>
+              <a:rPr lang="en-US" sz="1400" i="1" dirty="0" err="1">
+                <a:solidFill>
+                  <a:schemeClr val="bg1"/>
+                </a:solidFill>
+                <a:latin typeface="Comic Sans MS" panose="030F0902030302020204" pitchFamily="66" charset="0"/>
+              </a:rPr>
+              <a:t>wovnrwiovnrwnvo</a:t>
+            </a:r>
+            <a:r>
+              <a:rPr lang="en-US" sz="1400" i="1" dirty="0">
+                <a:solidFill>
+                  <a:schemeClr val="bg1"/>
+                </a:solidFill>
+                <a:latin typeface="Comic Sans MS" panose="030F0902030302020204" pitchFamily="66" charset="0"/>
+              </a:rPr>
+              <a:t> </a:t>
+            </a:r>
+            <a:r>
+              <a:rPr lang="en-US" sz="1400" i="1" dirty="0" err="1">
+                <a:solidFill>
+                  <a:schemeClr val="bg1"/>
+                </a:solidFill>
+                <a:latin typeface="Comic Sans MS" panose="030F0902030302020204" pitchFamily="66" charset="0"/>
+              </a:rPr>
+              <a:t>nwornviorwnviorwmv</a:t>
+            </a:r>
+            <a:r>
+              <a:rPr lang="en-US" sz="1400" i="1" dirty="0">
+                <a:solidFill>
+                  <a:schemeClr val="bg1"/>
+                </a:solidFill>
+                <a:latin typeface="Comic Sans MS" panose="030F0902030302020204" pitchFamily="66" charset="0"/>
+              </a:rPr>
+              <a:t> </a:t>
+            </a:r>
+            <a:r>
+              <a:rPr lang="en-US" sz="1400" i="1" dirty="0" err="1">
+                <a:solidFill>
+                  <a:schemeClr val="bg1"/>
+                </a:solidFill>
+                <a:latin typeface="Comic Sans MS" panose="030F0902030302020204" pitchFamily="66" charset="0"/>
+              </a:rPr>
+              <a:t>wmdlvm</a:t>
+            </a:r>
+            <a:r>
+              <a:rPr lang="en-US" sz="1400" i="1" dirty="0">
+                <a:solidFill>
+                  <a:schemeClr val="bg1"/>
+                </a:solidFill>
+                <a:latin typeface="Comic Sans MS" panose="030F0902030302020204" pitchFamily="66" charset="0"/>
+              </a:rPr>
+              <a:t> </a:t>
+            </a:r>
+            <a:r>
+              <a:rPr lang="en-US" sz="1400" i="1" dirty="0" err="1">
+                <a:solidFill>
+                  <a:schemeClr val="bg1"/>
+                </a:solidFill>
+                <a:latin typeface="Comic Sans MS" panose="030F0902030302020204" pitchFamily="66" charset="0"/>
+              </a:rPr>
+              <a:t>wovmwi</a:t>
+            </a:r>
+            <a:r>
+              <a:rPr lang="en-US" sz="1400" i="1" dirty="0">
+                <a:solidFill>
+                  <a:schemeClr val="bg1"/>
+                </a:solidFill>
+                <a:latin typeface="Comic Sans MS" panose="030F0902030302020204" pitchFamily="66" charset="0"/>
+              </a:rPr>
+              <a:t> </a:t>
+            </a:r>
+            <a:r>
+              <a:rPr lang="en-US" sz="1400" i="1" dirty="0" err="1">
+                <a:solidFill>
+                  <a:schemeClr val="bg1"/>
+                </a:solidFill>
+                <a:latin typeface="Comic Sans MS" panose="030F0902030302020204" pitchFamily="66" charset="0"/>
+              </a:rPr>
+              <a:t>meiwvmwrmv</a:t>
+            </a:r>
+            <a:r>
+              <a:rPr lang="en-US" sz="1400" i="1" dirty="0">
+                <a:solidFill>
+                  <a:schemeClr val="bg1"/>
+                </a:solidFill>
+                <a:latin typeface="Comic Sans MS" panose="030F0902030302020204" pitchFamily="66" charset="0"/>
+              </a:rPr>
+              <a:t> </a:t>
+            </a:r>
+            <a:r>
+              <a:rPr lang="en-US" sz="1400" i="1" dirty="0" err="1">
+                <a:solidFill>
+                  <a:schemeClr val="bg1"/>
+                </a:solidFill>
+                <a:latin typeface="Comic Sans MS" panose="030F0902030302020204" pitchFamily="66" charset="0"/>
+              </a:rPr>
+              <a:t>wvmwvniwn</a:t>
+            </a:r>
+            <a:r>
+              <a:rPr lang="en-US" sz="1400" i="1" dirty="0">
+                <a:solidFill>
+                  <a:schemeClr val="bg1"/>
+                </a:solidFill>
+                <a:latin typeface="Comic Sans MS" panose="030F0902030302020204" pitchFamily="66" charset="0"/>
+              </a:rPr>
+              <a:t> </a:t>
+            </a:r>
+            <a:r>
+              <a:rPr lang="en-US" sz="1400" i="1" dirty="0" err="1">
+                <a:solidFill>
+                  <a:schemeClr val="bg1"/>
+                </a:solidFill>
+                <a:latin typeface="Comic Sans MS" panose="030F0902030302020204" pitchFamily="66" charset="0"/>
+              </a:rPr>
+              <a:t>wivrwv</a:t>
+            </a:r>
+            <a:r>
+              <a:rPr lang="en-US" sz="1400" i="1" dirty="0">
+                <a:solidFill>
+                  <a:schemeClr val="bg1"/>
+                </a:solidFill>
+                <a:latin typeface="Comic Sans MS" panose="030F0902030302020204" pitchFamily="66" charset="0"/>
+              </a:rPr>
+              <a:t> </a:t>
+            </a:r>
+            <a:r>
+              <a:rPr lang="en-US" sz="1400" i="1" dirty="0" err="1">
+                <a:solidFill>
+                  <a:schemeClr val="bg1"/>
+                </a:solidFill>
+                <a:latin typeface="Comic Sans MS" panose="030F0902030302020204" pitchFamily="66" charset="0"/>
+              </a:rPr>
+              <a:t>pwv</a:t>
+            </a:r>
+            <a:r>
+              <a:rPr lang="en-US" sz="1400" i="1" dirty="0">
+                <a:solidFill>
+                  <a:schemeClr val="bg1"/>
+                </a:solidFill>
+                <a:latin typeface="Comic Sans MS" panose="030F0902030302020204" pitchFamily="66" charset="0"/>
+              </a:rPr>
+              <a:t> </a:t>
+            </a:r>
+            <a:r>
+              <a:rPr lang="en-US" sz="1400" i="1" dirty="0" err="1">
+                <a:solidFill>
+                  <a:schemeClr val="bg1"/>
+                </a:solidFill>
+                <a:latin typeface="Comic Sans MS" panose="030F0902030302020204" pitchFamily="66" charset="0"/>
+              </a:rPr>
+              <a:t>pwvm</a:t>
+            </a:r>
+            <a:r>
+              <a:rPr lang="en-US" sz="1400" i="1" dirty="0">
+                <a:solidFill>
+                  <a:schemeClr val="bg1"/>
+                </a:solidFill>
+                <a:latin typeface="Comic Sans MS" panose="030F0902030302020204" pitchFamily="66" charset="0"/>
+              </a:rPr>
+              <a:t> </a:t>
+            </a:r>
+            <a:r>
+              <a:rPr lang="en-US" sz="1400" i="1" dirty="0" err="1">
+                <a:solidFill>
+                  <a:schemeClr val="bg1"/>
+                </a:solidFill>
+                <a:latin typeface="Comic Sans MS" panose="030F0902030302020204" pitchFamily="66" charset="0"/>
+              </a:rPr>
+              <a:t>pwmvwprvmprwm</a:t>
+            </a:r>
+            <a:r>
+              <a:rPr lang="en-US" sz="1400" i="1" dirty="0">
+                <a:solidFill>
+                  <a:schemeClr val="bg1"/>
+                </a:solidFill>
+                <a:latin typeface="Comic Sans MS" panose="030F0902030302020204" pitchFamily="66" charset="0"/>
+              </a:rPr>
+              <a:t> </a:t>
+            </a:r>
+            <a:r>
+              <a:rPr lang="en-US" sz="1400" i="1" dirty="0" err="1">
+                <a:solidFill>
+                  <a:schemeClr val="bg1"/>
+                </a:solidFill>
+                <a:latin typeface="Comic Sans MS" panose="030F0902030302020204" pitchFamily="66" charset="0"/>
+              </a:rPr>
+              <a:t>wrvmnrwnv</a:t>
+            </a:r>
+            <a:r>
+              <a:rPr lang="en-US" sz="1400" i="1" dirty="0">
+                <a:solidFill>
+                  <a:schemeClr val="bg1"/>
+                </a:solidFill>
+                <a:latin typeface="Comic Sans MS" panose="030F0902030302020204" pitchFamily="66" charset="0"/>
+              </a:rPr>
+              <a:t> </a:t>
+            </a:r>
+            <a:r>
+              <a:rPr lang="en-US" sz="1400" i="1" dirty="0" err="1">
+                <a:solidFill>
+                  <a:schemeClr val="bg1"/>
+                </a:solidFill>
+                <a:latin typeface="Comic Sans MS" panose="030F0902030302020204" pitchFamily="66" charset="0"/>
+              </a:rPr>
+              <a:t>rwnvirwnviw</a:t>
+            </a:r>
+            <a:r>
+              <a:rPr lang="en-US" sz="1400" i="1" dirty="0">
+                <a:solidFill>
+                  <a:schemeClr val="bg1"/>
+                </a:solidFill>
+                <a:latin typeface="Comic Sans MS" panose="030F0902030302020204" pitchFamily="66" charset="0"/>
+              </a:rPr>
+              <a:t> </a:t>
+            </a:r>
+            <a:r>
+              <a:rPr lang="en-US" sz="1400" i="1" dirty="0" err="1">
+                <a:solidFill>
+                  <a:schemeClr val="bg1"/>
+                </a:solidFill>
+                <a:latin typeface="Comic Sans MS" panose="030F0902030302020204" pitchFamily="66" charset="0"/>
+              </a:rPr>
+              <a:t>nviwnvior</a:t>
+            </a:r>
+            <a:r>
+              <a:rPr lang="en-US" sz="1400" i="1" dirty="0">
+                <a:solidFill>
+                  <a:schemeClr val="bg1"/>
+                </a:solidFill>
+                <a:latin typeface="Comic Sans MS" panose="030F0902030302020204" pitchFamily="66" charset="0"/>
+              </a:rPr>
+              <a:t>  </a:t>
+            </a:r>
+            <a:r>
+              <a:rPr lang="en-US" sz="1400" i="1" dirty="0" err="1">
+                <a:solidFill>
+                  <a:schemeClr val="bg1"/>
+                </a:solidFill>
+                <a:latin typeface="Comic Sans MS" panose="030F0902030302020204" pitchFamily="66" charset="0"/>
+              </a:rPr>
+              <a:t>wvnorwr</a:t>
+            </a:r>
+            <a:r>
+              <a:rPr lang="en-US" sz="1400" i="1" dirty="0">
+                <a:solidFill>
+                  <a:schemeClr val="bg1"/>
+                </a:solidFill>
+                <a:latin typeface="Comic Sans MS" panose="030F0902030302020204" pitchFamily="66" charset="0"/>
+              </a:rPr>
+              <a:t> </a:t>
+            </a:r>
+            <a:r>
+              <a:rPr lang="en-US" sz="1400" i="1" dirty="0" err="1">
+                <a:solidFill>
+                  <a:schemeClr val="bg1"/>
+                </a:solidFill>
+                <a:latin typeface="Comic Sans MS" panose="030F0902030302020204" pitchFamily="66" charset="0"/>
+              </a:rPr>
+              <a:t>vnior</a:t>
+            </a:r>
+            <a:r>
+              <a:rPr lang="en-US" sz="1400" i="1" dirty="0">
+                <a:solidFill>
+                  <a:schemeClr val="bg1"/>
+                </a:solidFill>
+                <a:latin typeface="Comic Sans MS" panose="030F0902030302020204" pitchFamily="66" charset="0"/>
+              </a:rPr>
+              <a:t> </a:t>
+            </a:r>
+            <a:r>
+              <a:rPr lang="en-US" sz="1400" i="1" dirty="0" err="1">
+                <a:solidFill>
+                  <a:schemeClr val="bg1"/>
+                </a:solidFill>
+                <a:latin typeface="Comic Sans MS" panose="030F0902030302020204" pitchFamily="66" charset="0"/>
+              </a:rPr>
+              <a:t>wnvwrivr</a:t>
+            </a:r>
+            <a:r>
+              <a:rPr lang="en-US" sz="1400" i="1" dirty="0">
+                <a:solidFill>
+                  <a:schemeClr val="bg1"/>
+                </a:solidFill>
+                <a:latin typeface="Comic Sans MS" panose="030F0902030302020204" pitchFamily="66" charset="0"/>
+              </a:rPr>
+              <a:t> </a:t>
+            </a:r>
+            <a:r>
+              <a:rPr lang="en-US" sz="1400" i="1" dirty="0" err="1">
+                <a:solidFill>
+                  <a:schemeClr val="bg1"/>
+                </a:solidFill>
+                <a:latin typeface="Comic Sans MS" panose="030F0902030302020204" pitchFamily="66" charset="0"/>
+              </a:rPr>
+              <a:t>wmvwiv</a:t>
+            </a:r>
+            <a:r>
+              <a:rPr lang="en-US" sz="1400" i="1" dirty="0">
+                <a:solidFill>
+                  <a:schemeClr val="bg1"/>
+                </a:solidFill>
+                <a:latin typeface="Comic Sans MS" panose="030F0902030302020204" pitchFamily="66" charset="0"/>
+              </a:rPr>
+              <a:t> </a:t>
+            </a:r>
+            <a:r>
+              <a:rPr lang="en-US" sz="1400" i="1" dirty="0" err="1">
+                <a:solidFill>
+                  <a:schemeClr val="bg1"/>
+                </a:solidFill>
+                <a:latin typeface="Comic Sans MS" panose="030F0902030302020204" pitchFamily="66" charset="0"/>
+              </a:rPr>
+              <a:t>mwek</a:t>
+            </a:r>
+            <a:r>
+              <a:rPr lang="en-US" sz="1400" i="1" dirty="0">
+                <a:solidFill>
+                  <a:schemeClr val="bg1"/>
+                </a:solidFill>
+                <a:latin typeface="Comic Sans MS" panose="030F0902030302020204" pitchFamily="66" charset="0"/>
+              </a:rPr>
+              <a:t> </a:t>
+            </a:r>
+            <a:r>
+              <a:rPr lang="en-US" sz="1400" i="1" dirty="0" err="1">
+                <a:solidFill>
+                  <a:schemeClr val="bg1"/>
+                </a:solidFill>
+                <a:latin typeface="Comic Sans MS" panose="030F0902030302020204" pitchFamily="66" charset="0"/>
+              </a:rPr>
+              <a:t>krekekv</a:t>
+            </a:r>
+            <a:r>
+              <a:rPr lang="en-US" sz="1400" i="1" dirty="0">
+                <a:solidFill>
+                  <a:schemeClr val="bg1"/>
+                </a:solidFill>
+                <a:latin typeface="Comic Sans MS" panose="030F0902030302020204" pitchFamily="66" charset="0"/>
+              </a:rPr>
+              <a:t> </a:t>
+            </a:r>
+            <a:r>
+              <a:rPr lang="en-US" sz="1400" i="1" dirty="0" err="1">
+                <a:solidFill>
+                  <a:schemeClr val="bg1"/>
+                </a:solidFill>
+                <a:latin typeface="Comic Sans MS" panose="030F0902030302020204" pitchFamily="66" charset="0"/>
+              </a:rPr>
+              <a:t>ekke</a:t>
+            </a:r>
+            <a:r>
+              <a:rPr lang="en-US" sz="1400" i="1" dirty="0">
+                <a:solidFill>
+                  <a:schemeClr val="bg1"/>
+                </a:solidFill>
+                <a:latin typeface="Comic Sans MS" panose="030F0902030302020204" pitchFamily="66" charset="0"/>
+              </a:rPr>
+              <a:t> </a:t>
+            </a:r>
+            <a:r>
+              <a:rPr lang="en-US" sz="1400" i="1" dirty="0" err="1">
+                <a:solidFill>
+                  <a:schemeClr val="bg1"/>
+                </a:solidFill>
+                <a:latin typeface="Comic Sans MS" panose="030F0902030302020204" pitchFamily="66" charset="0"/>
+              </a:rPr>
+              <a:t>ekvmevkevek</a:t>
+            </a:r>
+            <a:r>
+              <a:rPr lang="en-US" sz="1400" i="1" dirty="0">
+                <a:solidFill>
+                  <a:schemeClr val="bg1"/>
+                </a:solidFill>
+                <a:latin typeface="Comic Sans MS" panose="030F0902030302020204" pitchFamily="66" charset="0"/>
+              </a:rPr>
+              <a:t> </a:t>
+            </a:r>
+            <a:r>
+              <a:rPr lang="en-US" sz="1400" i="1" dirty="0" err="1">
+                <a:solidFill>
+                  <a:schemeClr val="bg1"/>
+                </a:solidFill>
+                <a:latin typeface="Comic Sans MS" panose="030F0902030302020204" pitchFamily="66" charset="0"/>
+              </a:rPr>
+              <a:t>ekgenbebe</a:t>
+            </a:r>
+            <a:r>
+              <a:rPr lang="en-US" sz="1400" i="1" dirty="0">
+                <a:solidFill>
+                  <a:schemeClr val="bg1"/>
+                </a:solidFill>
+                <a:latin typeface="Comic Sans MS" panose="030F0902030302020204" pitchFamily="66" charset="0"/>
+              </a:rPr>
+              <a:t> </a:t>
+            </a:r>
+            <a:r>
+              <a:rPr lang="en-US" sz="1400" i="1" dirty="0" err="1">
+                <a:solidFill>
+                  <a:schemeClr val="bg1"/>
+                </a:solidFill>
+                <a:latin typeface="Comic Sans MS" panose="030F0902030302020204" pitchFamily="66" charset="0"/>
+              </a:rPr>
+              <a:t>enbeobne</a:t>
+            </a:r>
+            <a:r>
+              <a:rPr lang="en-US" sz="1400" i="1" dirty="0">
+                <a:solidFill>
+                  <a:schemeClr val="bg1"/>
+                </a:solidFill>
+                <a:latin typeface="Comic Sans MS" panose="030F0902030302020204" pitchFamily="66" charset="0"/>
+              </a:rPr>
+              <a:t> ne </a:t>
+            </a:r>
+            <a:r>
+              <a:rPr lang="en-US" sz="1400" i="1" dirty="0" err="1">
+                <a:solidFill>
+                  <a:schemeClr val="bg1"/>
+                </a:solidFill>
+                <a:latin typeface="Comic Sans MS" panose="030F0902030302020204" pitchFamily="66" charset="0"/>
+              </a:rPr>
+              <a:t>ei</a:t>
+            </a:r>
+            <a:r>
+              <a:rPr lang="en-US" sz="1400" i="1" dirty="0">
+                <a:solidFill>
+                  <a:schemeClr val="bg1"/>
+                </a:solidFill>
+                <a:latin typeface="Comic Sans MS" panose="030F0902030302020204" pitchFamily="66" charset="0"/>
+              </a:rPr>
+              <a:t> </a:t>
+            </a:r>
+            <a:r>
+              <a:rPr lang="en-US" sz="1400" i="1" dirty="0" err="1">
+                <a:solidFill>
+                  <a:schemeClr val="bg1"/>
+                </a:solidFill>
+                <a:latin typeface="Comic Sans MS" panose="030F0902030302020204" pitchFamily="66" charset="0"/>
+              </a:rPr>
+              <a:t>nienvie</a:t>
+            </a:r>
+            <a:r>
+              <a:rPr lang="en-US" sz="1400" i="1" dirty="0">
+                <a:solidFill>
+                  <a:schemeClr val="bg1"/>
+                </a:solidFill>
+                <a:latin typeface="Comic Sans MS" panose="030F0902030302020204" pitchFamily="66" charset="0"/>
+              </a:rPr>
+              <a:t> </a:t>
+            </a:r>
+            <a:r>
+              <a:rPr lang="en-US" sz="1400" i="1" dirty="0" err="1" smtClean="0">
+                <a:solidFill>
+                  <a:schemeClr val="bg1"/>
+                </a:solidFill>
+                <a:latin typeface="Comic Sans MS" panose="030F0902030302020204" pitchFamily="66" charset="0"/>
+              </a:rPr>
+              <a:t>eibienbie</a:t>
+            </a:r>
+            <a:endParaRPr lang="en-US" sz="1400" i="1" dirty="0">
+              <a:solidFill>
+                <a:schemeClr val="bg1"/>
+              </a:solidFill>
+              <a:latin typeface="Comic Sans MS" panose="030F0902030302020204" pitchFamily="66" charset="0"/>
+            </a:endParaRPr>
+          </a:p>
+        </p:txBody>
+      </p:sp>
+      <p:sp>
+        <p:nvSpPr>
+          <p:cNvPr id="10" name="TextBox 9">
+            <a:extLst>
+              <a:ext uri="{FF2B5EF4-FFF2-40B4-BE49-F238E27FC236}">
+                <a16:creationId xmlns:a16="http://schemas.microsoft.com/office/drawing/2014/main" xmlns="" id="{32820AB9-7CA6-8F41-A812-9F4C46331562}"/>
+              </a:ext>
+            </a:extLst>
+          </p:cNvPr>
+          <p:cNvSpPr txBox="1"/>
+          <p:nvPr/>
+        </p:nvSpPr>
+        <p:spPr>
+          <a:xfrm>
+            <a:off x="1418656" y="5323569"/>
+            <a:ext cx="9336110" cy="1600438"/>
+          </a:xfrm>
+          <a:prstGeom prst="rect">
+            <a:avLst/>
+          </a:prstGeom>
+          <a:noFill/>
+          <a:ln>
+            <a:solidFill>
+              <a:schemeClr val="bg1"/>
+            </a:solidFill>
+          </a:ln>
+        </p:spPr>
+        <p:txBody>
+          <a:bodyPr wrap="square" rtlCol="0">
+            <a:spAutoFit/>
+          </a:bodyPr>
+          <a:lstStyle/>
+          <a:p>
+            <a:pPr algn="l"/>
+            <a:r>
+              <a:rPr lang="en-US" sz="1400" i="1" dirty="0" smtClean="0">
+                <a:solidFill>
+                  <a:schemeClr val="bg1"/>
+                </a:solidFill>
+                <a:latin typeface="Comic Sans MS" panose="030F0902030302020204" pitchFamily="66" charset="0"/>
+              </a:rPr>
+              <a:t>COMMENTS</a:t>
+            </a:r>
+          </a:p>
+          <a:p>
+            <a:pPr algn="l"/>
+            <a:endParaRPr lang="en-US" sz="1400" i="1" dirty="0">
+              <a:solidFill>
+                <a:schemeClr val="bg1"/>
+              </a:solidFill>
+              <a:latin typeface="Comic Sans MS" panose="030F0902030302020204" pitchFamily="66" charset="0"/>
+            </a:endParaRPr>
+          </a:p>
+          <a:p>
+            <a:pPr algn="l"/>
+            <a:endParaRPr lang="en-US" sz="1400" i="1" dirty="0" smtClean="0">
+              <a:solidFill>
+                <a:schemeClr val="bg1"/>
+              </a:solidFill>
+              <a:latin typeface="Comic Sans MS" panose="030F0902030302020204" pitchFamily="66" charset="0"/>
+            </a:endParaRPr>
+          </a:p>
+          <a:p>
+            <a:pPr algn="l"/>
+            <a:endParaRPr lang="en-US" sz="1400" i="1" dirty="0">
+              <a:solidFill>
+                <a:schemeClr val="bg1"/>
+              </a:solidFill>
+              <a:latin typeface="Comic Sans MS" panose="030F0902030302020204" pitchFamily="66" charset="0"/>
+            </a:endParaRPr>
+          </a:p>
+          <a:p>
+            <a:pPr algn="l"/>
+            <a:endParaRPr lang="en-US" sz="1400" i="1" dirty="0" smtClean="0">
+              <a:solidFill>
+                <a:schemeClr val="bg1"/>
+              </a:solidFill>
+              <a:latin typeface="Comic Sans MS" panose="030F0902030302020204" pitchFamily="66" charset="0"/>
+            </a:endParaRPr>
+          </a:p>
+          <a:p>
+            <a:pPr algn="l"/>
+            <a:endParaRPr lang="en-US" sz="1400" i="1" dirty="0" smtClean="0">
+              <a:solidFill>
+                <a:schemeClr val="bg1"/>
+              </a:solidFill>
+              <a:latin typeface="Comic Sans MS" panose="030F0902030302020204" pitchFamily="66" charset="0"/>
+            </a:endParaRPr>
+          </a:p>
+          <a:p>
+            <a:pPr algn="l"/>
+            <a:endParaRPr lang="en-US" sz="1400" i="1" dirty="0">
+              <a:solidFill>
+                <a:schemeClr val="bg1"/>
+              </a:solidFill>
+              <a:latin typeface="Comic Sans MS" panose="030F0902030302020204" pitchFamily="66" charset="0"/>
+            </a:endParaRPr>
+          </a:p>
+        </p:txBody>
+      </p:sp>
+      <p:sp>
+        <p:nvSpPr>
+          <p:cNvPr id="11" name="Rectangle 10">
+            <a:extLst>
+              <a:ext uri="{FF2B5EF4-FFF2-40B4-BE49-F238E27FC236}">
+                <a16:creationId xmlns:a16="http://schemas.microsoft.com/office/drawing/2014/main" xmlns="" id="{61CD5799-7FC2-F04C-ADCF-330CB97C8DA9}"/>
+              </a:ext>
+            </a:extLst>
+          </p:cNvPr>
+          <p:cNvSpPr/>
+          <p:nvPr/>
+        </p:nvSpPr>
+        <p:spPr>
+          <a:xfrm>
+            <a:off x="7548877" y="870277"/>
+            <a:ext cx="3459549" cy="344384"/>
+          </a:xfrm>
+          <a:prstGeom prst="rect">
+            <a:avLst/>
+          </a:prstGeom>
+          <a:solidFill>
+            <a:schemeClr val="bg1"/>
+          </a:solidFill>
+          <a:ln>
+            <a:noFill/>
+          </a:ln>
+        </p:spPr>
+        <p:style>
+          <a:lnRef idx="2">
+            <a:schemeClr val="accent1">
+              <a:shade val="50000"/>
+            </a:schemeClr>
+          </a:lnRef>
+          <a:fillRef idx="1">
+            <a:schemeClr val="accent1"/>
+          </a:fillRef>
+          <a:effectRef idx="0">
+            <a:schemeClr val="accent1"/>
+          </a:effectRef>
+          <a:fontRef idx="minor">
+            <a:schemeClr val="lt1"/>
+          </a:fontRef>
+        </p:style>
+        <p:txBody>
+          <a:bodyPr rtlCol="0" anchor="ctr"/>
+          <a:lstStyle/>
+          <a:p>
+            <a:r>
+              <a:rPr lang="en-US" sz="1400" dirty="0" smtClean="0">
+                <a:solidFill>
+                  <a:schemeClr val="tx1"/>
+                </a:solidFill>
+                <a:latin typeface="Comic Sans MS" panose="030F0902030302020204" pitchFamily="66" charset="0"/>
+              </a:rPr>
+              <a:t>		              Sign-In</a:t>
+            </a:r>
+            <a:endParaRPr lang="en-US" sz="1400" dirty="0">
+              <a:solidFill>
+                <a:schemeClr val="tx1"/>
+              </a:solidFill>
+              <a:latin typeface="Comic Sans MS" panose="030F0902030302020204" pitchFamily="66" charset="0"/>
+            </a:endParaRPr>
+          </a:p>
+        </p:txBody>
+      </p:sp>
+      <p:sp>
+        <p:nvSpPr>
+          <p:cNvPr id="12" name="TextBox 11">
+            <a:extLst>
+              <a:ext uri="{FF2B5EF4-FFF2-40B4-BE49-F238E27FC236}">
+                <a16:creationId xmlns:a16="http://schemas.microsoft.com/office/drawing/2014/main" xmlns="" id="{32820AB9-7CA6-8F41-A812-9F4C46331562}"/>
+              </a:ext>
+            </a:extLst>
+          </p:cNvPr>
+          <p:cNvSpPr txBox="1"/>
+          <p:nvPr/>
+        </p:nvSpPr>
+        <p:spPr>
+          <a:xfrm>
+            <a:off x="1898882" y="5740985"/>
+            <a:ext cx="1192748" cy="1169551"/>
+          </a:xfrm>
+          <a:prstGeom prst="rect">
+            <a:avLst/>
+          </a:prstGeom>
+          <a:noFill/>
+          <a:ln>
+            <a:solidFill>
+              <a:schemeClr val="bg1"/>
+            </a:solidFill>
+          </a:ln>
+        </p:spPr>
+        <p:txBody>
+          <a:bodyPr wrap="square" rtlCol="0">
+            <a:spAutoFit/>
+          </a:bodyPr>
+          <a:lstStyle/>
+          <a:p>
+            <a:pPr algn="l"/>
+            <a:r>
+              <a:rPr lang="en-US" sz="1400" i="1" dirty="0" smtClean="0">
+                <a:solidFill>
+                  <a:schemeClr val="bg1"/>
+                </a:solidFill>
+                <a:latin typeface="Comic Sans MS" panose="030F0902030302020204" pitchFamily="66" charset="0"/>
+              </a:rPr>
+              <a:t>User1</a:t>
+            </a:r>
+          </a:p>
+          <a:p>
+            <a:pPr algn="l"/>
+            <a:r>
+              <a:rPr lang="en-US" sz="1400" i="1" dirty="0" smtClean="0">
+                <a:solidFill>
+                  <a:schemeClr val="bg1"/>
+                </a:solidFill>
+                <a:latin typeface="Comic Sans MS" panose="030F0902030302020204" pitchFamily="66" charset="0"/>
+              </a:rPr>
+              <a:t>“</a:t>
+            </a:r>
+            <a:r>
+              <a:rPr lang="en-US" sz="1400" i="1" dirty="0" err="1" smtClean="0">
+                <a:solidFill>
+                  <a:schemeClr val="bg1"/>
+                </a:solidFill>
+                <a:latin typeface="Comic Sans MS" panose="030F0902030302020204" pitchFamily="66" charset="0"/>
+              </a:rPr>
+              <a:t>heheifie</a:t>
+            </a:r>
+            <a:r>
+              <a:rPr lang="en-US" sz="1400" i="1" dirty="0" smtClean="0">
+                <a:solidFill>
+                  <a:schemeClr val="bg1"/>
+                </a:solidFill>
+                <a:latin typeface="Comic Sans MS" panose="030F0902030302020204" pitchFamily="66" charset="0"/>
+              </a:rPr>
+              <a:t> </a:t>
+            </a:r>
+            <a:r>
+              <a:rPr lang="en-US" sz="1400" i="1" dirty="0" err="1" smtClean="0">
+                <a:solidFill>
+                  <a:schemeClr val="bg1"/>
+                </a:solidFill>
+                <a:latin typeface="Comic Sans MS" panose="030F0902030302020204" pitchFamily="66" charset="0"/>
+              </a:rPr>
+              <a:t>eievneiv</a:t>
+            </a:r>
+            <a:r>
+              <a:rPr lang="en-US" sz="1400" i="1" dirty="0" smtClean="0">
+                <a:solidFill>
+                  <a:schemeClr val="bg1"/>
+                </a:solidFill>
+                <a:latin typeface="Comic Sans MS" panose="030F0902030302020204" pitchFamily="66" charset="0"/>
+              </a:rPr>
+              <a:t> </a:t>
+            </a:r>
+            <a:r>
+              <a:rPr lang="en-US" sz="1400" i="1" dirty="0" err="1" smtClean="0">
+                <a:solidFill>
+                  <a:schemeClr val="bg1"/>
+                </a:solidFill>
+                <a:latin typeface="Comic Sans MS" panose="030F0902030302020204" pitchFamily="66" charset="0"/>
+              </a:rPr>
+              <a:t>einveev</a:t>
+            </a:r>
+            <a:r>
+              <a:rPr lang="en-US" sz="1400" i="1" dirty="0" smtClean="0">
+                <a:solidFill>
+                  <a:schemeClr val="bg1"/>
+                </a:solidFill>
+                <a:latin typeface="Comic Sans MS" panose="030F0902030302020204" pitchFamily="66" charset="0"/>
+              </a:rPr>
+              <a:t>”</a:t>
+            </a:r>
+          </a:p>
+          <a:p>
+            <a:pPr algn="l"/>
+            <a:r>
+              <a:rPr lang="en-US" sz="1400" i="1" dirty="0" smtClean="0">
+                <a:solidFill>
+                  <a:schemeClr val="bg1"/>
+                </a:solidFill>
+                <a:latin typeface="Comic Sans MS" panose="030F0902030302020204" pitchFamily="66" charset="0"/>
+              </a:rPr>
+              <a:t>Rating</a:t>
+            </a:r>
+            <a:endParaRPr lang="en-US" sz="1400" i="1" dirty="0">
+              <a:solidFill>
+                <a:schemeClr val="bg1"/>
+              </a:solidFill>
+              <a:latin typeface="Comic Sans MS" panose="030F0902030302020204" pitchFamily="66" charset="0"/>
+            </a:endParaRPr>
+          </a:p>
+        </p:txBody>
+      </p:sp>
+      <p:sp>
+        <p:nvSpPr>
+          <p:cNvPr id="13" name="TextBox 12">
+            <a:extLst>
+              <a:ext uri="{FF2B5EF4-FFF2-40B4-BE49-F238E27FC236}">
+                <a16:creationId xmlns:a16="http://schemas.microsoft.com/office/drawing/2014/main" xmlns="" id="{32820AB9-7CA6-8F41-A812-9F4C46331562}"/>
+              </a:ext>
+            </a:extLst>
+          </p:cNvPr>
+          <p:cNvSpPr txBox="1"/>
+          <p:nvPr/>
+        </p:nvSpPr>
+        <p:spPr>
+          <a:xfrm>
+            <a:off x="3765073" y="5688449"/>
+            <a:ext cx="1192748" cy="1169551"/>
+          </a:xfrm>
+          <a:prstGeom prst="rect">
+            <a:avLst/>
+          </a:prstGeom>
+          <a:noFill/>
+          <a:ln>
+            <a:solidFill>
+              <a:schemeClr val="bg1"/>
+            </a:solidFill>
+          </a:ln>
+        </p:spPr>
+        <p:txBody>
+          <a:bodyPr wrap="square" rtlCol="0">
+            <a:spAutoFit/>
+          </a:bodyPr>
+          <a:lstStyle/>
+          <a:p>
+            <a:r>
+              <a:rPr lang="en-US" sz="1400" i="1" dirty="0" smtClean="0">
+                <a:solidFill>
+                  <a:schemeClr val="bg1"/>
+                </a:solidFill>
+                <a:latin typeface="Comic Sans MS" panose="030F0902030302020204" pitchFamily="66" charset="0"/>
+              </a:rPr>
+              <a:t>User2</a:t>
+            </a:r>
+            <a:endParaRPr lang="en-US" sz="1400" i="1" dirty="0">
+              <a:solidFill>
+                <a:schemeClr val="bg1"/>
+              </a:solidFill>
+              <a:latin typeface="Comic Sans MS" panose="030F0902030302020204" pitchFamily="66" charset="0"/>
+            </a:endParaRPr>
+          </a:p>
+          <a:p>
+            <a:r>
+              <a:rPr lang="en-US" sz="1400" i="1" dirty="0">
+                <a:solidFill>
+                  <a:schemeClr val="bg1"/>
+                </a:solidFill>
+                <a:latin typeface="Comic Sans MS" panose="030F0902030302020204" pitchFamily="66" charset="0"/>
+              </a:rPr>
+              <a:t>“</a:t>
+            </a:r>
+            <a:r>
+              <a:rPr lang="en-US" sz="1400" i="1" dirty="0" err="1">
+                <a:solidFill>
+                  <a:schemeClr val="bg1"/>
+                </a:solidFill>
+                <a:latin typeface="Comic Sans MS" panose="030F0902030302020204" pitchFamily="66" charset="0"/>
+              </a:rPr>
+              <a:t>heheifie</a:t>
+            </a:r>
+            <a:r>
+              <a:rPr lang="en-US" sz="1400" i="1" dirty="0">
+                <a:solidFill>
+                  <a:schemeClr val="bg1"/>
+                </a:solidFill>
+                <a:latin typeface="Comic Sans MS" panose="030F0902030302020204" pitchFamily="66" charset="0"/>
+              </a:rPr>
+              <a:t> </a:t>
+            </a:r>
+            <a:r>
+              <a:rPr lang="en-US" sz="1400" i="1" dirty="0" err="1">
+                <a:solidFill>
+                  <a:schemeClr val="bg1"/>
+                </a:solidFill>
+                <a:latin typeface="Comic Sans MS" panose="030F0902030302020204" pitchFamily="66" charset="0"/>
+              </a:rPr>
+              <a:t>eievneiv</a:t>
+            </a:r>
+            <a:r>
+              <a:rPr lang="en-US" sz="1400" i="1" dirty="0">
+                <a:solidFill>
+                  <a:schemeClr val="bg1"/>
+                </a:solidFill>
+                <a:latin typeface="Comic Sans MS" panose="030F0902030302020204" pitchFamily="66" charset="0"/>
+              </a:rPr>
+              <a:t> </a:t>
+            </a:r>
+            <a:r>
+              <a:rPr lang="en-US" sz="1400" i="1" dirty="0" err="1">
+                <a:solidFill>
+                  <a:schemeClr val="bg1"/>
+                </a:solidFill>
+                <a:latin typeface="Comic Sans MS" panose="030F0902030302020204" pitchFamily="66" charset="0"/>
+              </a:rPr>
+              <a:t>einveev</a:t>
+            </a:r>
+            <a:r>
+              <a:rPr lang="en-US" sz="1400" i="1" dirty="0">
+                <a:solidFill>
+                  <a:schemeClr val="bg1"/>
+                </a:solidFill>
+                <a:latin typeface="Comic Sans MS" panose="030F0902030302020204" pitchFamily="66" charset="0"/>
+              </a:rPr>
+              <a:t>”</a:t>
+            </a:r>
+          </a:p>
+          <a:p>
+            <a:r>
+              <a:rPr lang="en-US" sz="1400" i="1" dirty="0">
+                <a:solidFill>
+                  <a:schemeClr val="bg1"/>
+                </a:solidFill>
+                <a:latin typeface="Comic Sans MS" panose="030F0902030302020204" pitchFamily="66" charset="0"/>
+              </a:rPr>
+              <a:t>Rating</a:t>
+            </a:r>
+            <a:endParaRPr lang="en-US" sz="1400" i="1" dirty="0">
+              <a:solidFill>
+                <a:schemeClr val="bg1"/>
+              </a:solidFill>
+              <a:latin typeface="Comic Sans MS" panose="030F0902030302020204" pitchFamily="66" charset="0"/>
+            </a:endParaRPr>
+          </a:p>
+        </p:txBody>
+      </p:sp>
+      <p:sp>
+        <p:nvSpPr>
+          <p:cNvPr id="14" name="TextBox 13">
+            <a:extLst>
+              <a:ext uri="{FF2B5EF4-FFF2-40B4-BE49-F238E27FC236}">
+                <a16:creationId xmlns:a16="http://schemas.microsoft.com/office/drawing/2014/main" xmlns="" id="{32820AB9-7CA6-8F41-A812-9F4C46331562}"/>
+              </a:ext>
+            </a:extLst>
+          </p:cNvPr>
+          <p:cNvSpPr txBox="1"/>
+          <p:nvPr/>
+        </p:nvSpPr>
+        <p:spPr>
+          <a:xfrm>
+            <a:off x="5672233" y="5688449"/>
+            <a:ext cx="1192748" cy="1169551"/>
+          </a:xfrm>
+          <a:prstGeom prst="rect">
+            <a:avLst/>
+          </a:prstGeom>
+          <a:noFill/>
+          <a:ln>
+            <a:solidFill>
+              <a:schemeClr val="bg1"/>
+            </a:solidFill>
+          </a:ln>
+        </p:spPr>
+        <p:txBody>
+          <a:bodyPr wrap="square" rtlCol="0">
+            <a:spAutoFit/>
+          </a:bodyPr>
+          <a:lstStyle/>
+          <a:p>
+            <a:r>
+              <a:rPr lang="en-US" sz="1400" i="1" dirty="0" smtClean="0">
+                <a:solidFill>
+                  <a:schemeClr val="bg1"/>
+                </a:solidFill>
+                <a:latin typeface="Comic Sans MS" panose="030F0902030302020204" pitchFamily="66" charset="0"/>
+              </a:rPr>
+              <a:t>User3</a:t>
+            </a:r>
+            <a:endParaRPr lang="en-US" sz="1400" i="1" dirty="0">
+              <a:solidFill>
+                <a:schemeClr val="bg1"/>
+              </a:solidFill>
+              <a:latin typeface="Comic Sans MS" panose="030F0902030302020204" pitchFamily="66" charset="0"/>
+            </a:endParaRPr>
+          </a:p>
+          <a:p>
+            <a:r>
+              <a:rPr lang="en-US" sz="1400" i="1" dirty="0">
+                <a:solidFill>
+                  <a:schemeClr val="bg1"/>
+                </a:solidFill>
+                <a:latin typeface="Comic Sans MS" panose="030F0902030302020204" pitchFamily="66" charset="0"/>
+              </a:rPr>
+              <a:t>“</a:t>
+            </a:r>
+            <a:r>
+              <a:rPr lang="en-US" sz="1400" i="1" dirty="0" err="1">
+                <a:solidFill>
+                  <a:schemeClr val="bg1"/>
+                </a:solidFill>
+                <a:latin typeface="Comic Sans MS" panose="030F0902030302020204" pitchFamily="66" charset="0"/>
+              </a:rPr>
+              <a:t>heheifie</a:t>
+            </a:r>
+            <a:r>
+              <a:rPr lang="en-US" sz="1400" i="1" dirty="0">
+                <a:solidFill>
+                  <a:schemeClr val="bg1"/>
+                </a:solidFill>
+                <a:latin typeface="Comic Sans MS" panose="030F0902030302020204" pitchFamily="66" charset="0"/>
+              </a:rPr>
+              <a:t> </a:t>
+            </a:r>
+            <a:r>
+              <a:rPr lang="en-US" sz="1400" i="1" dirty="0" err="1">
+                <a:solidFill>
+                  <a:schemeClr val="bg1"/>
+                </a:solidFill>
+                <a:latin typeface="Comic Sans MS" panose="030F0902030302020204" pitchFamily="66" charset="0"/>
+              </a:rPr>
+              <a:t>eievneiv</a:t>
+            </a:r>
+            <a:r>
+              <a:rPr lang="en-US" sz="1400" i="1" dirty="0">
+                <a:solidFill>
+                  <a:schemeClr val="bg1"/>
+                </a:solidFill>
+                <a:latin typeface="Comic Sans MS" panose="030F0902030302020204" pitchFamily="66" charset="0"/>
+              </a:rPr>
+              <a:t> </a:t>
+            </a:r>
+            <a:r>
+              <a:rPr lang="en-US" sz="1400" i="1" dirty="0" err="1">
+                <a:solidFill>
+                  <a:schemeClr val="bg1"/>
+                </a:solidFill>
+                <a:latin typeface="Comic Sans MS" panose="030F0902030302020204" pitchFamily="66" charset="0"/>
+              </a:rPr>
+              <a:t>einveev</a:t>
+            </a:r>
+            <a:r>
+              <a:rPr lang="en-US" sz="1400" i="1" dirty="0">
+                <a:solidFill>
+                  <a:schemeClr val="bg1"/>
+                </a:solidFill>
+                <a:latin typeface="Comic Sans MS" panose="030F0902030302020204" pitchFamily="66" charset="0"/>
+              </a:rPr>
+              <a:t>”</a:t>
+            </a:r>
+          </a:p>
+          <a:p>
+            <a:r>
+              <a:rPr lang="en-US" sz="1400" i="1" dirty="0">
+                <a:solidFill>
+                  <a:schemeClr val="bg1"/>
+                </a:solidFill>
+                <a:latin typeface="Comic Sans MS" panose="030F0902030302020204" pitchFamily="66" charset="0"/>
+              </a:rPr>
+              <a:t>Rating</a:t>
+            </a:r>
+            <a:endParaRPr lang="en-US" sz="1400" i="1" dirty="0">
+              <a:solidFill>
+                <a:schemeClr val="bg1"/>
+              </a:solidFill>
+              <a:latin typeface="Comic Sans MS" panose="030F0902030302020204" pitchFamily="66" charset="0"/>
+            </a:endParaRPr>
+          </a:p>
+        </p:txBody>
+      </p:sp>
+      <p:sp>
+        <p:nvSpPr>
+          <p:cNvPr id="15" name="TextBox 14">
+            <a:extLst>
+              <a:ext uri="{FF2B5EF4-FFF2-40B4-BE49-F238E27FC236}">
+                <a16:creationId xmlns:a16="http://schemas.microsoft.com/office/drawing/2014/main" xmlns="" id="{32820AB9-7CA6-8F41-A812-9F4C46331562}"/>
+              </a:ext>
+            </a:extLst>
+          </p:cNvPr>
+          <p:cNvSpPr txBox="1"/>
+          <p:nvPr/>
+        </p:nvSpPr>
+        <p:spPr>
+          <a:xfrm>
+            <a:off x="7452410" y="5686907"/>
+            <a:ext cx="1192748" cy="1169551"/>
+          </a:xfrm>
+          <a:prstGeom prst="rect">
+            <a:avLst/>
+          </a:prstGeom>
+          <a:noFill/>
+          <a:ln>
+            <a:solidFill>
+              <a:schemeClr val="bg1"/>
+            </a:solidFill>
+          </a:ln>
+        </p:spPr>
+        <p:txBody>
+          <a:bodyPr wrap="square" rtlCol="0">
+            <a:spAutoFit/>
+          </a:bodyPr>
+          <a:lstStyle/>
+          <a:p>
+            <a:r>
+              <a:rPr lang="en-US" sz="1400" i="1" dirty="0" smtClean="0">
+                <a:solidFill>
+                  <a:schemeClr val="bg1"/>
+                </a:solidFill>
+                <a:latin typeface="Comic Sans MS" panose="030F0902030302020204" pitchFamily="66" charset="0"/>
+              </a:rPr>
+              <a:t>User4</a:t>
+            </a:r>
+            <a:endParaRPr lang="en-US" sz="1400" i="1" dirty="0">
+              <a:solidFill>
+                <a:schemeClr val="bg1"/>
+              </a:solidFill>
+              <a:latin typeface="Comic Sans MS" panose="030F0902030302020204" pitchFamily="66" charset="0"/>
+            </a:endParaRPr>
+          </a:p>
+          <a:p>
+            <a:r>
+              <a:rPr lang="en-US" sz="1400" i="1" dirty="0">
+                <a:solidFill>
+                  <a:schemeClr val="bg1"/>
+                </a:solidFill>
+                <a:latin typeface="Comic Sans MS" panose="030F0902030302020204" pitchFamily="66" charset="0"/>
+              </a:rPr>
+              <a:t>“</a:t>
+            </a:r>
+            <a:r>
+              <a:rPr lang="en-US" sz="1400" i="1" dirty="0" err="1">
+                <a:solidFill>
+                  <a:schemeClr val="bg1"/>
+                </a:solidFill>
+                <a:latin typeface="Comic Sans MS" panose="030F0902030302020204" pitchFamily="66" charset="0"/>
+              </a:rPr>
+              <a:t>heheifie</a:t>
+            </a:r>
+            <a:r>
+              <a:rPr lang="en-US" sz="1400" i="1" dirty="0">
+                <a:solidFill>
+                  <a:schemeClr val="bg1"/>
+                </a:solidFill>
+                <a:latin typeface="Comic Sans MS" panose="030F0902030302020204" pitchFamily="66" charset="0"/>
+              </a:rPr>
+              <a:t> </a:t>
+            </a:r>
+            <a:r>
+              <a:rPr lang="en-US" sz="1400" i="1" dirty="0" err="1">
+                <a:solidFill>
+                  <a:schemeClr val="bg1"/>
+                </a:solidFill>
+                <a:latin typeface="Comic Sans MS" panose="030F0902030302020204" pitchFamily="66" charset="0"/>
+              </a:rPr>
+              <a:t>eievneiv</a:t>
+            </a:r>
+            <a:r>
+              <a:rPr lang="en-US" sz="1400" i="1" dirty="0">
+                <a:solidFill>
+                  <a:schemeClr val="bg1"/>
+                </a:solidFill>
+                <a:latin typeface="Comic Sans MS" panose="030F0902030302020204" pitchFamily="66" charset="0"/>
+              </a:rPr>
+              <a:t> </a:t>
+            </a:r>
+            <a:r>
+              <a:rPr lang="en-US" sz="1400" i="1" dirty="0" err="1">
+                <a:solidFill>
+                  <a:schemeClr val="bg1"/>
+                </a:solidFill>
+                <a:latin typeface="Comic Sans MS" panose="030F0902030302020204" pitchFamily="66" charset="0"/>
+              </a:rPr>
+              <a:t>einveev</a:t>
+            </a:r>
+            <a:r>
+              <a:rPr lang="en-US" sz="1400" i="1" dirty="0">
+                <a:solidFill>
+                  <a:schemeClr val="bg1"/>
+                </a:solidFill>
+                <a:latin typeface="Comic Sans MS" panose="030F0902030302020204" pitchFamily="66" charset="0"/>
+              </a:rPr>
+              <a:t>”</a:t>
+            </a:r>
+          </a:p>
+          <a:p>
+            <a:r>
+              <a:rPr lang="en-US" sz="1400" i="1" dirty="0">
+                <a:solidFill>
+                  <a:schemeClr val="bg1"/>
+                </a:solidFill>
+                <a:latin typeface="Comic Sans MS" panose="030F0902030302020204" pitchFamily="66" charset="0"/>
+              </a:rPr>
+              <a:t>Rating</a:t>
+            </a:r>
+            <a:endParaRPr lang="en-US" sz="1400" i="1" dirty="0">
+              <a:solidFill>
+                <a:schemeClr val="bg1"/>
+              </a:solidFill>
+              <a:latin typeface="Comic Sans MS" panose="030F0902030302020204" pitchFamily="66" charset="0"/>
+            </a:endParaRPr>
+          </a:p>
+        </p:txBody>
+      </p:sp>
+      <p:sp>
+        <p:nvSpPr>
+          <p:cNvPr id="16" name="TextBox 15">
+            <a:extLst>
+              <a:ext uri="{FF2B5EF4-FFF2-40B4-BE49-F238E27FC236}">
+                <a16:creationId xmlns:a16="http://schemas.microsoft.com/office/drawing/2014/main" xmlns="" id="{32820AB9-7CA6-8F41-A812-9F4C46331562}"/>
+              </a:ext>
+            </a:extLst>
+          </p:cNvPr>
+          <p:cNvSpPr txBox="1"/>
+          <p:nvPr/>
+        </p:nvSpPr>
+        <p:spPr>
+          <a:xfrm>
+            <a:off x="9185097" y="5686907"/>
+            <a:ext cx="1192748" cy="1169551"/>
+          </a:xfrm>
+          <a:prstGeom prst="rect">
+            <a:avLst/>
+          </a:prstGeom>
+          <a:noFill/>
+          <a:ln>
+            <a:solidFill>
+              <a:schemeClr val="bg1"/>
+            </a:solidFill>
+          </a:ln>
+        </p:spPr>
+        <p:txBody>
+          <a:bodyPr wrap="square" rtlCol="0">
+            <a:spAutoFit/>
+          </a:bodyPr>
+          <a:lstStyle/>
+          <a:p>
+            <a:r>
+              <a:rPr lang="en-US" sz="1400" i="1" dirty="0" smtClean="0">
+                <a:solidFill>
+                  <a:schemeClr val="bg1"/>
+                </a:solidFill>
+                <a:latin typeface="Comic Sans MS" panose="030F0902030302020204" pitchFamily="66" charset="0"/>
+              </a:rPr>
+              <a:t>User4</a:t>
+            </a:r>
+            <a:endParaRPr lang="en-US" sz="1400" i="1" dirty="0">
+              <a:solidFill>
+                <a:schemeClr val="bg1"/>
+              </a:solidFill>
+              <a:latin typeface="Comic Sans MS" panose="030F0902030302020204" pitchFamily="66" charset="0"/>
+            </a:endParaRPr>
+          </a:p>
+          <a:p>
+            <a:r>
+              <a:rPr lang="en-US" sz="1400" i="1" dirty="0">
+                <a:solidFill>
+                  <a:schemeClr val="bg1"/>
+                </a:solidFill>
+                <a:latin typeface="Comic Sans MS" panose="030F0902030302020204" pitchFamily="66" charset="0"/>
+              </a:rPr>
+              <a:t>“</a:t>
+            </a:r>
+            <a:r>
+              <a:rPr lang="en-US" sz="1400" i="1" dirty="0" err="1">
+                <a:solidFill>
+                  <a:schemeClr val="bg1"/>
+                </a:solidFill>
+                <a:latin typeface="Comic Sans MS" panose="030F0902030302020204" pitchFamily="66" charset="0"/>
+              </a:rPr>
+              <a:t>heheifie</a:t>
+            </a:r>
+            <a:r>
+              <a:rPr lang="en-US" sz="1400" i="1" dirty="0">
+                <a:solidFill>
+                  <a:schemeClr val="bg1"/>
+                </a:solidFill>
+                <a:latin typeface="Comic Sans MS" panose="030F0902030302020204" pitchFamily="66" charset="0"/>
+              </a:rPr>
+              <a:t> </a:t>
+            </a:r>
+            <a:r>
+              <a:rPr lang="en-US" sz="1400" i="1" dirty="0" err="1">
+                <a:solidFill>
+                  <a:schemeClr val="bg1"/>
+                </a:solidFill>
+                <a:latin typeface="Comic Sans MS" panose="030F0902030302020204" pitchFamily="66" charset="0"/>
+              </a:rPr>
+              <a:t>eievneiv</a:t>
+            </a:r>
+            <a:r>
+              <a:rPr lang="en-US" sz="1400" i="1" dirty="0">
+                <a:solidFill>
+                  <a:schemeClr val="bg1"/>
+                </a:solidFill>
+                <a:latin typeface="Comic Sans MS" panose="030F0902030302020204" pitchFamily="66" charset="0"/>
+              </a:rPr>
+              <a:t> </a:t>
+            </a:r>
+            <a:r>
+              <a:rPr lang="en-US" sz="1400" i="1" dirty="0" err="1">
+                <a:solidFill>
+                  <a:schemeClr val="bg1"/>
+                </a:solidFill>
+                <a:latin typeface="Comic Sans MS" panose="030F0902030302020204" pitchFamily="66" charset="0"/>
+              </a:rPr>
+              <a:t>einveev</a:t>
+            </a:r>
+            <a:r>
+              <a:rPr lang="en-US" sz="1400" i="1" dirty="0">
+                <a:solidFill>
+                  <a:schemeClr val="bg1"/>
+                </a:solidFill>
+                <a:latin typeface="Comic Sans MS" panose="030F0902030302020204" pitchFamily="66" charset="0"/>
+              </a:rPr>
+              <a:t>”</a:t>
+            </a:r>
+          </a:p>
+          <a:p>
+            <a:r>
+              <a:rPr lang="en-US" sz="1400" i="1" dirty="0" smtClean="0">
+                <a:solidFill>
+                  <a:schemeClr val="bg1"/>
+                </a:solidFill>
+                <a:latin typeface="Comic Sans MS" panose="030F0902030302020204" pitchFamily="66" charset="0"/>
+              </a:rPr>
+              <a:t>Rating</a:t>
+            </a:r>
+            <a:endParaRPr lang="en-US" sz="1400" i="1" dirty="0">
+              <a:solidFill>
+                <a:schemeClr val="bg1"/>
+              </a:solidFill>
+              <a:latin typeface="Comic Sans MS" panose="030F0902030302020204" pitchFamily="66" charset="0"/>
+            </a:endParaRPr>
+          </a:p>
+        </p:txBody>
+      </p:sp>
+    </p:spTree>
+    <p:extLst>
+      <p:ext uri="{BB962C8B-B14F-4D97-AF65-F5344CB8AC3E}">
+        <p14:creationId xmlns:p14="http://schemas.microsoft.com/office/powerpoint/2010/main" val="3887755001"/>
       </p:ext>
     </p:extLst>
   </p:cSld>
@@ -5112,7 +7487,7 @@
     </a:clrScheme>
     <a:fontScheme name="Office Theme">
       <a:majorFont>
-        <a:latin typeface="Calibri Light" panose="020F0302020204030204"/>
+        <a:latin typeface="Calibri Light"/>
         <a:ea typeface=""/>
         <a:cs typeface=""/>
         <a:font script="Jpan" typeface="游ゴシック Light"/>
@@ -5147,7 +7522,7 @@
         <a:font script="Geor" typeface="Sylfaen"/>
       </a:majorFont>
       <a:minorFont>
-        <a:latin typeface="Calibri" panose="020F0502020204030204"/>
+        <a:latin typeface="Calibri"/>
         <a:ea typeface=""/>
         <a:cs typeface=""/>
         <a:font script="Jpan" typeface="游ゴシック"/>
@@ -5343,7 +7718,7 @@
   <a:extraClrSchemeLst/>
   <a:extLst>
     <a:ext uri="{05A4C25C-085E-4340-85A3-A5531E510DB2}">
-      <thm15:themeFamily xmlns:thm15="http://schemas.microsoft.com/office/thememl/2012/main" name="Office Theme" id="{62F939B6-93AF-4DB8-9C6B-D6C7DFDC589F}" vid="{4F46216B-77A9-411A-B9D3-5023FCB70208}"/>
+      <thm15:themeFamily xmlns:thm15="http://schemas.microsoft.com/office/thememl/2012/main" xmlns="" name="Office Theme" id="{62F939B6-93AF-4DB8-9C6B-D6C7DFDC589F}" vid="{4F46216B-77A9-411A-B9D3-5023FCB70208}"/>
     </a:ext>
   </a:extLst>
 </a:theme>

</xml_diff>

<commit_message>
Creating New Account's page
</commit_message>
<xml_diff>
--- a/docs/wireframes/wireframes.pptx
+++ b/docs/wireframes/wireframes.pptx
@@ -8,6 +8,7 @@
     <p:sldId id="260" r:id="rId2"/>
     <p:sldId id="261" r:id="rId3"/>
     <p:sldId id="262" r:id="rId4"/>
+    <p:sldId id="263" r:id="rId5"/>
   </p:sldIdLst>
   <p:sldSz cx="12192000" cy="6858000"/>
   <p:notesSz cx="6858000" cy="9144000"/>
@@ -6639,7 +6640,7 @@
           <a:p>
             <a:pPr algn="l"/>
             <a:r>
-              <a:rPr lang="en-US" sz="1400" i="1" dirty="0" smtClean="0">
+              <a:rPr lang="en-US" sz="1400" b="1" i="1" dirty="0" smtClean="0">
                 <a:solidFill>
                   <a:schemeClr val="bg1"/>
                 </a:solidFill>
@@ -7435,6 +7436,886 @@
     <p:extLst>
       <p:ext uri="{BB962C8B-B14F-4D97-AF65-F5344CB8AC3E}">
         <p14:creationId xmlns:p14="http://schemas.microsoft.com/office/powerpoint/2010/main" val="3887755001"/>
+      </p:ext>
+    </p:extLst>
+  </p:cSld>
+  <p:clrMapOvr>
+    <a:masterClrMapping/>
+  </p:clrMapOvr>
+</p:sld>
+</file>
+
+<file path=ppt/slides/slide4.xml><?xml version="1.0" encoding="utf-8"?>
+<p:sld xmlns:a="http://schemas.openxmlformats.org/drawingml/2006/main" xmlns:r="http://schemas.openxmlformats.org/officeDocument/2006/relationships" xmlns:p="http://schemas.openxmlformats.org/presentationml/2006/main">
+  <p:cSld>
+    <p:spTree>
+      <p:nvGrpSpPr>
+        <p:cNvPr id="1" name=""/>
+        <p:cNvGrpSpPr/>
+        <p:nvPr/>
+      </p:nvGrpSpPr>
+      <p:grpSpPr>
+        <a:xfrm>
+          <a:off x="0" y="0"/>
+          <a:ext cx="0" cy="0"/>
+          <a:chOff x="0" y="0"/>
+          <a:chExt cx="0" cy="0"/>
+        </a:xfrm>
+      </p:grpSpPr>
+      <p:sp>
+        <p:nvSpPr>
+          <p:cNvPr id="2" name="TextBox 1">
+            <a:extLst>
+              <a:ext uri="{FF2B5EF4-FFF2-40B4-BE49-F238E27FC236}">
+                <a16:creationId xmlns:a16="http://schemas.microsoft.com/office/drawing/2014/main" xmlns="" id="{F3573DF9-457D-7948-8B22-DB5337292FA7}"/>
+              </a:ext>
+            </a:extLst>
+          </p:cNvPr>
+          <p:cNvSpPr txBox="1"/>
+          <p:nvPr/>
+        </p:nvSpPr>
+        <p:spPr>
+          <a:xfrm>
+            <a:off x="1784068" y="292529"/>
+            <a:ext cx="2017394" cy="276999"/>
+          </a:xfrm>
+          <a:prstGeom prst="rect">
+            <a:avLst/>
+          </a:prstGeom>
+          <a:noFill/>
+        </p:spPr>
+        <p:txBody>
+          <a:bodyPr wrap="none" rtlCol="0">
+            <a:spAutoFit/>
+          </a:bodyPr>
+          <a:lstStyle/>
+          <a:p>
+            <a:r>
+              <a:rPr lang="en-US" sz="1200" dirty="0" err="1" smtClean="0">
+                <a:solidFill>
+                  <a:schemeClr val="bg1"/>
+                </a:solidFill>
+                <a:latin typeface="Comic Sans MS" panose="030F0902030302020204" pitchFamily="66" charset="0"/>
+              </a:rPr>
+              <a:t>SellBackMart</a:t>
+            </a:r>
+            <a:r>
+              <a:rPr lang="en-US" sz="1200" dirty="0" smtClean="0">
+                <a:solidFill>
+                  <a:schemeClr val="bg1"/>
+                </a:solidFill>
+                <a:latin typeface="Comic Sans MS" panose="030F0902030302020204" pitchFamily="66" charset="0"/>
+              </a:rPr>
+              <a:t> </a:t>
+            </a:r>
+            <a:r>
+              <a:rPr lang="mr-IN" sz="1200" dirty="0" smtClean="0">
+                <a:solidFill>
+                  <a:schemeClr val="bg1"/>
+                </a:solidFill>
+                <a:latin typeface="Comic Sans MS" panose="030F0902030302020204" pitchFamily="66" charset="0"/>
+              </a:rPr>
+              <a:t>–</a:t>
+            </a:r>
+            <a:r>
+              <a:rPr lang="en-US" sz="1200" dirty="0" smtClean="0">
+                <a:solidFill>
+                  <a:schemeClr val="bg1"/>
+                </a:solidFill>
+                <a:latin typeface="Comic Sans MS" panose="030F0902030302020204" pitchFamily="66" charset="0"/>
+              </a:rPr>
+              <a:t> New User</a:t>
+            </a:r>
+            <a:endParaRPr lang="en-US" sz="1200" dirty="0">
+              <a:solidFill>
+                <a:schemeClr val="bg1"/>
+              </a:solidFill>
+              <a:latin typeface="Comic Sans MS" panose="030F0902030302020204" pitchFamily="66" charset="0"/>
+            </a:endParaRPr>
+          </a:p>
+        </p:txBody>
+      </p:sp>
+      <p:sp>
+        <p:nvSpPr>
+          <p:cNvPr id="3" name="TextBox 2">
+            <a:extLst>
+              <a:ext uri="{FF2B5EF4-FFF2-40B4-BE49-F238E27FC236}">
+                <a16:creationId xmlns:a16="http://schemas.microsoft.com/office/drawing/2014/main" xmlns="" id="{49DF0299-C639-944C-9F0E-91BE71AC7E52}"/>
+              </a:ext>
+            </a:extLst>
+          </p:cNvPr>
+          <p:cNvSpPr txBox="1"/>
+          <p:nvPr/>
+        </p:nvSpPr>
+        <p:spPr>
+          <a:xfrm>
+            <a:off x="2233351" y="581403"/>
+            <a:ext cx="2519941" cy="276999"/>
+          </a:xfrm>
+          <a:prstGeom prst="rect">
+            <a:avLst/>
+          </a:prstGeom>
+          <a:noFill/>
+        </p:spPr>
+        <p:txBody>
+          <a:bodyPr wrap="none" rtlCol="0">
+            <a:spAutoFit/>
+          </a:bodyPr>
+          <a:lstStyle/>
+          <a:p>
+            <a:r>
+              <a:rPr lang="en-US" sz="1200" dirty="0">
+                <a:solidFill>
+                  <a:schemeClr val="bg1"/>
+                </a:solidFill>
+                <a:latin typeface="Comic Sans MS" panose="030F0902030302020204" pitchFamily="66" charset="0"/>
+              </a:rPr>
+              <a:t>http://localhost:3000</a:t>
+            </a:r>
+            <a:r>
+              <a:rPr lang="en-US" sz="1200" dirty="0" smtClean="0">
+                <a:solidFill>
+                  <a:schemeClr val="bg1"/>
+                </a:solidFill>
+                <a:latin typeface="Comic Sans MS" panose="030F0902030302020204" pitchFamily="66" charset="0"/>
+              </a:rPr>
+              <a:t>/user/new</a:t>
+            </a:r>
+            <a:endParaRPr lang="en-US" sz="1200" dirty="0">
+              <a:solidFill>
+                <a:schemeClr val="bg1"/>
+              </a:solidFill>
+              <a:latin typeface="Comic Sans MS" panose="030F0902030302020204" pitchFamily="66" charset="0"/>
+            </a:endParaRPr>
+          </a:p>
+        </p:txBody>
+      </p:sp>
+      <p:sp>
+        <p:nvSpPr>
+          <p:cNvPr id="4" name="Rectangle 3">
+            <a:extLst>
+              <a:ext uri="{FF2B5EF4-FFF2-40B4-BE49-F238E27FC236}">
+                <a16:creationId xmlns:a16="http://schemas.microsoft.com/office/drawing/2014/main" xmlns="" id="{61CD5799-7FC2-F04C-ADCF-330CB97C8DA9}"/>
+              </a:ext>
+            </a:extLst>
+          </p:cNvPr>
+          <p:cNvSpPr/>
+          <p:nvPr/>
+        </p:nvSpPr>
+        <p:spPr>
+          <a:xfrm>
+            <a:off x="1175657" y="870277"/>
+            <a:ext cx="9832769" cy="344384"/>
+          </a:xfrm>
+          <a:prstGeom prst="rect">
+            <a:avLst/>
+          </a:prstGeom>
+          <a:solidFill>
+            <a:schemeClr val="bg1"/>
+          </a:solidFill>
+          <a:ln>
+            <a:noFill/>
+          </a:ln>
+        </p:spPr>
+        <p:style>
+          <a:lnRef idx="2">
+            <a:schemeClr val="accent1">
+              <a:shade val="50000"/>
+            </a:schemeClr>
+          </a:lnRef>
+          <a:fillRef idx="1">
+            <a:schemeClr val="accent1"/>
+          </a:fillRef>
+          <a:effectRef idx="0">
+            <a:schemeClr val="accent1"/>
+          </a:effectRef>
+          <a:fontRef idx="minor">
+            <a:schemeClr val="lt1"/>
+          </a:fontRef>
+        </p:style>
+        <p:txBody>
+          <a:bodyPr rtlCol="0" anchor="ctr"/>
+          <a:lstStyle/>
+          <a:p>
+            <a:r>
+              <a:rPr lang="en-US" sz="1400" dirty="0" smtClean="0">
+                <a:solidFill>
+                  <a:schemeClr val="tx1"/>
+                </a:solidFill>
+                <a:latin typeface="Comic Sans MS" panose="030F0902030302020204" pitchFamily="66" charset="0"/>
+              </a:rPr>
+              <a:t>Home</a:t>
+            </a:r>
+            <a:r>
+              <a:rPr lang="en-US" sz="1400" dirty="0" smtClean="0">
+                <a:solidFill>
+                  <a:schemeClr val="tx1"/>
+                </a:solidFill>
+                <a:latin typeface="Comic Sans MS" panose="030F0902030302020204" pitchFamily="66" charset="0"/>
+              </a:rPr>
+              <a:t> </a:t>
+            </a:r>
+            <a:endParaRPr lang="en-US" sz="1400" dirty="0">
+              <a:solidFill>
+                <a:schemeClr val="tx1"/>
+              </a:solidFill>
+              <a:latin typeface="Comic Sans MS" panose="030F0902030302020204" pitchFamily="66" charset="0"/>
+            </a:endParaRPr>
+          </a:p>
+        </p:txBody>
+      </p:sp>
+      <p:sp>
+        <p:nvSpPr>
+          <p:cNvPr id="5" name="TextBox 4">
+            <a:extLst>
+              <a:ext uri="{FF2B5EF4-FFF2-40B4-BE49-F238E27FC236}">
+                <a16:creationId xmlns:a16="http://schemas.microsoft.com/office/drawing/2014/main" xmlns="" id="{221DED5B-F56B-0F43-A308-4F2DD034B5B7}"/>
+              </a:ext>
+            </a:extLst>
+          </p:cNvPr>
+          <p:cNvSpPr txBox="1"/>
+          <p:nvPr/>
+        </p:nvSpPr>
+        <p:spPr>
+          <a:xfrm>
+            <a:off x="1923798" y="1266033"/>
+            <a:ext cx="1718840" cy="338554"/>
+          </a:xfrm>
+          <a:prstGeom prst="rect">
+            <a:avLst/>
+          </a:prstGeom>
+          <a:noFill/>
+        </p:spPr>
+        <p:txBody>
+          <a:bodyPr wrap="none" rtlCol="0">
+            <a:spAutoFit/>
+          </a:bodyPr>
+          <a:lstStyle/>
+          <a:p>
+            <a:r>
+              <a:rPr lang="en-US" sz="1600" b="1" dirty="0" smtClean="0">
+                <a:solidFill>
+                  <a:schemeClr val="bg1"/>
+                </a:solidFill>
+                <a:latin typeface="Comic Sans MS" panose="030F0902030302020204" pitchFamily="66" charset="0"/>
+              </a:rPr>
+              <a:t>Create Account</a:t>
+            </a:r>
+            <a:endParaRPr lang="en-US" sz="1600" b="1" dirty="0">
+              <a:solidFill>
+                <a:schemeClr val="bg1"/>
+              </a:solidFill>
+              <a:latin typeface="Comic Sans MS" panose="030F0902030302020204" pitchFamily="66" charset="0"/>
+            </a:endParaRPr>
+          </a:p>
+        </p:txBody>
+      </p:sp>
+      <p:sp>
+        <p:nvSpPr>
+          <p:cNvPr id="7" name="TextBox 6">
+            <a:extLst>
+              <a:ext uri="{FF2B5EF4-FFF2-40B4-BE49-F238E27FC236}">
+                <a16:creationId xmlns:a16="http://schemas.microsoft.com/office/drawing/2014/main" xmlns="" id="{C8E10E37-1019-8D4C-BA6F-9A6E9CF0D317}"/>
+              </a:ext>
+            </a:extLst>
+          </p:cNvPr>
+          <p:cNvSpPr txBox="1"/>
+          <p:nvPr/>
+        </p:nvSpPr>
+        <p:spPr>
+          <a:xfrm>
+            <a:off x="1942013" y="1831383"/>
+            <a:ext cx="1602221" cy="4616648"/>
+          </a:xfrm>
+          <a:prstGeom prst="rect">
+            <a:avLst/>
+          </a:prstGeom>
+          <a:noFill/>
+        </p:spPr>
+        <p:txBody>
+          <a:bodyPr wrap="none" rtlCol="0">
+            <a:spAutoFit/>
+          </a:bodyPr>
+          <a:lstStyle/>
+          <a:p>
+            <a:r>
+              <a:rPr lang="en-US" sz="1400" dirty="0" smtClean="0">
+                <a:solidFill>
+                  <a:schemeClr val="bg1"/>
+                </a:solidFill>
+                <a:latin typeface="Comic Sans MS" panose="030F0902030302020204" pitchFamily="66" charset="0"/>
+              </a:rPr>
+              <a:t>Name</a:t>
+            </a:r>
+            <a:endParaRPr lang="en-US" sz="1400" dirty="0">
+              <a:solidFill>
+                <a:schemeClr val="bg1"/>
+              </a:solidFill>
+              <a:latin typeface="Comic Sans MS" panose="030F0902030302020204" pitchFamily="66" charset="0"/>
+            </a:endParaRPr>
+          </a:p>
+          <a:p>
+            <a:endParaRPr lang="en-US" sz="1400" dirty="0">
+              <a:solidFill>
+                <a:schemeClr val="bg1"/>
+              </a:solidFill>
+              <a:latin typeface="Comic Sans MS" panose="030F0902030302020204" pitchFamily="66" charset="0"/>
+            </a:endParaRPr>
+          </a:p>
+          <a:p>
+            <a:endParaRPr lang="en-US" sz="1400" dirty="0">
+              <a:solidFill>
+                <a:schemeClr val="bg1"/>
+              </a:solidFill>
+              <a:latin typeface="Comic Sans MS" panose="030F0902030302020204" pitchFamily="66" charset="0"/>
+            </a:endParaRPr>
+          </a:p>
+          <a:p>
+            <a:r>
+              <a:rPr lang="en-US" sz="1400" dirty="0" smtClean="0">
+                <a:solidFill>
+                  <a:schemeClr val="bg1"/>
+                </a:solidFill>
+                <a:latin typeface="Comic Sans MS" panose="030F0902030302020204" pitchFamily="66" charset="0"/>
+              </a:rPr>
+              <a:t>Department*</a:t>
+            </a:r>
+            <a:endParaRPr lang="en-US" sz="1400" dirty="0">
+              <a:solidFill>
+                <a:schemeClr val="bg1"/>
+              </a:solidFill>
+              <a:latin typeface="Comic Sans MS" panose="030F0902030302020204" pitchFamily="66" charset="0"/>
+            </a:endParaRPr>
+          </a:p>
+          <a:p>
+            <a:endParaRPr lang="en-US" sz="1400" dirty="0">
+              <a:solidFill>
+                <a:schemeClr val="bg1"/>
+              </a:solidFill>
+              <a:latin typeface="Comic Sans MS" panose="030F0902030302020204" pitchFamily="66" charset="0"/>
+            </a:endParaRPr>
+          </a:p>
+          <a:p>
+            <a:endParaRPr lang="en-US" sz="1400" dirty="0">
+              <a:solidFill>
+                <a:schemeClr val="bg1"/>
+              </a:solidFill>
+              <a:latin typeface="Comic Sans MS" panose="030F0902030302020204" pitchFamily="66" charset="0"/>
+            </a:endParaRPr>
+          </a:p>
+          <a:p>
+            <a:r>
+              <a:rPr lang="en-US" sz="1400" dirty="0" smtClean="0">
+                <a:solidFill>
+                  <a:schemeClr val="bg1"/>
+                </a:solidFill>
+                <a:latin typeface="Comic Sans MS" panose="030F0902030302020204" pitchFamily="66" charset="0"/>
+              </a:rPr>
+              <a:t>Email</a:t>
+            </a:r>
+            <a:endParaRPr lang="en-US" sz="1400" dirty="0">
+              <a:solidFill>
+                <a:schemeClr val="bg1"/>
+              </a:solidFill>
+              <a:latin typeface="Comic Sans MS" panose="030F0902030302020204" pitchFamily="66" charset="0"/>
+            </a:endParaRPr>
+          </a:p>
+          <a:p>
+            <a:endParaRPr lang="en-US" sz="1400" dirty="0">
+              <a:solidFill>
+                <a:schemeClr val="bg1"/>
+              </a:solidFill>
+              <a:latin typeface="Comic Sans MS" panose="030F0902030302020204" pitchFamily="66" charset="0"/>
+            </a:endParaRPr>
+          </a:p>
+          <a:p>
+            <a:endParaRPr lang="en-US" sz="1400" dirty="0">
+              <a:solidFill>
+                <a:schemeClr val="bg1"/>
+              </a:solidFill>
+              <a:latin typeface="Comic Sans MS" panose="030F0902030302020204" pitchFamily="66" charset="0"/>
+            </a:endParaRPr>
+          </a:p>
+          <a:p>
+            <a:r>
+              <a:rPr lang="en-US" sz="1400" dirty="0" smtClean="0">
+                <a:solidFill>
+                  <a:schemeClr val="bg1"/>
+                </a:solidFill>
+                <a:latin typeface="Comic Sans MS" panose="030F0902030302020204" pitchFamily="66" charset="0"/>
+              </a:rPr>
+              <a:t>Password</a:t>
+            </a:r>
+            <a:endParaRPr lang="en-US" sz="1400" dirty="0">
+              <a:solidFill>
+                <a:schemeClr val="bg1"/>
+              </a:solidFill>
+              <a:latin typeface="Comic Sans MS" panose="030F0902030302020204" pitchFamily="66" charset="0"/>
+            </a:endParaRPr>
+          </a:p>
+          <a:p>
+            <a:endParaRPr lang="en-US" sz="1400" dirty="0">
+              <a:solidFill>
+                <a:schemeClr val="bg1"/>
+              </a:solidFill>
+              <a:latin typeface="Comic Sans MS" panose="030F0902030302020204" pitchFamily="66" charset="0"/>
+            </a:endParaRPr>
+          </a:p>
+          <a:p>
+            <a:endParaRPr lang="en-US" sz="1400" dirty="0" smtClean="0">
+              <a:solidFill>
+                <a:schemeClr val="bg1"/>
+              </a:solidFill>
+              <a:latin typeface="Comic Sans MS" panose="030F0902030302020204" pitchFamily="66" charset="0"/>
+            </a:endParaRPr>
+          </a:p>
+          <a:p>
+            <a:r>
+              <a:rPr lang="en-US" sz="1400" dirty="0">
+                <a:solidFill>
+                  <a:schemeClr val="bg1"/>
+                </a:solidFill>
+                <a:latin typeface="Comic Sans MS" panose="030F0902030302020204" pitchFamily="66" charset="0"/>
+              </a:rPr>
+              <a:t>Repeat </a:t>
+            </a:r>
+            <a:r>
+              <a:rPr lang="en-US" sz="1400" dirty="0" smtClean="0">
+                <a:solidFill>
+                  <a:schemeClr val="bg1"/>
+                </a:solidFill>
+                <a:latin typeface="Comic Sans MS" panose="030F0902030302020204" pitchFamily="66" charset="0"/>
+              </a:rPr>
+              <a:t>Password</a:t>
+            </a:r>
+            <a:endParaRPr lang="en-US" sz="1400" dirty="0" smtClean="0">
+              <a:solidFill>
+                <a:schemeClr val="bg1"/>
+              </a:solidFill>
+              <a:latin typeface="Comic Sans MS" panose="030F0902030302020204" pitchFamily="66" charset="0"/>
+            </a:endParaRPr>
+          </a:p>
+          <a:p>
+            <a:endParaRPr lang="en-US" sz="1400" dirty="0">
+              <a:solidFill>
+                <a:schemeClr val="bg1"/>
+              </a:solidFill>
+              <a:latin typeface="Comic Sans MS" panose="030F0902030302020204" pitchFamily="66" charset="0"/>
+            </a:endParaRPr>
+          </a:p>
+          <a:p>
+            <a:endParaRPr lang="en-US" sz="1400" dirty="0">
+              <a:solidFill>
+                <a:schemeClr val="bg1"/>
+              </a:solidFill>
+              <a:latin typeface="Comic Sans MS" panose="030F0902030302020204" pitchFamily="66" charset="0"/>
+            </a:endParaRPr>
+          </a:p>
+          <a:p>
+            <a:r>
+              <a:rPr lang="en-US" sz="1000" dirty="0" smtClean="0">
+                <a:solidFill>
+                  <a:schemeClr val="bg1"/>
+                </a:solidFill>
+                <a:latin typeface="Comic Sans MS" panose="030F0902030302020204" pitchFamily="66" charset="0"/>
+              </a:rPr>
+              <a:t>* Optional field.</a:t>
+            </a:r>
+            <a:endParaRPr lang="en-US" sz="1000" dirty="0">
+              <a:solidFill>
+                <a:schemeClr val="bg1"/>
+              </a:solidFill>
+              <a:latin typeface="Comic Sans MS" panose="030F0902030302020204" pitchFamily="66" charset="0"/>
+            </a:endParaRPr>
+          </a:p>
+          <a:p>
+            <a:endParaRPr lang="en-US" sz="1400" dirty="0">
+              <a:solidFill>
+                <a:schemeClr val="bg1"/>
+              </a:solidFill>
+              <a:latin typeface="Comic Sans MS" panose="030F0902030302020204" pitchFamily="66" charset="0"/>
+            </a:endParaRPr>
+          </a:p>
+          <a:p>
+            <a:endParaRPr lang="en-US" sz="1400" dirty="0">
+              <a:solidFill>
+                <a:schemeClr val="bg1"/>
+              </a:solidFill>
+              <a:latin typeface="Comic Sans MS" panose="030F0902030302020204" pitchFamily="66" charset="0"/>
+            </a:endParaRPr>
+          </a:p>
+          <a:p>
+            <a:endParaRPr lang="en-US" sz="1400" u="sng" dirty="0">
+              <a:solidFill>
+                <a:srgbClr val="0432FF"/>
+              </a:solidFill>
+              <a:latin typeface="Comic Sans MS" panose="030F0902030302020204" pitchFamily="66" charset="0"/>
+            </a:endParaRPr>
+          </a:p>
+          <a:p>
+            <a:endParaRPr lang="en-US" sz="1400" u="sng" dirty="0">
+              <a:solidFill>
+                <a:srgbClr val="0432FF"/>
+              </a:solidFill>
+              <a:latin typeface="Comic Sans MS" panose="030F0902030302020204" pitchFamily="66" charset="0"/>
+            </a:endParaRPr>
+          </a:p>
+          <a:p>
+            <a:endParaRPr lang="en-US" sz="1400" u="sng" dirty="0">
+              <a:solidFill>
+                <a:srgbClr val="0432FF"/>
+              </a:solidFill>
+              <a:latin typeface="Comic Sans MS" panose="030F0902030302020204" pitchFamily="66" charset="0"/>
+            </a:endParaRPr>
+          </a:p>
+        </p:txBody>
+      </p:sp>
+      <p:sp>
+        <p:nvSpPr>
+          <p:cNvPr id="8" name="TextBox 7">
+            <a:extLst>
+              <a:ext uri="{FF2B5EF4-FFF2-40B4-BE49-F238E27FC236}">
+                <a16:creationId xmlns:a16="http://schemas.microsoft.com/office/drawing/2014/main" xmlns="" id="{32820AB9-7CA6-8F41-A812-9F4C46331562}"/>
+              </a:ext>
+            </a:extLst>
+          </p:cNvPr>
+          <p:cNvSpPr txBox="1"/>
+          <p:nvPr/>
+        </p:nvSpPr>
+        <p:spPr>
+          <a:xfrm>
+            <a:off x="2018804" y="2111092"/>
+            <a:ext cx="3610099" cy="307777"/>
+          </a:xfrm>
+          <a:prstGeom prst="rect">
+            <a:avLst/>
+          </a:prstGeom>
+          <a:noFill/>
+          <a:ln>
+            <a:solidFill>
+              <a:schemeClr val="bg1"/>
+            </a:solidFill>
+          </a:ln>
+        </p:spPr>
+        <p:txBody>
+          <a:bodyPr wrap="square" rtlCol="0">
+            <a:spAutoFit/>
+          </a:bodyPr>
+          <a:lstStyle/>
+          <a:p>
+            <a:pPr algn="l"/>
+            <a:endParaRPr lang="en-US" sz="1400" dirty="0">
+              <a:solidFill>
+                <a:schemeClr val="bg1"/>
+              </a:solidFill>
+              <a:latin typeface="Comic Sans MS" panose="030F0902030302020204" pitchFamily="66" charset="0"/>
+            </a:endParaRPr>
+          </a:p>
+        </p:txBody>
+      </p:sp>
+      <p:sp>
+        <p:nvSpPr>
+          <p:cNvPr id="9" name="TextBox 8">
+            <a:extLst>
+              <a:ext uri="{FF2B5EF4-FFF2-40B4-BE49-F238E27FC236}">
+                <a16:creationId xmlns:a16="http://schemas.microsoft.com/office/drawing/2014/main" xmlns="" id="{32820AB9-7CA6-8F41-A812-9F4C46331562}"/>
+              </a:ext>
+            </a:extLst>
+          </p:cNvPr>
+          <p:cNvSpPr txBox="1"/>
+          <p:nvPr/>
+        </p:nvSpPr>
+        <p:spPr>
+          <a:xfrm>
+            <a:off x="2018804" y="2736341"/>
+            <a:ext cx="3610099" cy="307777"/>
+          </a:xfrm>
+          <a:prstGeom prst="rect">
+            <a:avLst/>
+          </a:prstGeom>
+          <a:noFill/>
+          <a:ln>
+            <a:solidFill>
+              <a:schemeClr val="bg1"/>
+            </a:solidFill>
+          </a:ln>
+        </p:spPr>
+        <p:txBody>
+          <a:bodyPr wrap="square" rtlCol="0">
+            <a:spAutoFit/>
+          </a:bodyPr>
+          <a:lstStyle/>
+          <a:p>
+            <a:pPr algn="l"/>
+            <a:endParaRPr lang="en-US" sz="1400" dirty="0">
+              <a:solidFill>
+                <a:schemeClr val="bg1"/>
+              </a:solidFill>
+              <a:latin typeface="Comic Sans MS" panose="030F0902030302020204" pitchFamily="66" charset="0"/>
+            </a:endParaRPr>
+          </a:p>
+        </p:txBody>
+      </p:sp>
+      <p:sp>
+        <p:nvSpPr>
+          <p:cNvPr id="10" name="TextBox 9">
+            <a:extLst>
+              <a:ext uri="{FF2B5EF4-FFF2-40B4-BE49-F238E27FC236}">
+                <a16:creationId xmlns:a16="http://schemas.microsoft.com/office/drawing/2014/main" xmlns="" id="{32820AB9-7CA6-8F41-A812-9F4C46331562}"/>
+              </a:ext>
+            </a:extLst>
+          </p:cNvPr>
+          <p:cNvSpPr txBox="1"/>
+          <p:nvPr/>
+        </p:nvSpPr>
+        <p:spPr>
+          <a:xfrm>
+            <a:off x="1996413" y="3384820"/>
+            <a:ext cx="2151468" cy="307777"/>
+          </a:xfrm>
+          <a:prstGeom prst="rect">
+            <a:avLst/>
+          </a:prstGeom>
+          <a:noFill/>
+          <a:ln>
+            <a:solidFill>
+              <a:schemeClr val="bg1"/>
+            </a:solidFill>
+          </a:ln>
+        </p:spPr>
+        <p:txBody>
+          <a:bodyPr wrap="square" rtlCol="0">
+            <a:spAutoFit/>
+          </a:bodyPr>
+          <a:lstStyle/>
+          <a:p>
+            <a:pPr algn="l"/>
+            <a:endParaRPr lang="en-US" sz="1400" dirty="0">
+              <a:solidFill>
+                <a:schemeClr val="bg1"/>
+              </a:solidFill>
+              <a:latin typeface="Comic Sans MS" panose="030F0902030302020204" pitchFamily="66" charset="0"/>
+            </a:endParaRPr>
+          </a:p>
+        </p:txBody>
+      </p:sp>
+      <p:sp>
+        <p:nvSpPr>
+          <p:cNvPr id="12" name="TextBox 11">
+            <a:extLst>
+              <a:ext uri="{FF2B5EF4-FFF2-40B4-BE49-F238E27FC236}">
+                <a16:creationId xmlns:a16="http://schemas.microsoft.com/office/drawing/2014/main" xmlns="" id="{32820AB9-7CA6-8F41-A812-9F4C46331562}"/>
+              </a:ext>
+            </a:extLst>
+          </p:cNvPr>
+          <p:cNvSpPr txBox="1"/>
+          <p:nvPr/>
+        </p:nvSpPr>
+        <p:spPr>
+          <a:xfrm>
+            <a:off x="1996412" y="4064108"/>
+            <a:ext cx="3610099" cy="307777"/>
+          </a:xfrm>
+          <a:prstGeom prst="rect">
+            <a:avLst/>
+          </a:prstGeom>
+          <a:noFill/>
+          <a:ln>
+            <a:solidFill>
+              <a:schemeClr val="bg1"/>
+            </a:solidFill>
+          </a:ln>
+        </p:spPr>
+        <p:txBody>
+          <a:bodyPr wrap="square" rtlCol="0">
+            <a:spAutoFit/>
+          </a:bodyPr>
+          <a:lstStyle/>
+          <a:p>
+            <a:pPr algn="l"/>
+            <a:endParaRPr lang="en-US" sz="1400" dirty="0">
+              <a:solidFill>
+                <a:schemeClr val="bg1"/>
+              </a:solidFill>
+              <a:latin typeface="Comic Sans MS" panose="030F0902030302020204" pitchFamily="66" charset="0"/>
+            </a:endParaRPr>
+          </a:p>
+        </p:txBody>
+      </p:sp>
+      <p:sp>
+        <p:nvSpPr>
+          <p:cNvPr id="13" name="Rounded Rectangle 12">
+            <a:extLst>
+              <a:ext uri="{FF2B5EF4-FFF2-40B4-BE49-F238E27FC236}">
+                <a16:creationId xmlns:a16="http://schemas.microsoft.com/office/drawing/2014/main" xmlns="" id="{1376ECFE-A6F2-6C42-A904-0E15AFF7920D}"/>
+              </a:ext>
+            </a:extLst>
+          </p:cNvPr>
+          <p:cNvSpPr/>
+          <p:nvPr/>
+        </p:nvSpPr>
+        <p:spPr>
+          <a:xfrm>
+            <a:off x="1996412" y="5645060"/>
+            <a:ext cx="2367645" cy="327860"/>
+          </a:xfrm>
+          <a:prstGeom prst="roundRect">
+            <a:avLst/>
+          </a:prstGeom>
+          <a:solidFill>
+            <a:schemeClr val="tx2"/>
+          </a:solidFill>
+          <a:ln>
+            <a:solidFill>
+              <a:schemeClr val="bg1"/>
+            </a:solidFill>
+          </a:ln>
+        </p:spPr>
+        <p:style>
+          <a:lnRef idx="2">
+            <a:schemeClr val="accent1">
+              <a:shade val="50000"/>
+            </a:schemeClr>
+          </a:lnRef>
+          <a:fillRef idx="1">
+            <a:schemeClr val="accent1"/>
+          </a:fillRef>
+          <a:effectRef idx="0">
+            <a:schemeClr val="accent1"/>
+          </a:effectRef>
+          <a:fontRef idx="minor">
+            <a:schemeClr val="lt1"/>
+          </a:fontRef>
+        </p:style>
+        <p:txBody>
+          <a:bodyPr rtlCol="0" anchor="ctr"/>
+          <a:lstStyle/>
+          <a:p>
+            <a:pPr algn="ctr"/>
+            <a:r>
+              <a:rPr lang="en-US" sz="1400" dirty="0" smtClean="0">
+                <a:solidFill>
+                  <a:schemeClr val="bg1"/>
+                </a:solidFill>
+                <a:latin typeface="Comic Sans MS" panose="030F0902030302020204" pitchFamily="66" charset="0"/>
+              </a:rPr>
+              <a:t>Create</a:t>
+            </a:r>
+            <a:endParaRPr lang="en-US" sz="1400" dirty="0">
+              <a:solidFill>
+                <a:schemeClr val="bg1"/>
+              </a:solidFill>
+              <a:latin typeface="Comic Sans MS" panose="030F0902030302020204" pitchFamily="66" charset="0"/>
+            </a:endParaRPr>
+          </a:p>
+        </p:txBody>
+      </p:sp>
+      <p:sp>
+        <p:nvSpPr>
+          <p:cNvPr id="14" name="TextBox 13">
+            <a:extLst>
+              <a:ext uri="{FF2B5EF4-FFF2-40B4-BE49-F238E27FC236}">
+                <a16:creationId xmlns:a16="http://schemas.microsoft.com/office/drawing/2014/main" xmlns="" id="{32820AB9-7CA6-8F41-A812-9F4C46331562}"/>
+              </a:ext>
+            </a:extLst>
+          </p:cNvPr>
+          <p:cNvSpPr txBox="1"/>
+          <p:nvPr/>
+        </p:nvSpPr>
+        <p:spPr>
+          <a:xfrm>
+            <a:off x="1996412" y="4724608"/>
+            <a:ext cx="3610099" cy="307777"/>
+          </a:xfrm>
+          <a:prstGeom prst="rect">
+            <a:avLst/>
+          </a:prstGeom>
+          <a:noFill/>
+          <a:ln>
+            <a:solidFill>
+              <a:schemeClr val="bg1"/>
+            </a:solidFill>
+          </a:ln>
+        </p:spPr>
+        <p:txBody>
+          <a:bodyPr wrap="square" rtlCol="0">
+            <a:spAutoFit/>
+          </a:bodyPr>
+          <a:lstStyle/>
+          <a:p>
+            <a:pPr algn="l"/>
+            <a:endParaRPr lang="en-US" sz="1400" dirty="0">
+              <a:solidFill>
+                <a:schemeClr val="bg1"/>
+              </a:solidFill>
+              <a:latin typeface="Comic Sans MS" panose="030F0902030302020204" pitchFamily="66" charset="0"/>
+            </a:endParaRPr>
+          </a:p>
+        </p:txBody>
+      </p:sp>
+      <p:sp>
+        <p:nvSpPr>
+          <p:cNvPr id="15" name="TextBox 14">
+            <a:extLst>
+              <a:ext uri="{FF2B5EF4-FFF2-40B4-BE49-F238E27FC236}">
+                <a16:creationId xmlns:a16="http://schemas.microsoft.com/office/drawing/2014/main" xmlns="" id="{32820AB9-7CA6-8F41-A812-9F4C46331562}"/>
+              </a:ext>
+            </a:extLst>
+          </p:cNvPr>
+          <p:cNvSpPr txBox="1"/>
+          <p:nvPr/>
+        </p:nvSpPr>
+        <p:spPr>
+          <a:xfrm>
+            <a:off x="4147881" y="3384820"/>
+            <a:ext cx="1481023" cy="307777"/>
+          </a:xfrm>
+          <a:prstGeom prst="rect">
+            <a:avLst/>
+          </a:prstGeom>
+          <a:noFill/>
+          <a:ln>
+            <a:noFill/>
+          </a:ln>
+        </p:spPr>
+        <p:txBody>
+          <a:bodyPr wrap="square" rtlCol="0">
+            <a:spAutoFit/>
+          </a:bodyPr>
+          <a:lstStyle/>
+          <a:p>
+            <a:pPr algn="l"/>
+            <a:r>
+              <a:rPr lang="en-US" sz="1400" dirty="0" smtClean="0">
+                <a:solidFill>
+                  <a:schemeClr val="bg1"/>
+                </a:solidFill>
+                <a:latin typeface="Comic Sans MS" panose="030F0902030302020204" pitchFamily="66" charset="0"/>
+              </a:rPr>
+              <a:t>@</a:t>
+            </a:r>
+            <a:r>
+              <a:rPr lang="en-US" sz="1400" dirty="0" err="1" smtClean="0">
+                <a:solidFill>
+                  <a:schemeClr val="bg1"/>
+                </a:solidFill>
+                <a:latin typeface="Comic Sans MS" panose="030F0902030302020204" pitchFamily="66" charset="0"/>
+              </a:rPr>
+              <a:t>memphis.edu</a:t>
+            </a:r>
+            <a:endParaRPr lang="en-US" sz="1400" dirty="0">
+              <a:solidFill>
+                <a:schemeClr val="bg1"/>
+              </a:solidFill>
+              <a:latin typeface="Comic Sans MS" panose="030F0902030302020204" pitchFamily="66" charset="0"/>
+            </a:endParaRPr>
+          </a:p>
+        </p:txBody>
+      </p:sp>
+    </p:spTree>
+    <p:extLst>
+      <p:ext uri="{BB962C8B-B14F-4D97-AF65-F5344CB8AC3E}">
+        <p14:creationId xmlns:p14="http://schemas.microsoft.com/office/powerpoint/2010/main" val="2713129278"/>
       </p:ext>
     </p:extLst>
   </p:cSld>

</xml_diff>

<commit_message>
Creating Messages wireframes page
</commit_message>
<xml_diff>
--- a/docs/wireframes/wireframes.pptx
+++ b/docs/wireframes/wireframes.pptx
@@ -9,6 +9,7 @@
     <p:sldId id="261" r:id="rId3"/>
     <p:sldId id="262" r:id="rId4"/>
     <p:sldId id="263" r:id="rId5"/>
+    <p:sldId id="264" r:id="rId6"/>
   </p:sldIdLst>
   <p:sldSz cx="12192000" cy="6858000"/>
   <p:notesSz cx="6858000" cy="9144000"/>
@@ -5351,9 +5352,50 @@
           <a:p>
             <a:pPr algn="ctr"/>
             <a:r>
-              <a:rPr lang="en-US" i="1" dirty="0"/>
-              <a:t>Item Picture</a:t>
-            </a:r>
+              <a:rPr lang="en-US" i="1" dirty="0" err="1" smtClean="0"/>
+              <a:t>Yiueot</a:t>
+            </a:r>
+            <a:r>
+              <a:rPr lang="en-US" i="1" dirty="0" smtClean="0"/>
+              <a:t> </a:t>
+            </a:r>
+            <a:r>
+              <a:rPr lang="en-US" i="1" dirty="0" err="1" smtClean="0"/>
+              <a:t>ei</a:t>
+            </a:r>
+            <a:r>
+              <a:rPr lang="en-US" i="1" dirty="0" smtClean="0"/>
+              <a:t> </a:t>
+            </a:r>
+            <a:r>
+              <a:rPr lang="en-US" i="1" dirty="0" err="1" smtClean="0"/>
+              <a:t>eunen</a:t>
+            </a:r>
+            <a:r>
+              <a:rPr lang="en-US" i="1" dirty="0" smtClean="0"/>
+              <a:t> </a:t>
+            </a:r>
+            <a:r>
+              <a:rPr lang="en-US" i="1" dirty="0" err="1" smtClean="0"/>
+              <a:t>enen</a:t>
+            </a:r>
+            <a:endParaRPr lang="en-US" i="1" dirty="0" smtClean="0"/>
+          </a:p>
+          <a:p>
+            <a:pPr algn="ctr"/>
+            <a:r>
+              <a:rPr lang="en-US" i="1" dirty="0" err="1" smtClean="0"/>
+              <a:t>Ieienvievqkm</a:t>
+            </a:r>
+            <a:endParaRPr lang="en-US" i="1" dirty="0" smtClean="0"/>
+          </a:p>
+          <a:p>
+            <a:pPr algn="ctr"/>
+            <a:r>
+              <a:rPr lang="en-US" i="1" dirty="0" err="1" smtClean="0"/>
+              <a:t>eiveivnneikekelel</a:t>
+            </a:r>
+            <a:endParaRPr lang="en-US" i="1" dirty="0"/>
           </a:p>
         </p:txBody>
       </p:sp>
@@ -8316,6 +8358,2221 @@
     <p:extLst>
       <p:ext uri="{BB962C8B-B14F-4D97-AF65-F5344CB8AC3E}">
         <p14:creationId xmlns:p14="http://schemas.microsoft.com/office/powerpoint/2010/main" val="2713129278"/>
+      </p:ext>
+    </p:extLst>
+  </p:cSld>
+  <p:clrMapOvr>
+    <a:masterClrMapping/>
+  </p:clrMapOvr>
+</p:sld>
+</file>
+
+<file path=ppt/slides/slide5.xml><?xml version="1.0" encoding="utf-8"?>
+<p:sld xmlns:a="http://schemas.openxmlformats.org/drawingml/2006/main" xmlns:r="http://schemas.openxmlformats.org/officeDocument/2006/relationships" xmlns:p="http://schemas.openxmlformats.org/presentationml/2006/main">
+  <p:cSld>
+    <p:spTree>
+      <p:nvGrpSpPr>
+        <p:cNvPr id="1" name=""/>
+        <p:cNvGrpSpPr/>
+        <p:nvPr/>
+      </p:nvGrpSpPr>
+      <p:grpSpPr>
+        <a:xfrm>
+          <a:off x="0" y="0"/>
+          <a:ext cx="0" cy="0"/>
+          <a:chOff x="0" y="0"/>
+          <a:chExt cx="0" cy="0"/>
+        </a:xfrm>
+      </p:grpSpPr>
+      <p:sp>
+        <p:nvSpPr>
+          <p:cNvPr id="2" name="TextBox 1">
+            <a:extLst>
+              <a:ext uri="{FF2B5EF4-FFF2-40B4-BE49-F238E27FC236}">
+                <a16:creationId xmlns:a16="http://schemas.microsoft.com/office/drawing/2014/main" xmlns="" id="{F3573DF9-457D-7948-8B22-DB5337292FA7}"/>
+              </a:ext>
+            </a:extLst>
+          </p:cNvPr>
+          <p:cNvSpPr txBox="1"/>
+          <p:nvPr/>
+        </p:nvSpPr>
+        <p:spPr>
+          <a:xfrm>
+            <a:off x="1784068" y="292529"/>
+            <a:ext cx="2017394" cy="276999"/>
+          </a:xfrm>
+          <a:prstGeom prst="rect">
+            <a:avLst/>
+          </a:prstGeom>
+          <a:noFill/>
+        </p:spPr>
+        <p:txBody>
+          <a:bodyPr wrap="none" rtlCol="0">
+            <a:spAutoFit/>
+          </a:bodyPr>
+          <a:lstStyle/>
+          <a:p>
+            <a:r>
+              <a:rPr lang="en-US" sz="1200" dirty="0" err="1" smtClean="0">
+                <a:solidFill>
+                  <a:schemeClr val="bg1"/>
+                </a:solidFill>
+                <a:latin typeface="Comic Sans MS" panose="030F0902030302020204" pitchFamily="66" charset="0"/>
+              </a:rPr>
+              <a:t>SellBackMart</a:t>
+            </a:r>
+            <a:r>
+              <a:rPr lang="en-US" sz="1200" dirty="0" smtClean="0">
+                <a:solidFill>
+                  <a:schemeClr val="bg1"/>
+                </a:solidFill>
+                <a:latin typeface="Comic Sans MS" panose="030F0902030302020204" pitchFamily="66" charset="0"/>
+              </a:rPr>
+              <a:t> </a:t>
+            </a:r>
+            <a:r>
+              <a:rPr lang="mr-IN" sz="1200" dirty="0" smtClean="0">
+                <a:solidFill>
+                  <a:schemeClr val="bg1"/>
+                </a:solidFill>
+                <a:latin typeface="Comic Sans MS" panose="030F0902030302020204" pitchFamily="66" charset="0"/>
+              </a:rPr>
+              <a:t>–</a:t>
+            </a:r>
+            <a:r>
+              <a:rPr lang="en-US" sz="1200" dirty="0" smtClean="0">
+                <a:solidFill>
+                  <a:schemeClr val="bg1"/>
+                </a:solidFill>
+                <a:latin typeface="Comic Sans MS" panose="030F0902030302020204" pitchFamily="66" charset="0"/>
+              </a:rPr>
+              <a:t> New User</a:t>
+            </a:r>
+            <a:endParaRPr lang="en-US" sz="1200" dirty="0">
+              <a:solidFill>
+                <a:schemeClr val="bg1"/>
+              </a:solidFill>
+              <a:latin typeface="Comic Sans MS" panose="030F0902030302020204" pitchFamily="66" charset="0"/>
+            </a:endParaRPr>
+          </a:p>
+        </p:txBody>
+      </p:sp>
+      <p:sp>
+        <p:nvSpPr>
+          <p:cNvPr id="3" name="TextBox 2">
+            <a:extLst>
+              <a:ext uri="{FF2B5EF4-FFF2-40B4-BE49-F238E27FC236}">
+                <a16:creationId xmlns:a16="http://schemas.microsoft.com/office/drawing/2014/main" xmlns="" id="{221DED5B-F56B-0F43-A308-4F2DD034B5B7}"/>
+              </a:ext>
+            </a:extLst>
+          </p:cNvPr>
+          <p:cNvSpPr txBox="1"/>
+          <p:nvPr/>
+        </p:nvSpPr>
+        <p:spPr>
+          <a:xfrm>
+            <a:off x="1580787" y="1266033"/>
+            <a:ext cx="2945401" cy="338554"/>
+          </a:xfrm>
+          <a:prstGeom prst="rect">
+            <a:avLst/>
+          </a:prstGeom>
+          <a:noFill/>
+        </p:spPr>
+        <p:txBody>
+          <a:bodyPr wrap="square" rtlCol="0">
+            <a:spAutoFit/>
+          </a:bodyPr>
+          <a:lstStyle/>
+          <a:p>
+            <a:r>
+              <a:rPr lang="en-US" sz="1600" b="1" dirty="0" smtClean="0">
+                <a:solidFill>
+                  <a:schemeClr val="bg1"/>
+                </a:solidFill>
+                <a:latin typeface="Comic Sans MS" panose="030F0902030302020204" pitchFamily="66" charset="0"/>
+              </a:rPr>
+              <a:t>My Messages</a:t>
+            </a:r>
+            <a:endParaRPr lang="en-US" sz="1600" b="1" dirty="0">
+              <a:solidFill>
+                <a:schemeClr val="bg1"/>
+              </a:solidFill>
+              <a:latin typeface="Comic Sans MS" panose="030F0902030302020204" pitchFamily="66" charset="0"/>
+            </a:endParaRPr>
+          </a:p>
+        </p:txBody>
+      </p:sp>
+      <p:sp>
+        <p:nvSpPr>
+          <p:cNvPr id="5" name="TextBox 4">
+            <a:extLst>
+              <a:ext uri="{FF2B5EF4-FFF2-40B4-BE49-F238E27FC236}">
+                <a16:creationId xmlns:a16="http://schemas.microsoft.com/office/drawing/2014/main" xmlns="" id="{49DF0299-C639-944C-9F0E-91BE71AC7E52}"/>
+              </a:ext>
+            </a:extLst>
+          </p:cNvPr>
+          <p:cNvSpPr txBox="1"/>
+          <p:nvPr/>
+        </p:nvSpPr>
+        <p:spPr>
+          <a:xfrm>
+            <a:off x="2233351" y="581403"/>
+            <a:ext cx="2531212" cy="276999"/>
+          </a:xfrm>
+          <a:prstGeom prst="rect">
+            <a:avLst/>
+          </a:prstGeom>
+          <a:noFill/>
+        </p:spPr>
+        <p:txBody>
+          <a:bodyPr wrap="none" rtlCol="0">
+            <a:spAutoFit/>
+          </a:bodyPr>
+          <a:lstStyle/>
+          <a:p>
+            <a:r>
+              <a:rPr lang="en-US" sz="1200" dirty="0">
+                <a:solidFill>
+                  <a:schemeClr val="bg1"/>
+                </a:solidFill>
+                <a:latin typeface="Comic Sans MS" panose="030F0902030302020204" pitchFamily="66" charset="0"/>
+              </a:rPr>
+              <a:t>http://localhost:3000</a:t>
+            </a:r>
+            <a:r>
+              <a:rPr lang="en-US" sz="1200" dirty="0" smtClean="0">
+                <a:solidFill>
+                  <a:schemeClr val="bg1"/>
+                </a:solidFill>
+                <a:latin typeface="Comic Sans MS" panose="030F0902030302020204" pitchFamily="66" charset="0"/>
+              </a:rPr>
+              <a:t>/messages</a:t>
+            </a:r>
+            <a:endParaRPr lang="en-US" sz="1200" dirty="0">
+              <a:solidFill>
+                <a:schemeClr val="bg1"/>
+              </a:solidFill>
+              <a:latin typeface="Comic Sans MS" panose="030F0902030302020204" pitchFamily="66" charset="0"/>
+            </a:endParaRPr>
+          </a:p>
+        </p:txBody>
+      </p:sp>
+      <p:sp>
+        <p:nvSpPr>
+          <p:cNvPr id="7" name="TextBox 6"/>
+          <p:cNvSpPr txBox="1"/>
+          <p:nvPr/>
+        </p:nvSpPr>
+        <p:spPr>
+          <a:xfrm>
+            <a:off x="1580788" y="1796826"/>
+            <a:ext cx="9119934" cy="4770537"/>
+          </a:xfrm>
+          <a:prstGeom prst="rect">
+            <a:avLst/>
+          </a:prstGeom>
+          <a:noFill/>
+          <a:ln>
+            <a:solidFill>
+              <a:schemeClr val="bg1"/>
+            </a:solidFill>
+          </a:ln>
+        </p:spPr>
+        <p:txBody>
+          <a:bodyPr wrap="square" rtlCol="0">
+            <a:spAutoFit/>
+          </a:bodyPr>
+          <a:lstStyle/>
+          <a:p>
+            <a:pPr algn="l"/>
+            <a:endParaRPr lang="en-US" sz="1600" dirty="0" smtClean="0">
+              <a:solidFill>
+                <a:schemeClr val="bg1"/>
+              </a:solidFill>
+              <a:latin typeface="Comic Sans MS" panose="030F0902030302020204" pitchFamily="66" charset="0"/>
+            </a:endParaRPr>
+          </a:p>
+          <a:p>
+            <a:pPr algn="l"/>
+            <a:endParaRPr lang="en-US" sz="1600" dirty="0">
+              <a:solidFill>
+                <a:schemeClr val="bg1"/>
+              </a:solidFill>
+              <a:latin typeface="Comic Sans MS" panose="030F0902030302020204" pitchFamily="66" charset="0"/>
+            </a:endParaRPr>
+          </a:p>
+          <a:p>
+            <a:pPr algn="l"/>
+            <a:endParaRPr lang="en-US" sz="1600" dirty="0" smtClean="0">
+              <a:solidFill>
+                <a:schemeClr val="bg1"/>
+              </a:solidFill>
+              <a:latin typeface="Comic Sans MS" panose="030F0902030302020204" pitchFamily="66" charset="0"/>
+            </a:endParaRPr>
+          </a:p>
+          <a:p>
+            <a:pPr algn="l"/>
+            <a:endParaRPr lang="en-US" sz="1600" dirty="0">
+              <a:solidFill>
+                <a:schemeClr val="bg1"/>
+              </a:solidFill>
+              <a:latin typeface="Comic Sans MS" panose="030F0902030302020204" pitchFamily="66" charset="0"/>
+            </a:endParaRPr>
+          </a:p>
+          <a:p>
+            <a:pPr algn="l"/>
+            <a:endParaRPr lang="en-US" sz="1600" dirty="0" smtClean="0">
+              <a:solidFill>
+                <a:schemeClr val="bg1"/>
+              </a:solidFill>
+              <a:latin typeface="Comic Sans MS" panose="030F0902030302020204" pitchFamily="66" charset="0"/>
+            </a:endParaRPr>
+          </a:p>
+          <a:p>
+            <a:pPr algn="l"/>
+            <a:endParaRPr lang="en-US" sz="1600" dirty="0">
+              <a:solidFill>
+                <a:schemeClr val="bg1"/>
+              </a:solidFill>
+              <a:latin typeface="Comic Sans MS" panose="030F0902030302020204" pitchFamily="66" charset="0"/>
+            </a:endParaRPr>
+          </a:p>
+          <a:p>
+            <a:pPr algn="l"/>
+            <a:endParaRPr lang="en-US" sz="1600" dirty="0" smtClean="0">
+              <a:solidFill>
+                <a:schemeClr val="bg1"/>
+              </a:solidFill>
+              <a:latin typeface="Comic Sans MS" panose="030F0902030302020204" pitchFamily="66" charset="0"/>
+            </a:endParaRPr>
+          </a:p>
+          <a:p>
+            <a:pPr algn="l"/>
+            <a:endParaRPr lang="en-US" sz="1600" dirty="0">
+              <a:solidFill>
+                <a:schemeClr val="bg1"/>
+              </a:solidFill>
+              <a:latin typeface="Comic Sans MS" panose="030F0902030302020204" pitchFamily="66" charset="0"/>
+            </a:endParaRPr>
+          </a:p>
+          <a:p>
+            <a:pPr algn="l"/>
+            <a:endParaRPr lang="en-US" sz="1600" dirty="0" smtClean="0">
+              <a:solidFill>
+                <a:schemeClr val="bg1"/>
+              </a:solidFill>
+              <a:latin typeface="Comic Sans MS" panose="030F0902030302020204" pitchFamily="66" charset="0"/>
+            </a:endParaRPr>
+          </a:p>
+          <a:p>
+            <a:pPr algn="l"/>
+            <a:endParaRPr lang="en-US" sz="1600" dirty="0">
+              <a:solidFill>
+                <a:schemeClr val="bg1"/>
+              </a:solidFill>
+              <a:latin typeface="Comic Sans MS" panose="030F0902030302020204" pitchFamily="66" charset="0"/>
+            </a:endParaRPr>
+          </a:p>
+          <a:p>
+            <a:pPr algn="l"/>
+            <a:endParaRPr lang="en-US" sz="1600" dirty="0" smtClean="0">
+              <a:solidFill>
+                <a:schemeClr val="bg1"/>
+              </a:solidFill>
+              <a:latin typeface="Comic Sans MS" panose="030F0902030302020204" pitchFamily="66" charset="0"/>
+            </a:endParaRPr>
+          </a:p>
+          <a:p>
+            <a:pPr algn="l"/>
+            <a:endParaRPr lang="en-US" sz="1600" dirty="0">
+              <a:solidFill>
+                <a:schemeClr val="bg1"/>
+              </a:solidFill>
+              <a:latin typeface="Comic Sans MS" panose="030F0902030302020204" pitchFamily="66" charset="0"/>
+            </a:endParaRPr>
+          </a:p>
+          <a:p>
+            <a:pPr algn="l"/>
+            <a:endParaRPr lang="en-US" sz="1600" dirty="0" smtClean="0">
+              <a:solidFill>
+                <a:schemeClr val="bg1"/>
+              </a:solidFill>
+              <a:latin typeface="Comic Sans MS" panose="030F0902030302020204" pitchFamily="66" charset="0"/>
+            </a:endParaRPr>
+          </a:p>
+          <a:p>
+            <a:pPr algn="l"/>
+            <a:endParaRPr lang="en-US" sz="1600" dirty="0">
+              <a:solidFill>
+                <a:schemeClr val="bg1"/>
+              </a:solidFill>
+              <a:latin typeface="Comic Sans MS" panose="030F0902030302020204" pitchFamily="66" charset="0"/>
+            </a:endParaRPr>
+          </a:p>
+          <a:p>
+            <a:pPr algn="l"/>
+            <a:endParaRPr lang="en-US" sz="1600" dirty="0" smtClean="0">
+              <a:solidFill>
+                <a:schemeClr val="bg1"/>
+              </a:solidFill>
+              <a:latin typeface="Comic Sans MS" panose="030F0902030302020204" pitchFamily="66" charset="0"/>
+            </a:endParaRPr>
+          </a:p>
+          <a:p>
+            <a:pPr algn="l"/>
+            <a:endParaRPr lang="en-US" sz="1600" dirty="0">
+              <a:solidFill>
+                <a:schemeClr val="bg1"/>
+              </a:solidFill>
+              <a:latin typeface="Comic Sans MS" panose="030F0902030302020204" pitchFamily="66" charset="0"/>
+            </a:endParaRPr>
+          </a:p>
+          <a:p>
+            <a:pPr algn="l"/>
+            <a:endParaRPr lang="en-US" sz="1600" dirty="0" smtClean="0">
+              <a:solidFill>
+                <a:schemeClr val="bg1"/>
+              </a:solidFill>
+              <a:latin typeface="Comic Sans MS" panose="030F0902030302020204" pitchFamily="66" charset="0"/>
+            </a:endParaRPr>
+          </a:p>
+          <a:p>
+            <a:pPr algn="l"/>
+            <a:endParaRPr lang="en-US" sz="1600" dirty="0">
+              <a:solidFill>
+                <a:schemeClr val="bg1"/>
+              </a:solidFill>
+              <a:latin typeface="Comic Sans MS" panose="030F0902030302020204" pitchFamily="66" charset="0"/>
+            </a:endParaRPr>
+          </a:p>
+          <a:p>
+            <a:pPr algn="l"/>
+            <a:endParaRPr lang="en-US" sz="1600" dirty="0" err="1" smtClean="0">
+              <a:solidFill>
+                <a:schemeClr val="bg1"/>
+              </a:solidFill>
+              <a:latin typeface="Comic Sans MS" panose="030F0902030302020204" pitchFamily="66" charset="0"/>
+            </a:endParaRPr>
+          </a:p>
+        </p:txBody>
+      </p:sp>
+      <p:sp>
+        <p:nvSpPr>
+          <p:cNvPr id="8" name="TextBox 7">
+            <a:extLst>
+              <a:ext uri="{FF2B5EF4-FFF2-40B4-BE49-F238E27FC236}">
+                <a16:creationId xmlns:a16="http://schemas.microsoft.com/office/drawing/2014/main" xmlns="" id="{32820AB9-7CA6-8F41-A812-9F4C46331562}"/>
+              </a:ext>
+            </a:extLst>
+          </p:cNvPr>
+          <p:cNvSpPr txBox="1"/>
+          <p:nvPr/>
+        </p:nvSpPr>
+        <p:spPr>
+          <a:xfrm>
+            <a:off x="1675366" y="1898468"/>
+            <a:ext cx="4296502" cy="4616648"/>
+          </a:xfrm>
+          <a:prstGeom prst="rect">
+            <a:avLst/>
+          </a:prstGeom>
+          <a:noFill/>
+          <a:ln>
+            <a:solidFill>
+              <a:schemeClr val="bg1"/>
+            </a:solidFill>
+          </a:ln>
+        </p:spPr>
+        <p:txBody>
+          <a:bodyPr wrap="square" rtlCol="0">
+            <a:spAutoFit/>
+          </a:bodyPr>
+          <a:lstStyle/>
+          <a:p>
+            <a:pPr algn="l"/>
+            <a:endParaRPr lang="en-US" sz="1400" dirty="0" smtClean="0">
+              <a:solidFill>
+                <a:schemeClr val="bg1"/>
+              </a:solidFill>
+              <a:latin typeface="Comic Sans MS" panose="030F0902030302020204" pitchFamily="66" charset="0"/>
+            </a:endParaRPr>
+          </a:p>
+          <a:p>
+            <a:pPr algn="l"/>
+            <a:endParaRPr lang="en-US" sz="1400" dirty="0">
+              <a:solidFill>
+                <a:schemeClr val="bg1"/>
+              </a:solidFill>
+              <a:latin typeface="Comic Sans MS" panose="030F0902030302020204" pitchFamily="66" charset="0"/>
+            </a:endParaRPr>
+          </a:p>
+          <a:p>
+            <a:pPr algn="l"/>
+            <a:endParaRPr lang="en-US" sz="1400" dirty="0" smtClean="0">
+              <a:solidFill>
+                <a:schemeClr val="bg1"/>
+              </a:solidFill>
+              <a:latin typeface="Comic Sans MS" panose="030F0902030302020204" pitchFamily="66" charset="0"/>
+            </a:endParaRPr>
+          </a:p>
+          <a:p>
+            <a:pPr algn="l"/>
+            <a:endParaRPr lang="en-US" sz="1400" dirty="0">
+              <a:solidFill>
+                <a:schemeClr val="bg1"/>
+              </a:solidFill>
+              <a:latin typeface="Comic Sans MS" panose="030F0902030302020204" pitchFamily="66" charset="0"/>
+            </a:endParaRPr>
+          </a:p>
+          <a:p>
+            <a:pPr algn="l"/>
+            <a:endParaRPr lang="en-US" sz="1400" dirty="0" smtClean="0">
+              <a:solidFill>
+                <a:schemeClr val="bg1"/>
+              </a:solidFill>
+              <a:latin typeface="Comic Sans MS" panose="030F0902030302020204" pitchFamily="66" charset="0"/>
+            </a:endParaRPr>
+          </a:p>
+          <a:p>
+            <a:pPr algn="l"/>
+            <a:endParaRPr lang="en-US" sz="1400" dirty="0">
+              <a:solidFill>
+                <a:schemeClr val="bg1"/>
+              </a:solidFill>
+              <a:latin typeface="Comic Sans MS" panose="030F0902030302020204" pitchFamily="66" charset="0"/>
+            </a:endParaRPr>
+          </a:p>
+          <a:p>
+            <a:pPr algn="l"/>
+            <a:endParaRPr lang="en-US" sz="1400" dirty="0" smtClean="0">
+              <a:solidFill>
+                <a:schemeClr val="bg1"/>
+              </a:solidFill>
+              <a:latin typeface="Comic Sans MS" panose="030F0902030302020204" pitchFamily="66" charset="0"/>
+            </a:endParaRPr>
+          </a:p>
+          <a:p>
+            <a:pPr algn="l"/>
+            <a:endParaRPr lang="en-US" sz="1400" dirty="0">
+              <a:solidFill>
+                <a:schemeClr val="bg1"/>
+              </a:solidFill>
+              <a:latin typeface="Comic Sans MS" panose="030F0902030302020204" pitchFamily="66" charset="0"/>
+            </a:endParaRPr>
+          </a:p>
+          <a:p>
+            <a:pPr algn="l"/>
+            <a:endParaRPr lang="en-US" sz="1400" dirty="0" smtClean="0">
+              <a:solidFill>
+                <a:schemeClr val="bg1"/>
+              </a:solidFill>
+              <a:latin typeface="Comic Sans MS" panose="030F0902030302020204" pitchFamily="66" charset="0"/>
+            </a:endParaRPr>
+          </a:p>
+          <a:p>
+            <a:pPr algn="l"/>
+            <a:endParaRPr lang="en-US" sz="1400" dirty="0">
+              <a:solidFill>
+                <a:schemeClr val="bg1"/>
+              </a:solidFill>
+              <a:latin typeface="Comic Sans MS" panose="030F0902030302020204" pitchFamily="66" charset="0"/>
+            </a:endParaRPr>
+          </a:p>
+          <a:p>
+            <a:pPr algn="l"/>
+            <a:endParaRPr lang="en-US" sz="1400" dirty="0" smtClean="0">
+              <a:solidFill>
+                <a:schemeClr val="bg1"/>
+              </a:solidFill>
+              <a:latin typeface="Comic Sans MS" panose="030F0902030302020204" pitchFamily="66" charset="0"/>
+            </a:endParaRPr>
+          </a:p>
+          <a:p>
+            <a:pPr algn="l"/>
+            <a:endParaRPr lang="en-US" sz="1400" dirty="0">
+              <a:solidFill>
+                <a:schemeClr val="bg1"/>
+              </a:solidFill>
+              <a:latin typeface="Comic Sans MS" panose="030F0902030302020204" pitchFamily="66" charset="0"/>
+            </a:endParaRPr>
+          </a:p>
+          <a:p>
+            <a:pPr algn="l"/>
+            <a:endParaRPr lang="en-US" sz="1400" dirty="0" smtClean="0">
+              <a:solidFill>
+                <a:schemeClr val="bg1"/>
+              </a:solidFill>
+              <a:latin typeface="Comic Sans MS" panose="030F0902030302020204" pitchFamily="66" charset="0"/>
+            </a:endParaRPr>
+          </a:p>
+          <a:p>
+            <a:pPr algn="l"/>
+            <a:endParaRPr lang="en-US" sz="1400" dirty="0">
+              <a:solidFill>
+                <a:schemeClr val="bg1"/>
+              </a:solidFill>
+              <a:latin typeface="Comic Sans MS" panose="030F0902030302020204" pitchFamily="66" charset="0"/>
+            </a:endParaRPr>
+          </a:p>
+          <a:p>
+            <a:pPr algn="l"/>
+            <a:endParaRPr lang="en-US" sz="1400" dirty="0" smtClean="0">
+              <a:solidFill>
+                <a:schemeClr val="bg1"/>
+              </a:solidFill>
+              <a:latin typeface="Comic Sans MS" panose="030F0902030302020204" pitchFamily="66" charset="0"/>
+            </a:endParaRPr>
+          </a:p>
+          <a:p>
+            <a:pPr algn="l"/>
+            <a:endParaRPr lang="en-US" sz="1400" dirty="0">
+              <a:solidFill>
+                <a:schemeClr val="bg1"/>
+              </a:solidFill>
+              <a:latin typeface="Comic Sans MS" panose="030F0902030302020204" pitchFamily="66" charset="0"/>
+            </a:endParaRPr>
+          </a:p>
+          <a:p>
+            <a:pPr algn="l"/>
+            <a:endParaRPr lang="en-US" sz="1400" dirty="0" smtClean="0">
+              <a:solidFill>
+                <a:schemeClr val="bg1"/>
+              </a:solidFill>
+              <a:latin typeface="Comic Sans MS" panose="030F0902030302020204" pitchFamily="66" charset="0"/>
+            </a:endParaRPr>
+          </a:p>
+          <a:p>
+            <a:pPr algn="l"/>
+            <a:endParaRPr lang="en-US" sz="1400" dirty="0">
+              <a:solidFill>
+                <a:schemeClr val="bg1"/>
+              </a:solidFill>
+              <a:latin typeface="Comic Sans MS" panose="030F0902030302020204" pitchFamily="66" charset="0"/>
+            </a:endParaRPr>
+          </a:p>
+          <a:p>
+            <a:pPr algn="l"/>
+            <a:endParaRPr lang="en-US" sz="1400" dirty="0" smtClean="0">
+              <a:solidFill>
+                <a:schemeClr val="bg1"/>
+              </a:solidFill>
+              <a:latin typeface="Comic Sans MS" panose="030F0902030302020204" pitchFamily="66" charset="0"/>
+            </a:endParaRPr>
+          </a:p>
+          <a:p>
+            <a:pPr algn="l"/>
+            <a:endParaRPr lang="en-US" sz="1400" dirty="0">
+              <a:solidFill>
+                <a:schemeClr val="bg1"/>
+              </a:solidFill>
+              <a:latin typeface="Comic Sans MS" panose="030F0902030302020204" pitchFamily="66" charset="0"/>
+            </a:endParaRPr>
+          </a:p>
+          <a:p>
+            <a:pPr algn="l"/>
+            <a:endParaRPr lang="en-US" sz="1400" dirty="0">
+              <a:solidFill>
+                <a:schemeClr val="bg1"/>
+              </a:solidFill>
+              <a:latin typeface="Comic Sans MS" panose="030F0902030302020204" pitchFamily="66" charset="0"/>
+            </a:endParaRPr>
+          </a:p>
+        </p:txBody>
+      </p:sp>
+      <p:sp>
+        <p:nvSpPr>
+          <p:cNvPr id="9" name="TextBox 8">
+            <a:extLst>
+              <a:ext uri="{FF2B5EF4-FFF2-40B4-BE49-F238E27FC236}">
+                <a16:creationId xmlns:a16="http://schemas.microsoft.com/office/drawing/2014/main" xmlns="" id="{32820AB9-7CA6-8F41-A812-9F4C46331562}"/>
+              </a:ext>
+            </a:extLst>
+          </p:cNvPr>
+          <p:cNvSpPr txBox="1"/>
+          <p:nvPr/>
+        </p:nvSpPr>
+        <p:spPr>
+          <a:xfrm>
+            <a:off x="6147511" y="1950715"/>
+            <a:ext cx="4435391" cy="4616648"/>
+          </a:xfrm>
+          <a:prstGeom prst="rect">
+            <a:avLst/>
+          </a:prstGeom>
+          <a:noFill/>
+          <a:ln>
+            <a:solidFill>
+              <a:schemeClr val="bg1"/>
+            </a:solidFill>
+          </a:ln>
+        </p:spPr>
+        <p:txBody>
+          <a:bodyPr wrap="square" rtlCol="0">
+            <a:spAutoFit/>
+          </a:bodyPr>
+          <a:lstStyle/>
+          <a:p>
+            <a:pPr algn="l"/>
+            <a:endParaRPr lang="en-US" sz="1400" dirty="0" smtClean="0">
+              <a:solidFill>
+                <a:schemeClr val="bg1"/>
+              </a:solidFill>
+              <a:latin typeface="Comic Sans MS" panose="030F0902030302020204" pitchFamily="66" charset="0"/>
+            </a:endParaRPr>
+          </a:p>
+          <a:p>
+            <a:pPr algn="l"/>
+            <a:endParaRPr lang="en-US" sz="1400" dirty="0">
+              <a:solidFill>
+                <a:schemeClr val="bg1"/>
+              </a:solidFill>
+              <a:latin typeface="Comic Sans MS" panose="030F0902030302020204" pitchFamily="66" charset="0"/>
+            </a:endParaRPr>
+          </a:p>
+          <a:p>
+            <a:pPr algn="l"/>
+            <a:endParaRPr lang="en-US" sz="1400" dirty="0" smtClean="0">
+              <a:solidFill>
+                <a:schemeClr val="bg1"/>
+              </a:solidFill>
+              <a:latin typeface="Comic Sans MS" panose="030F0902030302020204" pitchFamily="66" charset="0"/>
+            </a:endParaRPr>
+          </a:p>
+          <a:p>
+            <a:pPr algn="l"/>
+            <a:endParaRPr lang="en-US" sz="1400" dirty="0">
+              <a:solidFill>
+                <a:schemeClr val="bg1"/>
+              </a:solidFill>
+              <a:latin typeface="Comic Sans MS" panose="030F0902030302020204" pitchFamily="66" charset="0"/>
+            </a:endParaRPr>
+          </a:p>
+          <a:p>
+            <a:pPr algn="l"/>
+            <a:endParaRPr lang="en-US" sz="1400" dirty="0" smtClean="0">
+              <a:solidFill>
+                <a:schemeClr val="bg1"/>
+              </a:solidFill>
+              <a:latin typeface="Comic Sans MS" panose="030F0902030302020204" pitchFamily="66" charset="0"/>
+            </a:endParaRPr>
+          </a:p>
+          <a:p>
+            <a:pPr algn="l"/>
+            <a:endParaRPr lang="en-US" sz="1400" dirty="0">
+              <a:solidFill>
+                <a:schemeClr val="bg1"/>
+              </a:solidFill>
+              <a:latin typeface="Comic Sans MS" panose="030F0902030302020204" pitchFamily="66" charset="0"/>
+            </a:endParaRPr>
+          </a:p>
+          <a:p>
+            <a:pPr algn="l"/>
+            <a:endParaRPr lang="en-US" sz="1400" dirty="0" smtClean="0">
+              <a:solidFill>
+                <a:schemeClr val="bg1"/>
+              </a:solidFill>
+              <a:latin typeface="Comic Sans MS" panose="030F0902030302020204" pitchFamily="66" charset="0"/>
+            </a:endParaRPr>
+          </a:p>
+          <a:p>
+            <a:pPr algn="l"/>
+            <a:endParaRPr lang="en-US" sz="1400" dirty="0">
+              <a:solidFill>
+                <a:schemeClr val="bg1"/>
+              </a:solidFill>
+              <a:latin typeface="Comic Sans MS" panose="030F0902030302020204" pitchFamily="66" charset="0"/>
+            </a:endParaRPr>
+          </a:p>
+          <a:p>
+            <a:pPr algn="l"/>
+            <a:endParaRPr lang="en-US" sz="1400" dirty="0" smtClean="0">
+              <a:solidFill>
+                <a:schemeClr val="bg1"/>
+              </a:solidFill>
+              <a:latin typeface="Comic Sans MS" panose="030F0902030302020204" pitchFamily="66" charset="0"/>
+            </a:endParaRPr>
+          </a:p>
+          <a:p>
+            <a:pPr algn="l"/>
+            <a:endParaRPr lang="en-US" sz="1400" dirty="0">
+              <a:solidFill>
+                <a:schemeClr val="bg1"/>
+              </a:solidFill>
+              <a:latin typeface="Comic Sans MS" panose="030F0902030302020204" pitchFamily="66" charset="0"/>
+            </a:endParaRPr>
+          </a:p>
+          <a:p>
+            <a:pPr algn="l"/>
+            <a:endParaRPr lang="en-US" sz="1400" dirty="0" smtClean="0">
+              <a:solidFill>
+                <a:schemeClr val="bg1"/>
+              </a:solidFill>
+              <a:latin typeface="Comic Sans MS" panose="030F0902030302020204" pitchFamily="66" charset="0"/>
+            </a:endParaRPr>
+          </a:p>
+          <a:p>
+            <a:pPr algn="l"/>
+            <a:endParaRPr lang="en-US" sz="1400" dirty="0">
+              <a:solidFill>
+                <a:schemeClr val="bg1"/>
+              </a:solidFill>
+              <a:latin typeface="Comic Sans MS" panose="030F0902030302020204" pitchFamily="66" charset="0"/>
+            </a:endParaRPr>
+          </a:p>
+          <a:p>
+            <a:pPr algn="l"/>
+            <a:endParaRPr lang="en-US" sz="1400" dirty="0" smtClean="0">
+              <a:solidFill>
+                <a:schemeClr val="bg1"/>
+              </a:solidFill>
+              <a:latin typeface="Comic Sans MS" panose="030F0902030302020204" pitchFamily="66" charset="0"/>
+            </a:endParaRPr>
+          </a:p>
+          <a:p>
+            <a:pPr algn="l"/>
+            <a:endParaRPr lang="en-US" sz="1400" dirty="0">
+              <a:solidFill>
+                <a:schemeClr val="bg1"/>
+              </a:solidFill>
+              <a:latin typeface="Comic Sans MS" panose="030F0902030302020204" pitchFamily="66" charset="0"/>
+            </a:endParaRPr>
+          </a:p>
+          <a:p>
+            <a:pPr algn="l"/>
+            <a:endParaRPr lang="en-US" sz="1400" dirty="0" smtClean="0">
+              <a:solidFill>
+                <a:schemeClr val="bg1"/>
+              </a:solidFill>
+              <a:latin typeface="Comic Sans MS" panose="030F0902030302020204" pitchFamily="66" charset="0"/>
+            </a:endParaRPr>
+          </a:p>
+          <a:p>
+            <a:pPr algn="l"/>
+            <a:endParaRPr lang="en-US" sz="1400" dirty="0">
+              <a:solidFill>
+                <a:schemeClr val="bg1"/>
+              </a:solidFill>
+              <a:latin typeface="Comic Sans MS" panose="030F0902030302020204" pitchFamily="66" charset="0"/>
+            </a:endParaRPr>
+          </a:p>
+          <a:p>
+            <a:pPr algn="l"/>
+            <a:endParaRPr lang="en-US" sz="1400" dirty="0" smtClean="0">
+              <a:solidFill>
+                <a:schemeClr val="bg1"/>
+              </a:solidFill>
+              <a:latin typeface="Comic Sans MS" panose="030F0902030302020204" pitchFamily="66" charset="0"/>
+            </a:endParaRPr>
+          </a:p>
+          <a:p>
+            <a:pPr algn="l"/>
+            <a:endParaRPr lang="en-US" sz="1400" dirty="0">
+              <a:solidFill>
+                <a:schemeClr val="bg1"/>
+              </a:solidFill>
+              <a:latin typeface="Comic Sans MS" panose="030F0902030302020204" pitchFamily="66" charset="0"/>
+            </a:endParaRPr>
+          </a:p>
+          <a:p>
+            <a:pPr algn="l"/>
+            <a:endParaRPr lang="en-US" sz="1400" dirty="0" smtClean="0">
+              <a:solidFill>
+                <a:schemeClr val="bg1"/>
+              </a:solidFill>
+              <a:latin typeface="Comic Sans MS" panose="030F0902030302020204" pitchFamily="66" charset="0"/>
+            </a:endParaRPr>
+          </a:p>
+          <a:p>
+            <a:pPr algn="l"/>
+            <a:endParaRPr lang="en-US" sz="1400" dirty="0">
+              <a:solidFill>
+                <a:schemeClr val="bg1"/>
+              </a:solidFill>
+              <a:latin typeface="Comic Sans MS" panose="030F0902030302020204" pitchFamily="66" charset="0"/>
+            </a:endParaRPr>
+          </a:p>
+          <a:p>
+            <a:pPr algn="l"/>
+            <a:endParaRPr lang="en-US" sz="1400" dirty="0">
+              <a:solidFill>
+                <a:schemeClr val="bg1"/>
+              </a:solidFill>
+              <a:latin typeface="Comic Sans MS" panose="030F0902030302020204" pitchFamily="66" charset="0"/>
+            </a:endParaRPr>
+          </a:p>
+        </p:txBody>
+      </p:sp>
+      <p:sp>
+        <p:nvSpPr>
+          <p:cNvPr id="10" name="TextBox 9">
+            <a:extLst>
+              <a:ext uri="{FF2B5EF4-FFF2-40B4-BE49-F238E27FC236}">
+                <a16:creationId xmlns:a16="http://schemas.microsoft.com/office/drawing/2014/main" xmlns="" id="{32820AB9-7CA6-8F41-A812-9F4C46331562}"/>
+              </a:ext>
+            </a:extLst>
+          </p:cNvPr>
+          <p:cNvSpPr txBox="1"/>
+          <p:nvPr/>
+        </p:nvSpPr>
+        <p:spPr>
+          <a:xfrm>
+            <a:off x="1754851" y="1979527"/>
+            <a:ext cx="4093222" cy="523220"/>
+          </a:xfrm>
+          <a:prstGeom prst="rect">
+            <a:avLst/>
+          </a:prstGeom>
+          <a:solidFill>
+            <a:schemeClr val="accent1">
+              <a:lumMod val="40000"/>
+              <a:lumOff val="60000"/>
+            </a:schemeClr>
+          </a:solidFill>
+          <a:ln>
+            <a:solidFill>
+              <a:schemeClr val="accent1"/>
+            </a:solidFill>
+          </a:ln>
+        </p:spPr>
+        <p:txBody>
+          <a:bodyPr wrap="square" rtlCol="0">
+            <a:spAutoFit/>
+          </a:bodyPr>
+          <a:lstStyle/>
+          <a:p>
+            <a:pPr algn="l"/>
+            <a:r>
+              <a:rPr lang="en-US" sz="1400" b="1" dirty="0" smtClean="0">
+                <a:solidFill>
+                  <a:schemeClr val="bg1"/>
+                </a:solidFill>
+                <a:latin typeface="Comic Sans MS" panose="030F0902030302020204" pitchFamily="66" charset="0"/>
+              </a:rPr>
+              <a:t>User Name 1</a:t>
+            </a:r>
+          </a:p>
+          <a:p>
+            <a:pPr algn="l"/>
+            <a:r>
+              <a:rPr lang="en-US" sz="1400" dirty="0" smtClean="0">
+                <a:solidFill>
+                  <a:schemeClr val="bg1"/>
+                </a:solidFill>
+                <a:latin typeface="Comic Sans MS" panose="030F0902030302020204" pitchFamily="66" charset="0"/>
+              </a:rPr>
+              <a:t>Last Massage Date</a:t>
+            </a:r>
+            <a:endParaRPr lang="en-US" sz="1400" dirty="0">
+              <a:solidFill>
+                <a:schemeClr val="bg1"/>
+              </a:solidFill>
+              <a:latin typeface="Comic Sans MS" panose="030F0902030302020204" pitchFamily="66" charset="0"/>
+            </a:endParaRPr>
+          </a:p>
+        </p:txBody>
+      </p:sp>
+      <p:sp>
+        <p:nvSpPr>
+          <p:cNvPr id="11" name="TextBox 10">
+            <a:extLst>
+              <a:ext uri="{FF2B5EF4-FFF2-40B4-BE49-F238E27FC236}">
+                <a16:creationId xmlns:a16="http://schemas.microsoft.com/office/drawing/2014/main" xmlns="" id="{32820AB9-7CA6-8F41-A812-9F4C46331562}"/>
+              </a:ext>
+            </a:extLst>
+          </p:cNvPr>
+          <p:cNvSpPr txBox="1"/>
+          <p:nvPr/>
+        </p:nvSpPr>
+        <p:spPr>
+          <a:xfrm>
+            <a:off x="1754851" y="2543969"/>
+            <a:ext cx="4093222" cy="523220"/>
+          </a:xfrm>
+          <a:prstGeom prst="rect">
+            <a:avLst/>
+          </a:prstGeom>
+          <a:noFill/>
+          <a:ln>
+            <a:solidFill>
+              <a:schemeClr val="bg1"/>
+            </a:solidFill>
+          </a:ln>
+        </p:spPr>
+        <p:txBody>
+          <a:bodyPr wrap="square" rtlCol="0">
+            <a:spAutoFit/>
+          </a:bodyPr>
+          <a:lstStyle/>
+          <a:p>
+            <a:r>
+              <a:rPr lang="en-US" sz="1400" b="1" dirty="0">
+                <a:solidFill>
+                  <a:schemeClr val="bg1"/>
+                </a:solidFill>
+                <a:latin typeface="Comic Sans MS" panose="030F0902030302020204" pitchFamily="66" charset="0"/>
+              </a:rPr>
+              <a:t>User </a:t>
+            </a:r>
+            <a:r>
+              <a:rPr lang="en-US" sz="1400" b="1" dirty="0" smtClean="0">
+                <a:solidFill>
+                  <a:schemeClr val="bg1"/>
+                </a:solidFill>
+                <a:latin typeface="Comic Sans MS" panose="030F0902030302020204" pitchFamily="66" charset="0"/>
+              </a:rPr>
+              <a:t>Name 2</a:t>
+            </a:r>
+            <a:endParaRPr lang="en-US" sz="1400" b="1" dirty="0">
+              <a:solidFill>
+                <a:schemeClr val="bg1"/>
+              </a:solidFill>
+              <a:latin typeface="Comic Sans MS" panose="030F0902030302020204" pitchFamily="66" charset="0"/>
+            </a:endParaRPr>
+          </a:p>
+          <a:p>
+            <a:r>
+              <a:rPr lang="en-US" sz="1400" dirty="0">
+                <a:solidFill>
+                  <a:schemeClr val="bg1"/>
+                </a:solidFill>
+                <a:latin typeface="Comic Sans MS" panose="030F0902030302020204" pitchFamily="66" charset="0"/>
+              </a:rPr>
+              <a:t>Last Massage Date</a:t>
+            </a:r>
+            <a:endParaRPr lang="en-US" sz="1400" dirty="0">
+              <a:solidFill>
+                <a:schemeClr val="bg1"/>
+              </a:solidFill>
+              <a:latin typeface="Comic Sans MS" panose="030F0902030302020204" pitchFamily="66" charset="0"/>
+            </a:endParaRPr>
+          </a:p>
+        </p:txBody>
+      </p:sp>
+      <p:sp>
+        <p:nvSpPr>
+          <p:cNvPr id="12" name="TextBox 11">
+            <a:extLst>
+              <a:ext uri="{FF2B5EF4-FFF2-40B4-BE49-F238E27FC236}">
+                <a16:creationId xmlns:a16="http://schemas.microsoft.com/office/drawing/2014/main" xmlns="" id="{32820AB9-7CA6-8F41-A812-9F4C46331562}"/>
+              </a:ext>
+            </a:extLst>
+          </p:cNvPr>
+          <p:cNvSpPr txBox="1"/>
+          <p:nvPr/>
+        </p:nvSpPr>
+        <p:spPr>
+          <a:xfrm>
+            <a:off x="1754851" y="3126641"/>
+            <a:ext cx="4093222" cy="523220"/>
+          </a:xfrm>
+          <a:prstGeom prst="rect">
+            <a:avLst/>
+          </a:prstGeom>
+          <a:noFill/>
+          <a:ln>
+            <a:solidFill>
+              <a:schemeClr val="bg1"/>
+            </a:solidFill>
+          </a:ln>
+        </p:spPr>
+        <p:txBody>
+          <a:bodyPr wrap="square" rtlCol="0">
+            <a:spAutoFit/>
+          </a:bodyPr>
+          <a:lstStyle/>
+          <a:p>
+            <a:r>
+              <a:rPr lang="en-US" sz="1400" b="1" dirty="0">
+                <a:solidFill>
+                  <a:schemeClr val="bg1"/>
+                </a:solidFill>
+                <a:latin typeface="Comic Sans MS" panose="030F0902030302020204" pitchFamily="66" charset="0"/>
+              </a:rPr>
+              <a:t>User </a:t>
+            </a:r>
+            <a:r>
+              <a:rPr lang="en-US" sz="1400" b="1" dirty="0" smtClean="0">
+                <a:solidFill>
+                  <a:schemeClr val="bg1"/>
+                </a:solidFill>
+                <a:latin typeface="Comic Sans MS" panose="030F0902030302020204" pitchFamily="66" charset="0"/>
+              </a:rPr>
+              <a:t>Name 3</a:t>
+            </a:r>
+            <a:endParaRPr lang="en-US" sz="1400" b="1" dirty="0">
+              <a:solidFill>
+                <a:schemeClr val="bg1"/>
+              </a:solidFill>
+              <a:latin typeface="Comic Sans MS" panose="030F0902030302020204" pitchFamily="66" charset="0"/>
+            </a:endParaRPr>
+          </a:p>
+          <a:p>
+            <a:r>
+              <a:rPr lang="en-US" sz="1400" dirty="0">
+                <a:solidFill>
+                  <a:schemeClr val="bg1"/>
+                </a:solidFill>
+                <a:latin typeface="Comic Sans MS" panose="030F0902030302020204" pitchFamily="66" charset="0"/>
+              </a:rPr>
+              <a:t>Last Massage Date</a:t>
+            </a:r>
+            <a:endParaRPr lang="en-US" sz="1400" dirty="0">
+              <a:solidFill>
+                <a:schemeClr val="bg1"/>
+              </a:solidFill>
+              <a:latin typeface="Comic Sans MS" panose="030F0902030302020204" pitchFamily="66" charset="0"/>
+            </a:endParaRPr>
+          </a:p>
+        </p:txBody>
+      </p:sp>
+      <p:sp>
+        <p:nvSpPr>
+          <p:cNvPr id="13" name="TextBox 12">
+            <a:extLst>
+              <a:ext uri="{FF2B5EF4-FFF2-40B4-BE49-F238E27FC236}">
+                <a16:creationId xmlns:a16="http://schemas.microsoft.com/office/drawing/2014/main" xmlns="" id="{32820AB9-7CA6-8F41-A812-9F4C46331562}"/>
+              </a:ext>
+            </a:extLst>
+          </p:cNvPr>
+          <p:cNvSpPr txBox="1"/>
+          <p:nvPr/>
+        </p:nvSpPr>
+        <p:spPr>
+          <a:xfrm>
+            <a:off x="1754851" y="3711361"/>
+            <a:ext cx="4093222" cy="523220"/>
+          </a:xfrm>
+          <a:prstGeom prst="rect">
+            <a:avLst/>
+          </a:prstGeom>
+          <a:noFill/>
+          <a:ln>
+            <a:solidFill>
+              <a:schemeClr val="bg1"/>
+            </a:solidFill>
+          </a:ln>
+        </p:spPr>
+        <p:txBody>
+          <a:bodyPr wrap="square" rtlCol="0">
+            <a:spAutoFit/>
+          </a:bodyPr>
+          <a:lstStyle/>
+          <a:p>
+            <a:r>
+              <a:rPr lang="en-US" sz="1400" b="1" dirty="0">
+                <a:solidFill>
+                  <a:schemeClr val="bg1"/>
+                </a:solidFill>
+                <a:latin typeface="Comic Sans MS" panose="030F0902030302020204" pitchFamily="66" charset="0"/>
+              </a:rPr>
+              <a:t>User </a:t>
+            </a:r>
+            <a:r>
+              <a:rPr lang="en-US" sz="1400" b="1" dirty="0" smtClean="0">
+                <a:solidFill>
+                  <a:schemeClr val="bg1"/>
+                </a:solidFill>
+                <a:latin typeface="Comic Sans MS" panose="030F0902030302020204" pitchFamily="66" charset="0"/>
+              </a:rPr>
+              <a:t>Name 4</a:t>
+            </a:r>
+            <a:endParaRPr lang="en-US" sz="1400" b="1" dirty="0">
+              <a:solidFill>
+                <a:schemeClr val="bg1"/>
+              </a:solidFill>
+              <a:latin typeface="Comic Sans MS" panose="030F0902030302020204" pitchFamily="66" charset="0"/>
+            </a:endParaRPr>
+          </a:p>
+          <a:p>
+            <a:r>
+              <a:rPr lang="en-US" sz="1400" dirty="0">
+                <a:solidFill>
+                  <a:schemeClr val="bg1"/>
+                </a:solidFill>
+                <a:latin typeface="Comic Sans MS" panose="030F0902030302020204" pitchFamily="66" charset="0"/>
+              </a:rPr>
+              <a:t>Last Massage Date</a:t>
+            </a:r>
+            <a:endParaRPr lang="en-US" sz="1400" dirty="0">
+              <a:solidFill>
+                <a:schemeClr val="bg1"/>
+              </a:solidFill>
+              <a:latin typeface="Comic Sans MS" panose="030F0902030302020204" pitchFamily="66" charset="0"/>
+            </a:endParaRPr>
+          </a:p>
+        </p:txBody>
+      </p:sp>
+      <p:sp>
+        <p:nvSpPr>
+          <p:cNvPr id="14" name="TextBox 13">
+            <a:extLst>
+              <a:ext uri="{FF2B5EF4-FFF2-40B4-BE49-F238E27FC236}">
+                <a16:creationId xmlns:a16="http://schemas.microsoft.com/office/drawing/2014/main" xmlns="" id="{32820AB9-7CA6-8F41-A812-9F4C46331562}"/>
+              </a:ext>
+            </a:extLst>
+          </p:cNvPr>
+          <p:cNvSpPr txBox="1"/>
+          <p:nvPr/>
+        </p:nvSpPr>
+        <p:spPr>
+          <a:xfrm>
+            <a:off x="1754851" y="4323100"/>
+            <a:ext cx="4093222" cy="523220"/>
+          </a:xfrm>
+          <a:prstGeom prst="rect">
+            <a:avLst/>
+          </a:prstGeom>
+          <a:noFill/>
+          <a:ln>
+            <a:solidFill>
+              <a:schemeClr val="bg1"/>
+            </a:solidFill>
+          </a:ln>
+        </p:spPr>
+        <p:txBody>
+          <a:bodyPr wrap="square" rtlCol="0">
+            <a:spAutoFit/>
+          </a:bodyPr>
+          <a:lstStyle/>
+          <a:p>
+            <a:r>
+              <a:rPr lang="en-US" sz="1400" b="1" dirty="0">
+                <a:solidFill>
+                  <a:schemeClr val="bg1"/>
+                </a:solidFill>
+                <a:latin typeface="Comic Sans MS" panose="030F0902030302020204" pitchFamily="66" charset="0"/>
+              </a:rPr>
+              <a:t>User </a:t>
+            </a:r>
+            <a:r>
+              <a:rPr lang="en-US" sz="1400" b="1" dirty="0" smtClean="0">
+                <a:solidFill>
+                  <a:schemeClr val="bg1"/>
+                </a:solidFill>
+                <a:latin typeface="Comic Sans MS" panose="030F0902030302020204" pitchFamily="66" charset="0"/>
+              </a:rPr>
+              <a:t>Name 5</a:t>
+            </a:r>
+            <a:endParaRPr lang="en-US" sz="1400" b="1" dirty="0">
+              <a:solidFill>
+                <a:schemeClr val="bg1"/>
+              </a:solidFill>
+              <a:latin typeface="Comic Sans MS" panose="030F0902030302020204" pitchFamily="66" charset="0"/>
+            </a:endParaRPr>
+          </a:p>
+          <a:p>
+            <a:r>
+              <a:rPr lang="en-US" sz="1400" dirty="0">
+                <a:solidFill>
+                  <a:schemeClr val="bg1"/>
+                </a:solidFill>
+                <a:latin typeface="Comic Sans MS" panose="030F0902030302020204" pitchFamily="66" charset="0"/>
+              </a:rPr>
+              <a:t>Last Massage Date</a:t>
+            </a:r>
+            <a:endParaRPr lang="en-US" sz="1400" dirty="0">
+              <a:solidFill>
+                <a:schemeClr val="bg1"/>
+              </a:solidFill>
+              <a:latin typeface="Comic Sans MS" panose="030F0902030302020204" pitchFamily="66" charset="0"/>
+            </a:endParaRPr>
+          </a:p>
+        </p:txBody>
+      </p:sp>
+      <p:sp>
+        <p:nvSpPr>
+          <p:cNvPr id="15" name="TextBox 14">
+            <a:extLst>
+              <a:ext uri="{FF2B5EF4-FFF2-40B4-BE49-F238E27FC236}">
+                <a16:creationId xmlns:a16="http://schemas.microsoft.com/office/drawing/2014/main" xmlns="" id="{32820AB9-7CA6-8F41-A812-9F4C46331562}"/>
+              </a:ext>
+            </a:extLst>
+          </p:cNvPr>
+          <p:cNvSpPr txBox="1"/>
+          <p:nvPr/>
+        </p:nvSpPr>
+        <p:spPr>
+          <a:xfrm>
+            <a:off x="1754851" y="4934840"/>
+            <a:ext cx="4093222" cy="523220"/>
+          </a:xfrm>
+          <a:prstGeom prst="rect">
+            <a:avLst/>
+          </a:prstGeom>
+          <a:noFill/>
+          <a:ln>
+            <a:solidFill>
+              <a:schemeClr val="bg1"/>
+            </a:solidFill>
+          </a:ln>
+        </p:spPr>
+        <p:txBody>
+          <a:bodyPr wrap="square" rtlCol="0">
+            <a:spAutoFit/>
+          </a:bodyPr>
+          <a:lstStyle/>
+          <a:p>
+            <a:r>
+              <a:rPr lang="en-US" sz="1400" b="1" dirty="0">
+                <a:solidFill>
+                  <a:schemeClr val="bg1"/>
+                </a:solidFill>
+                <a:latin typeface="Comic Sans MS" panose="030F0902030302020204" pitchFamily="66" charset="0"/>
+              </a:rPr>
+              <a:t>User </a:t>
+            </a:r>
+            <a:r>
+              <a:rPr lang="en-US" sz="1400" b="1" dirty="0" smtClean="0">
+                <a:solidFill>
+                  <a:schemeClr val="bg1"/>
+                </a:solidFill>
+                <a:latin typeface="Comic Sans MS" panose="030F0902030302020204" pitchFamily="66" charset="0"/>
+              </a:rPr>
+              <a:t>Name 6</a:t>
+            </a:r>
+            <a:endParaRPr lang="en-US" sz="1400" b="1" dirty="0">
+              <a:solidFill>
+                <a:schemeClr val="bg1"/>
+              </a:solidFill>
+              <a:latin typeface="Comic Sans MS" panose="030F0902030302020204" pitchFamily="66" charset="0"/>
+            </a:endParaRPr>
+          </a:p>
+          <a:p>
+            <a:r>
+              <a:rPr lang="en-US" sz="1400" dirty="0">
+                <a:solidFill>
+                  <a:schemeClr val="bg1"/>
+                </a:solidFill>
+                <a:latin typeface="Comic Sans MS" panose="030F0902030302020204" pitchFamily="66" charset="0"/>
+              </a:rPr>
+              <a:t>Last Massage Date</a:t>
+            </a:r>
+            <a:endParaRPr lang="en-US" sz="1400" dirty="0">
+              <a:solidFill>
+                <a:schemeClr val="bg1"/>
+              </a:solidFill>
+              <a:latin typeface="Comic Sans MS" panose="030F0902030302020204" pitchFamily="66" charset="0"/>
+            </a:endParaRPr>
+          </a:p>
+        </p:txBody>
+      </p:sp>
+      <p:sp>
+        <p:nvSpPr>
+          <p:cNvPr id="16" name="TextBox 15">
+            <a:extLst>
+              <a:ext uri="{FF2B5EF4-FFF2-40B4-BE49-F238E27FC236}">
+                <a16:creationId xmlns:a16="http://schemas.microsoft.com/office/drawing/2014/main" xmlns="" id="{32820AB9-7CA6-8F41-A812-9F4C46331562}"/>
+              </a:ext>
+            </a:extLst>
+          </p:cNvPr>
+          <p:cNvSpPr txBox="1"/>
+          <p:nvPr/>
+        </p:nvSpPr>
+        <p:spPr>
+          <a:xfrm>
+            <a:off x="1757046" y="5552630"/>
+            <a:ext cx="4093222" cy="523220"/>
+          </a:xfrm>
+          <a:prstGeom prst="rect">
+            <a:avLst/>
+          </a:prstGeom>
+          <a:noFill/>
+          <a:ln>
+            <a:solidFill>
+              <a:schemeClr val="bg1"/>
+            </a:solidFill>
+          </a:ln>
+        </p:spPr>
+        <p:txBody>
+          <a:bodyPr wrap="square" rtlCol="0">
+            <a:spAutoFit/>
+          </a:bodyPr>
+          <a:lstStyle/>
+          <a:p>
+            <a:r>
+              <a:rPr lang="en-US" sz="1400" b="1" dirty="0">
+                <a:solidFill>
+                  <a:schemeClr val="bg1"/>
+                </a:solidFill>
+                <a:latin typeface="Comic Sans MS" panose="030F0902030302020204" pitchFamily="66" charset="0"/>
+              </a:rPr>
+              <a:t>User </a:t>
+            </a:r>
+            <a:r>
+              <a:rPr lang="en-US" sz="1400" b="1" dirty="0" smtClean="0">
+                <a:solidFill>
+                  <a:schemeClr val="bg1"/>
+                </a:solidFill>
+                <a:latin typeface="Comic Sans MS" panose="030F0902030302020204" pitchFamily="66" charset="0"/>
+              </a:rPr>
+              <a:t>Name 7</a:t>
+            </a:r>
+            <a:endParaRPr lang="en-US" sz="1400" b="1" dirty="0">
+              <a:solidFill>
+                <a:schemeClr val="bg1"/>
+              </a:solidFill>
+              <a:latin typeface="Comic Sans MS" panose="030F0902030302020204" pitchFamily="66" charset="0"/>
+            </a:endParaRPr>
+          </a:p>
+          <a:p>
+            <a:r>
+              <a:rPr lang="en-US" sz="1400" dirty="0">
+                <a:solidFill>
+                  <a:schemeClr val="bg1"/>
+                </a:solidFill>
+                <a:latin typeface="Comic Sans MS" panose="030F0902030302020204" pitchFamily="66" charset="0"/>
+              </a:rPr>
+              <a:t>Last Massage Date</a:t>
+            </a:r>
+            <a:endParaRPr lang="en-US" sz="1400" dirty="0">
+              <a:solidFill>
+                <a:schemeClr val="bg1"/>
+              </a:solidFill>
+              <a:latin typeface="Comic Sans MS" panose="030F0902030302020204" pitchFamily="66" charset="0"/>
+            </a:endParaRPr>
+          </a:p>
+        </p:txBody>
+      </p:sp>
+      <p:sp>
+        <p:nvSpPr>
+          <p:cNvPr id="17" name="TextBox 16">
+            <a:extLst>
+              <a:ext uri="{FF2B5EF4-FFF2-40B4-BE49-F238E27FC236}">
+                <a16:creationId xmlns:a16="http://schemas.microsoft.com/office/drawing/2014/main" xmlns="" id="{32820AB9-7CA6-8F41-A812-9F4C46331562}"/>
+              </a:ext>
+            </a:extLst>
+          </p:cNvPr>
+          <p:cNvSpPr txBox="1"/>
+          <p:nvPr/>
+        </p:nvSpPr>
+        <p:spPr>
+          <a:xfrm>
+            <a:off x="6232971" y="5239874"/>
+            <a:ext cx="4282376" cy="1169551"/>
+          </a:xfrm>
+          <a:prstGeom prst="rect">
+            <a:avLst/>
+          </a:prstGeom>
+          <a:noFill/>
+          <a:ln>
+            <a:solidFill>
+              <a:schemeClr val="bg1"/>
+            </a:solidFill>
+          </a:ln>
+        </p:spPr>
+        <p:txBody>
+          <a:bodyPr wrap="square" rtlCol="0">
+            <a:spAutoFit/>
+          </a:bodyPr>
+          <a:lstStyle/>
+          <a:p>
+            <a:r>
+              <a:rPr lang="en-US" sz="1400" dirty="0" smtClean="0">
+                <a:solidFill>
+                  <a:schemeClr val="bg1"/>
+                </a:solidFill>
+                <a:latin typeface="Comic Sans MS" panose="030F0902030302020204" pitchFamily="66" charset="0"/>
+              </a:rPr>
+              <a:t>New message textbox</a:t>
+            </a:r>
+          </a:p>
+          <a:p>
+            <a:endParaRPr lang="en-US" sz="1400" dirty="0">
+              <a:solidFill>
+                <a:schemeClr val="bg1"/>
+              </a:solidFill>
+              <a:latin typeface="Comic Sans MS" panose="030F0902030302020204" pitchFamily="66" charset="0"/>
+            </a:endParaRPr>
+          </a:p>
+          <a:p>
+            <a:endParaRPr lang="en-US" sz="1400" dirty="0" smtClean="0">
+              <a:solidFill>
+                <a:schemeClr val="bg1"/>
+              </a:solidFill>
+              <a:latin typeface="Comic Sans MS" panose="030F0902030302020204" pitchFamily="66" charset="0"/>
+            </a:endParaRPr>
+          </a:p>
+          <a:p>
+            <a:endParaRPr lang="en-US" sz="1400" dirty="0">
+              <a:solidFill>
+                <a:schemeClr val="bg1"/>
+              </a:solidFill>
+              <a:latin typeface="Comic Sans MS" panose="030F0902030302020204" pitchFamily="66" charset="0"/>
+            </a:endParaRPr>
+          </a:p>
+          <a:p>
+            <a:endParaRPr lang="en-US" sz="1400" dirty="0">
+              <a:solidFill>
+                <a:schemeClr val="bg1"/>
+              </a:solidFill>
+              <a:latin typeface="Comic Sans MS" panose="030F0902030302020204" pitchFamily="66" charset="0"/>
+            </a:endParaRPr>
+          </a:p>
+        </p:txBody>
+      </p:sp>
+      <p:sp>
+        <p:nvSpPr>
+          <p:cNvPr id="18" name="TextBox 17">
+            <a:extLst>
+              <a:ext uri="{FF2B5EF4-FFF2-40B4-BE49-F238E27FC236}">
+                <a16:creationId xmlns:a16="http://schemas.microsoft.com/office/drawing/2014/main" xmlns="" id="{32820AB9-7CA6-8F41-A812-9F4C46331562}"/>
+              </a:ext>
+            </a:extLst>
+          </p:cNvPr>
+          <p:cNvSpPr txBox="1"/>
+          <p:nvPr/>
+        </p:nvSpPr>
+        <p:spPr>
+          <a:xfrm>
+            <a:off x="6232972" y="2020749"/>
+            <a:ext cx="2184389" cy="307777"/>
+          </a:xfrm>
+          <a:prstGeom prst="rect">
+            <a:avLst/>
+          </a:prstGeom>
+          <a:noFill/>
+          <a:ln>
+            <a:noFill/>
+          </a:ln>
+        </p:spPr>
+        <p:txBody>
+          <a:bodyPr wrap="square" rtlCol="0">
+            <a:spAutoFit/>
+          </a:bodyPr>
+          <a:lstStyle/>
+          <a:p>
+            <a:r>
+              <a:rPr lang="en-US" sz="1400" dirty="0" smtClean="0">
+                <a:solidFill>
+                  <a:schemeClr val="bg1"/>
+                </a:solidFill>
+                <a:latin typeface="Comic Sans MS" panose="030F0902030302020204" pitchFamily="66" charset="0"/>
+              </a:rPr>
+              <a:t>Hello!!</a:t>
+            </a:r>
+            <a:endParaRPr lang="en-US" sz="1400" dirty="0">
+              <a:solidFill>
+                <a:schemeClr val="bg1"/>
+              </a:solidFill>
+              <a:latin typeface="Comic Sans MS" panose="030F0902030302020204" pitchFamily="66" charset="0"/>
+            </a:endParaRPr>
+          </a:p>
+        </p:txBody>
+      </p:sp>
+      <p:sp>
+        <p:nvSpPr>
+          <p:cNvPr id="20" name="TextBox 19">
+            <a:extLst>
+              <a:ext uri="{FF2B5EF4-FFF2-40B4-BE49-F238E27FC236}">
+                <a16:creationId xmlns:a16="http://schemas.microsoft.com/office/drawing/2014/main" xmlns="" id="{32820AB9-7CA6-8F41-A812-9F4C46331562}"/>
+              </a:ext>
+            </a:extLst>
+          </p:cNvPr>
+          <p:cNvSpPr txBox="1"/>
+          <p:nvPr/>
+        </p:nvSpPr>
+        <p:spPr>
+          <a:xfrm>
+            <a:off x="8398513" y="2359749"/>
+            <a:ext cx="2184389" cy="307777"/>
+          </a:xfrm>
+          <a:prstGeom prst="rect">
+            <a:avLst/>
+          </a:prstGeom>
+          <a:solidFill>
+            <a:srgbClr val="C5E0B4"/>
+          </a:solidFill>
+          <a:ln>
+            <a:noFill/>
+          </a:ln>
+        </p:spPr>
+        <p:txBody>
+          <a:bodyPr wrap="square" rtlCol="0">
+            <a:spAutoFit/>
+          </a:bodyPr>
+          <a:lstStyle/>
+          <a:p>
+            <a:r>
+              <a:rPr lang="en-US" sz="1400" dirty="0" smtClean="0">
+                <a:solidFill>
+                  <a:schemeClr val="bg1"/>
+                </a:solidFill>
+                <a:latin typeface="Comic Sans MS" panose="030F0902030302020204" pitchFamily="66" charset="0"/>
+              </a:rPr>
+              <a:t>Hello!</a:t>
+            </a:r>
+            <a:endParaRPr lang="en-US" sz="1400" dirty="0">
+              <a:solidFill>
+                <a:schemeClr val="bg1"/>
+              </a:solidFill>
+              <a:latin typeface="Comic Sans MS" panose="030F0902030302020204" pitchFamily="66" charset="0"/>
+            </a:endParaRPr>
+          </a:p>
+        </p:txBody>
+      </p:sp>
+      <p:sp>
+        <p:nvSpPr>
+          <p:cNvPr id="21" name="TextBox 20">
+            <a:extLst>
+              <a:ext uri="{FF2B5EF4-FFF2-40B4-BE49-F238E27FC236}">
+                <a16:creationId xmlns:a16="http://schemas.microsoft.com/office/drawing/2014/main" xmlns="" id="{32820AB9-7CA6-8F41-A812-9F4C46331562}"/>
+              </a:ext>
+            </a:extLst>
+          </p:cNvPr>
+          <p:cNvSpPr txBox="1"/>
+          <p:nvPr/>
+        </p:nvSpPr>
+        <p:spPr>
+          <a:xfrm>
+            <a:off x="6232972" y="2782773"/>
+            <a:ext cx="2184389" cy="738664"/>
+          </a:xfrm>
+          <a:prstGeom prst="rect">
+            <a:avLst/>
+          </a:prstGeom>
+          <a:noFill/>
+          <a:ln>
+            <a:noFill/>
+          </a:ln>
+        </p:spPr>
+        <p:txBody>
+          <a:bodyPr wrap="square" rtlCol="0">
+            <a:spAutoFit/>
+          </a:bodyPr>
+          <a:lstStyle/>
+          <a:p>
+            <a:r>
+              <a:rPr lang="en-US" sz="1400" dirty="0" err="1" smtClean="0">
+                <a:solidFill>
+                  <a:schemeClr val="bg1"/>
+                </a:solidFill>
+                <a:latin typeface="Comic Sans MS" panose="030F0902030302020204" pitchFamily="66" charset="0"/>
+              </a:rPr>
+              <a:t>Yeoeive</a:t>
+            </a:r>
+            <a:r>
+              <a:rPr lang="en-US" sz="1400" dirty="0" smtClean="0">
+                <a:solidFill>
+                  <a:schemeClr val="bg1"/>
+                </a:solidFill>
+                <a:latin typeface="Comic Sans MS" panose="030F0902030302020204" pitchFamily="66" charset="0"/>
+              </a:rPr>
+              <a:t> </a:t>
+            </a:r>
+            <a:r>
+              <a:rPr lang="en-US" sz="1400" dirty="0" err="1" smtClean="0">
+                <a:solidFill>
+                  <a:schemeClr val="bg1"/>
+                </a:solidFill>
+                <a:latin typeface="Comic Sans MS" panose="030F0902030302020204" pitchFamily="66" charset="0"/>
+              </a:rPr>
+              <a:t>ien</a:t>
+            </a:r>
+            <a:r>
+              <a:rPr lang="en-US" sz="1400" dirty="0" smtClean="0">
+                <a:solidFill>
+                  <a:schemeClr val="bg1"/>
+                </a:solidFill>
+                <a:latin typeface="Comic Sans MS" panose="030F0902030302020204" pitchFamily="66" charset="0"/>
+              </a:rPr>
+              <a:t> </a:t>
+            </a:r>
+            <a:r>
+              <a:rPr lang="en-US" sz="1400" dirty="0" err="1" smtClean="0">
+                <a:solidFill>
+                  <a:schemeClr val="bg1"/>
+                </a:solidFill>
+                <a:latin typeface="Comic Sans MS" panose="030F0902030302020204" pitchFamily="66" charset="0"/>
+              </a:rPr>
+              <a:t>evka</a:t>
+            </a:r>
+            <a:r>
+              <a:rPr lang="en-US" sz="1400" dirty="0" smtClean="0">
+                <a:solidFill>
+                  <a:schemeClr val="bg1"/>
+                </a:solidFill>
+                <a:latin typeface="Comic Sans MS" panose="030F0902030302020204" pitchFamily="66" charset="0"/>
+              </a:rPr>
+              <a:t> </a:t>
+            </a:r>
+            <a:r>
+              <a:rPr lang="en-US" sz="1400" dirty="0" err="1" smtClean="0">
+                <a:solidFill>
+                  <a:schemeClr val="bg1"/>
+                </a:solidFill>
+                <a:latin typeface="Comic Sans MS" panose="030F0902030302020204" pitchFamily="66" charset="0"/>
+              </a:rPr>
+              <a:t>eignw</a:t>
+            </a:r>
+            <a:r>
+              <a:rPr lang="en-US" sz="1400" dirty="0" smtClean="0">
+                <a:solidFill>
+                  <a:schemeClr val="bg1"/>
+                </a:solidFill>
+                <a:latin typeface="Comic Sans MS" panose="030F0902030302020204" pitchFamily="66" charset="0"/>
+              </a:rPr>
+              <a:t> </a:t>
+            </a:r>
+            <a:r>
+              <a:rPr lang="en-US" sz="1400" dirty="0" err="1" smtClean="0">
+                <a:solidFill>
+                  <a:schemeClr val="bg1"/>
+                </a:solidFill>
+                <a:latin typeface="Comic Sans MS" panose="030F0902030302020204" pitchFamily="66" charset="0"/>
+              </a:rPr>
+              <a:t>vinwvwnvw</a:t>
+            </a:r>
+            <a:r>
+              <a:rPr lang="en-US" sz="1400" dirty="0" smtClean="0">
+                <a:solidFill>
+                  <a:schemeClr val="bg1"/>
+                </a:solidFill>
+                <a:latin typeface="Comic Sans MS" panose="030F0902030302020204" pitchFamily="66" charset="0"/>
+              </a:rPr>
+              <a:t> </a:t>
+            </a:r>
+            <a:r>
+              <a:rPr lang="en-US" sz="1400" dirty="0" err="1" smtClean="0">
+                <a:solidFill>
+                  <a:schemeClr val="bg1"/>
+                </a:solidFill>
+                <a:latin typeface="Comic Sans MS" panose="030F0902030302020204" pitchFamily="66" charset="0"/>
+              </a:rPr>
+              <a:t>kwk</a:t>
+            </a:r>
+            <a:r>
+              <a:rPr lang="en-US" sz="1400" dirty="0" smtClean="0">
+                <a:solidFill>
+                  <a:schemeClr val="bg1"/>
+                </a:solidFill>
+                <a:latin typeface="Comic Sans MS" panose="030F0902030302020204" pitchFamily="66" charset="0"/>
+              </a:rPr>
+              <a:t> </a:t>
+            </a:r>
+            <a:r>
+              <a:rPr lang="en-US" sz="1400" dirty="0" err="1" smtClean="0">
+                <a:solidFill>
+                  <a:schemeClr val="bg1"/>
+                </a:solidFill>
+                <a:latin typeface="Comic Sans MS" panose="030F0902030302020204" pitchFamily="66" charset="0"/>
+              </a:rPr>
+              <a:t>ei</a:t>
+            </a:r>
+            <a:r>
+              <a:rPr lang="en-US" sz="1400" dirty="0" smtClean="0">
+                <a:solidFill>
+                  <a:schemeClr val="bg1"/>
+                </a:solidFill>
+                <a:latin typeface="Comic Sans MS" panose="030F0902030302020204" pitchFamily="66" charset="0"/>
+              </a:rPr>
+              <a:t> </a:t>
+            </a:r>
+            <a:r>
+              <a:rPr lang="en-US" sz="1400" dirty="0" err="1" smtClean="0">
+                <a:solidFill>
+                  <a:schemeClr val="bg1"/>
+                </a:solidFill>
+                <a:latin typeface="Comic Sans MS" panose="030F0902030302020204" pitchFamily="66" charset="0"/>
+              </a:rPr>
+              <a:t>ienge</a:t>
+            </a:r>
+            <a:r>
+              <a:rPr lang="en-US" sz="1400" dirty="0" smtClean="0">
+                <a:solidFill>
+                  <a:schemeClr val="bg1"/>
+                </a:solidFill>
+                <a:latin typeface="Comic Sans MS" panose="030F0902030302020204" pitchFamily="66" charset="0"/>
+              </a:rPr>
+              <a:t> </a:t>
+            </a:r>
+            <a:r>
+              <a:rPr lang="en-US" sz="1400" dirty="0" err="1" smtClean="0">
+                <a:solidFill>
+                  <a:schemeClr val="bg1"/>
+                </a:solidFill>
+                <a:latin typeface="Comic Sans MS" panose="030F0902030302020204" pitchFamily="66" charset="0"/>
+              </a:rPr>
+              <a:t>iegoe</a:t>
+            </a:r>
+            <a:r>
+              <a:rPr lang="en-US" sz="1400" dirty="0" smtClean="0">
+                <a:solidFill>
+                  <a:schemeClr val="bg1"/>
+                </a:solidFill>
+                <a:latin typeface="Comic Sans MS" panose="030F0902030302020204" pitchFamily="66" charset="0"/>
+              </a:rPr>
+              <a:t>?</a:t>
+            </a:r>
+            <a:endParaRPr lang="en-US" sz="1400" dirty="0">
+              <a:solidFill>
+                <a:schemeClr val="bg1"/>
+              </a:solidFill>
+              <a:latin typeface="Comic Sans MS" panose="030F0902030302020204" pitchFamily="66" charset="0"/>
+            </a:endParaRPr>
+          </a:p>
+        </p:txBody>
+      </p:sp>
+      <p:sp>
+        <p:nvSpPr>
+          <p:cNvPr id="22" name="TextBox 21">
+            <a:extLst>
+              <a:ext uri="{FF2B5EF4-FFF2-40B4-BE49-F238E27FC236}">
+                <a16:creationId xmlns:a16="http://schemas.microsoft.com/office/drawing/2014/main" xmlns="" id="{32820AB9-7CA6-8F41-A812-9F4C46331562}"/>
+              </a:ext>
+            </a:extLst>
+          </p:cNvPr>
+          <p:cNvSpPr txBox="1"/>
+          <p:nvPr/>
+        </p:nvSpPr>
+        <p:spPr>
+          <a:xfrm>
+            <a:off x="8330958" y="3549241"/>
+            <a:ext cx="2184389" cy="523220"/>
+          </a:xfrm>
+          <a:prstGeom prst="rect">
+            <a:avLst/>
+          </a:prstGeom>
+          <a:solidFill>
+            <a:schemeClr val="accent6">
+              <a:lumMod val="40000"/>
+              <a:lumOff val="60000"/>
+            </a:schemeClr>
+          </a:solidFill>
+          <a:ln>
+            <a:noFill/>
+          </a:ln>
+        </p:spPr>
+        <p:txBody>
+          <a:bodyPr wrap="square" rtlCol="0">
+            <a:spAutoFit/>
+          </a:bodyPr>
+          <a:lstStyle/>
+          <a:p>
+            <a:r>
+              <a:rPr lang="en-US" sz="1400" dirty="0" err="1" smtClean="0">
+                <a:solidFill>
+                  <a:schemeClr val="bg1"/>
+                </a:solidFill>
+                <a:latin typeface="Comic Sans MS" panose="030F0902030302020204" pitchFamily="66" charset="0"/>
+              </a:rPr>
+              <a:t>Kkege</a:t>
+            </a:r>
+            <a:r>
+              <a:rPr lang="en-US" sz="1400" dirty="0" smtClean="0">
+                <a:solidFill>
+                  <a:schemeClr val="bg1"/>
+                </a:solidFill>
+                <a:latin typeface="Comic Sans MS" panose="030F0902030302020204" pitchFamily="66" charset="0"/>
+              </a:rPr>
+              <a:t> </a:t>
+            </a:r>
+            <a:r>
+              <a:rPr lang="en-US" sz="1400" dirty="0" err="1" smtClean="0">
+                <a:solidFill>
+                  <a:schemeClr val="bg1"/>
+                </a:solidFill>
+                <a:latin typeface="Comic Sans MS" panose="030F0902030302020204" pitchFamily="66" charset="0"/>
+              </a:rPr>
+              <a:t>qngq</a:t>
+            </a:r>
+            <a:r>
+              <a:rPr lang="en-US" sz="1400" dirty="0" smtClean="0">
+                <a:solidFill>
+                  <a:schemeClr val="bg1"/>
+                </a:solidFill>
+                <a:latin typeface="Comic Sans MS" panose="030F0902030302020204" pitchFamily="66" charset="0"/>
+              </a:rPr>
+              <a:t> </a:t>
+            </a:r>
+            <a:r>
+              <a:rPr lang="en-US" sz="1400" dirty="0" err="1" smtClean="0">
+                <a:solidFill>
+                  <a:schemeClr val="bg1"/>
+                </a:solidFill>
+                <a:latin typeface="Comic Sans MS" panose="030F0902030302020204" pitchFamily="66" charset="0"/>
+              </a:rPr>
+              <a:t>jekgnqk</a:t>
+            </a:r>
+            <a:r>
+              <a:rPr lang="en-US" sz="1400" dirty="0" smtClean="0">
+                <a:solidFill>
+                  <a:schemeClr val="bg1"/>
+                </a:solidFill>
+                <a:latin typeface="Comic Sans MS" panose="030F0902030302020204" pitchFamily="66" charset="0"/>
+              </a:rPr>
+              <a:t> </a:t>
+            </a:r>
+            <a:r>
+              <a:rPr lang="en-US" sz="1400" dirty="0" err="1" smtClean="0">
+                <a:solidFill>
+                  <a:schemeClr val="bg1"/>
+                </a:solidFill>
+                <a:latin typeface="Comic Sans MS" panose="030F0902030302020204" pitchFamily="66" charset="0"/>
+              </a:rPr>
+              <a:t>knev</a:t>
+            </a:r>
+            <a:r>
+              <a:rPr lang="en-US" sz="1400" dirty="0" smtClean="0">
+                <a:solidFill>
+                  <a:schemeClr val="bg1"/>
+                </a:solidFill>
+                <a:latin typeface="Comic Sans MS" panose="030F0902030302020204" pitchFamily="66" charset="0"/>
+              </a:rPr>
+              <a:t> </a:t>
+            </a:r>
+            <a:r>
+              <a:rPr lang="en-US" sz="1400" dirty="0" err="1" smtClean="0">
+                <a:solidFill>
+                  <a:schemeClr val="bg1"/>
+                </a:solidFill>
+                <a:latin typeface="Comic Sans MS" panose="030F0902030302020204" pitchFamily="66" charset="0"/>
+              </a:rPr>
+              <a:t>ek</a:t>
+            </a:r>
+            <a:r>
+              <a:rPr lang="en-US" sz="1400" dirty="0" smtClean="0">
+                <a:solidFill>
+                  <a:schemeClr val="bg1"/>
+                </a:solidFill>
+                <a:latin typeface="Comic Sans MS" panose="030F0902030302020204" pitchFamily="66" charset="0"/>
+              </a:rPr>
+              <a:t> </a:t>
+            </a:r>
+            <a:r>
+              <a:rPr lang="en-US" sz="1400" dirty="0" err="1" smtClean="0">
+                <a:solidFill>
+                  <a:schemeClr val="bg1"/>
+                </a:solidFill>
+                <a:latin typeface="Comic Sans MS" panose="030F0902030302020204" pitchFamily="66" charset="0"/>
+              </a:rPr>
+              <a:t>keknfkqffe</a:t>
+            </a:r>
+            <a:r>
+              <a:rPr lang="en-US" sz="1400" dirty="0" smtClean="0">
+                <a:solidFill>
+                  <a:schemeClr val="bg1"/>
+                </a:solidFill>
+                <a:latin typeface="Comic Sans MS" panose="030F0902030302020204" pitchFamily="66" charset="0"/>
+              </a:rPr>
+              <a:t> </a:t>
+            </a:r>
+            <a:r>
+              <a:rPr lang="en-US" sz="1400" dirty="0" err="1" smtClean="0">
+                <a:solidFill>
+                  <a:schemeClr val="bg1"/>
+                </a:solidFill>
+                <a:latin typeface="Comic Sans MS" panose="030F0902030302020204" pitchFamily="66" charset="0"/>
+              </a:rPr>
+              <a:t>ek</a:t>
+            </a:r>
+            <a:endParaRPr lang="en-US" sz="1400" dirty="0">
+              <a:solidFill>
+                <a:schemeClr val="bg1"/>
+              </a:solidFill>
+              <a:latin typeface="Comic Sans MS" panose="030F0902030302020204" pitchFamily="66" charset="0"/>
+            </a:endParaRPr>
+          </a:p>
+        </p:txBody>
+      </p:sp>
+      <p:sp>
+        <p:nvSpPr>
+          <p:cNvPr id="23" name="TextBox 22">
+            <a:extLst>
+              <a:ext uri="{FF2B5EF4-FFF2-40B4-BE49-F238E27FC236}">
+                <a16:creationId xmlns:a16="http://schemas.microsoft.com/office/drawing/2014/main" xmlns="" id="{32820AB9-7CA6-8F41-A812-9F4C46331562}"/>
+              </a:ext>
+            </a:extLst>
+          </p:cNvPr>
+          <p:cNvSpPr txBox="1"/>
+          <p:nvPr/>
+        </p:nvSpPr>
+        <p:spPr>
+          <a:xfrm>
+            <a:off x="6214124" y="4099481"/>
+            <a:ext cx="2184389" cy="738664"/>
+          </a:xfrm>
+          <a:prstGeom prst="rect">
+            <a:avLst/>
+          </a:prstGeom>
+          <a:noFill/>
+          <a:ln>
+            <a:noFill/>
+          </a:ln>
+        </p:spPr>
+        <p:txBody>
+          <a:bodyPr wrap="square" rtlCol="0">
+            <a:spAutoFit/>
+          </a:bodyPr>
+          <a:lstStyle/>
+          <a:p>
+            <a:r>
+              <a:rPr lang="en-US" sz="1400" dirty="0" err="1" smtClean="0">
+                <a:solidFill>
+                  <a:schemeClr val="bg1"/>
+                </a:solidFill>
+                <a:latin typeface="Comic Sans MS" panose="030F0902030302020204" pitchFamily="66" charset="0"/>
+              </a:rPr>
+              <a:t>Jgie</a:t>
+            </a:r>
+            <a:r>
+              <a:rPr lang="en-US" sz="1400" dirty="0" smtClean="0">
+                <a:solidFill>
+                  <a:schemeClr val="bg1"/>
+                </a:solidFill>
+                <a:latin typeface="Comic Sans MS" panose="030F0902030302020204" pitchFamily="66" charset="0"/>
+              </a:rPr>
+              <a:t> </a:t>
+            </a:r>
+            <a:r>
+              <a:rPr lang="en-US" sz="1400" dirty="0" err="1" smtClean="0">
+                <a:solidFill>
+                  <a:schemeClr val="bg1"/>
+                </a:solidFill>
+                <a:latin typeface="Comic Sans MS" panose="030F0902030302020204" pitchFamily="66" charset="0"/>
+              </a:rPr>
+              <a:t>qkvke</a:t>
+            </a:r>
+            <a:r>
+              <a:rPr lang="en-US" sz="1400" dirty="0" smtClean="0">
+                <a:solidFill>
+                  <a:schemeClr val="bg1"/>
+                </a:solidFill>
+                <a:latin typeface="Comic Sans MS" panose="030F0902030302020204" pitchFamily="66" charset="0"/>
+              </a:rPr>
+              <a:t> </a:t>
+            </a:r>
+            <a:r>
+              <a:rPr lang="en-US" sz="1400" dirty="0" err="1" smtClean="0">
+                <a:solidFill>
+                  <a:schemeClr val="bg1"/>
+                </a:solidFill>
+                <a:latin typeface="Comic Sans MS" panose="030F0902030302020204" pitchFamily="66" charset="0"/>
+              </a:rPr>
+              <a:t>kqkvnkq</a:t>
+            </a:r>
+            <a:r>
+              <a:rPr lang="en-US" sz="1400" dirty="0" smtClean="0">
+                <a:solidFill>
+                  <a:schemeClr val="bg1"/>
+                </a:solidFill>
+                <a:latin typeface="Comic Sans MS" panose="030F0902030302020204" pitchFamily="66" charset="0"/>
+              </a:rPr>
+              <a:t> </a:t>
+            </a:r>
+            <a:r>
+              <a:rPr lang="en-US" sz="1400" dirty="0" err="1" smtClean="0">
+                <a:solidFill>
+                  <a:schemeClr val="bg1"/>
+                </a:solidFill>
+                <a:latin typeface="Comic Sans MS" panose="030F0902030302020204" pitchFamily="66" charset="0"/>
+              </a:rPr>
+              <a:t>kemkeken</a:t>
+            </a:r>
+            <a:r>
+              <a:rPr lang="en-US" sz="1400" dirty="0" smtClean="0">
+                <a:solidFill>
+                  <a:schemeClr val="bg1"/>
+                </a:solidFill>
+                <a:latin typeface="Comic Sans MS" panose="030F0902030302020204" pitchFamily="66" charset="0"/>
+              </a:rPr>
+              <a:t> </a:t>
+            </a:r>
+            <a:r>
+              <a:rPr lang="en-US" sz="1400" dirty="0" err="1" smtClean="0">
+                <a:solidFill>
+                  <a:schemeClr val="bg1"/>
+                </a:solidFill>
+                <a:latin typeface="Comic Sans MS" panose="030F0902030302020204" pitchFamily="66" charset="0"/>
+              </a:rPr>
+              <a:t>ekqooef</a:t>
+            </a:r>
+            <a:r>
+              <a:rPr lang="en-US" sz="1400" dirty="0" smtClean="0">
+                <a:solidFill>
+                  <a:schemeClr val="bg1"/>
+                </a:solidFill>
+                <a:latin typeface="Comic Sans MS" panose="030F0902030302020204" pitchFamily="66" charset="0"/>
+              </a:rPr>
+              <a:t> </a:t>
+            </a:r>
+            <a:r>
+              <a:rPr lang="en-US" sz="1400" dirty="0" err="1" smtClean="0">
+                <a:solidFill>
+                  <a:schemeClr val="bg1"/>
+                </a:solidFill>
+                <a:latin typeface="Comic Sans MS" panose="030F0902030302020204" pitchFamily="66" charset="0"/>
+              </a:rPr>
+              <a:t>ei</a:t>
+            </a:r>
+            <a:r>
+              <a:rPr lang="en-US" sz="1400" dirty="0" smtClean="0">
+                <a:solidFill>
+                  <a:schemeClr val="bg1"/>
+                </a:solidFill>
+                <a:latin typeface="Comic Sans MS" panose="030F0902030302020204" pitchFamily="66" charset="0"/>
+              </a:rPr>
+              <a:t> </a:t>
+            </a:r>
+            <a:r>
+              <a:rPr lang="en-US" sz="1400" dirty="0" err="1" smtClean="0">
+                <a:solidFill>
+                  <a:schemeClr val="bg1"/>
+                </a:solidFill>
+                <a:latin typeface="Comic Sans MS" panose="030F0902030302020204" pitchFamily="66" charset="0"/>
+              </a:rPr>
+              <a:t>vkenn</a:t>
+            </a:r>
+            <a:r>
+              <a:rPr lang="en-US" sz="1400" dirty="0" smtClean="0">
+                <a:solidFill>
+                  <a:schemeClr val="bg1"/>
+                </a:solidFill>
+                <a:latin typeface="Comic Sans MS" panose="030F0902030302020204" pitchFamily="66" charset="0"/>
+              </a:rPr>
+              <a:t> </a:t>
+            </a:r>
+            <a:r>
+              <a:rPr lang="en-US" sz="1400" dirty="0" err="1" smtClean="0">
+                <a:solidFill>
+                  <a:schemeClr val="bg1"/>
+                </a:solidFill>
+                <a:latin typeface="Comic Sans MS" panose="030F0902030302020204" pitchFamily="66" charset="0"/>
+              </a:rPr>
+              <a:t>keog</a:t>
+            </a:r>
+            <a:endParaRPr lang="en-US" sz="1400" dirty="0">
+              <a:solidFill>
+                <a:schemeClr val="bg1"/>
+              </a:solidFill>
+              <a:latin typeface="Comic Sans MS" panose="030F0902030302020204" pitchFamily="66" charset="0"/>
+            </a:endParaRPr>
+          </a:p>
+        </p:txBody>
+      </p:sp>
+      <p:sp>
+        <p:nvSpPr>
+          <p:cNvPr id="24" name="Rectangle 23">
+            <a:extLst>
+              <a:ext uri="{FF2B5EF4-FFF2-40B4-BE49-F238E27FC236}">
+                <a16:creationId xmlns:a16="http://schemas.microsoft.com/office/drawing/2014/main" xmlns="" id="{61CD5799-7FC2-F04C-ADCF-330CB97C8DA9}"/>
+              </a:ext>
+            </a:extLst>
+          </p:cNvPr>
+          <p:cNvSpPr/>
+          <p:nvPr/>
+        </p:nvSpPr>
+        <p:spPr>
+          <a:xfrm>
+            <a:off x="1175657" y="870277"/>
+            <a:ext cx="9832769" cy="344384"/>
+          </a:xfrm>
+          <a:prstGeom prst="rect">
+            <a:avLst/>
+          </a:prstGeom>
+          <a:solidFill>
+            <a:schemeClr val="bg1"/>
+          </a:solidFill>
+          <a:ln>
+            <a:noFill/>
+          </a:ln>
+        </p:spPr>
+        <p:style>
+          <a:lnRef idx="2">
+            <a:schemeClr val="accent1">
+              <a:shade val="50000"/>
+            </a:schemeClr>
+          </a:lnRef>
+          <a:fillRef idx="1">
+            <a:schemeClr val="accent1"/>
+          </a:fillRef>
+          <a:effectRef idx="0">
+            <a:schemeClr val="accent1"/>
+          </a:effectRef>
+          <a:fontRef idx="minor">
+            <a:schemeClr val="lt1"/>
+          </a:fontRef>
+        </p:style>
+        <p:txBody>
+          <a:bodyPr rtlCol="0" anchor="ctr"/>
+          <a:lstStyle/>
+          <a:p>
+            <a:r>
+              <a:rPr lang="en-US" sz="1400" dirty="0">
+                <a:solidFill>
+                  <a:schemeClr val="tx1"/>
+                </a:solidFill>
+                <a:latin typeface="Comic Sans MS" panose="030F0902030302020204" pitchFamily="66" charset="0"/>
+              </a:rPr>
+              <a:t>Profile |  Catalog |  Messages</a:t>
+            </a:r>
+          </a:p>
+        </p:txBody>
+      </p:sp>
+      <p:sp>
+        <p:nvSpPr>
+          <p:cNvPr id="25" name="Rectangle 24">
+            <a:extLst>
+              <a:ext uri="{FF2B5EF4-FFF2-40B4-BE49-F238E27FC236}">
+                <a16:creationId xmlns:a16="http://schemas.microsoft.com/office/drawing/2014/main" xmlns="" id="{6866C721-FE01-1B49-8B68-07C98D112373}"/>
+              </a:ext>
+            </a:extLst>
+          </p:cNvPr>
+          <p:cNvSpPr/>
+          <p:nvPr/>
+        </p:nvSpPr>
+        <p:spPr>
+          <a:xfrm>
+            <a:off x="8445690" y="870277"/>
+            <a:ext cx="2562736" cy="344384"/>
+          </a:xfrm>
+          <a:prstGeom prst="rect">
+            <a:avLst/>
+          </a:prstGeom>
+          <a:solidFill>
+            <a:schemeClr val="bg1"/>
+          </a:solidFill>
+          <a:ln>
+            <a:noFill/>
+          </a:ln>
+        </p:spPr>
+        <p:style>
+          <a:lnRef idx="2">
+            <a:schemeClr val="accent1">
+              <a:shade val="50000"/>
+            </a:schemeClr>
+          </a:lnRef>
+          <a:fillRef idx="1">
+            <a:schemeClr val="accent1"/>
+          </a:fillRef>
+          <a:effectRef idx="0">
+            <a:schemeClr val="accent1"/>
+          </a:effectRef>
+          <a:fontRef idx="minor">
+            <a:schemeClr val="lt1"/>
+          </a:fontRef>
+        </p:style>
+        <p:txBody>
+          <a:bodyPr rtlCol="0" anchor="ctr"/>
+          <a:lstStyle/>
+          <a:p>
+            <a:pPr algn="r"/>
+            <a:r>
+              <a:rPr lang="en-US" sz="1400" dirty="0">
+                <a:solidFill>
+                  <a:schemeClr val="tx1"/>
+                </a:solidFill>
+                <a:latin typeface="Comic Sans MS" panose="030F0902030302020204" pitchFamily="66" charset="0"/>
+              </a:rPr>
+              <a:t>Log Out</a:t>
+            </a:r>
+          </a:p>
+        </p:txBody>
+      </p:sp>
+    </p:spTree>
+    <p:extLst>
+      <p:ext uri="{BB962C8B-B14F-4D97-AF65-F5344CB8AC3E}">
+        <p14:creationId xmlns:p14="http://schemas.microsoft.com/office/powerpoint/2010/main" val="1874698543"/>
       </p:ext>
     </p:extLst>
   </p:cSld>

</xml_diff>

<commit_message>
Closes #22 and Closes #16
</commit_message>
<xml_diff>
--- a/docs/wireframes/wireframes.pptx
+++ b/docs/wireframes/wireframes.pptx
@@ -123,7 +123,7 @@
   </p:defaultTextStyle>
   <p:extLst>
     <p:ext uri="{EFAFB233-063F-42B5-8137-9DF3F51BA10A}">
-      <p15:sldGuideLst xmlns:p15="http://schemas.microsoft.com/office/powerpoint/2012/main">
+      <p15:sldGuideLst xmlns:p15="http://schemas.microsoft.com/office/powerpoint/2012/main" xmlns="">
         <p15:guide id="1" orient="horz" pos="2160">
           <p15:clr>
             <a:srgbClr val="A4A3A4"/>
@@ -271,7 +271,7 @@
           <a:p>
             <a:fld id="{E739BB41-DB51-AC40-8BC3-82550C14AA6F}" type="datetimeFigureOut">
               <a:rPr lang="en-US" smtClean="0"/>
-              <a:t>4/14/19</a:t>
+              <a:t>4/15/19</a:t>
             </a:fld>
             <a:endParaRPr lang="en-US"/>
           </a:p>
@@ -441,7 +441,7 @@
           <a:p>
             <a:fld id="{E739BB41-DB51-AC40-8BC3-82550C14AA6F}" type="datetimeFigureOut">
               <a:rPr lang="en-US" smtClean="0"/>
-              <a:t>4/14/19</a:t>
+              <a:t>4/15/19</a:t>
             </a:fld>
             <a:endParaRPr lang="en-US"/>
           </a:p>
@@ -621,7 +621,7 @@
           <a:p>
             <a:fld id="{E739BB41-DB51-AC40-8BC3-82550C14AA6F}" type="datetimeFigureOut">
               <a:rPr lang="en-US" smtClean="0"/>
-              <a:t>4/14/19</a:t>
+              <a:t>4/15/19</a:t>
             </a:fld>
             <a:endParaRPr lang="en-US"/>
           </a:p>
@@ -791,7 +791,7 @@
           <a:p>
             <a:fld id="{E739BB41-DB51-AC40-8BC3-82550C14AA6F}" type="datetimeFigureOut">
               <a:rPr lang="en-US" smtClean="0"/>
-              <a:t>4/14/19</a:t>
+              <a:t>4/15/19</a:t>
             </a:fld>
             <a:endParaRPr lang="en-US"/>
           </a:p>
@@ -1037,7 +1037,7 @@
           <a:p>
             <a:fld id="{E739BB41-DB51-AC40-8BC3-82550C14AA6F}" type="datetimeFigureOut">
               <a:rPr lang="en-US" smtClean="0"/>
-              <a:t>4/14/19</a:t>
+              <a:t>4/15/19</a:t>
             </a:fld>
             <a:endParaRPr lang="en-US"/>
           </a:p>
@@ -1269,7 +1269,7 @@
           <a:p>
             <a:fld id="{E739BB41-DB51-AC40-8BC3-82550C14AA6F}" type="datetimeFigureOut">
               <a:rPr lang="en-US" smtClean="0"/>
-              <a:t>4/14/19</a:t>
+              <a:t>4/15/19</a:t>
             </a:fld>
             <a:endParaRPr lang="en-US"/>
           </a:p>
@@ -1636,7 +1636,7 @@
           <a:p>
             <a:fld id="{E739BB41-DB51-AC40-8BC3-82550C14AA6F}" type="datetimeFigureOut">
               <a:rPr lang="en-US" smtClean="0"/>
-              <a:t>4/14/19</a:t>
+              <a:t>4/15/19</a:t>
             </a:fld>
             <a:endParaRPr lang="en-US"/>
           </a:p>
@@ -1754,7 +1754,7 @@
           <a:p>
             <a:fld id="{E739BB41-DB51-AC40-8BC3-82550C14AA6F}" type="datetimeFigureOut">
               <a:rPr lang="en-US" smtClean="0"/>
-              <a:t>4/14/19</a:t>
+              <a:t>4/15/19</a:t>
             </a:fld>
             <a:endParaRPr lang="en-US"/>
           </a:p>
@@ -1849,7 +1849,7 @@
           <a:p>
             <a:fld id="{E739BB41-DB51-AC40-8BC3-82550C14AA6F}" type="datetimeFigureOut">
               <a:rPr lang="en-US" smtClean="0"/>
-              <a:t>4/14/19</a:t>
+              <a:t>4/15/19</a:t>
             </a:fld>
             <a:endParaRPr lang="en-US"/>
           </a:p>
@@ -2126,7 +2126,7 @@
           <a:p>
             <a:fld id="{E739BB41-DB51-AC40-8BC3-82550C14AA6F}" type="datetimeFigureOut">
               <a:rPr lang="en-US" smtClean="0"/>
-              <a:t>4/14/19</a:t>
+              <a:t>4/15/19</a:t>
             </a:fld>
             <a:endParaRPr lang="en-US"/>
           </a:p>
@@ -2383,7 +2383,7 @@
           <a:p>
             <a:fld id="{E739BB41-DB51-AC40-8BC3-82550C14AA6F}" type="datetimeFigureOut">
               <a:rPr lang="en-US" smtClean="0"/>
-              <a:t>4/14/19</a:t>
+              <a:t>4/15/19</a:t>
             </a:fld>
             <a:endParaRPr lang="en-US"/>
           </a:p>
@@ -2471,7 +2471,7 @@
           <p:cNvPr id="7" name="Picture 6">
             <a:extLst>
               <a:ext uri="{FF2B5EF4-FFF2-40B4-BE49-F238E27FC236}">
-                <a16:creationId xmlns:a16="http://schemas.microsoft.com/office/drawing/2014/main" id="{987A0DDE-E9C3-FE42-9929-DD9146A706AA}"/>
+                <a16:creationId xmlns:a16="http://schemas.microsoft.com/office/drawing/2014/main" xmlns="" id="{987A0DDE-E9C3-FE42-9929-DD9146A706AA}"/>
               </a:ext>
             </a:extLst>
           </p:cNvPr>
@@ -2501,7 +2501,7 @@
           <p:cNvPr id="8" name="Rectangle 7">
             <a:extLst>
               <a:ext uri="{FF2B5EF4-FFF2-40B4-BE49-F238E27FC236}">
-                <a16:creationId xmlns:a16="http://schemas.microsoft.com/office/drawing/2014/main" id="{81BD0B67-76E8-FD41-A66D-BE4915F50BFC}"/>
+                <a16:creationId xmlns:a16="http://schemas.microsoft.com/office/drawing/2014/main" xmlns="" id="{81BD0B67-76E8-FD41-A66D-BE4915F50BFC}"/>
               </a:ext>
             </a:extLst>
           </p:cNvPr>
@@ -2553,7 +2553,7 @@
           <p:cNvPr id="9" name="Rectangle 8">
             <a:extLst>
               <a:ext uri="{FF2B5EF4-FFF2-40B4-BE49-F238E27FC236}">
-                <a16:creationId xmlns:a16="http://schemas.microsoft.com/office/drawing/2014/main" id="{3BF477E5-BB1D-1541-B34B-AFABF28A0D14}"/>
+                <a16:creationId xmlns:a16="http://schemas.microsoft.com/office/drawing/2014/main" xmlns="" id="{3BF477E5-BB1D-1541-B34B-AFABF28A0D14}"/>
               </a:ext>
             </a:extLst>
           </p:cNvPr>
@@ -2729,7 +2729,7 @@
           <a:p>
             <a:fld id="{E739BB41-DB51-AC40-8BC3-82550C14AA6F}" type="datetimeFigureOut">
               <a:rPr lang="en-US" smtClean="0"/>
-              <a:t>4/14/19</a:t>
+              <a:t>4/15/19</a:t>
             </a:fld>
             <a:endParaRPr lang="en-US"/>
           </a:p>
@@ -3139,7 +3139,7 @@
           <p:cNvPr id="2" name="TextBox 1">
             <a:extLst>
               <a:ext uri="{FF2B5EF4-FFF2-40B4-BE49-F238E27FC236}">
-                <a16:creationId xmlns:a16="http://schemas.microsoft.com/office/drawing/2014/main" id="{49DF0299-C639-944C-9F0E-91BE71AC7E52}"/>
+                <a16:creationId xmlns:a16="http://schemas.microsoft.com/office/drawing/2014/main" xmlns="" id="{49DF0299-C639-944C-9F0E-91BE71AC7E52}"/>
               </a:ext>
             </a:extLst>
           </p:cNvPr>
@@ -3179,7 +3179,7 @@
           <p:cNvPr id="5" name="TextBox 4">
             <a:extLst>
               <a:ext uri="{FF2B5EF4-FFF2-40B4-BE49-F238E27FC236}">
-                <a16:creationId xmlns:a16="http://schemas.microsoft.com/office/drawing/2014/main" id="{F3573DF9-457D-7948-8B22-DB5337292FA7}"/>
+                <a16:creationId xmlns:a16="http://schemas.microsoft.com/office/drawing/2014/main" xmlns="" id="{F3573DF9-457D-7948-8B22-DB5337292FA7}"/>
               </a:ext>
             </a:extLst>
           </p:cNvPr>
@@ -3225,7 +3225,7 @@
           <p:cNvPr id="6" name="Rectangle 5">
             <a:extLst>
               <a:ext uri="{FF2B5EF4-FFF2-40B4-BE49-F238E27FC236}">
-                <a16:creationId xmlns:a16="http://schemas.microsoft.com/office/drawing/2014/main" id="{61CD5799-7FC2-F04C-ADCF-330CB97C8DA9}"/>
+                <a16:creationId xmlns:a16="http://schemas.microsoft.com/office/drawing/2014/main" xmlns="" id="{61CD5799-7FC2-F04C-ADCF-330CB97C8DA9}"/>
               </a:ext>
             </a:extLst>
           </p:cNvPr>
@@ -3284,7 +3284,7 @@
           <p:cNvPr id="7" name="Rectangle 6">
             <a:extLst>
               <a:ext uri="{FF2B5EF4-FFF2-40B4-BE49-F238E27FC236}">
-                <a16:creationId xmlns:a16="http://schemas.microsoft.com/office/drawing/2014/main" id="{CC0D1823-74B5-5646-9898-CD48F15882BF}"/>
+                <a16:creationId xmlns:a16="http://schemas.microsoft.com/office/drawing/2014/main" xmlns="" id="{CC0D1823-74B5-5646-9898-CD48F15882BF}"/>
               </a:ext>
             </a:extLst>
           </p:cNvPr>
@@ -3374,7 +3374,7 @@
           <p:cNvPr id="8" name="TextBox 7">
             <a:extLst>
               <a:ext uri="{FF2B5EF4-FFF2-40B4-BE49-F238E27FC236}">
-                <a16:creationId xmlns:a16="http://schemas.microsoft.com/office/drawing/2014/main" id="{32820AB9-7CA6-8F41-A812-9F4C46331562}"/>
+                <a16:creationId xmlns:a16="http://schemas.microsoft.com/office/drawing/2014/main" xmlns="" id="{32820AB9-7CA6-8F41-A812-9F4C46331562}"/>
               </a:ext>
             </a:extLst>
           </p:cNvPr>
@@ -3996,7 +3996,7 @@
           <p:cNvPr id="9" name="TextBox 8">
             <a:extLst>
               <a:ext uri="{FF2B5EF4-FFF2-40B4-BE49-F238E27FC236}">
-                <a16:creationId xmlns:a16="http://schemas.microsoft.com/office/drawing/2014/main" id="{32820AB9-7CA6-8F41-A812-9F4C46331562}"/>
+                <a16:creationId xmlns:a16="http://schemas.microsoft.com/office/drawing/2014/main" xmlns="" id="{32820AB9-7CA6-8F41-A812-9F4C46331562}"/>
               </a:ext>
             </a:extLst>
           </p:cNvPr>
@@ -4616,7 +4616,7 @@
           <p:cNvPr id="10" name="TextBox 9">
             <a:extLst>
               <a:ext uri="{FF2B5EF4-FFF2-40B4-BE49-F238E27FC236}">
-                <a16:creationId xmlns:a16="http://schemas.microsoft.com/office/drawing/2014/main" id="{32820AB9-7CA6-8F41-A812-9F4C46331562}"/>
+                <a16:creationId xmlns:a16="http://schemas.microsoft.com/office/drawing/2014/main" xmlns="" id="{32820AB9-7CA6-8F41-A812-9F4C46331562}"/>
               </a:ext>
             </a:extLst>
           </p:cNvPr>
@@ -4716,7 +4716,7 @@
           <p:cNvPr id="11" name="Rectangle 10">
             <a:extLst>
               <a:ext uri="{FF2B5EF4-FFF2-40B4-BE49-F238E27FC236}">
-                <a16:creationId xmlns:a16="http://schemas.microsoft.com/office/drawing/2014/main" id="{61CD5799-7FC2-F04C-ADCF-330CB97C8DA9}"/>
+                <a16:creationId xmlns:a16="http://schemas.microsoft.com/office/drawing/2014/main" xmlns="" id="{61CD5799-7FC2-F04C-ADCF-330CB97C8DA9}"/>
               </a:ext>
             </a:extLst>
           </p:cNvPr>
@@ -4775,7 +4775,7 @@
           <p:cNvPr id="12" name="TextBox 11">
             <a:extLst>
               <a:ext uri="{FF2B5EF4-FFF2-40B4-BE49-F238E27FC236}">
-                <a16:creationId xmlns:a16="http://schemas.microsoft.com/office/drawing/2014/main" id="{32820AB9-7CA6-8F41-A812-9F4C46331562}"/>
+                <a16:creationId xmlns:a16="http://schemas.microsoft.com/office/drawing/2014/main" xmlns="" id="{32820AB9-7CA6-8F41-A812-9F4C46331562}"/>
               </a:ext>
             </a:extLst>
           </p:cNvPr>
@@ -4899,7 +4899,7 @@
           <p:cNvPr id="13" name="TextBox 12">
             <a:extLst>
               <a:ext uri="{FF2B5EF4-FFF2-40B4-BE49-F238E27FC236}">
-                <a16:creationId xmlns:a16="http://schemas.microsoft.com/office/drawing/2014/main" id="{32820AB9-7CA6-8F41-A812-9F4C46331562}"/>
+                <a16:creationId xmlns:a16="http://schemas.microsoft.com/office/drawing/2014/main" xmlns="" id="{32820AB9-7CA6-8F41-A812-9F4C46331562}"/>
               </a:ext>
             </a:extLst>
           </p:cNvPr>
@@ -5020,7 +5020,7 @@
           <p:cNvPr id="14" name="TextBox 13">
             <a:extLst>
               <a:ext uri="{FF2B5EF4-FFF2-40B4-BE49-F238E27FC236}">
-                <a16:creationId xmlns:a16="http://schemas.microsoft.com/office/drawing/2014/main" id="{32820AB9-7CA6-8F41-A812-9F4C46331562}"/>
+                <a16:creationId xmlns:a16="http://schemas.microsoft.com/office/drawing/2014/main" xmlns="" id="{32820AB9-7CA6-8F41-A812-9F4C46331562}"/>
               </a:ext>
             </a:extLst>
           </p:cNvPr>
@@ -5141,7 +5141,7 @@
           <p:cNvPr id="15" name="TextBox 14">
             <a:extLst>
               <a:ext uri="{FF2B5EF4-FFF2-40B4-BE49-F238E27FC236}">
-                <a16:creationId xmlns:a16="http://schemas.microsoft.com/office/drawing/2014/main" id="{32820AB9-7CA6-8F41-A812-9F4C46331562}"/>
+                <a16:creationId xmlns:a16="http://schemas.microsoft.com/office/drawing/2014/main" xmlns="" id="{32820AB9-7CA6-8F41-A812-9F4C46331562}"/>
               </a:ext>
             </a:extLst>
           </p:cNvPr>
@@ -5262,7 +5262,7 @@
           <p:cNvPr id="16" name="TextBox 15">
             <a:extLst>
               <a:ext uri="{FF2B5EF4-FFF2-40B4-BE49-F238E27FC236}">
-                <a16:creationId xmlns:a16="http://schemas.microsoft.com/office/drawing/2014/main" id="{32820AB9-7CA6-8F41-A812-9F4C46331562}"/>
+                <a16:creationId xmlns:a16="http://schemas.microsoft.com/office/drawing/2014/main" xmlns="" id="{32820AB9-7CA6-8F41-A812-9F4C46331562}"/>
               </a:ext>
             </a:extLst>
           </p:cNvPr>
@@ -5375,6 +5375,312 @@
               </a:rPr>
               <a:t>Rating</a:t>
             </a:r>
+          </a:p>
+        </p:txBody>
+      </p:sp>
+      <p:sp>
+        <p:nvSpPr>
+          <p:cNvPr id="17" name="Rectangle 16">
+            <a:extLst>
+              <a:ext uri="{FF2B5EF4-FFF2-40B4-BE49-F238E27FC236}">
+                <a16:creationId xmlns:a16="http://schemas.microsoft.com/office/drawing/2014/main" xmlns="" id="{61CD5799-7FC2-F04C-ADCF-330CB97C8DA9}"/>
+              </a:ext>
+            </a:extLst>
+          </p:cNvPr>
+          <p:cNvSpPr/>
+          <p:nvPr/>
+        </p:nvSpPr>
+        <p:spPr>
+          <a:xfrm>
+            <a:off x="1175657" y="870277"/>
+            <a:ext cx="9832769" cy="344384"/>
+          </a:xfrm>
+          <a:prstGeom prst="rect">
+            <a:avLst/>
+          </a:prstGeom>
+          <a:solidFill>
+            <a:schemeClr val="bg1"/>
+          </a:solidFill>
+          <a:ln>
+            <a:noFill/>
+          </a:ln>
+        </p:spPr>
+        <p:style>
+          <a:lnRef idx="2">
+            <a:schemeClr val="accent1">
+              <a:shade val="50000"/>
+            </a:schemeClr>
+          </a:lnRef>
+          <a:fillRef idx="1">
+            <a:schemeClr val="accent1"/>
+          </a:fillRef>
+          <a:effectRef idx="0">
+            <a:schemeClr val="accent1"/>
+          </a:effectRef>
+          <a:fontRef idx="minor">
+            <a:schemeClr val="lt1"/>
+          </a:fontRef>
+        </p:style>
+        <p:txBody>
+          <a:bodyPr rtlCol="0" anchor="ctr"/>
+          <a:lstStyle/>
+          <a:p>
+            <a:r>
+              <a:rPr lang="en-US" sz="1400" dirty="0">
+                <a:solidFill>
+                  <a:schemeClr val="tx1"/>
+                </a:solidFill>
+                <a:latin typeface="Comic Sans MS" panose="030F0902030302020204" pitchFamily="66" charset="0"/>
+              </a:rPr>
+              <a:t>Home </a:t>
+            </a:r>
+          </a:p>
+        </p:txBody>
+      </p:sp>
+      <p:sp>
+        <p:nvSpPr>
+          <p:cNvPr id="18" name="Rectangle 17">
+            <a:extLst>
+              <a:ext uri="{FF2B5EF4-FFF2-40B4-BE49-F238E27FC236}">
+                <a16:creationId xmlns:a16="http://schemas.microsoft.com/office/drawing/2014/main" xmlns="" id="{6889F56C-0800-9F4E-BE33-281A675CE1DD}"/>
+              </a:ext>
+            </a:extLst>
+          </p:cNvPr>
+          <p:cNvSpPr/>
+          <p:nvPr/>
+        </p:nvSpPr>
+        <p:spPr>
+          <a:xfrm>
+            <a:off x="6911440" y="865442"/>
+            <a:ext cx="4044384" cy="344384"/>
+          </a:xfrm>
+          <a:prstGeom prst="rect">
+            <a:avLst/>
+          </a:prstGeom>
+          <a:solidFill>
+            <a:schemeClr val="tx1"/>
+          </a:solidFill>
+          <a:ln>
+            <a:noFill/>
+          </a:ln>
+        </p:spPr>
+        <p:style>
+          <a:lnRef idx="2">
+            <a:schemeClr val="accent1">
+              <a:shade val="50000"/>
+            </a:schemeClr>
+          </a:lnRef>
+          <a:fillRef idx="1">
+            <a:schemeClr val="accent1"/>
+          </a:fillRef>
+          <a:effectRef idx="0">
+            <a:schemeClr val="accent1"/>
+          </a:effectRef>
+          <a:fontRef idx="minor">
+            <a:schemeClr val="lt1"/>
+          </a:fontRef>
+        </p:style>
+        <p:txBody>
+          <a:bodyPr rtlCol="0" anchor="ctr"/>
+          <a:lstStyle/>
+          <a:p>
+            <a:pPr algn="r"/>
+            <a:r>
+              <a:rPr lang="en-US" sz="1400" dirty="0">
+                <a:solidFill>
+                  <a:schemeClr val="bg2">
+                    <a:lumMod val="50000"/>
+                  </a:schemeClr>
+                </a:solidFill>
+                <a:latin typeface="Comic Sans MS" panose="030F0902030302020204" pitchFamily="66" charset="0"/>
+              </a:rPr>
+              <a:t>Catalog     Users Profile    Username</a:t>
+            </a:r>
+          </a:p>
+        </p:txBody>
+      </p:sp>
+      <p:sp>
+        <p:nvSpPr>
+          <p:cNvPr id="19" name="Rectangle 18">
+            <a:extLst>
+              <a:ext uri="{FF2B5EF4-FFF2-40B4-BE49-F238E27FC236}">
+                <a16:creationId xmlns:a16="http://schemas.microsoft.com/office/drawing/2014/main" xmlns="" id="{8003D022-BA0D-A042-92B7-9C2E431128DB}"/>
+              </a:ext>
+            </a:extLst>
+          </p:cNvPr>
+          <p:cNvSpPr/>
+          <p:nvPr/>
+        </p:nvSpPr>
+        <p:spPr>
+          <a:xfrm>
+            <a:off x="1188497" y="869150"/>
+            <a:ext cx="9832769" cy="344384"/>
+          </a:xfrm>
+          <a:prstGeom prst="rect">
+            <a:avLst/>
+          </a:prstGeom>
+          <a:solidFill>
+            <a:schemeClr val="tx1"/>
+          </a:solidFill>
+          <a:ln>
+            <a:noFill/>
+          </a:ln>
+        </p:spPr>
+        <p:style>
+          <a:lnRef idx="2">
+            <a:schemeClr val="accent1">
+              <a:shade val="50000"/>
+            </a:schemeClr>
+          </a:lnRef>
+          <a:fillRef idx="1">
+            <a:schemeClr val="accent1"/>
+          </a:fillRef>
+          <a:effectRef idx="0">
+            <a:schemeClr val="accent1"/>
+          </a:effectRef>
+          <a:fontRef idx="minor">
+            <a:schemeClr val="lt1"/>
+          </a:fontRef>
+        </p:style>
+        <p:txBody>
+          <a:bodyPr rtlCol="0" anchor="ctr"/>
+          <a:lstStyle/>
+          <a:p>
+            <a:r>
+              <a:rPr lang="en-US" sz="1400" dirty="0">
+                <a:solidFill>
+                  <a:schemeClr val="accent1">
+                    <a:lumMod val="50000"/>
+                  </a:schemeClr>
+                </a:solidFill>
+                <a:latin typeface="Comic Sans MS" panose="030F0902030302020204" pitchFamily="66" charset="0"/>
+              </a:rPr>
+              <a:t> </a:t>
+            </a:r>
+            <a:r>
+              <a:rPr lang="en-US" sz="2400" b="1" dirty="0" err="1">
+                <a:solidFill>
+                  <a:schemeClr val="accent1">
+                    <a:lumMod val="50000"/>
+                  </a:schemeClr>
+                </a:solidFill>
+                <a:latin typeface="Comic Sans MS" panose="030F0902030302020204" pitchFamily="66" charset="0"/>
+              </a:rPr>
+              <a:t>SellBack</a:t>
+            </a:r>
+            <a:r>
+              <a:rPr lang="en-US" sz="2400" b="1" dirty="0" err="1">
+                <a:solidFill>
+                  <a:schemeClr val="accent1">
+                    <a:lumMod val="60000"/>
+                    <a:lumOff val="40000"/>
+                  </a:schemeClr>
+                </a:solidFill>
+                <a:latin typeface="Comic Sans MS" panose="030F0902030302020204" pitchFamily="66" charset="0"/>
+              </a:rPr>
+              <a:t>Mart</a:t>
+            </a:r>
+            <a:endParaRPr lang="en-US" sz="1400" b="1" dirty="0">
+              <a:solidFill>
+                <a:schemeClr val="accent1">
+                  <a:lumMod val="60000"/>
+                  <a:lumOff val="40000"/>
+                </a:schemeClr>
+              </a:solidFill>
+              <a:latin typeface="Comic Sans MS" panose="030F0902030302020204" pitchFamily="66" charset="0"/>
+            </a:endParaRPr>
+          </a:p>
+        </p:txBody>
+      </p:sp>
+      <p:sp>
+        <p:nvSpPr>
+          <p:cNvPr id="20" name="Rectangle 19">
+            <a:extLst>
+              <a:ext uri="{FF2B5EF4-FFF2-40B4-BE49-F238E27FC236}">
+                <a16:creationId xmlns:a16="http://schemas.microsoft.com/office/drawing/2014/main" xmlns="" id="{6889F56C-0800-9F4E-BE33-281A675CE1DD}"/>
+              </a:ext>
+            </a:extLst>
+          </p:cNvPr>
+          <p:cNvSpPr/>
+          <p:nvPr/>
+        </p:nvSpPr>
+        <p:spPr>
+          <a:xfrm>
+            <a:off x="5481053" y="858402"/>
+            <a:ext cx="5527373" cy="344384"/>
+          </a:xfrm>
+          <a:prstGeom prst="rect">
+            <a:avLst/>
+          </a:prstGeom>
+          <a:solidFill>
+            <a:schemeClr val="tx1"/>
+          </a:solidFill>
+          <a:ln>
+            <a:noFill/>
+          </a:ln>
+        </p:spPr>
+        <p:style>
+          <a:lnRef idx="2">
+            <a:schemeClr val="accent1">
+              <a:shade val="50000"/>
+            </a:schemeClr>
+          </a:lnRef>
+          <a:fillRef idx="1">
+            <a:schemeClr val="accent1"/>
+          </a:fillRef>
+          <a:effectRef idx="0">
+            <a:schemeClr val="accent1"/>
+          </a:effectRef>
+          <a:fontRef idx="minor">
+            <a:schemeClr val="lt1"/>
+          </a:fontRef>
+        </p:style>
+        <p:txBody>
+          <a:bodyPr rtlCol="0" anchor="ctr"/>
+          <a:lstStyle/>
+          <a:p>
+            <a:pPr algn="r"/>
+            <a:r>
+              <a:rPr lang="en-US" sz="1400" dirty="0" smtClean="0">
+                <a:solidFill>
+                  <a:schemeClr val="bg2">
+                    <a:lumMod val="50000"/>
+                  </a:schemeClr>
+                </a:solidFill>
+                <a:latin typeface="Comic Sans MS" panose="030F0902030302020204" pitchFamily="66" charset="0"/>
+              </a:rPr>
+              <a:t>Home     About Us	Services	Testimonials</a:t>
+            </a:r>
+            <a:r>
+              <a:rPr lang="en-US" sz="1400" dirty="0" smtClean="0">
+                <a:solidFill>
+                  <a:schemeClr val="bg2">
+                    <a:lumMod val="50000"/>
+                  </a:schemeClr>
+                </a:solidFill>
+                <a:latin typeface="Comic Sans MS" panose="030F0902030302020204" pitchFamily="66" charset="0"/>
+              </a:rPr>
+              <a:t>     </a:t>
+            </a:r>
+            <a:r>
+              <a:rPr lang="en-US" sz="1400" dirty="0" smtClean="0">
+                <a:solidFill>
+                  <a:schemeClr val="bg2">
+                    <a:lumMod val="50000"/>
+                  </a:schemeClr>
+                </a:solidFill>
+                <a:latin typeface="Comic Sans MS" panose="030F0902030302020204" pitchFamily="66" charset="0"/>
+              </a:rPr>
+              <a:t>Login</a:t>
+            </a:r>
+            <a:endParaRPr lang="en-US" sz="1400" dirty="0">
+              <a:solidFill>
+                <a:schemeClr val="bg2">
+                  <a:lumMod val="50000"/>
+                </a:schemeClr>
+              </a:solidFill>
+              <a:latin typeface="Comic Sans MS" panose="030F0902030302020204" pitchFamily="66" charset="0"/>
+            </a:endParaRPr>
           </a:p>
         </p:txBody>
       </p:sp>
@@ -5413,7 +5719,7 @@
           <p:cNvPr id="2" name="TextBox 1">
             <a:extLst>
               <a:ext uri="{FF2B5EF4-FFF2-40B4-BE49-F238E27FC236}">
-                <a16:creationId xmlns:a16="http://schemas.microsoft.com/office/drawing/2014/main" id="{221DED5B-F56B-0F43-A308-4F2DD034B5B7}"/>
+                <a16:creationId xmlns:a16="http://schemas.microsoft.com/office/drawing/2014/main" xmlns="" id="{221DED5B-F56B-0F43-A308-4F2DD034B5B7}"/>
               </a:ext>
             </a:extLst>
           </p:cNvPr>
@@ -5453,7 +5759,7 @@
           <p:cNvPr id="7" name="TextBox 6">
             <a:extLst>
               <a:ext uri="{FF2B5EF4-FFF2-40B4-BE49-F238E27FC236}">
-                <a16:creationId xmlns:a16="http://schemas.microsoft.com/office/drawing/2014/main" id="{F3573DF9-457D-7948-8B22-DB5337292FA7}"/>
+                <a16:creationId xmlns:a16="http://schemas.microsoft.com/office/drawing/2014/main" xmlns="" id="{F3573DF9-457D-7948-8B22-DB5337292FA7}"/>
               </a:ext>
             </a:extLst>
           </p:cNvPr>
@@ -5502,7 +5808,7 @@
           <p:cNvPr id="8" name="TextBox 7">
             <a:extLst>
               <a:ext uri="{FF2B5EF4-FFF2-40B4-BE49-F238E27FC236}">
-                <a16:creationId xmlns:a16="http://schemas.microsoft.com/office/drawing/2014/main" id="{49DF0299-C639-944C-9F0E-91BE71AC7E52}"/>
+                <a16:creationId xmlns:a16="http://schemas.microsoft.com/office/drawing/2014/main" xmlns="" id="{49DF0299-C639-944C-9F0E-91BE71AC7E52}"/>
               </a:ext>
             </a:extLst>
           </p:cNvPr>
@@ -5560,7 +5866,7 @@
           <p:cNvPr id="10" name="TextBox 9">
             <a:extLst>
               <a:ext uri="{FF2B5EF4-FFF2-40B4-BE49-F238E27FC236}">
-                <a16:creationId xmlns:a16="http://schemas.microsoft.com/office/drawing/2014/main" id="{C8E10E37-1019-8D4C-BA6F-9A6E9CF0D317}"/>
+                <a16:creationId xmlns:a16="http://schemas.microsoft.com/office/drawing/2014/main" xmlns="" id="{C8E10E37-1019-8D4C-BA6F-9A6E9CF0D317}"/>
               </a:ext>
             </a:extLst>
           </p:cNvPr>
@@ -5770,7 +6076,7 @@
           <p:cNvPr id="4" name="TextBox 3">
             <a:extLst>
               <a:ext uri="{FF2B5EF4-FFF2-40B4-BE49-F238E27FC236}">
-                <a16:creationId xmlns:a16="http://schemas.microsoft.com/office/drawing/2014/main" id="{32820AB9-7CA6-8F41-A812-9F4C46331562}"/>
+                <a16:creationId xmlns:a16="http://schemas.microsoft.com/office/drawing/2014/main" xmlns="" id="{32820AB9-7CA6-8F41-A812-9F4C46331562}"/>
               </a:ext>
             </a:extLst>
           </p:cNvPr>
@@ -5816,7 +6122,7 @@
           <p:cNvPr id="11" name="TextBox 10">
             <a:extLst>
               <a:ext uri="{FF2B5EF4-FFF2-40B4-BE49-F238E27FC236}">
-                <a16:creationId xmlns:a16="http://schemas.microsoft.com/office/drawing/2014/main" id="{5880DF0C-DDBC-A243-8BC6-846ACCD4FA07}"/>
+                <a16:creationId xmlns:a16="http://schemas.microsoft.com/office/drawing/2014/main" xmlns="" id="{5880DF0C-DDBC-A243-8BC6-846ACCD4FA07}"/>
               </a:ext>
             </a:extLst>
           </p:cNvPr>
@@ -5862,7 +6168,7 @@
           <p:cNvPr id="12" name="TextBox 11">
             <a:extLst>
               <a:ext uri="{FF2B5EF4-FFF2-40B4-BE49-F238E27FC236}">
-                <a16:creationId xmlns:a16="http://schemas.microsoft.com/office/drawing/2014/main" id="{4B5CE2DA-6350-BC4D-A2FD-AD1AC0B9E0B5}"/>
+                <a16:creationId xmlns:a16="http://schemas.microsoft.com/office/drawing/2014/main" xmlns="" id="{4B5CE2DA-6350-BC4D-A2FD-AD1AC0B9E0B5}"/>
               </a:ext>
             </a:extLst>
           </p:cNvPr>
@@ -5905,7 +6211,7 @@
           <p:cNvPr id="13" name="TextBox 12">
             <a:extLst>
               <a:ext uri="{FF2B5EF4-FFF2-40B4-BE49-F238E27FC236}">
-                <a16:creationId xmlns:a16="http://schemas.microsoft.com/office/drawing/2014/main" id="{7CDBED8A-FB80-BD47-A4EA-1246C8D98E35}"/>
+                <a16:creationId xmlns:a16="http://schemas.microsoft.com/office/drawing/2014/main" xmlns="" id="{7CDBED8A-FB80-BD47-A4EA-1246C8D98E35}"/>
               </a:ext>
             </a:extLst>
           </p:cNvPr>
@@ -5948,7 +6254,7 @@
           <p:cNvPr id="14" name="TextBox 13">
             <a:extLst>
               <a:ext uri="{FF2B5EF4-FFF2-40B4-BE49-F238E27FC236}">
-                <a16:creationId xmlns:a16="http://schemas.microsoft.com/office/drawing/2014/main" id="{FE03B4FC-5EA8-DC43-8C63-28E23C611684}"/>
+                <a16:creationId xmlns:a16="http://schemas.microsoft.com/office/drawing/2014/main" xmlns="" id="{FE03B4FC-5EA8-DC43-8C63-28E23C611684}"/>
               </a:ext>
             </a:extLst>
           </p:cNvPr>
@@ -6035,7 +6341,7 @@
           <p:cNvPr id="5" name="Rounded Rectangle 4">
             <a:extLst>
               <a:ext uri="{FF2B5EF4-FFF2-40B4-BE49-F238E27FC236}">
-                <a16:creationId xmlns:a16="http://schemas.microsoft.com/office/drawing/2014/main" id="{1376ECFE-A6F2-6C42-A904-0E15AFF7920D}"/>
+                <a16:creationId xmlns:a16="http://schemas.microsoft.com/office/drawing/2014/main" xmlns="" id="{1376ECFE-A6F2-6C42-A904-0E15AFF7920D}"/>
               </a:ext>
             </a:extLst>
           </p:cNvPr>
@@ -6097,7 +6403,7 @@
           <p:cNvPr id="3" name="Triangle 2">
             <a:extLst>
               <a:ext uri="{FF2B5EF4-FFF2-40B4-BE49-F238E27FC236}">
-                <a16:creationId xmlns:a16="http://schemas.microsoft.com/office/drawing/2014/main" id="{5F9400FE-0C26-6A4E-ACDE-0A649B57EB8F}"/>
+                <a16:creationId xmlns:a16="http://schemas.microsoft.com/office/drawing/2014/main" xmlns="" id="{5F9400FE-0C26-6A4E-ACDE-0A649B57EB8F}"/>
               </a:ext>
             </a:extLst>
           </p:cNvPr>
@@ -6146,7 +6452,7 @@
           <p:cNvPr id="19" name="TextBox 18">
             <a:extLst>
               <a:ext uri="{FF2B5EF4-FFF2-40B4-BE49-F238E27FC236}">
-                <a16:creationId xmlns:a16="http://schemas.microsoft.com/office/drawing/2014/main" id="{C59CDDF8-D1B9-5346-85B5-D3C73EB35176}"/>
+                <a16:creationId xmlns:a16="http://schemas.microsoft.com/office/drawing/2014/main" xmlns="" id="{C59CDDF8-D1B9-5346-85B5-D3C73EB35176}"/>
               </a:ext>
             </a:extLst>
           </p:cNvPr>
@@ -6192,7 +6498,7 @@
           <p:cNvPr id="20" name="Triangle 19">
             <a:extLst>
               <a:ext uri="{FF2B5EF4-FFF2-40B4-BE49-F238E27FC236}">
-                <a16:creationId xmlns:a16="http://schemas.microsoft.com/office/drawing/2014/main" id="{B2C79898-88DE-854C-87C5-E714E45E8FFA}"/>
+                <a16:creationId xmlns:a16="http://schemas.microsoft.com/office/drawing/2014/main" xmlns="" id="{B2C79898-88DE-854C-87C5-E714E45E8FFA}"/>
               </a:ext>
             </a:extLst>
           </p:cNvPr>
@@ -6241,7 +6547,7 @@
           <p:cNvPr id="22" name="TextBox 21">
             <a:extLst>
               <a:ext uri="{FF2B5EF4-FFF2-40B4-BE49-F238E27FC236}">
-                <a16:creationId xmlns:a16="http://schemas.microsoft.com/office/drawing/2014/main" id="{36399FF9-6457-BC40-BF02-314054BA4BBF}"/>
+                <a16:creationId xmlns:a16="http://schemas.microsoft.com/office/drawing/2014/main" xmlns="" id="{36399FF9-6457-BC40-BF02-314054BA4BBF}"/>
               </a:ext>
             </a:extLst>
           </p:cNvPr>
@@ -6287,7 +6593,7 @@
           <p:cNvPr id="32" name="Straight Arrow Connector 31">
             <a:extLst>
               <a:ext uri="{FF2B5EF4-FFF2-40B4-BE49-F238E27FC236}">
-                <a16:creationId xmlns:a16="http://schemas.microsoft.com/office/drawing/2014/main" id="{384FBB7B-8473-E04A-89B1-1D0EF7D0B7A8}"/>
+                <a16:creationId xmlns:a16="http://schemas.microsoft.com/office/drawing/2014/main" xmlns="" id="{384FBB7B-8473-E04A-89B1-1D0EF7D0B7A8}"/>
               </a:ext>
             </a:extLst>
           </p:cNvPr>
@@ -6326,7 +6632,7 @@
           <p:cNvPr id="33" name="Rectangle 32">
             <a:extLst>
               <a:ext uri="{FF2B5EF4-FFF2-40B4-BE49-F238E27FC236}">
-                <a16:creationId xmlns:a16="http://schemas.microsoft.com/office/drawing/2014/main" id="{36754BCA-73D3-1044-80F9-B5544A77D27A}"/>
+                <a16:creationId xmlns:a16="http://schemas.microsoft.com/office/drawing/2014/main" xmlns="" id="{36754BCA-73D3-1044-80F9-B5544A77D27A}"/>
               </a:ext>
             </a:extLst>
           </p:cNvPr>
@@ -6385,7 +6691,7 @@
           <p:cNvPr id="24" name="Rounded Rectangle 23">
             <a:extLst>
               <a:ext uri="{FF2B5EF4-FFF2-40B4-BE49-F238E27FC236}">
-                <a16:creationId xmlns:a16="http://schemas.microsoft.com/office/drawing/2014/main" id="{2231C758-33D0-FC48-B20A-4615AAD679EF}"/>
+                <a16:creationId xmlns:a16="http://schemas.microsoft.com/office/drawing/2014/main" xmlns="" id="{2231C758-33D0-FC48-B20A-4615AAD679EF}"/>
               </a:ext>
             </a:extLst>
           </p:cNvPr>
@@ -6447,7 +6753,7 @@
           <p:cNvPr id="25" name="TextBox 24">
             <a:extLst>
               <a:ext uri="{FF2B5EF4-FFF2-40B4-BE49-F238E27FC236}">
-                <a16:creationId xmlns:a16="http://schemas.microsoft.com/office/drawing/2014/main" id="{BF605BAE-D900-6D4F-BD24-C723DC4E94B2}"/>
+                <a16:creationId xmlns:a16="http://schemas.microsoft.com/office/drawing/2014/main" xmlns="" id="{BF605BAE-D900-6D4F-BD24-C723DC4E94B2}"/>
               </a:ext>
             </a:extLst>
           </p:cNvPr>
@@ -6488,7 +6794,7 @@
           <p:cNvPr id="26" name="TextBox 25">
             <a:extLst>
               <a:ext uri="{FF2B5EF4-FFF2-40B4-BE49-F238E27FC236}">
-                <a16:creationId xmlns:a16="http://schemas.microsoft.com/office/drawing/2014/main" id="{AAB52ED1-54B2-2C4E-AB0C-1379ABEB5E9D}"/>
+                <a16:creationId xmlns:a16="http://schemas.microsoft.com/office/drawing/2014/main" xmlns="" id="{AAB52ED1-54B2-2C4E-AB0C-1379ABEB5E9D}"/>
               </a:ext>
             </a:extLst>
           </p:cNvPr>
@@ -6529,7 +6835,7 @@
           <p:cNvPr id="27" name="Rounded Rectangle 26">
             <a:extLst>
               <a:ext uri="{FF2B5EF4-FFF2-40B4-BE49-F238E27FC236}">
-                <a16:creationId xmlns:a16="http://schemas.microsoft.com/office/drawing/2014/main" id="{B66E3EF1-7615-D545-AD5C-063674D069F2}"/>
+                <a16:creationId xmlns:a16="http://schemas.microsoft.com/office/drawing/2014/main" xmlns="" id="{B66E3EF1-7615-D545-AD5C-063674D069F2}"/>
               </a:ext>
             </a:extLst>
           </p:cNvPr>
@@ -6591,7 +6897,7 @@
           <p:cNvPr id="28" name="TextBox 27">
             <a:extLst>
               <a:ext uri="{FF2B5EF4-FFF2-40B4-BE49-F238E27FC236}">
-                <a16:creationId xmlns:a16="http://schemas.microsoft.com/office/drawing/2014/main" id="{3D09829A-FD8C-934F-8FC2-0A1A7B85893E}"/>
+                <a16:creationId xmlns:a16="http://schemas.microsoft.com/office/drawing/2014/main" xmlns="" id="{3D09829A-FD8C-934F-8FC2-0A1A7B85893E}"/>
               </a:ext>
             </a:extLst>
           </p:cNvPr>
@@ -6637,7 +6943,7 @@
           <p:cNvPr id="29" name="Rectangle 28">
             <a:extLst>
               <a:ext uri="{FF2B5EF4-FFF2-40B4-BE49-F238E27FC236}">
-                <a16:creationId xmlns:a16="http://schemas.microsoft.com/office/drawing/2014/main" id="{BE18127F-1774-BF40-B0B8-41A67D4CD648}"/>
+                <a16:creationId xmlns:a16="http://schemas.microsoft.com/office/drawing/2014/main" xmlns="" id="{BE18127F-1774-BF40-B0B8-41A67D4CD648}"/>
               </a:ext>
             </a:extLst>
           </p:cNvPr>
@@ -6696,7 +7002,7 @@
           <p:cNvPr id="30" name="Straight Arrow Connector 29">
             <a:extLst>
               <a:ext uri="{FF2B5EF4-FFF2-40B4-BE49-F238E27FC236}">
-                <a16:creationId xmlns:a16="http://schemas.microsoft.com/office/drawing/2014/main" id="{B1E6150E-94CD-6A47-ACC0-B753AE929C90}"/>
+                <a16:creationId xmlns:a16="http://schemas.microsoft.com/office/drawing/2014/main" xmlns="" id="{B1E6150E-94CD-6A47-ACC0-B753AE929C90}"/>
               </a:ext>
             </a:extLst>
           </p:cNvPr>
@@ -6738,7 +7044,7 @@
           <p:cNvPr id="31" name="Rectangle 30">
             <a:extLst>
               <a:ext uri="{FF2B5EF4-FFF2-40B4-BE49-F238E27FC236}">
-                <a16:creationId xmlns:a16="http://schemas.microsoft.com/office/drawing/2014/main" id="{5BD548A1-62C3-5146-9D92-8D26A376073A}"/>
+                <a16:creationId xmlns:a16="http://schemas.microsoft.com/office/drawing/2014/main" xmlns="" id="{5BD548A1-62C3-5146-9D92-8D26A376073A}"/>
               </a:ext>
             </a:extLst>
           </p:cNvPr>
@@ -6831,7 +7137,7 @@
           <p:cNvPr id="34" name="Rectangle 33">
             <a:extLst>
               <a:ext uri="{FF2B5EF4-FFF2-40B4-BE49-F238E27FC236}">
-                <a16:creationId xmlns:a16="http://schemas.microsoft.com/office/drawing/2014/main" id="{C73C6616-3DC9-D349-A7B5-C88B2431367C}"/>
+                <a16:creationId xmlns:a16="http://schemas.microsoft.com/office/drawing/2014/main" xmlns="" id="{C73C6616-3DC9-D349-A7B5-C88B2431367C}"/>
               </a:ext>
             </a:extLst>
           </p:cNvPr>
@@ -6923,7 +7229,7 @@
           <p:cNvPr id="2" name="TextBox 1">
             <a:extLst>
               <a:ext uri="{FF2B5EF4-FFF2-40B4-BE49-F238E27FC236}">
-                <a16:creationId xmlns:a16="http://schemas.microsoft.com/office/drawing/2014/main" id="{221DED5B-F56B-0F43-A308-4F2DD034B5B7}"/>
+                <a16:creationId xmlns:a16="http://schemas.microsoft.com/office/drawing/2014/main" xmlns="" id="{221DED5B-F56B-0F43-A308-4F2DD034B5B7}"/>
               </a:ext>
             </a:extLst>
           </p:cNvPr>
@@ -6963,7 +7269,7 @@
           <p:cNvPr id="7" name="TextBox 6">
             <a:extLst>
               <a:ext uri="{FF2B5EF4-FFF2-40B4-BE49-F238E27FC236}">
-                <a16:creationId xmlns:a16="http://schemas.microsoft.com/office/drawing/2014/main" id="{F3573DF9-457D-7948-8B22-DB5337292FA7}"/>
+                <a16:creationId xmlns:a16="http://schemas.microsoft.com/office/drawing/2014/main" xmlns="" id="{F3573DF9-457D-7948-8B22-DB5337292FA7}"/>
               </a:ext>
             </a:extLst>
           </p:cNvPr>
@@ -7012,7 +7318,7 @@
           <p:cNvPr id="8" name="TextBox 7">
             <a:extLst>
               <a:ext uri="{FF2B5EF4-FFF2-40B4-BE49-F238E27FC236}">
-                <a16:creationId xmlns:a16="http://schemas.microsoft.com/office/drawing/2014/main" id="{49DF0299-C639-944C-9F0E-91BE71AC7E52}"/>
+                <a16:creationId xmlns:a16="http://schemas.microsoft.com/office/drawing/2014/main" xmlns="" id="{49DF0299-C639-944C-9F0E-91BE71AC7E52}"/>
               </a:ext>
             </a:extLst>
           </p:cNvPr>
@@ -7070,7 +7376,7 @@
           <p:cNvPr id="24" name="Rectangle 23">
             <a:extLst>
               <a:ext uri="{FF2B5EF4-FFF2-40B4-BE49-F238E27FC236}">
-                <a16:creationId xmlns:a16="http://schemas.microsoft.com/office/drawing/2014/main" id="{0FF49D2D-AD55-FC42-812F-F1C7667D9F36}"/>
+                <a16:creationId xmlns:a16="http://schemas.microsoft.com/office/drawing/2014/main" xmlns="" id="{0FF49D2D-AD55-FC42-812F-F1C7667D9F36}"/>
               </a:ext>
             </a:extLst>
           </p:cNvPr>
@@ -7119,7 +7425,7 @@
           <p:cNvPr id="25" name="TextBox 24">
             <a:extLst>
               <a:ext uri="{FF2B5EF4-FFF2-40B4-BE49-F238E27FC236}">
-                <a16:creationId xmlns:a16="http://schemas.microsoft.com/office/drawing/2014/main" id="{5ABC19D5-4195-C54F-8CD4-37D47073FF5F}"/>
+                <a16:creationId xmlns:a16="http://schemas.microsoft.com/office/drawing/2014/main" xmlns="" id="{5ABC19D5-4195-C54F-8CD4-37D47073FF5F}"/>
               </a:ext>
             </a:extLst>
           </p:cNvPr>
@@ -7172,7 +7478,7 @@
           <p:cNvPr id="26" name="Rounded Rectangle 25">
             <a:extLst>
               <a:ext uri="{FF2B5EF4-FFF2-40B4-BE49-F238E27FC236}">
-                <a16:creationId xmlns:a16="http://schemas.microsoft.com/office/drawing/2014/main" id="{65766278-B659-334E-82DA-B452DB42B674}"/>
+                <a16:creationId xmlns:a16="http://schemas.microsoft.com/office/drawing/2014/main" xmlns="" id="{65766278-B659-334E-82DA-B452DB42B674}"/>
               </a:ext>
             </a:extLst>
           </p:cNvPr>
@@ -7234,7 +7540,7 @@
           <p:cNvPr id="27" name="Rounded Rectangle 26">
             <a:extLst>
               <a:ext uri="{FF2B5EF4-FFF2-40B4-BE49-F238E27FC236}">
-                <a16:creationId xmlns:a16="http://schemas.microsoft.com/office/drawing/2014/main" id="{AD40C6B6-0BD0-ED4D-9EAA-5C9775A8E54F}"/>
+                <a16:creationId xmlns:a16="http://schemas.microsoft.com/office/drawing/2014/main" xmlns="" id="{AD40C6B6-0BD0-ED4D-9EAA-5C9775A8E54F}"/>
               </a:ext>
             </a:extLst>
           </p:cNvPr>
@@ -7296,7 +7602,7 @@
           <p:cNvPr id="29" name="TextBox 28">
             <a:extLst>
               <a:ext uri="{FF2B5EF4-FFF2-40B4-BE49-F238E27FC236}">
-                <a16:creationId xmlns:a16="http://schemas.microsoft.com/office/drawing/2014/main" id="{77F7DE57-E06E-684E-9226-A080B7D6ECCA}"/>
+                <a16:creationId xmlns:a16="http://schemas.microsoft.com/office/drawing/2014/main" xmlns="" id="{77F7DE57-E06E-684E-9226-A080B7D6ECCA}"/>
               </a:ext>
             </a:extLst>
           </p:cNvPr>
@@ -7355,7 +7661,7 @@
           <p:cNvPr id="30" name="TextBox 29">
             <a:extLst>
               <a:ext uri="{FF2B5EF4-FFF2-40B4-BE49-F238E27FC236}">
-                <a16:creationId xmlns:a16="http://schemas.microsoft.com/office/drawing/2014/main" id="{57CA2F3E-F7B2-BD47-BE38-7D7A4921BA4F}"/>
+                <a16:creationId xmlns:a16="http://schemas.microsoft.com/office/drawing/2014/main" xmlns="" id="{57CA2F3E-F7B2-BD47-BE38-7D7A4921BA4F}"/>
               </a:ext>
             </a:extLst>
           </p:cNvPr>
@@ -7414,7 +7720,7 @@
           <p:cNvPr id="31" name="TextBox 30">
             <a:extLst>
               <a:ext uri="{FF2B5EF4-FFF2-40B4-BE49-F238E27FC236}">
-                <a16:creationId xmlns:a16="http://schemas.microsoft.com/office/drawing/2014/main" id="{672F6CDF-112D-1645-9E28-B80BEAD7C42F}"/>
+                <a16:creationId xmlns:a16="http://schemas.microsoft.com/office/drawing/2014/main" xmlns="" id="{672F6CDF-112D-1645-9E28-B80BEAD7C42F}"/>
               </a:ext>
             </a:extLst>
           </p:cNvPr>
@@ -7517,7 +7823,7 @@
           <p:cNvPr id="6" name="Rectangle 5">
             <a:extLst>
               <a:ext uri="{FF2B5EF4-FFF2-40B4-BE49-F238E27FC236}">
-                <a16:creationId xmlns:a16="http://schemas.microsoft.com/office/drawing/2014/main" id="{B4BFFB39-F420-6646-B34F-E5CB9DD7EF67}"/>
+                <a16:creationId xmlns:a16="http://schemas.microsoft.com/office/drawing/2014/main" xmlns="" id="{B4BFFB39-F420-6646-B34F-E5CB9DD7EF67}"/>
               </a:ext>
             </a:extLst>
           </p:cNvPr>
@@ -7564,7 +7870,7 @@
           <p:cNvPr id="34" name="TextBox 33">
             <a:extLst>
               <a:ext uri="{FF2B5EF4-FFF2-40B4-BE49-F238E27FC236}">
-                <a16:creationId xmlns:a16="http://schemas.microsoft.com/office/drawing/2014/main" id="{C32AE3DF-7A42-814E-B3FA-F8152E5C2379}"/>
+                <a16:creationId xmlns:a16="http://schemas.microsoft.com/office/drawing/2014/main" xmlns="" id="{C32AE3DF-7A42-814E-B3FA-F8152E5C2379}"/>
               </a:ext>
             </a:extLst>
           </p:cNvPr>
@@ -7883,7 +8189,7 @@
           <p:cNvPr id="20" name="Rectangle 19">
             <a:extLst>
               <a:ext uri="{FF2B5EF4-FFF2-40B4-BE49-F238E27FC236}">
-                <a16:creationId xmlns:a16="http://schemas.microsoft.com/office/drawing/2014/main" id="{75204765-239D-4140-B84C-D59DF2CC03F2}"/>
+                <a16:creationId xmlns:a16="http://schemas.microsoft.com/office/drawing/2014/main" xmlns="" id="{75204765-239D-4140-B84C-D59DF2CC03F2}"/>
               </a:ext>
             </a:extLst>
           </p:cNvPr>
@@ -7932,7 +8238,7 @@
           <p:cNvPr id="21" name="Rectangle 20">
             <a:extLst>
               <a:ext uri="{FF2B5EF4-FFF2-40B4-BE49-F238E27FC236}">
-                <a16:creationId xmlns:a16="http://schemas.microsoft.com/office/drawing/2014/main" id="{8093E3FF-C9A7-EB49-A48A-509AD92A4158}"/>
+                <a16:creationId xmlns:a16="http://schemas.microsoft.com/office/drawing/2014/main" xmlns="" id="{8093E3FF-C9A7-EB49-A48A-509AD92A4158}"/>
               </a:ext>
             </a:extLst>
           </p:cNvPr>
@@ -7981,7 +8287,7 @@
           <p:cNvPr id="22" name="Rectangle 21">
             <a:extLst>
               <a:ext uri="{FF2B5EF4-FFF2-40B4-BE49-F238E27FC236}">
-                <a16:creationId xmlns:a16="http://schemas.microsoft.com/office/drawing/2014/main" id="{A89878A0-9B17-8649-933D-47CDCB8C7091}"/>
+                <a16:creationId xmlns:a16="http://schemas.microsoft.com/office/drawing/2014/main" xmlns="" id="{A89878A0-9B17-8649-933D-47CDCB8C7091}"/>
               </a:ext>
             </a:extLst>
           </p:cNvPr>
@@ -8074,7 +8380,7 @@
           <p:cNvPr id="23" name="Rectangle 22">
             <a:extLst>
               <a:ext uri="{FF2B5EF4-FFF2-40B4-BE49-F238E27FC236}">
-                <a16:creationId xmlns:a16="http://schemas.microsoft.com/office/drawing/2014/main" id="{0AB14E50-A3EB-6A4B-A9D4-BE4D183C4179}"/>
+                <a16:creationId xmlns:a16="http://schemas.microsoft.com/office/drawing/2014/main" xmlns="" id="{0AB14E50-A3EB-6A4B-A9D4-BE4D183C4179}"/>
               </a:ext>
             </a:extLst>
           </p:cNvPr>
@@ -8166,7 +8472,7 @@
           <p:cNvPr id="2" name="TextBox 1">
             <a:extLst>
               <a:ext uri="{FF2B5EF4-FFF2-40B4-BE49-F238E27FC236}">
-                <a16:creationId xmlns:a16="http://schemas.microsoft.com/office/drawing/2014/main" id="{221DED5B-F56B-0F43-A308-4F2DD034B5B7}"/>
+                <a16:creationId xmlns:a16="http://schemas.microsoft.com/office/drawing/2014/main" xmlns="" id="{221DED5B-F56B-0F43-A308-4F2DD034B5B7}"/>
               </a:ext>
             </a:extLst>
           </p:cNvPr>
@@ -8206,7 +8512,7 @@
           <p:cNvPr id="7" name="TextBox 6">
             <a:extLst>
               <a:ext uri="{FF2B5EF4-FFF2-40B4-BE49-F238E27FC236}">
-                <a16:creationId xmlns:a16="http://schemas.microsoft.com/office/drawing/2014/main" id="{F3573DF9-457D-7948-8B22-DB5337292FA7}"/>
+                <a16:creationId xmlns:a16="http://schemas.microsoft.com/office/drawing/2014/main" xmlns="" id="{F3573DF9-457D-7948-8B22-DB5337292FA7}"/>
               </a:ext>
             </a:extLst>
           </p:cNvPr>
@@ -8255,7 +8561,7 @@
           <p:cNvPr id="8" name="TextBox 7">
             <a:extLst>
               <a:ext uri="{FF2B5EF4-FFF2-40B4-BE49-F238E27FC236}">
-                <a16:creationId xmlns:a16="http://schemas.microsoft.com/office/drawing/2014/main" id="{49DF0299-C639-944C-9F0E-91BE71AC7E52}"/>
+                <a16:creationId xmlns:a16="http://schemas.microsoft.com/office/drawing/2014/main" xmlns="" id="{49DF0299-C639-944C-9F0E-91BE71AC7E52}"/>
               </a:ext>
             </a:extLst>
           </p:cNvPr>
@@ -8313,7 +8619,7 @@
           <p:cNvPr id="16" name="Rectangle 15">
             <a:extLst>
               <a:ext uri="{FF2B5EF4-FFF2-40B4-BE49-F238E27FC236}">
-                <a16:creationId xmlns:a16="http://schemas.microsoft.com/office/drawing/2014/main" id="{61CD5799-7FC2-F04C-ADCF-330CB97C8DA9}"/>
+                <a16:creationId xmlns:a16="http://schemas.microsoft.com/office/drawing/2014/main" xmlns="" id="{61CD5799-7FC2-F04C-ADCF-330CB97C8DA9}"/>
               </a:ext>
             </a:extLst>
           </p:cNvPr>
@@ -8372,7 +8678,7 @@
           <p:cNvPr id="17" name="Rectangle 16">
             <a:extLst>
               <a:ext uri="{FF2B5EF4-FFF2-40B4-BE49-F238E27FC236}">
-                <a16:creationId xmlns:a16="http://schemas.microsoft.com/office/drawing/2014/main" id="{6866C721-FE01-1B49-8B68-07C98D112373}"/>
+                <a16:creationId xmlns:a16="http://schemas.microsoft.com/office/drawing/2014/main" xmlns="" id="{6866C721-FE01-1B49-8B68-07C98D112373}"/>
               </a:ext>
             </a:extLst>
           </p:cNvPr>
@@ -8432,7 +8738,7 @@
           <p:cNvPr id="24" name="Rectangle 23">
             <a:extLst>
               <a:ext uri="{FF2B5EF4-FFF2-40B4-BE49-F238E27FC236}">
-                <a16:creationId xmlns:a16="http://schemas.microsoft.com/office/drawing/2014/main" id="{0FF49D2D-AD55-FC42-812F-F1C7667D9F36}"/>
+                <a16:creationId xmlns:a16="http://schemas.microsoft.com/office/drawing/2014/main" xmlns="" id="{0FF49D2D-AD55-FC42-812F-F1C7667D9F36}"/>
               </a:ext>
             </a:extLst>
           </p:cNvPr>
@@ -8481,7 +8787,7 @@
           <p:cNvPr id="25" name="TextBox 24">
             <a:extLst>
               <a:ext uri="{FF2B5EF4-FFF2-40B4-BE49-F238E27FC236}">
-                <a16:creationId xmlns:a16="http://schemas.microsoft.com/office/drawing/2014/main" id="{5ABC19D5-4195-C54F-8CD4-37D47073FF5F}"/>
+                <a16:creationId xmlns:a16="http://schemas.microsoft.com/office/drawing/2014/main" xmlns="" id="{5ABC19D5-4195-C54F-8CD4-37D47073FF5F}"/>
               </a:ext>
             </a:extLst>
           </p:cNvPr>
@@ -8534,7 +8840,7 @@
           <p:cNvPr id="26" name="Rounded Rectangle 25">
             <a:extLst>
               <a:ext uri="{FF2B5EF4-FFF2-40B4-BE49-F238E27FC236}">
-                <a16:creationId xmlns:a16="http://schemas.microsoft.com/office/drawing/2014/main" id="{65766278-B659-334E-82DA-B452DB42B674}"/>
+                <a16:creationId xmlns:a16="http://schemas.microsoft.com/office/drawing/2014/main" xmlns="" id="{65766278-B659-334E-82DA-B452DB42B674}"/>
               </a:ext>
             </a:extLst>
           </p:cNvPr>
@@ -8596,7 +8902,7 @@
           <p:cNvPr id="27" name="Rounded Rectangle 26">
             <a:extLst>
               <a:ext uri="{FF2B5EF4-FFF2-40B4-BE49-F238E27FC236}">
-                <a16:creationId xmlns:a16="http://schemas.microsoft.com/office/drawing/2014/main" id="{AD40C6B6-0BD0-ED4D-9EAA-5C9775A8E54F}"/>
+                <a16:creationId xmlns:a16="http://schemas.microsoft.com/office/drawing/2014/main" xmlns="" id="{AD40C6B6-0BD0-ED4D-9EAA-5C9775A8E54F}"/>
               </a:ext>
             </a:extLst>
           </p:cNvPr>
@@ -8658,7 +8964,7 @@
           <p:cNvPr id="29" name="TextBox 28">
             <a:extLst>
               <a:ext uri="{FF2B5EF4-FFF2-40B4-BE49-F238E27FC236}">
-                <a16:creationId xmlns:a16="http://schemas.microsoft.com/office/drawing/2014/main" id="{77F7DE57-E06E-684E-9226-A080B7D6ECCA}"/>
+                <a16:creationId xmlns:a16="http://schemas.microsoft.com/office/drawing/2014/main" xmlns="" id="{77F7DE57-E06E-684E-9226-A080B7D6ECCA}"/>
               </a:ext>
             </a:extLst>
           </p:cNvPr>
@@ -8717,7 +9023,7 @@
           <p:cNvPr id="30" name="TextBox 29">
             <a:extLst>
               <a:ext uri="{FF2B5EF4-FFF2-40B4-BE49-F238E27FC236}">
-                <a16:creationId xmlns:a16="http://schemas.microsoft.com/office/drawing/2014/main" id="{57CA2F3E-F7B2-BD47-BE38-7D7A4921BA4F}"/>
+                <a16:creationId xmlns:a16="http://schemas.microsoft.com/office/drawing/2014/main" xmlns="" id="{57CA2F3E-F7B2-BD47-BE38-7D7A4921BA4F}"/>
               </a:ext>
             </a:extLst>
           </p:cNvPr>
@@ -8776,7 +9082,7 @@
           <p:cNvPr id="31" name="TextBox 30">
             <a:extLst>
               <a:ext uri="{FF2B5EF4-FFF2-40B4-BE49-F238E27FC236}">
-                <a16:creationId xmlns:a16="http://schemas.microsoft.com/office/drawing/2014/main" id="{672F6CDF-112D-1645-9E28-B80BEAD7C42F}"/>
+                <a16:creationId xmlns:a16="http://schemas.microsoft.com/office/drawing/2014/main" xmlns="" id="{672F6CDF-112D-1645-9E28-B80BEAD7C42F}"/>
               </a:ext>
             </a:extLst>
           </p:cNvPr>
@@ -8879,7 +9185,7 @@
           <p:cNvPr id="34" name="TextBox 33">
             <a:extLst>
               <a:ext uri="{FF2B5EF4-FFF2-40B4-BE49-F238E27FC236}">
-                <a16:creationId xmlns:a16="http://schemas.microsoft.com/office/drawing/2014/main" id="{C32AE3DF-7A42-814E-B3FA-F8152E5C2379}"/>
+                <a16:creationId xmlns:a16="http://schemas.microsoft.com/office/drawing/2014/main" xmlns="" id="{C32AE3DF-7A42-814E-B3FA-F8152E5C2379}"/>
               </a:ext>
             </a:extLst>
           </p:cNvPr>
@@ -9198,7 +9504,7 @@
           <p:cNvPr id="18" name="Rectangle 17">
             <a:extLst>
               <a:ext uri="{FF2B5EF4-FFF2-40B4-BE49-F238E27FC236}">
-                <a16:creationId xmlns:a16="http://schemas.microsoft.com/office/drawing/2014/main" id="{61CD5799-7FC2-F04C-ADCF-330CB97C8DA9}"/>
+                <a16:creationId xmlns:a16="http://schemas.microsoft.com/office/drawing/2014/main" xmlns="" id="{61CD5799-7FC2-F04C-ADCF-330CB97C8DA9}"/>
               </a:ext>
             </a:extLst>
           </p:cNvPr>
@@ -9291,7 +9597,7 @@
           <p:cNvPr id="19" name="Rectangle 18">
             <a:extLst>
               <a:ext uri="{FF2B5EF4-FFF2-40B4-BE49-F238E27FC236}">
-                <a16:creationId xmlns:a16="http://schemas.microsoft.com/office/drawing/2014/main" id="{6866C721-FE01-1B49-8B68-07C98D112373}"/>
+                <a16:creationId xmlns:a16="http://schemas.microsoft.com/office/drawing/2014/main" xmlns="" id="{6866C721-FE01-1B49-8B68-07C98D112373}"/>
               </a:ext>
             </a:extLst>
           </p:cNvPr>
@@ -9353,7 +9659,7 @@
           <p:cNvPr id="20" name="Rectangle 19">
             <a:extLst>
               <a:ext uri="{FF2B5EF4-FFF2-40B4-BE49-F238E27FC236}">
-                <a16:creationId xmlns:a16="http://schemas.microsoft.com/office/drawing/2014/main" id="{75204765-239D-4140-B84C-D59DF2CC03F2}"/>
+                <a16:creationId xmlns:a16="http://schemas.microsoft.com/office/drawing/2014/main" xmlns="" id="{75204765-239D-4140-B84C-D59DF2CC03F2}"/>
               </a:ext>
             </a:extLst>
           </p:cNvPr>
@@ -9402,7 +9708,7 @@
           <p:cNvPr id="21" name="Rectangle 20">
             <a:extLst>
               <a:ext uri="{FF2B5EF4-FFF2-40B4-BE49-F238E27FC236}">
-                <a16:creationId xmlns:a16="http://schemas.microsoft.com/office/drawing/2014/main" id="{8093E3FF-C9A7-EB49-A48A-509AD92A4158}"/>
+                <a16:creationId xmlns:a16="http://schemas.microsoft.com/office/drawing/2014/main" xmlns="" id="{8093E3FF-C9A7-EB49-A48A-509AD92A4158}"/>
               </a:ext>
             </a:extLst>
           </p:cNvPr>
@@ -9481,7 +9787,7 @@
           <p:cNvPr id="2" name="TextBox 1">
             <a:extLst>
               <a:ext uri="{FF2B5EF4-FFF2-40B4-BE49-F238E27FC236}">
-                <a16:creationId xmlns:a16="http://schemas.microsoft.com/office/drawing/2014/main" id="{221DED5B-F56B-0F43-A308-4F2DD034B5B7}"/>
+                <a16:creationId xmlns:a16="http://schemas.microsoft.com/office/drawing/2014/main" xmlns="" id="{221DED5B-F56B-0F43-A308-4F2DD034B5B7}"/>
               </a:ext>
             </a:extLst>
           </p:cNvPr>
@@ -9521,7 +9827,7 @@
           <p:cNvPr id="7" name="TextBox 6">
             <a:extLst>
               <a:ext uri="{FF2B5EF4-FFF2-40B4-BE49-F238E27FC236}">
-                <a16:creationId xmlns:a16="http://schemas.microsoft.com/office/drawing/2014/main" id="{F3573DF9-457D-7948-8B22-DB5337292FA7}"/>
+                <a16:creationId xmlns:a16="http://schemas.microsoft.com/office/drawing/2014/main" xmlns="" id="{F3573DF9-457D-7948-8B22-DB5337292FA7}"/>
               </a:ext>
             </a:extLst>
           </p:cNvPr>
@@ -9570,7 +9876,7 @@
           <p:cNvPr id="8" name="TextBox 7">
             <a:extLst>
               <a:ext uri="{FF2B5EF4-FFF2-40B4-BE49-F238E27FC236}">
-                <a16:creationId xmlns:a16="http://schemas.microsoft.com/office/drawing/2014/main" id="{49DF0299-C639-944C-9F0E-91BE71AC7E52}"/>
+                <a16:creationId xmlns:a16="http://schemas.microsoft.com/office/drawing/2014/main" xmlns="" id="{49DF0299-C639-944C-9F0E-91BE71AC7E52}"/>
               </a:ext>
             </a:extLst>
           </p:cNvPr>
@@ -9628,7 +9934,7 @@
           <p:cNvPr id="5" name="Rounded Rectangle 4">
             <a:extLst>
               <a:ext uri="{FF2B5EF4-FFF2-40B4-BE49-F238E27FC236}">
-                <a16:creationId xmlns:a16="http://schemas.microsoft.com/office/drawing/2014/main" id="{1376ECFE-A6F2-6C42-A904-0E15AFF7920D}"/>
+                <a16:creationId xmlns:a16="http://schemas.microsoft.com/office/drawing/2014/main" xmlns="" id="{1376ECFE-A6F2-6C42-A904-0E15AFF7920D}"/>
               </a:ext>
             </a:extLst>
           </p:cNvPr>
@@ -9690,7 +9996,7 @@
           <p:cNvPr id="17" name="Rectangle 16">
             <a:extLst>
               <a:ext uri="{FF2B5EF4-FFF2-40B4-BE49-F238E27FC236}">
-                <a16:creationId xmlns:a16="http://schemas.microsoft.com/office/drawing/2014/main" id="{6866C721-FE01-1B49-8B68-07C98D112373}"/>
+                <a16:creationId xmlns:a16="http://schemas.microsoft.com/office/drawing/2014/main" xmlns="" id="{6866C721-FE01-1B49-8B68-07C98D112373}"/>
               </a:ext>
             </a:extLst>
           </p:cNvPr>
@@ -9750,7 +10056,7 @@
           <p:cNvPr id="6" name="Picture 5">
             <a:extLst>
               <a:ext uri="{FF2B5EF4-FFF2-40B4-BE49-F238E27FC236}">
-                <a16:creationId xmlns:a16="http://schemas.microsoft.com/office/drawing/2014/main" id="{A7F11B26-2BC9-FE46-AC69-A53B0BFFD471}"/>
+                <a16:creationId xmlns:a16="http://schemas.microsoft.com/office/drawing/2014/main" xmlns="" id="{A7F11B26-2BC9-FE46-AC69-A53B0BFFD471}"/>
               </a:ext>
             </a:extLst>
           </p:cNvPr>
@@ -9780,7 +10086,7 @@
           <p:cNvPr id="9" name="TextBox 8">
             <a:extLst>
               <a:ext uri="{FF2B5EF4-FFF2-40B4-BE49-F238E27FC236}">
-                <a16:creationId xmlns:a16="http://schemas.microsoft.com/office/drawing/2014/main" id="{9DDBC895-FCFB-3A47-9E03-ECA92F586E8E}"/>
+                <a16:creationId xmlns:a16="http://schemas.microsoft.com/office/drawing/2014/main" xmlns="" id="{9DDBC895-FCFB-3A47-9E03-ECA92F586E8E}"/>
               </a:ext>
             </a:extLst>
           </p:cNvPr>
@@ -9913,7 +10219,7 @@
           <p:cNvPr id="18" name="Rounded Rectangle 17">
             <a:extLst>
               <a:ext uri="{FF2B5EF4-FFF2-40B4-BE49-F238E27FC236}">
-                <a16:creationId xmlns:a16="http://schemas.microsoft.com/office/drawing/2014/main" id="{5BCBF1FE-BD27-3C4C-892A-36F7CB191B90}"/>
+                <a16:creationId xmlns:a16="http://schemas.microsoft.com/office/drawing/2014/main" xmlns="" id="{5BCBF1FE-BD27-3C4C-892A-36F7CB191B90}"/>
               </a:ext>
             </a:extLst>
           </p:cNvPr>
@@ -9975,7 +10281,7 @@
           <p:cNvPr id="20" name="Rounded Rectangle 19">
             <a:extLst>
               <a:ext uri="{FF2B5EF4-FFF2-40B4-BE49-F238E27FC236}">
-                <a16:creationId xmlns:a16="http://schemas.microsoft.com/office/drawing/2014/main" id="{4BEBFFB0-3422-9540-99C7-6A70E61CA9EE}"/>
+                <a16:creationId xmlns:a16="http://schemas.microsoft.com/office/drawing/2014/main" xmlns="" id="{4BEBFFB0-3422-9540-99C7-6A70E61CA9EE}"/>
               </a:ext>
             </a:extLst>
           </p:cNvPr>
@@ -10037,7 +10343,7 @@
           <p:cNvPr id="14" name="TextBox 13">
             <a:extLst>
               <a:ext uri="{FF2B5EF4-FFF2-40B4-BE49-F238E27FC236}">
-                <a16:creationId xmlns:a16="http://schemas.microsoft.com/office/drawing/2014/main" id="{78583B44-7EF9-B84C-82A0-B76DDA850F25}"/>
+                <a16:creationId xmlns:a16="http://schemas.microsoft.com/office/drawing/2014/main" xmlns="" id="{78583B44-7EF9-B84C-82A0-B76DDA850F25}"/>
               </a:ext>
             </a:extLst>
           </p:cNvPr>
@@ -10085,7 +10391,7 @@
           <p:cNvPr id="15" name="TextBox 14">
             <a:extLst>
               <a:ext uri="{FF2B5EF4-FFF2-40B4-BE49-F238E27FC236}">
-                <a16:creationId xmlns:a16="http://schemas.microsoft.com/office/drawing/2014/main" id="{0FFEF61B-8BF9-3341-9EE3-AE79DCB6E990}"/>
+                <a16:creationId xmlns:a16="http://schemas.microsoft.com/office/drawing/2014/main" xmlns="" id="{0FFEF61B-8BF9-3341-9EE3-AE79DCB6E990}"/>
               </a:ext>
             </a:extLst>
           </p:cNvPr>
@@ -10135,7 +10441,7 @@
           <p:cNvPr id="19" name="TextBox 18">
             <a:extLst>
               <a:ext uri="{FF2B5EF4-FFF2-40B4-BE49-F238E27FC236}">
-                <a16:creationId xmlns:a16="http://schemas.microsoft.com/office/drawing/2014/main" id="{03039236-23FD-9149-A597-7039706A384C}"/>
+                <a16:creationId xmlns:a16="http://schemas.microsoft.com/office/drawing/2014/main" xmlns="" id="{03039236-23FD-9149-A597-7039706A384C}"/>
               </a:ext>
             </a:extLst>
           </p:cNvPr>
@@ -10185,7 +10491,7 @@
           <p:cNvPr id="23" name="Rectangle 22">
             <a:extLst>
               <a:ext uri="{FF2B5EF4-FFF2-40B4-BE49-F238E27FC236}">
-                <a16:creationId xmlns:a16="http://schemas.microsoft.com/office/drawing/2014/main" id="{7342613B-92E6-DB4A-AF63-46904E673D32}"/>
+                <a16:creationId xmlns:a16="http://schemas.microsoft.com/office/drawing/2014/main" xmlns="" id="{7342613B-92E6-DB4A-AF63-46904E673D32}"/>
               </a:ext>
             </a:extLst>
           </p:cNvPr>
@@ -10278,7 +10584,7 @@
           <p:cNvPr id="24" name="Rectangle 23">
             <a:extLst>
               <a:ext uri="{FF2B5EF4-FFF2-40B4-BE49-F238E27FC236}">
-                <a16:creationId xmlns:a16="http://schemas.microsoft.com/office/drawing/2014/main" id="{56539402-9B1A-4F48-8711-55B55C89028A}"/>
+                <a16:creationId xmlns:a16="http://schemas.microsoft.com/office/drawing/2014/main" xmlns="" id="{56539402-9B1A-4F48-8711-55B55C89028A}"/>
               </a:ext>
             </a:extLst>
           </p:cNvPr>
@@ -10370,7 +10676,7 @@
           <p:cNvPr id="2" name="TextBox 1">
             <a:extLst>
               <a:ext uri="{FF2B5EF4-FFF2-40B4-BE49-F238E27FC236}">
-                <a16:creationId xmlns:a16="http://schemas.microsoft.com/office/drawing/2014/main" id="{221DED5B-F56B-0F43-A308-4F2DD034B5B7}"/>
+                <a16:creationId xmlns:a16="http://schemas.microsoft.com/office/drawing/2014/main" xmlns="" id="{221DED5B-F56B-0F43-A308-4F2DD034B5B7}"/>
               </a:ext>
             </a:extLst>
           </p:cNvPr>
@@ -10410,7 +10716,7 @@
           <p:cNvPr id="7" name="TextBox 6">
             <a:extLst>
               <a:ext uri="{FF2B5EF4-FFF2-40B4-BE49-F238E27FC236}">
-                <a16:creationId xmlns:a16="http://schemas.microsoft.com/office/drawing/2014/main" id="{F3573DF9-457D-7948-8B22-DB5337292FA7}"/>
+                <a16:creationId xmlns:a16="http://schemas.microsoft.com/office/drawing/2014/main" xmlns="" id="{F3573DF9-457D-7948-8B22-DB5337292FA7}"/>
               </a:ext>
             </a:extLst>
           </p:cNvPr>
@@ -10459,7 +10765,7 @@
           <p:cNvPr id="8" name="TextBox 7">
             <a:extLst>
               <a:ext uri="{FF2B5EF4-FFF2-40B4-BE49-F238E27FC236}">
-                <a16:creationId xmlns:a16="http://schemas.microsoft.com/office/drawing/2014/main" id="{49DF0299-C639-944C-9F0E-91BE71AC7E52}"/>
+                <a16:creationId xmlns:a16="http://schemas.microsoft.com/office/drawing/2014/main" xmlns="" id="{49DF0299-C639-944C-9F0E-91BE71AC7E52}"/>
               </a:ext>
             </a:extLst>
           </p:cNvPr>
@@ -10517,7 +10823,7 @@
           <p:cNvPr id="16" name="Rectangle 15">
             <a:extLst>
               <a:ext uri="{FF2B5EF4-FFF2-40B4-BE49-F238E27FC236}">
-                <a16:creationId xmlns:a16="http://schemas.microsoft.com/office/drawing/2014/main" id="{61CD5799-7FC2-F04C-ADCF-330CB97C8DA9}"/>
+                <a16:creationId xmlns:a16="http://schemas.microsoft.com/office/drawing/2014/main" xmlns="" id="{61CD5799-7FC2-F04C-ADCF-330CB97C8DA9}"/>
               </a:ext>
             </a:extLst>
           </p:cNvPr>
@@ -10576,7 +10882,7 @@
           <p:cNvPr id="17" name="Rectangle 16">
             <a:extLst>
               <a:ext uri="{FF2B5EF4-FFF2-40B4-BE49-F238E27FC236}">
-                <a16:creationId xmlns:a16="http://schemas.microsoft.com/office/drawing/2014/main" id="{6866C721-FE01-1B49-8B68-07C98D112373}"/>
+                <a16:creationId xmlns:a16="http://schemas.microsoft.com/office/drawing/2014/main" xmlns="" id="{6866C721-FE01-1B49-8B68-07C98D112373}"/>
               </a:ext>
             </a:extLst>
           </p:cNvPr>
@@ -10636,7 +10942,7 @@
           <p:cNvPr id="6" name="Picture 5">
             <a:extLst>
               <a:ext uri="{FF2B5EF4-FFF2-40B4-BE49-F238E27FC236}">
-                <a16:creationId xmlns:a16="http://schemas.microsoft.com/office/drawing/2014/main" id="{A7F11B26-2BC9-FE46-AC69-A53B0BFFD471}"/>
+                <a16:creationId xmlns:a16="http://schemas.microsoft.com/office/drawing/2014/main" xmlns="" id="{A7F11B26-2BC9-FE46-AC69-A53B0BFFD471}"/>
               </a:ext>
             </a:extLst>
           </p:cNvPr>
@@ -10666,7 +10972,7 @@
           <p:cNvPr id="9" name="TextBox 8">
             <a:extLst>
               <a:ext uri="{FF2B5EF4-FFF2-40B4-BE49-F238E27FC236}">
-                <a16:creationId xmlns:a16="http://schemas.microsoft.com/office/drawing/2014/main" id="{9DDBC895-FCFB-3A47-9E03-ECA92F586E8E}"/>
+                <a16:creationId xmlns:a16="http://schemas.microsoft.com/office/drawing/2014/main" xmlns="" id="{9DDBC895-FCFB-3A47-9E03-ECA92F586E8E}"/>
               </a:ext>
             </a:extLst>
           </p:cNvPr>
@@ -10795,7 +11101,7 @@
           <p:cNvPr id="18" name="Rounded Rectangle 17">
             <a:extLst>
               <a:ext uri="{FF2B5EF4-FFF2-40B4-BE49-F238E27FC236}">
-                <a16:creationId xmlns:a16="http://schemas.microsoft.com/office/drawing/2014/main" id="{5BCBF1FE-BD27-3C4C-892A-36F7CB191B90}"/>
+                <a16:creationId xmlns:a16="http://schemas.microsoft.com/office/drawing/2014/main" xmlns="" id="{5BCBF1FE-BD27-3C4C-892A-36F7CB191B90}"/>
               </a:ext>
             </a:extLst>
           </p:cNvPr>
@@ -10857,7 +11163,7 @@
           <p:cNvPr id="20" name="Rounded Rectangle 19">
             <a:extLst>
               <a:ext uri="{FF2B5EF4-FFF2-40B4-BE49-F238E27FC236}">
-                <a16:creationId xmlns:a16="http://schemas.microsoft.com/office/drawing/2014/main" id="{4BEBFFB0-3422-9540-99C7-6A70E61CA9EE}"/>
+                <a16:creationId xmlns:a16="http://schemas.microsoft.com/office/drawing/2014/main" xmlns="" id="{4BEBFFB0-3422-9540-99C7-6A70E61CA9EE}"/>
               </a:ext>
             </a:extLst>
           </p:cNvPr>
@@ -10919,7 +11225,7 @@
           <p:cNvPr id="4" name="TextBox 3">
             <a:extLst>
               <a:ext uri="{FF2B5EF4-FFF2-40B4-BE49-F238E27FC236}">
-                <a16:creationId xmlns:a16="http://schemas.microsoft.com/office/drawing/2014/main" id="{F34410C0-B037-D144-80FC-AB321307446E}"/>
+                <a16:creationId xmlns:a16="http://schemas.microsoft.com/office/drawing/2014/main" xmlns="" id="{F34410C0-B037-D144-80FC-AB321307446E}"/>
               </a:ext>
             </a:extLst>
           </p:cNvPr>
@@ -10969,7 +11275,7 @@
           <p:cNvPr id="19" name="TextBox 18">
             <a:extLst>
               <a:ext uri="{FF2B5EF4-FFF2-40B4-BE49-F238E27FC236}">
-                <a16:creationId xmlns:a16="http://schemas.microsoft.com/office/drawing/2014/main" id="{B8792BF7-FDB0-C84B-AC3C-F44B726A4044}"/>
+                <a16:creationId xmlns:a16="http://schemas.microsoft.com/office/drawing/2014/main" xmlns="" id="{B8792BF7-FDB0-C84B-AC3C-F44B726A4044}"/>
               </a:ext>
             </a:extLst>
           </p:cNvPr>
@@ -11017,7 +11323,7 @@
           <p:cNvPr id="13" name="TextBox 12">
             <a:extLst>
               <a:ext uri="{FF2B5EF4-FFF2-40B4-BE49-F238E27FC236}">
-                <a16:creationId xmlns:a16="http://schemas.microsoft.com/office/drawing/2014/main" id="{5A67BCD8-FF63-914B-AE2E-007488308C8B}"/>
+                <a16:creationId xmlns:a16="http://schemas.microsoft.com/office/drawing/2014/main" xmlns="" id="{5A67BCD8-FF63-914B-AE2E-007488308C8B}"/>
               </a:ext>
             </a:extLst>
           </p:cNvPr>
@@ -11067,7 +11373,7 @@
           <p:cNvPr id="14" name="Rectangle 13">
             <a:extLst>
               <a:ext uri="{FF2B5EF4-FFF2-40B4-BE49-F238E27FC236}">
-                <a16:creationId xmlns:a16="http://schemas.microsoft.com/office/drawing/2014/main" id="{61CD5799-7FC2-F04C-ADCF-330CB97C8DA9}"/>
+                <a16:creationId xmlns:a16="http://schemas.microsoft.com/office/drawing/2014/main" xmlns="" id="{61CD5799-7FC2-F04C-ADCF-330CB97C8DA9}"/>
               </a:ext>
             </a:extLst>
           </p:cNvPr>
@@ -11126,7 +11432,7 @@
           <p:cNvPr id="15" name="Rectangle 14">
             <a:extLst>
               <a:ext uri="{FF2B5EF4-FFF2-40B4-BE49-F238E27FC236}">
-                <a16:creationId xmlns:a16="http://schemas.microsoft.com/office/drawing/2014/main" id="{6866C721-FE01-1B49-8B68-07C98D112373}"/>
+                <a16:creationId xmlns:a16="http://schemas.microsoft.com/office/drawing/2014/main" xmlns="" id="{6866C721-FE01-1B49-8B68-07C98D112373}"/>
               </a:ext>
             </a:extLst>
           </p:cNvPr>
@@ -11186,7 +11492,7 @@
           <p:cNvPr id="21" name="Rectangle 20">
             <a:extLst>
               <a:ext uri="{FF2B5EF4-FFF2-40B4-BE49-F238E27FC236}">
-                <a16:creationId xmlns:a16="http://schemas.microsoft.com/office/drawing/2014/main" id="{8F2C3E93-B9E8-DE47-BEBB-E0A34BE60AF2}"/>
+                <a16:creationId xmlns:a16="http://schemas.microsoft.com/office/drawing/2014/main" xmlns="" id="{8F2C3E93-B9E8-DE47-BEBB-E0A34BE60AF2}"/>
               </a:ext>
             </a:extLst>
           </p:cNvPr>
@@ -11279,7 +11585,7 @@
           <p:cNvPr id="22" name="Rectangle 21">
             <a:extLst>
               <a:ext uri="{FF2B5EF4-FFF2-40B4-BE49-F238E27FC236}">
-                <a16:creationId xmlns:a16="http://schemas.microsoft.com/office/drawing/2014/main" id="{74726836-4E8A-1349-A362-BA59556A1905}"/>
+                <a16:creationId xmlns:a16="http://schemas.microsoft.com/office/drawing/2014/main" xmlns="" id="{74726836-4E8A-1349-A362-BA59556A1905}"/>
               </a:ext>
             </a:extLst>
           </p:cNvPr>
@@ -11371,7 +11677,7 @@
           <p:cNvPr id="2" name="TextBox 1">
             <a:extLst>
               <a:ext uri="{FF2B5EF4-FFF2-40B4-BE49-F238E27FC236}">
-                <a16:creationId xmlns:a16="http://schemas.microsoft.com/office/drawing/2014/main" id="{221DED5B-F56B-0F43-A308-4F2DD034B5B7}"/>
+                <a16:creationId xmlns:a16="http://schemas.microsoft.com/office/drawing/2014/main" xmlns="" id="{221DED5B-F56B-0F43-A308-4F2DD034B5B7}"/>
               </a:ext>
             </a:extLst>
           </p:cNvPr>
@@ -11411,7 +11717,7 @@
           <p:cNvPr id="7" name="TextBox 6">
             <a:extLst>
               <a:ext uri="{FF2B5EF4-FFF2-40B4-BE49-F238E27FC236}">
-                <a16:creationId xmlns:a16="http://schemas.microsoft.com/office/drawing/2014/main" id="{F3573DF9-457D-7948-8B22-DB5337292FA7}"/>
+                <a16:creationId xmlns:a16="http://schemas.microsoft.com/office/drawing/2014/main" xmlns="" id="{F3573DF9-457D-7948-8B22-DB5337292FA7}"/>
               </a:ext>
             </a:extLst>
           </p:cNvPr>
@@ -11475,7 +11781,7 @@
           <p:cNvPr id="8" name="TextBox 7">
             <a:extLst>
               <a:ext uri="{FF2B5EF4-FFF2-40B4-BE49-F238E27FC236}">
-                <a16:creationId xmlns:a16="http://schemas.microsoft.com/office/drawing/2014/main" id="{49DF0299-C639-944C-9F0E-91BE71AC7E52}"/>
+                <a16:creationId xmlns:a16="http://schemas.microsoft.com/office/drawing/2014/main" xmlns="" id="{49DF0299-C639-944C-9F0E-91BE71AC7E52}"/>
               </a:ext>
             </a:extLst>
           </p:cNvPr>
@@ -11533,7 +11839,7 @@
           <p:cNvPr id="16" name="Rectangle 15">
             <a:extLst>
               <a:ext uri="{FF2B5EF4-FFF2-40B4-BE49-F238E27FC236}">
-                <a16:creationId xmlns:a16="http://schemas.microsoft.com/office/drawing/2014/main" id="{61CD5799-7FC2-F04C-ADCF-330CB97C8DA9}"/>
+                <a16:creationId xmlns:a16="http://schemas.microsoft.com/office/drawing/2014/main" xmlns="" id="{61CD5799-7FC2-F04C-ADCF-330CB97C8DA9}"/>
               </a:ext>
             </a:extLst>
           </p:cNvPr>
@@ -11592,7 +11898,7 @@
           <p:cNvPr id="17" name="Rectangle 16">
             <a:extLst>
               <a:ext uri="{FF2B5EF4-FFF2-40B4-BE49-F238E27FC236}">
-                <a16:creationId xmlns:a16="http://schemas.microsoft.com/office/drawing/2014/main" id="{6866C721-FE01-1B49-8B68-07C98D112373}"/>
+                <a16:creationId xmlns:a16="http://schemas.microsoft.com/office/drawing/2014/main" xmlns="" id="{6866C721-FE01-1B49-8B68-07C98D112373}"/>
               </a:ext>
             </a:extLst>
           </p:cNvPr>
@@ -11652,7 +11958,7 @@
           <p:cNvPr id="6" name="Picture 5">
             <a:extLst>
               <a:ext uri="{FF2B5EF4-FFF2-40B4-BE49-F238E27FC236}">
-                <a16:creationId xmlns:a16="http://schemas.microsoft.com/office/drawing/2014/main" id="{A7F11B26-2BC9-FE46-AC69-A53B0BFFD471}"/>
+                <a16:creationId xmlns:a16="http://schemas.microsoft.com/office/drawing/2014/main" xmlns="" id="{A7F11B26-2BC9-FE46-AC69-A53B0BFFD471}"/>
               </a:ext>
             </a:extLst>
           </p:cNvPr>
@@ -11682,7 +11988,7 @@
           <p:cNvPr id="18" name="Rounded Rectangle 17">
             <a:extLst>
               <a:ext uri="{FF2B5EF4-FFF2-40B4-BE49-F238E27FC236}">
-                <a16:creationId xmlns:a16="http://schemas.microsoft.com/office/drawing/2014/main" id="{5BCBF1FE-BD27-3C4C-892A-36F7CB191B90}"/>
+                <a16:creationId xmlns:a16="http://schemas.microsoft.com/office/drawing/2014/main" xmlns="" id="{5BCBF1FE-BD27-3C4C-892A-36F7CB191B90}"/>
               </a:ext>
             </a:extLst>
           </p:cNvPr>
@@ -11744,7 +12050,7 @@
           <p:cNvPr id="20" name="Rounded Rectangle 19">
             <a:extLst>
               <a:ext uri="{FF2B5EF4-FFF2-40B4-BE49-F238E27FC236}">
-                <a16:creationId xmlns:a16="http://schemas.microsoft.com/office/drawing/2014/main" id="{4BEBFFB0-3422-9540-99C7-6A70E61CA9EE}"/>
+                <a16:creationId xmlns:a16="http://schemas.microsoft.com/office/drawing/2014/main" xmlns="" id="{4BEBFFB0-3422-9540-99C7-6A70E61CA9EE}"/>
               </a:ext>
             </a:extLst>
           </p:cNvPr>
@@ -11806,7 +12112,7 @@
           <p:cNvPr id="4" name="TextBox 3">
             <a:extLst>
               <a:ext uri="{FF2B5EF4-FFF2-40B4-BE49-F238E27FC236}">
-                <a16:creationId xmlns:a16="http://schemas.microsoft.com/office/drawing/2014/main" id="{F34410C0-B037-D144-80FC-AB321307446E}"/>
+                <a16:creationId xmlns:a16="http://schemas.microsoft.com/office/drawing/2014/main" xmlns="" id="{F34410C0-B037-D144-80FC-AB321307446E}"/>
               </a:ext>
             </a:extLst>
           </p:cNvPr>
@@ -11856,7 +12162,7 @@
           <p:cNvPr id="19" name="TextBox 18">
             <a:extLst>
               <a:ext uri="{FF2B5EF4-FFF2-40B4-BE49-F238E27FC236}">
-                <a16:creationId xmlns:a16="http://schemas.microsoft.com/office/drawing/2014/main" id="{B8792BF7-FDB0-C84B-AC3C-F44B726A4044}"/>
+                <a16:creationId xmlns:a16="http://schemas.microsoft.com/office/drawing/2014/main" xmlns="" id="{B8792BF7-FDB0-C84B-AC3C-F44B726A4044}"/>
               </a:ext>
             </a:extLst>
           </p:cNvPr>
@@ -11906,7 +12212,7 @@
           <p:cNvPr id="13" name="TextBox 12">
             <a:extLst>
               <a:ext uri="{FF2B5EF4-FFF2-40B4-BE49-F238E27FC236}">
-                <a16:creationId xmlns:a16="http://schemas.microsoft.com/office/drawing/2014/main" id="{5A67BCD8-FF63-914B-AE2E-007488308C8B}"/>
+                <a16:creationId xmlns:a16="http://schemas.microsoft.com/office/drawing/2014/main" xmlns="" id="{5A67BCD8-FF63-914B-AE2E-007488308C8B}"/>
               </a:ext>
             </a:extLst>
           </p:cNvPr>
@@ -11954,7 +12260,7 @@
           <p:cNvPr id="14" name="Table 13">
             <a:extLst>
               <a:ext uri="{FF2B5EF4-FFF2-40B4-BE49-F238E27FC236}">
-                <a16:creationId xmlns:a16="http://schemas.microsoft.com/office/drawing/2014/main" id="{55DF4D50-F21B-B245-882C-E25093D308A0}"/>
+                <a16:creationId xmlns:a16="http://schemas.microsoft.com/office/drawing/2014/main" xmlns="" id="{55DF4D50-F21B-B245-882C-E25093D308A0}"/>
               </a:ext>
             </a:extLst>
           </p:cNvPr>
@@ -11983,21 +12289,21 @@
                 <a:gridCol w="1843562">
                   <a:extLst>
                     <a:ext uri="{9D8B030D-6E8A-4147-A177-3AD203B41FA5}">
-                      <a16:colId xmlns:a16="http://schemas.microsoft.com/office/drawing/2014/main" val="3343531259"/>
+                      <a16:colId xmlns:a16="http://schemas.microsoft.com/office/drawing/2014/main" xmlns="" val="3343531259"/>
                     </a:ext>
                   </a:extLst>
                 </a:gridCol>
                 <a:gridCol w="1843562">
                   <a:extLst>
                     <a:ext uri="{9D8B030D-6E8A-4147-A177-3AD203B41FA5}">
-                      <a16:colId xmlns:a16="http://schemas.microsoft.com/office/drawing/2014/main" val="2699499016"/>
+                      <a16:colId xmlns:a16="http://schemas.microsoft.com/office/drawing/2014/main" xmlns="" val="2699499016"/>
                     </a:ext>
                   </a:extLst>
                 </a:gridCol>
                 <a:gridCol w="1843562">
                   <a:extLst>
                     <a:ext uri="{9D8B030D-6E8A-4147-A177-3AD203B41FA5}">
-                      <a16:colId xmlns:a16="http://schemas.microsoft.com/office/drawing/2014/main" val="2130107338"/>
+                      <a16:colId xmlns:a16="http://schemas.microsoft.com/office/drawing/2014/main" xmlns="" val="2130107338"/>
                     </a:ext>
                   </a:extLst>
                 </a:gridCol>
@@ -12176,7 +12482,7 @@
                 </a:tc>
                 <a:extLst>
                   <a:ext uri="{0D108BD9-81ED-4DB2-BD59-A6C34878D82A}">
-                    <a16:rowId xmlns:a16="http://schemas.microsoft.com/office/drawing/2014/main" val="2959051322"/>
+                    <a16:rowId xmlns:a16="http://schemas.microsoft.com/office/drawing/2014/main" xmlns="" val="2959051322"/>
                   </a:ext>
                 </a:extLst>
               </a:tr>
@@ -12363,7 +12669,7 @@
                 </a:tc>
                 <a:extLst>
                   <a:ext uri="{0D108BD9-81ED-4DB2-BD59-A6C34878D82A}">
-                    <a16:rowId xmlns:a16="http://schemas.microsoft.com/office/drawing/2014/main" val="2439195287"/>
+                    <a16:rowId xmlns:a16="http://schemas.microsoft.com/office/drawing/2014/main" xmlns="" val="2439195287"/>
                   </a:ext>
                 </a:extLst>
               </a:tr>
@@ -12550,7 +12856,7 @@
                 </a:tc>
                 <a:extLst>
                   <a:ext uri="{0D108BD9-81ED-4DB2-BD59-A6C34878D82A}">
-                    <a16:rowId xmlns:a16="http://schemas.microsoft.com/office/drawing/2014/main" val="687243282"/>
+                    <a16:rowId xmlns:a16="http://schemas.microsoft.com/office/drawing/2014/main" xmlns="" val="687243282"/>
                   </a:ext>
                 </a:extLst>
               </a:tr>
@@ -12563,7 +12869,7 @@
           <p:cNvPr id="3" name="TextBox 2">
             <a:extLst>
               <a:ext uri="{FF2B5EF4-FFF2-40B4-BE49-F238E27FC236}">
-                <a16:creationId xmlns:a16="http://schemas.microsoft.com/office/drawing/2014/main" id="{B97675A7-45AB-8348-9693-9F83465137E9}"/>
+                <a16:creationId xmlns:a16="http://schemas.microsoft.com/office/drawing/2014/main" xmlns="" id="{B97675A7-45AB-8348-9693-9F83465137E9}"/>
               </a:ext>
             </a:extLst>
           </p:cNvPr>
@@ -12604,7 +12910,7 @@
           <p:cNvPr id="21" name="TextBox 20">
             <a:extLst>
               <a:ext uri="{FF2B5EF4-FFF2-40B4-BE49-F238E27FC236}">
-                <a16:creationId xmlns:a16="http://schemas.microsoft.com/office/drawing/2014/main" id="{D580C035-39CF-AB4F-9E62-1C4A4E108FD1}"/>
+                <a16:creationId xmlns:a16="http://schemas.microsoft.com/office/drawing/2014/main" xmlns="" id="{D580C035-39CF-AB4F-9E62-1C4A4E108FD1}"/>
               </a:ext>
             </a:extLst>
           </p:cNvPr>
@@ -12652,7 +12958,7 @@
           <p:cNvPr id="22" name="TextBox 21">
             <a:extLst>
               <a:ext uri="{FF2B5EF4-FFF2-40B4-BE49-F238E27FC236}">
-                <a16:creationId xmlns:a16="http://schemas.microsoft.com/office/drawing/2014/main" id="{E794799E-FD58-A74F-99AF-05321F0DE58E}"/>
+                <a16:creationId xmlns:a16="http://schemas.microsoft.com/office/drawing/2014/main" xmlns="" id="{E794799E-FD58-A74F-99AF-05321F0DE58E}"/>
               </a:ext>
             </a:extLst>
           </p:cNvPr>
@@ -12700,7 +13006,7 @@
           <p:cNvPr id="23" name="TextBox 22">
             <a:extLst>
               <a:ext uri="{FF2B5EF4-FFF2-40B4-BE49-F238E27FC236}">
-                <a16:creationId xmlns:a16="http://schemas.microsoft.com/office/drawing/2014/main" id="{FB4FB62A-202F-1F47-B73D-0F9DA7B7F30A}"/>
+                <a16:creationId xmlns:a16="http://schemas.microsoft.com/office/drawing/2014/main" xmlns="" id="{FB4FB62A-202F-1F47-B73D-0F9DA7B7F30A}"/>
               </a:ext>
             </a:extLst>
           </p:cNvPr>
@@ -12741,7 +13047,7 @@
           <p:cNvPr id="24" name="TextBox 23">
             <a:extLst>
               <a:ext uri="{FF2B5EF4-FFF2-40B4-BE49-F238E27FC236}">
-                <a16:creationId xmlns:a16="http://schemas.microsoft.com/office/drawing/2014/main" id="{97BDAD9A-8A20-F847-9C5E-3E58B0E2836C}"/>
+                <a16:creationId xmlns:a16="http://schemas.microsoft.com/office/drawing/2014/main" xmlns="" id="{97BDAD9A-8A20-F847-9C5E-3E58B0E2836C}"/>
               </a:ext>
             </a:extLst>
           </p:cNvPr>
@@ -12782,7 +13088,7 @@
           <p:cNvPr id="25" name="Rectangle 24">
             <a:extLst>
               <a:ext uri="{FF2B5EF4-FFF2-40B4-BE49-F238E27FC236}">
-                <a16:creationId xmlns:a16="http://schemas.microsoft.com/office/drawing/2014/main" id="{61CD5799-7FC2-F04C-ADCF-330CB97C8DA9}"/>
+                <a16:creationId xmlns:a16="http://schemas.microsoft.com/office/drawing/2014/main" xmlns="" id="{61CD5799-7FC2-F04C-ADCF-330CB97C8DA9}"/>
               </a:ext>
             </a:extLst>
           </p:cNvPr>
@@ -12841,7 +13147,7 @@
           <p:cNvPr id="26" name="Rectangle 25">
             <a:extLst>
               <a:ext uri="{FF2B5EF4-FFF2-40B4-BE49-F238E27FC236}">
-                <a16:creationId xmlns:a16="http://schemas.microsoft.com/office/drawing/2014/main" id="{6866C721-FE01-1B49-8B68-07C98D112373}"/>
+                <a16:creationId xmlns:a16="http://schemas.microsoft.com/office/drawing/2014/main" xmlns="" id="{6866C721-FE01-1B49-8B68-07C98D112373}"/>
               </a:ext>
             </a:extLst>
           </p:cNvPr>
@@ -12901,7 +13207,7 @@
           <p:cNvPr id="27" name="Rectangle 26">
             <a:extLst>
               <a:ext uri="{FF2B5EF4-FFF2-40B4-BE49-F238E27FC236}">
-                <a16:creationId xmlns:a16="http://schemas.microsoft.com/office/drawing/2014/main" id="{86CD917A-A03A-C14D-B86E-5388F51D8C8B}"/>
+                <a16:creationId xmlns:a16="http://schemas.microsoft.com/office/drawing/2014/main" xmlns="" id="{86CD917A-A03A-C14D-B86E-5388F51D8C8B}"/>
               </a:ext>
             </a:extLst>
           </p:cNvPr>
@@ -12994,7 +13300,7 @@
           <p:cNvPr id="28" name="Rectangle 27">
             <a:extLst>
               <a:ext uri="{FF2B5EF4-FFF2-40B4-BE49-F238E27FC236}">
-                <a16:creationId xmlns:a16="http://schemas.microsoft.com/office/drawing/2014/main" id="{C0AD6DC6-074C-9441-8E98-886E906145A5}"/>
+                <a16:creationId xmlns:a16="http://schemas.microsoft.com/office/drawing/2014/main" xmlns="" id="{C0AD6DC6-074C-9441-8E98-886E906145A5}"/>
               </a:ext>
             </a:extLst>
           </p:cNvPr>
@@ -13086,7 +13392,7 @@
           <p:cNvPr id="2" name="TextBox 1">
             <a:extLst>
               <a:ext uri="{FF2B5EF4-FFF2-40B4-BE49-F238E27FC236}">
-                <a16:creationId xmlns:a16="http://schemas.microsoft.com/office/drawing/2014/main" id="{221DED5B-F56B-0F43-A308-4F2DD034B5B7}"/>
+                <a16:creationId xmlns:a16="http://schemas.microsoft.com/office/drawing/2014/main" xmlns="" id="{221DED5B-F56B-0F43-A308-4F2DD034B5B7}"/>
               </a:ext>
             </a:extLst>
           </p:cNvPr>
@@ -13126,7 +13432,7 @@
           <p:cNvPr id="7" name="TextBox 6">
             <a:extLst>
               <a:ext uri="{FF2B5EF4-FFF2-40B4-BE49-F238E27FC236}">
-                <a16:creationId xmlns:a16="http://schemas.microsoft.com/office/drawing/2014/main" id="{F3573DF9-457D-7948-8B22-DB5337292FA7}"/>
+                <a16:creationId xmlns:a16="http://schemas.microsoft.com/office/drawing/2014/main" xmlns="" id="{F3573DF9-457D-7948-8B22-DB5337292FA7}"/>
               </a:ext>
             </a:extLst>
           </p:cNvPr>
@@ -13175,7 +13481,7 @@
           <p:cNvPr id="8" name="TextBox 7">
             <a:extLst>
               <a:ext uri="{FF2B5EF4-FFF2-40B4-BE49-F238E27FC236}">
-                <a16:creationId xmlns:a16="http://schemas.microsoft.com/office/drawing/2014/main" id="{49DF0299-C639-944C-9F0E-91BE71AC7E52}"/>
+                <a16:creationId xmlns:a16="http://schemas.microsoft.com/office/drawing/2014/main" xmlns="" id="{49DF0299-C639-944C-9F0E-91BE71AC7E52}"/>
               </a:ext>
             </a:extLst>
           </p:cNvPr>
@@ -13207,7 +13513,7 @@
                 <a:hlinkClick r:id="rId2">
                   <a:extLst>
                     <a:ext uri="{A12FA001-AC4F-418D-AE19-62706E023703}">
-                      <ahyp:hlinkClr xmlns:ahyp="http://schemas.microsoft.com/office/drawing/2018/hyperlinkcolor" val="tx"/>
+                      <ahyp:hlinkClr xmlns:ahyp="http://schemas.microsoft.com/office/drawing/2018/hyperlinkcolor" xmlns="" val="tx"/>
                     </a:ext>
                   </a:extLst>
                 </a:hlinkClick>
@@ -13236,7 +13542,7 @@
           <p:cNvPr id="16" name="Rectangle 15">
             <a:extLst>
               <a:ext uri="{FF2B5EF4-FFF2-40B4-BE49-F238E27FC236}">
-                <a16:creationId xmlns:a16="http://schemas.microsoft.com/office/drawing/2014/main" id="{61CD5799-7FC2-F04C-ADCF-330CB97C8DA9}"/>
+                <a16:creationId xmlns:a16="http://schemas.microsoft.com/office/drawing/2014/main" xmlns="" id="{61CD5799-7FC2-F04C-ADCF-330CB97C8DA9}"/>
               </a:ext>
             </a:extLst>
           </p:cNvPr>
@@ -13295,7 +13601,7 @@
           <p:cNvPr id="17" name="Rectangle 16">
             <a:extLst>
               <a:ext uri="{FF2B5EF4-FFF2-40B4-BE49-F238E27FC236}">
-                <a16:creationId xmlns:a16="http://schemas.microsoft.com/office/drawing/2014/main" id="{6866C721-FE01-1B49-8B68-07C98D112373}"/>
+                <a16:creationId xmlns:a16="http://schemas.microsoft.com/office/drawing/2014/main" xmlns="" id="{6866C721-FE01-1B49-8B68-07C98D112373}"/>
               </a:ext>
             </a:extLst>
           </p:cNvPr>
@@ -13355,7 +13661,7 @@
           <p:cNvPr id="6" name="Picture 5">
             <a:extLst>
               <a:ext uri="{FF2B5EF4-FFF2-40B4-BE49-F238E27FC236}">
-                <a16:creationId xmlns:a16="http://schemas.microsoft.com/office/drawing/2014/main" id="{A7F11B26-2BC9-FE46-AC69-A53B0BFFD471}"/>
+                <a16:creationId xmlns:a16="http://schemas.microsoft.com/office/drawing/2014/main" xmlns="" id="{A7F11B26-2BC9-FE46-AC69-A53B0BFFD471}"/>
               </a:ext>
             </a:extLst>
           </p:cNvPr>
@@ -13385,7 +13691,7 @@
           <p:cNvPr id="18" name="Rounded Rectangle 17">
             <a:extLst>
               <a:ext uri="{FF2B5EF4-FFF2-40B4-BE49-F238E27FC236}">
-                <a16:creationId xmlns:a16="http://schemas.microsoft.com/office/drawing/2014/main" id="{5BCBF1FE-BD27-3C4C-892A-36F7CB191B90}"/>
+                <a16:creationId xmlns:a16="http://schemas.microsoft.com/office/drawing/2014/main" xmlns="" id="{5BCBF1FE-BD27-3C4C-892A-36F7CB191B90}"/>
               </a:ext>
             </a:extLst>
           </p:cNvPr>
@@ -13447,7 +13753,7 @@
           <p:cNvPr id="20" name="Rounded Rectangle 19">
             <a:extLst>
               <a:ext uri="{FF2B5EF4-FFF2-40B4-BE49-F238E27FC236}">
-                <a16:creationId xmlns:a16="http://schemas.microsoft.com/office/drawing/2014/main" id="{4BEBFFB0-3422-9540-99C7-6A70E61CA9EE}"/>
+                <a16:creationId xmlns:a16="http://schemas.microsoft.com/office/drawing/2014/main" xmlns="" id="{4BEBFFB0-3422-9540-99C7-6A70E61CA9EE}"/>
               </a:ext>
             </a:extLst>
           </p:cNvPr>
@@ -13509,7 +13815,7 @@
           <p:cNvPr id="13" name="Rounded Rectangle 12">
             <a:extLst>
               <a:ext uri="{FF2B5EF4-FFF2-40B4-BE49-F238E27FC236}">
-                <a16:creationId xmlns:a16="http://schemas.microsoft.com/office/drawing/2014/main" id="{C1740EE0-2F38-8047-9FBF-56AB9B2A1832}"/>
+                <a16:creationId xmlns:a16="http://schemas.microsoft.com/office/drawing/2014/main" xmlns="" id="{C1740EE0-2F38-8047-9FBF-56AB9B2A1832}"/>
               </a:ext>
             </a:extLst>
           </p:cNvPr>
@@ -13571,7 +13877,7 @@
           <p:cNvPr id="14" name="TextBox 13">
             <a:extLst>
               <a:ext uri="{FF2B5EF4-FFF2-40B4-BE49-F238E27FC236}">
-                <a16:creationId xmlns:a16="http://schemas.microsoft.com/office/drawing/2014/main" id="{6E640CD1-2BE3-C449-8AD7-DA347A12D749}"/>
+                <a16:creationId xmlns:a16="http://schemas.microsoft.com/office/drawing/2014/main" xmlns="" id="{6E640CD1-2BE3-C449-8AD7-DA347A12D749}"/>
               </a:ext>
             </a:extLst>
           </p:cNvPr>
@@ -13800,7 +14106,7 @@
           <p:cNvPr id="15" name="TextBox 14">
             <a:extLst>
               <a:ext uri="{FF2B5EF4-FFF2-40B4-BE49-F238E27FC236}">
-                <a16:creationId xmlns:a16="http://schemas.microsoft.com/office/drawing/2014/main" id="{743DA3E8-190B-FB41-BFBF-760AF134FF7E}"/>
+                <a16:creationId xmlns:a16="http://schemas.microsoft.com/office/drawing/2014/main" xmlns="" id="{743DA3E8-190B-FB41-BFBF-760AF134FF7E}"/>
               </a:ext>
             </a:extLst>
           </p:cNvPr>
@@ -13843,7 +14149,7 @@
           <p:cNvPr id="19" name="TextBox 18">
             <a:extLst>
               <a:ext uri="{FF2B5EF4-FFF2-40B4-BE49-F238E27FC236}">
-                <a16:creationId xmlns:a16="http://schemas.microsoft.com/office/drawing/2014/main" id="{8A3A2BB8-1A5C-034A-93DB-EC3ECCD2DADB}"/>
+                <a16:creationId xmlns:a16="http://schemas.microsoft.com/office/drawing/2014/main" xmlns="" id="{8A3A2BB8-1A5C-034A-93DB-EC3ECCD2DADB}"/>
               </a:ext>
             </a:extLst>
           </p:cNvPr>
@@ -13886,7 +14192,7 @@
           <p:cNvPr id="22" name="TextBox 21">
             <a:extLst>
               <a:ext uri="{FF2B5EF4-FFF2-40B4-BE49-F238E27FC236}">
-                <a16:creationId xmlns:a16="http://schemas.microsoft.com/office/drawing/2014/main" id="{6F50CE91-F7E1-2142-97A6-DE0E63EAC3BF}"/>
+                <a16:creationId xmlns:a16="http://schemas.microsoft.com/office/drawing/2014/main" xmlns="" id="{6F50CE91-F7E1-2142-97A6-DE0E63EAC3BF}"/>
               </a:ext>
             </a:extLst>
           </p:cNvPr>
@@ -13929,7 +14235,7 @@
           <p:cNvPr id="23" name="TextBox 22">
             <a:extLst>
               <a:ext uri="{FF2B5EF4-FFF2-40B4-BE49-F238E27FC236}">
-                <a16:creationId xmlns:a16="http://schemas.microsoft.com/office/drawing/2014/main" id="{9E10206D-4B56-1E42-9047-DDC6A8C887AB}"/>
+                <a16:creationId xmlns:a16="http://schemas.microsoft.com/office/drawing/2014/main" xmlns="" id="{9E10206D-4B56-1E42-9047-DDC6A8C887AB}"/>
               </a:ext>
             </a:extLst>
           </p:cNvPr>
@@ -13972,7 +14278,7 @@
           <p:cNvPr id="21" name="Rectangle 20">
             <a:extLst>
               <a:ext uri="{FF2B5EF4-FFF2-40B4-BE49-F238E27FC236}">
-                <a16:creationId xmlns:a16="http://schemas.microsoft.com/office/drawing/2014/main" id="{61CD5799-7FC2-F04C-ADCF-330CB97C8DA9}"/>
+                <a16:creationId xmlns:a16="http://schemas.microsoft.com/office/drawing/2014/main" xmlns="" id="{61CD5799-7FC2-F04C-ADCF-330CB97C8DA9}"/>
               </a:ext>
             </a:extLst>
           </p:cNvPr>
@@ -14031,7 +14337,7 @@
           <p:cNvPr id="24" name="Rectangle 23">
             <a:extLst>
               <a:ext uri="{FF2B5EF4-FFF2-40B4-BE49-F238E27FC236}">
-                <a16:creationId xmlns:a16="http://schemas.microsoft.com/office/drawing/2014/main" id="{6866C721-FE01-1B49-8B68-07C98D112373}"/>
+                <a16:creationId xmlns:a16="http://schemas.microsoft.com/office/drawing/2014/main" xmlns="" id="{6866C721-FE01-1B49-8B68-07C98D112373}"/>
               </a:ext>
             </a:extLst>
           </p:cNvPr>
@@ -14091,7 +14397,7 @@
           <p:cNvPr id="25" name="TextBox 24">
             <a:extLst>
               <a:ext uri="{FF2B5EF4-FFF2-40B4-BE49-F238E27FC236}">
-                <a16:creationId xmlns:a16="http://schemas.microsoft.com/office/drawing/2014/main" id="{6F50CE91-F7E1-2142-97A6-DE0E63EAC3BF}"/>
+                <a16:creationId xmlns:a16="http://schemas.microsoft.com/office/drawing/2014/main" xmlns="" id="{6F50CE91-F7E1-2142-97A6-DE0E63EAC3BF}"/>
               </a:ext>
             </a:extLst>
           </p:cNvPr>
@@ -14134,7 +14440,7 @@
           <p:cNvPr id="26" name="TextBox 25">
             <a:extLst>
               <a:ext uri="{FF2B5EF4-FFF2-40B4-BE49-F238E27FC236}">
-                <a16:creationId xmlns:a16="http://schemas.microsoft.com/office/drawing/2014/main" id="{6F50CE91-F7E1-2142-97A6-DE0E63EAC3BF}"/>
+                <a16:creationId xmlns:a16="http://schemas.microsoft.com/office/drawing/2014/main" xmlns="" id="{6F50CE91-F7E1-2142-97A6-DE0E63EAC3BF}"/>
               </a:ext>
             </a:extLst>
           </p:cNvPr>
@@ -14177,7 +14483,7 @@
           <p:cNvPr id="27" name="Rectangle 26">
             <a:extLst>
               <a:ext uri="{FF2B5EF4-FFF2-40B4-BE49-F238E27FC236}">
-                <a16:creationId xmlns:a16="http://schemas.microsoft.com/office/drawing/2014/main" id="{7E5B074A-002E-D542-B2ED-64BB5A04359A}"/>
+                <a16:creationId xmlns:a16="http://schemas.microsoft.com/office/drawing/2014/main" xmlns="" id="{7E5B074A-002E-D542-B2ED-64BB5A04359A}"/>
               </a:ext>
             </a:extLst>
           </p:cNvPr>
@@ -14270,7 +14576,7 @@
           <p:cNvPr id="28" name="Rectangle 27">
             <a:extLst>
               <a:ext uri="{FF2B5EF4-FFF2-40B4-BE49-F238E27FC236}">
-                <a16:creationId xmlns:a16="http://schemas.microsoft.com/office/drawing/2014/main" id="{5539EB55-625C-3042-B2C8-1751F3084F12}"/>
+                <a16:creationId xmlns:a16="http://schemas.microsoft.com/office/drawing/2014/main" xmlns="" id="{5539EB55-625C-3042-B2C8-1751F3084F12}"/>
               </a:ext>
             </a:extLst>
           </p:cNvPr>
@@ -14362,7 +14668,7 @@
           <p:cNvPr id="2" name="TextBox 1">
             <a:extLst>
               <a:ext uri="{FF2B5EF4-FFF2-40B4-BE49-F238E27FC236}">
-                <a16:creationId xmlns:a16="http://schemas.microsoft.com/office/drawing/2014/main" id="{221DED5B-F56B-0F43-A308-4F2DD034B5B7}"/>
+                <a16:creationId xmlns:a16="http://schemas.microsoft.com/office/drawing/2014/main" xmlns="" id="{221DED5B-F56B-0F43-A308-4F2DD034B5B7}"/>
               </a:ext>
             </a:extLst>
           </p:cNvPr>
@@ -14402,7 +14708,7 @@
           <p:cNvPr id="7" name="TextBox 6">
             <a:extLst>
               <a:ext uri="{FF2B5EF4-FFF2-40B4-BE49-F238E27FC236}">
-                <a16:creationId xmlns:a16="http://schemas.microsoft.com/office/drawing/2014/main" id="{F3573DF9-457D-7948-8B22-DB5337292FA7}"/>
+                <a16:creationId xmlns:a16="http://schemas.microsoft.com/office/drawing/2014/main" xmlns="" id="{F3573DF9-457D-7948-8B22-DB5337292FA7}"/>
               </a:ext>
             </a:extLst>
           </p:cNvPr>
@@ -14451,7 +14757,7 @@
           <p:cNvPr id="8" name="TextBox 7">
             <a:extLst>
               <a:ext uri="{FF2B5EF4-FFF2-40B4-BE49-F238E27FC236}">
-                <a16:creationId xmlns:a16="http://schemas.microsoft.com/office/drawing/2014/main" id="{49DF0299-C639-944C-9F0E-91BE71AC7E52}"/>
+                <a16:creationId xmlns:a16="http://schemas.microsoft.com/office/drawing/2014/main" xmlns="" id="{49DF0299-C639-944C-9F0E-91BE71AC7E52}"/>
               </a:ext>
             </a:extLst>
           </p:cNvPr>
@@ -14491,7 +14797,7 @@
           <p:cNvPr id="16" name="Rectangle 15">
             <a:extLst>
               <a:ext uri="{FF2B5EF4-FFF2-40B4-BE49-F238E27FC236}">
-                <a16:creationId xmlns:a16="http://schemas.microsoft.com/office/drawing/2014/main" id="{61CD5799-7FC2-F04C-ADCF-330CB97C8DA9}"/>
+                <a16:creationId xmlns:a16="http://schemas.microsoft.com/office/drawing/2014/main" xmlns="" id="{61CD5799-7FC2-F04C-ADCF-330CB97C8DA9}"/>
               </a:ext>
             </a:extLst>
           </p:cNvPr>
@@ -14550,7 +14856,7 @@
           <p:cNvPr id="17" name="Rectangle 16">
             <a:extLst>
               <a:ext uri="{FF2B5EF4-FFF2-40B4-BE49-F238E27FC236}">
-                <a16:creationId xmlns:a16="http://schemas.microsoft.com/office/drawing/2014/main" id="{6866C721-FE01-1B49-8B68-07C98D112373}"/>
+                <a16:creationId xmlns:a16="http://schemas.microsoft.com/office/drawing/2014/main" xmlns="" id="{6866C721-FE01-1B49-8B68-07C98D112373}"/>
               </a:ext>
             </a:extLst>
           </p:cNvPr>
@@ -14610,7 +14916,7 @@
           <p:cNvPr id="6" name="Picture 5">
             <a:extLst>
               <a:ext uri="{FF2B5EF4-FFF2-40B4-BE49-F238E27FC236}">
-                <a16:creationId xmlns:a16="http://schemas.microsoft.com/office/drawing/2014/main" id="{A7F11B26-2BC9-FE46-AC69-A53B0BFFD471}"/>
+                <a16:creationId xmlns:a16="http://schemas.microsoft.com/office/drawing/2014/main" xmlns="" id="{A7F11B26-2BC9-FE46-AC69-A53B0BFFD471}"/>
               </a:ext>
             </a:extLst>
           </p:cNvPr>
@@ -14640,7 +14946,7 @@
           <p:cNvPr id="9" name="TextBox 8">
             <a:extLst>
               <a:ext uri="{FF2B5EF4-FFF2-40B4-BE49-F238E27FC236}">
-                <a16:creationId xmlns:a16="http://schemas.microsoft.com/office/drawing/2014/main" id="{9DDBC895-FCFB-3A47-9E03-ECA92F586E8E}"/>
+                <a16:creationId xmlns:a16="http://schemas.microsoft.com/office/drawing/2014/main" xmlns="" id="{9DDBC895-FCFB-3A47-9E03-ECA92F586E8E}"/>
               </a:ext>
             </a:extLst>
           </p:cNvPr>
@@ -14773,7 +15079,7 @@
           <p:cNvPr id="18" name="Rounded Rectangle 17">
             <a:extLst>
               <a:ext uri="{FF2B5EF4-FFF2-40B4-BE49-F238E27FC236}">
-                <a16:creationId xmlns:a16="http://schemas.microsoft.com/office/drawing/2014/main" id="{5BCBF1FE-BD27-3C4C-892A-36F7CB191B90}"/>
+                <a16:creationId xmlns:a16="http://schemas.microsoft.com/office/drawing/2014/main" xmlns="" id="{5BCBF1FE-BD27-3C4C-892A-36F7CB191B90}"/>
               </a:ext>
             </a:extLst>
           </p:cNvPr>
@@ -14835,7 +15141,7 @@
           <p:cNvPr id="20" name="Rounded Rectangle 19">
             <a:extLst>
               <a:ext uri="{FF2B5EF4-FFF2-40B4-BE49-F238E27FC236}">
-                <a16:creationId xmlns:a16="http://schemas.microsoft.com/office/drawing/2014/main" id="{4BEBFFB0-3422-9540-99C7-6A70E61CA9EE}"/>
+                <a16:creationId xmlns:a16="http://schemas.microsoft.com/office/drawing/2014/main" xmlns="" id="{4BEBFFB0-3422-9540-99C7-6A70E61CA9EE}"/>
               </a:ext>
             </a:extLst>
           </p:cNvPr>
@@ -14897,7 +15203,7 @@
           <p:cNvPr id="4" name="TextBox 3">
             <a:extLst>
               <a:ext uri="{FF2B5EF4-FFF2-40B4-BE49-F238E27FC236}">
-                <a16:creationId xmlns:a16="http://schemas.microsoft.com/office/drawing/2014/main" id="{F34410C0-B037-D144-80FC-AB321307446E}"/>
+                <a16:creationId xmlns:a16="http://schemas.microsoft.com/office/drawing/2014/main" xmlns="" id="{F34410C0-B037-D144-80FC-AB321307446E}"/>
               </a:ext>
             </a:extLst>
           </p:cNvPr>
@@ -14947,7 +15253,7 @@
           <p:cNvPr id="19" name="TextBox 18">
             <a:extLst>
               <a:ext uri="{FF2B5EF4-FFF2-40B4-BE49-F238E27FC236}">
-                <a16:creationId xmlns:a16="http://schemas.microsoft.com/office/drawing/2014/main" id="{B8792BF7-FDB0-C84B-AC3C-F44B726A4044}"/>
+                <a16:creationId xmlns:a16="http://schemas.microsoft.com/office/drawing/2014/main" xmlns="" id="{B8792BF7-FDB0-C84B-AC3C-F44B726A4044}"/>
               </a:ext>
             </a:extLst>
           </p:cNvPr>
@@ -14993,7 +15299,7 @@
           <p:cNvPr id="13" name="Rectangle 12">
             <a:extLst>
               <a:ext uri="{FF2B5EF4-FFF2-40B4-BE49-F238E27FC236}">
-                <a16:creationId xmlns:a16="http://schemas.microsoft.com/office/drawing/2014/main" id="{61CD5799-7FC2-F04C-ADCF-330CB97C8DA9}"/>
+                <a16:creationId xmlns:a16="http://schemas.microsoft.com/office/drawing/2014/main" xmlns="" id="{61CD5799-7FC2-F04C-ADCF-330CB97C8DA9}"/>
               </a:ext>
             </a:extLst>
           </p:cNvPr>
@@ -15052,7 +15358,7 @@
           <p:cNvPr id="14" name="Rectangle 13">
             <a:extLst>
               <a:ext uri="{FF2B5EF4-FFF2-40B4-BE49-F238E27FC236}">
-                <a16:creationId xmlns:a16="http://schemas.microsoft.com/office/drawing/2014/main" id="{6866C721-FE01-1B49-8B68-07C98D112373}"/>
+                <a16:creationId xmlns:a16="http://schemas.microsoft.com/office/drawing/2014/main" xmlns="" id="{6866C721-FE01-1B49-8B68-07C98D112373}"/>
               </a:ext>
             </a:extLst>
           </p:cNvPr>
@@ -15112,7 +15418,7 @@
           <p:cNvPr id="15" name="Rectangle 14">
             <a:extLst>
               <a:ext uri="{FF2B5EF4-FFF2-40B4-BE49-F238E27FC236}">
-                <a16:creationId xmlns:a16="http://schemas.microsoft.com/office/drawing/2014/main" id="{9D875C58-0A47-CC4F-B6ED-FF54C7E7F47B}"/>
+                <a16:creationId xmlns:a16="http://schemas.microsoft.com/office/drawing/2014/main" xmlns="" id="{9D875C58-0A47-CC4F-B6ED-FF54C7E7F47B}"/>
               </a:ext>
             </a:extLst>
           </p:cNvPr>
@@ -15205,7 +15511,7 @@
           <p:cNvPr id="21" name="Rectangle 20">
             <a:extLst>
               <a:ext uri="{FF2B5EF4-FFF2-40B4-BE49-F238E27FC236}">
-                <a16:creationId xmlns:a16="http://schemas.microsoft.com/office/drawing/2014/main" id="{02420FCF-7FD1-2F46-9C76-8BD353317E83}"/>
+                <a16:creationId xmlns:a16="http://schemas.microsoft.com/office/drawing/2014/main" xmlns="" id="{02420FCF-7FD1-2F46-9C76-8BD353317E83}"/>
               </a:ext>
             </a:extLst>
           </p:cNvPr>
@@ -15297,7 +15603,7 @@
           <p:cNvPr id="2" name="TextBox 1">
             <a:extLst>
               <a:ext uri="{FF2B5EF4-FFF2-40B4-BE49-F238E27FC236}">
-                <a16:creationId xmlns:a16="http://schemas.microsoft.com/office/drawing/2014/main" id="{221DED5B-F56B-0F43-A308-4F2DD034B5B7}"/>
+                <a16:creationId xmlns:a16="http://schemas.microsoft.com/office/drawing/2014/main" xmlns="" id="{221DED5B-F56B-0F43-A308-4F2DD034B5B7}"/>
               </a:ext>
             </a:extLst>
           </p:cNvPr>
@@ -15337,7 +15643,7 @@
           <p:cNvPr id="7" name="TextBox 6">
             <a:extLst>
               <a:ext uri="{FF2B5EF4-FFF2-40B4-BE49-F238E27FC236}">
-                <a16:creationId xmlns:a16="http://schemas.microsoft.com/office/drawing/2014/main" id="{F3573DF9-457D-7948-8B22-DB5337292FA7}"/>
+                <a16:creationId xmlns:a16="http://schemas.microsoft.com/office/drawing/2014/main" xmlns="" id="{F3573DF9-457D-7948-8B22-DB5337292FA7}"/>
               </a:ext>
             </a:extLst>
           </p:cNvPr>
@@ -15386,7 +15692,7 @@
           <p:cNvPr id="8" name="TextBox 7">
             <a:extLst>
               <a:ext uri="{FF2B5EF4-FFF2-40B4-BE49-F238E27FC236}">
-                <a16:creationId xmlns:a16="http://schemas.microsoft.com/office/drawing/2014/main" id="{49DF0299-C639-944C-9F0E-91BE71AC7E52}"/>
+                <a16:creationId xmlns:a16="http://schemas.microsoft.com/office/drawing/2014/main" xmlns="" id="{49DF0299-C639-944C-9F0E-91BE71AC7E52}"/>
               </a:ext>
             </a:extLst>
           </p:cNvPr>
@@ -15426,7 +15732,7 @@
           <p:cNvPr id="16" name="Rectangle 15">
             <a:extLst>
               <a:ext uri="{FF2B5EF4-FFF2-40B4-BE49-F238E27FC236}">
-                <a16:creationId xmlns:a16="http://schemas.microsoft.com/office/drawing/2014/main" id="{61CD5799-7FC2-F04C-ADCF-330CB97C8DA9}"/>
+                <a16:creationId xmlns:a16="http://schemas.microsoft.com/office/drawing/2014/main" xmlns="" id="{61CD5799-7FC2-F04C-ADCF-330CB97C8DA9}"/>
               </a:ext>
             </a:extLst>
           </p:cNvPr>
@@ -15485,7 +15791,7 @@
           <p:cNvPr id="17" name="Rectangle 16">
             <a:extLst>
               <a:ext uri="{FF2B5EF4-FFF2-40B4-BE49-F238E27FC236}">
-                <a16:creationId xmlns:a16="http://schemas.microsoft.com/office/drawing/2014/main" id="{6866C721-FE01-1B49-8B68-07C98D112373}"/>
+                <a16:creationId xmlns:a16="http://schemas.microsoft.com/office/drawing/2014/main" xmlns="" id="{6866C721-FE01-1B49-8B68-07C98D112373}"/>
               </a:ext>
             </a:extLst>
           </p:cNvPr>
@@ -15545,7 +15851,7 @@
           <p:cNvPr id="6" name="Picture 5">
             <a:extLst>
               <a:ext uri="{FF2B5EF4-FFF2-40B4-BE49-F238E27FC236}">
-                <a16:creationId xmlns:a16="http://schemas.microsoft.com/office/drawing/2014/main" id="{A7F11B26-2BC9-FE46-AC69-A53B0BFFD471}"/>
+                <a16:creationId xmlns:a16="http://schemas.microsoft.com/office/drawing/2014/main" xmlns="" id="{A7F11B26-2BC9-FE46-AC69-A53B0BFFD471}"/>
               </a:ext>
             </a:extLst>
           </p:cNvPr>
@@ -15575,7 +15881,7 @@
           <p:cNvPr id="9" name="TextBox 8">
             <a:extLst>
               <a:ext uri="{FF2B5EF4-FFF2-40B4-BE49-F238E27FC236}">
-                <a16:creationId xmlns:a16="http://schemas.microsoft.com/office/drawing/2014/main" id="{9DDBC895-FCFB-3A47-9E03-ECA92F586E8E}"/>
+                <a16:creationId xmlns:a16="http://schemas.microsoft.com/office/drawing/2014/main" xmlns="" id="{9DDBC895-FCFB-3A47-9E03-ECA92F586E8E}"/>
               </a:ext>
             </a:extLst>
           </p:cNvPr>
@@ -15704,7 +16010,7 @@
           <p:cNvPr id="18" name="Rounded Rectangle 17">
             <a:extLst>
               <a:ext uri="{FF2B5EF4-FFF2-40B4-BE49-F238E27FC236}">
-                <a16:creationId xmlns:a16="http://schemas.microsoft.com/office/drawing/2014/main" id="{5BCBF1FE-BD27-3C4C-892A-36F7CB191B90}"/>
+                <a16:creationId xmlns:a16="http://schemas.microsoft.com/office/drawing/2014/main" xmlns="" id="{5BCBF1FE-BD27-3C4C-892A-36F7CB191B90}"/>
               </a:ext>
             </a:extLst>
           </p:cNvPr>
@@ -15766,7 +16072,7 @@
           <p:cNvPr id="20" name="Rounded Rectangle 19">
             <a:extLst>
               <a:ext uri="{FF2B5EF4-FFF2-40B4-BE49-F238E27FC236}">
-                <a16:creationId xmlns:a16="http://schemas.microsoft.com/office/drawing/2014/main" id="{4BEBFFB0-3422-9540-99C7-6A70E61CA9EE}"/>
+                <a16:creationId xmlns:a16="http://schemas.microsoft.com/office/drawing/2014/main" xmlns="" id="{4BEBFFB0-3422-9540-99C7-6A70E61CA9EE}"/>
               </a:ext>
             </a:extLst>
           </p:cNvPr>
@@ -15828,7 +16134,7 @@
           <p:cNvPr id="4" name="TextBox 3">
             <a:extLst>
               <a:ext uri="{FF2B5EF4-FFF2-40B4-BE49-F238E27FC236}">
-                <a16:creationId xmlns:a16="http://schemas.microsoft.com/office/drawing/2014/main" id="{F34410C0-B037-D144-80FC-AB321307446E}"/>
+                <a16:creationId xmlns:a16="http://schemas.microsoft.com/office/drawing/2014/main" xmlns="" id="{F34410C0-B037-D144-80FC-AB321307446E}"/>
               </a:ext>
             </a:extLst>
           </p:cNvPr>
@@ -15876,7 +16182,7 @@
           <p:cNvPr id="19" name="TextBox 18">
             <a:extLst>
               <a:ext uri="{FF2B5EF4-FFF2-40B4-BE49-F238E27FC236}">
-                <a16:creationId xmlns:a16="http://schemas.microsoft.com/office/drawing/2014/main" id="{B8792BF7-FDB0-C84B-AC3C-F44B726A4044}"/>
+                <a16:creationId xmlns:a16="http://schemas.microsoft.com/office/drawing/2014/main" xmlns="" id="{B8792BF7-FDB0-C84B-AC3C-F44B726A4044}"/>
               </a:ext>
             </a:extLst>
           </p:cNvPr>
@@ -15926,7 +16232,7 @@
           <p:cNvPr id="13" name="Rectangle 12">
             <a:extLst>
               <a:ext uri="{FF2B5EF4-FFF2-40B4-BE49-F238E27FC236}">
-                <a16:creationId xmlns:a16="http://schemas.microsoft.com/office/drawing/2014/main" id="{61CD5799-7FC2-F04C-ADCF-330CB97C8DA9}"/>
+                <a16:creationId xmlns:a16="http://schemas.microsoft.com/office/drawing/2014/main" xmlns="" id="{61CD5799-7FC2-F04C-ADCF-330CB97C8DA9}"/>
               </a:ext>
             </a:extLst>
           </p:cNvPr>
@@ -15985,7 +16291,7 @@
           <p:cNvPr id="14" name="Rectangle 13">
             <a:extLst>
               <a:ext uri="{FF2B5EF4-FFF2-40B4-BE49-F238E27FC236}">
-                <a16:creationId xmlns:a16="http://schemas.microsoft.com/office/drawing/2014/main" id="{6866C721-FE01-1B49-8B68-07C98D112373}"/>
+                <a16:creationId xmlns:a16="http://schemas.microsoft.com/office/drawing/2014/main" xmlns="" id="{6866C721-FE01-1B49-8B68-07C98D112373}"/>
               </a:ext>
             </a:extLst>
           </p:cNvPr>
@@ -16045,7 +16351,7 @@
           <p:cNvPr id="15" name="Rectangle 14">
             <a:extLst>
               <a:ext uri="{FF2B5EF4-FFF2-40B4-BE49-F238E27FC236}">
-                <a16:creationId xmlns:a16="http://schemas.microsoft.com/office/drawing/2014/main" id="{E20295CC-58DF-0E47-95FC-6D5FF095C60D}"/>
+                <a16:creationId xmlns:a16="http://schemas.microsoft.com/office/drawing/2014/main" xmlns="" id="{E20295CC-58DF-0E47-95FC-6D5FF095C60D}"/>
               </a:ext>
             </a:extLst>
           </p:cNvPr>
@@ -16138,7 +16444,7 @@
           <p:cNvPr id="21" name="Rectangle 20">
             <a:extLst>
               <a:ext uri="{FF2B5EF4-FFF2-40B4-BE49-F238E27FC236}">
-                <a16:creationId xmlns:a16="http://schemas.microsoft.com/office/drawing/2014/main" id="{F22F8A5C-1EAD-7D4A-B24C-C2AA76DAF341}"/>
+                <a16:creationId xmlns:a16="http://schemas.microsoft.com/office/drawing/2014/main" xmlns="" id="{F22F8A5C-1EAD-7D4A-B24C-C2AA76DAF341}"/>
               </a:ext>
             </a:extLst>
           </p:cNvPr>
@@ -16230,7 +16536,7 @@
           <p:cNvPr id="2" name="TextBox 1">
             <a:extLst>
               <a:ext uri="{FF2B5EF4-FFF2-40B4-BE49-F238E27FC236}">
-                <a16:creationId xmlns:a16="http://schemas.microsoft.com/office/drawing/2014/main" id="{F3573DF9-457D-7948-8B22-DB5337292FA7}"/>
+                <a16:creationId xmlns:a16="http://schemas.microsoft.com/office/drawing/2014/main" xmlns="" id="{F3573DF9-457D-7948-8B22-DB5337292FA7}"/>
               </a:ext>
             </a:extLst>
           </p:cNvPr>
@@ -16297,7 +16603,7 @@
           <p:cNvPr id="3" name="TextBox 2">
             <a:extLst>
               <a:ext uri="{FF2B5EF4-FFF2-40B4-BE49-F238E27FC236}">
-                <a16:creationId xmlns:a16="http://schemas.microsoft.com/office/drawing/2014/main" id="{49DF0299-C639-944C-9F0E-91BE71AC7E52}"/>
+                <a16:creationId xmlns:a16="http://schemas.microsoft.com/office/drawing/2014/main" xmlns="" id="{49DF0299-C639-944C-9F0E-91BE71AC7E52}"/>
               </a:ext>
             </a:extLst>
           </p:cNvPr>
@@ -16352,7 +16658,7 @@
           <p:cNvPr id="4" name="Rectangle 3">
             <a:extLst>
               <a:ext uri="{FF2B5EF4-FFF2-40B4-BE49-F238E27FC236}">
-                <a16:creationId xmlns:a16="http://schemas.microsoft.com/office/drawing/2014/main" id="{61CD5799-7FC2-F04C-ADCF-330CB97C8DA9}"/>
+                <a16:creationId xmlns:a16="http://schemas.microsoft.com/office/drawing/2014/main" xmlns="" id="{61CD5799-7FC2-F04C-ADCF-330CB97C8DA9}"/>
               </a:ext>
             </a:extLst>
           </p:cNvPr>
@@ -16411,7 +16717,7 @@
           <p:cNvPr id="13" name="Rounded Rectangle 12">
             <a:extLst>
               <a:ext uri="{FF2B5EF4-FFF2-40B4-BE49-F238E27FC236}">
-                <a16:creationId xmlns:a16="http://schemas.microsoft.com/office/drawing/2014/main" id="{1376ECFE-A6F2-6C42-A904-0E15AFF7920D}"/>
+                <a16:creationId xmlns:a16="http://schemas.microsoft.com/office/drawing/2014/main" xmlns="" id="{1376ECFE-A6F2-6C42-A904-0E15AFF7920D}"/>
               </a:ext>
             </a:extLst>
           </p:cNvPr>
@@ -16473,7 +16779,7 @@
           <p:cNvPr id="6" name="TextBox 5">
             <a:extLst>
               <a:ext uri="{FF2B5EF4-FFF2-40B4-BE49-F238E27FC236}">
-                <a16:creationId xmlns:a16="http://schemas.microsoft.com/office/drawing/2014/main" id="{485A72C5-8E2C-EB4F-8CE5-9B79A113D65B}"/>
+                <a16:creationId xmlns:a16="http://schemas.microsoft.com/office/drawing/2014/main" xmlns="" id="{485A72C5-8E2C-EB4F-8CE5-9B79A113D65B}"/>
               </a:ext>
             </a:extLst>
           </p:cNvPr>
@@ -16514,7 +16820,7 @@
           <p:cNvPr id="16" name="TextBox 15">
             <a:extLst>
               <a:ext uri="{FF2B5EF4-FFF2-40B4-BE49-F238E27FC236}">
-                <a16:creationId xmlns:a16="http://schemas.microsoft.com/office/drawing/2014/main" id="{466B05F8-0E11-B947-95C8-E2F317016D98}"/>
+                <a16:creationId xmlns:a16="http://schemas.microsoft.com/office/drawing/2014/main" xmlns="" id="{466B05F8-0E11-B947-95C8-E2F317016D98}"/>
               </a:ext>
             </a:extLst>
           </p:cNvPr>
@@ -16555,7 +16861,7 @@
           <p:cNvPr id="11" name="TextBox 10">
             <a:extLst>
               <a:ext uri="{FF2B5EF4-FFF2-40B4-BE49-F238E27FC236}">
-                <a16:creationId xmlns:a16="http://schemas.microsoft.com/office/drawing/2014/main" id="{56B0BE7E-3CC4-B842-A582-2649FDE8D68C}"/>
+                <a16:creationId xmlns:a16="http://schemas.microsoft.com/office/drawing/2014/main" xmlns="" id="{56B0BE7E-3CC4-B842-A582-2649FDE8D68C}"/>
               </a:ext>
             </a:extLst>
           </p:cNvPr>
@@ -16598,7 +16904,7 @@
           <p:cNvPr id="17" name="TextBox 16">
             <a:extLst>
               <a:ext uri="{FF2B5EF4-FFF2-40B4-BE49-F238E27FC236}">
-                <a16:creationId xmlns:a16="http://schemas.microsoft.com/office/drawing/2014/main" id="{587296F0-7B2D-2446-B98A-568455FB8764}"/>
+                <a16:creationId xmlns:a16="http://schemas.microsoft.com/office/drawing/2014/main" xmlns="" id="{587296F0-7B2D-2446-B98A-568455FB8764}"/>
               </a:ext>
             </a:extLst>
           </p:cNvPr>
@@ -16641,7 +16947,7 @@
           <p:cNvPr id="18" name="Rectangle 17">
             <a:extLst>
               <a:ext uri="{FF2B5EF4-FFF2-40B4-BE49-F238E27FC236}">
-                <a16:creationId xmlns:a16="http://schemas.microsoft.com/office/drawing/2014/main" id="{75B94B02-8E0E-974D-BF19-2D7ADE836944}"/>
+                <a16:creationId xmlns:a16="http://schemas.microsoft.com/office/drawing/2014/main" xmlns="" id="{75B94B02-8E0E-974D-BF19-2D7ADE836944}"/>
               </a:ext>
             </a:extLst>
           </p:cNvPr>
@@ -16693,7 +16999,7 @@
           <p:cNvPr id="19" name="TextBox 18">
             <a:extLst>
               <a:ext uri="{FF2B5EF4-FFF2-40B4-BE49-F238E27FC236}">
-                <a16:creationId xmlns:a16="http://schemas.microsoft.com/office/drawing/2014/main" id="{55164157-1194-264D-8D78-71D5CAA11990}"/>
+                <a16:creationId xmlns:a16="http://schemas.microsoft.com/office/drawing/2014/main" xmlns="" id="{55164157-1194-264D-8D78-71D5CAA11990}"/>
               </a:ext>
             </a:extLst>
           </p:cNvPr>
@@ -16756,6 +17062,169 @@
               </a:rPr>
               <a:t>Forgot Password</a:t>
             </a:r>
+          </a:p>
+        </p:txBody>
+      </p:sp>
+      <p:sp>
+        <p:nvSpPr>
+          <p:cNvPr id="12" name="Rectangle 11">
+            <a:extLst>
+              <a:ext uri="{FF2B5EF4-FFF2-40B4-BE49-F238E27FC236}">
+                <a16:creationId xmlns:a16="http://schemas.microsoft.com/office/drawing/2014/main" xmlns="" id="{8003D022-BA0D-A042-92B7-9C2E431128DB}"/>
+              </a:ext>
+            </a:extLst>
+          </p:cNvPr>
+          <p:cNvSpPr/>
+          <p:nvPr/>
+        </p:nvSpPr>
+        <p:spPr>
+          <a:xfrm>
+            <a:off x="1188497" y="869150"/>
+            <a:ext cx="9832769" cy="344384"/>
+          </a:xfrm>
+          <a:prstGeom prst="rect">
+            <a:avLst/>
+          </a:prstGeom>
+          <a:solidFill>
+            <a:schemeClr val="tx1"/>
+          </a:solidFill>
+          <a:ln>
+            <a:noFill/>
+          </a:ln>
+        </p:spPr>
+        <p:style>
+          <a:lnRef idx="2">
+            <a:schemeClr val="accent1">
+              <a:shade val="50000"/>
+            </a:schemeClr>
+          </a:lnRef>
+          <a:fillRef idx="1">
+            <a:schemeClr val="accent1"/>
+          </a:fillRef>
+          <a:effectRef idx="0">
+            <a:schemeClr val="accent1"/>
+          </a:effectRef>
+          <a:fontRef idx="minor">
+            <a:schemeClr val="lt1"/>
+          </a:fontRef>
+        </p:style>
+        <p:txBody>
+          <a:bodyPr rtlCol="0" anchor="ctr"/>
+          <a:lstStyle/>
+          <a:p>
+            <a:r>
+              <a:rPr lang="en-US" sz="1400" dirty="0">
+                <a:solidFill>
+                  <a:schemeClr val="accent1">
+                    <a:lumMod val="50000"/>
+                  </a:schemeClr>
+                </a:solidFill>
+                <a:latin typeface="Comic Sans MS" panose="030F0902030302020204" pitchFamily="66" charset="0"/>
+              </a:rPr>
+              <a:t> </a:t>
+            </a:r>
+            <a:r>
+              <a:rPr lang="en-US" sz="2400" b="1" dirty="0" err="1">
+                <a:solidFill>
+                  <a:schemeClr val="accent1">
+                    <a:lumMod val="50000"/>
+                  </a:schemeClr>
+                </a:solidFill>
+                <a:latin typeface="Comic Sans MS" panose="030F0902030302020204" pitchFamily="66" charset="0"/>
+              </a:rPr>
+              <a:t>SellBack</a:t>
+            </a:r>
+            <a:r>
+              <a:rPr lang="en-US" sz="2400" b="1" dirty="0" err="1">
+                <a:solidFill>
+                  <a:schemeClr val="accent1">
+                    <a:lumMod val="60000"/>
+                    <a:lumOff val="40000"/>
+                  </a:schemeClr>
+                </a:solidFill>
+                <a:latin typeface="Comic Sans MS" panose="030F0902030302020204" pitchFamily="66" charset="0"/>
+              </a:rPr>
+              <a:t>Mart</a:t>
+            </a:r>
+            <a:endParaRPr lang="en-US" sz="1400" b="1" dirty="0">
+              <a:solidFill>
+                <a:schemeClr val="accent1">
+                  <a:lumMod val="60000"/>
+                  <a:lumOff val="40000"/>
+                </a:schemeClr>
+              </a:solidFill>
+              <a:latin typeface="Comic Sans MS" panose="030F0902030302020204" pitchFamily="66" charset="0"/>
+            </a:endParaRPr>
+          </a:p>
+        </p:txBody>
+      </p:sp>
+      <p:sp>
+        <p:nvSpPr>
+          <p:cNvPr id="14" name="Rectangle 13">
+            <a:extLst>
+              <a:ext uri="{FF2B5EF4-FFF2-40B4-BE49-F238E27FC236}">
+                <a16:creationId xmlns:a16="http://schemas.microsoft.com/office/drawing/2014/main" xmlns="" id="{6889F56C-0800-9F4E-BE33-281A675CE1DD}"/>
+              </a:ext>
+            </a:extLst>
+          </p:cNvPr>
+          <p:cNvSpPr/>
+          <p:nvPr/>
+        </p:nvSpPr>
+        <p:spPr>
+          <a:xfrm>
+            <a:off x="5481053" y="858402"/>
+            <a:ext cx="5527373" cy="344384"/>
+          </a:xfrm>
+          <a:prstGeom prst="rect">
+            <a:avLst/>
+          </a:prstGeom>
+          <a:solidFill>
+            <a:schemeClr val="tx1"/>
+          </a:solidFill>
+          <a:ln>
+            <a:noFill/>
+          </a:ln>
+        </p:spPr>
+        <p:style>
+          <a:lnRef idx="2">
+            <a:schemeClr val="accent1">
+              <a:shade val="50000"/>
+            </a:schemeClr>
+          </a:lnRef>
+          <a:fillRef idx="1">
+            <a:schemeClr val="accent1"/>
+          </a:fillRef>
+          <a:effectRef idx="0">
+            <a:schemeClr val="accent1"/>
+          </a:effectRef>
+          <a:fontRef idx="minor">
+            <a:schemeClr val="lt1"/>
+          </a:fontRef>
+        </p:style>
+        <p:txBody>
+          <a:bodyPr rtlCol="0" anchor="ctr"/>
+          <a:lstStyle/>
+          <a:p>
+            <a:pPr algn="r"/>
+            <a:r>
+              <a:rPr lang="en-US" sz="1400" dirty="0" smtClean="0">
+                <a:solidFill>
+                  <a:schemeClr val="bg2">
+                    <a:lumMod val="50000"/>
+                  </a:schemeClr>
+                </a:solidFill>
+                <a:latin typeface="Comic Sans MS" panose="030F0902030302020204" pitchFamily="66" charset="0"/>
+              </a:rPr>
+              <a:t>Home     </a:t>
+            </a:r>
+            <a:endParaRPr lang="en-US" sz="1400" dirty="0">
+              <a:solidFill>
+                <a:schemeClr val="bg2">
+                  <a:lumMod val="50000"/>
+                </a:schemeClr>
+              </a:solidFill>
+              <a:latin typeface="Comic Sans MS" panose="030F0902030302020204" pitchFamily="66" charset="0"/>
+            </a:endParaRPr>
           </a:p>
         </p:txBody>
       </p:sp>
@@ -16794,7 +17263,7 @@
           <p:cNvPr id="2" name="TextBox 1">
             <a:extLst>
               <a:ext uri="{FF2B5EF4-FFF2-40B4-BE49-F238E27FC236}">
-                <a16:creationId xmlns:a16="http://schemas.microsoft.com/office/drawing/2014/main" id="{F3573DF9-457D-7948-8B22-DB5337292FA7}"/>
+                <a16:creationId xmlns:a16="http://schemas.microsoft.com/office/drawing/2014/main" xmlns="" id="{F3573DF9-457D-7948-8B22-DB5337292FA7}"/>
               </a:ext>
             </a:extLst>
           </p:cNvPr>
@@ -16861,7 +17330,7 @@
           <p:cNvPr id="3" name="TextBox 2">
             <a:extLst>
               <a:ext uri="{FF2B5EF4-FFF2-40B4-BE49-F238E27FC236}">
-                <a16:creationId xmlns:a16="http://schemas.microsoft.com/office/drawing/2014/main" id="{49DF0299-C639-944C-9F0E-91BE71AC7E52}"/>
+                <a16:creationId xmlns:a16="http://schemas.microsoft.com/office/drawing/2014/main" xmlns="" id="{49DF0299-C639-944C-9F0E-91BE71AC7E52}"/>
               </a:ext>
             </a:extLst>
           </p:cNvPr>
@@ -16934,7 +17403,7 @@
           <p:cNvPr id="4" name="Rectangle 3">
             <a:extLst>
               <a:ext uri="{FF2B5EF4-FFF2-40B4-BE49-F238E27FC236}">
-                <a16:creationId xmlns:a16="http://schemas.microsoft.com/office/drawing/2014/main" id="{61CD5799-7FC2-F04C-ADCF-330CB97C8DA9}"/>
+                <a16:creationId xmlns:a16="http://schemas.microsoft.com/office/drawing/2014/main" xmlns="" id="{61CD5799-7FC2-F04C-ADCF-330CB97C8DA9}"/>
               </a:ext>
             </a:extLst>
           </p:cNvPr>
@@ -16993,7 +17462,7 @@
           <p:cNvPr id="13" name="Rounded Rectangle 12">
             <a:extLst>
               <a:ext uri="{FF2B5EF4-FFF2-40B4-BE49-F238E27FC236}">
-                <a16:creationId xmlns:a16="http://schemas.microsoft.com/office/drawing/2014/main" id="{1376ECFE-A6F2-6C42-A904-0E15AFF7920D}"/>
+                <a16:creationId xmlns:a16="http://schemas.microsoft.com/office/drawing/2014/main" xmlns="" id="{1376ECFE-A6F2-6C42-A904-0E15AFF7920D}"/>
               </a:ext>
             </a:extLst>
           </p:cNvPr>
@@ -17055,7 +17524,7 @@
           <p:cNvPr id="6" name="TextBox 5">
             <a:extLst>
               <a:ext uri="{FF2B5EF4-FFF2-40B4-BE49-F238E27FC236}">
-                <a16:creationId xmlns:a16="http://schemas.microsoft.com/office/drawing/2014/main" id="{485A72C5-8E2C-EB4F-8CE5-9B79A113D65B}"/>
+                <a16:creationId xmlns:a16="http://schemas.microsoft.com/office/drawing/2014/main" xmlns="" id="{485A72C5-8E2C-EB4F-8CE5-9B79A113D65B}"/>
               </a:ext>
             </a:extLst>
           </p:cNvPr>
@@ -17129,7 +17598,7 @@
           <p:cNvPr id="11" name="TextBox 10">
             <a:extLst>
               <a:ext uri="{FF2B5EF4-FFF2-40B4-BE49-F238E27FC236}">
-                <a16:creationId xmlns:a16="http://schemas.microsoft.com/office/drawing/2014/main" id="{56B0BE7E-3CC4-B842-A582-2649FDE8D68C}"/>
+                <a16:creationId xmlns:a16="http://schemas.microsoft.com/office/drawing/2014/main" xmlns="" id="{56B0BE7E-3CC4-B842-A582-2649FDE8D68C}"/>
               </a:ext>
             </a:extLst>
           </p:cNvPr>
@@ -17172,7 +17641,7 @@
           <p:cNvPr id="18" name="Rectangle 17">
             <a:extLst>
               <a:ext uri="{FF2B5EF4-FFF2-40B4-BE49-F238E27FC236}">
-                <a16:creationId xmlns:a16="http://schemas.microsoft.com/office/drawing/2014/main" id="{75B94B02-8E0E-974D-BF19-2D7ADE836944}"/>
+                <a16:creationId xmlns:a16="http://schemas.microsoft.com/office/drawing/2014/main" xmlns="" id="{75B94B02-8E0E-974D-BF19-2D7ADE836944}"/>
               </a:ext>
             </a:extLst>
           </p:cNvPr>
@@ -17224,7 +17693,7 @@
           <p:cNvPr id="12" name="Rounded Rectangle 11">
             <a:extLst>
               <a:ext uri="{FF2B5EF4-FFF2-40B4-BE49-F238E27FC236}">
-                <a16:creationId xmlns:a16="http://schemas.microsoft.com/office/drawing/2014/main" id="{35903EF9-80FA-7641-BE8B-4994D6BEE7F7}"/>
+                <a16:creationId xmlns:a16="http://schemas.microsoft.com/office/drawing/2014/main" xmlns="" id="{35903EF9-80FA-7641-BE8B-4994D6BEE7F7}"/>
               </a:ext>
             </a:extLst>
           </p:cNvPr>
@@ -17278,6 +17747,169 @@
               </a:rPr>
               <a:t>Back</a:t>
             </a:r>
+          </a:p>
+        </p:txBody>
+      </p:sp>
+      <p:sp>
+        <p:nvSpPr>
+          <p:cNvPr id="10" name="Rectangle 9">
+            <a:extLst>
+              <a:ext uri="{FF2B5EF4-FFF2-40B4-BE49-F238E27FC236}">
+                <a16:creationId xmlns:a16="http://schemas.microsoft.com/office/drawing/2014/main" xmlns="" id="{8003D022-BA0D-A042-92B7-9C2E431128DB}"/>
+              </a:ext>
+            </a:extLst>
+          </p:cNvPr>
+          <p:cNvSpPr/>
+          <p:nvPr/>
+        </p:nvSpPr>
+        <p:spPr>
+          <a:xfrm>
+            <a:off x="1188497" y="869150"/>
+            <a:ext cx="9832769" cy="344384"/>
+          </a:xfrm>
+          <a:prstGeom prst="rect">
+            <a:avLst/>
+          </a:prstGeom>
+          <a:solidFill>
+            <a:schemeClr val="tx1"/>
+          </a:solidFill>
+          <a:ln>
+            <a:noFill/>
+          </a:ln>
+        </p:spPr>
+        <p:style>
+          <a:lnRef idx="2">
+            <a:schemeClr val="accent1">
+              <a:shade val="50000"/>
+            </a:schemeClr>
+          </a:lnRef>
+          <a:fillRef idx="1">
+            <a:schemeClr val="accent1"/>
+          </a:fillRef>
+          <a:effectRef idx="0">
+            <a:schemeClr val="accent1"/>
+          </a:effectRef>
+          <a:fontRef idx="minor">
+            <a:schemeClr val="lt1"/>
+          </a:fontRef>
+        </p:style>
+        <p:txBody>
+          <a:bodyPr rtlCol="0" anchor="ctr"/>
+          <a:lstStyle/>
+          <a:p>
+            <a:r>
+              <a:rPr lang="en-US" sz="1400" dirty="0">
+                <a:solidFill>
+                  <a:schemeClr val="accent1">
+                    <a:lumMod val="50000"/>
+                  </a:schemeClr>
+                </a:solidFill>
+                <a:latin typeface="Comic Sans MS" panose="030F0902030302020204" pitchFamily="66" charset="0"/>
+              </a:rPr>
+              <a:t> </a:t>
+            </a:r>
+            <a:r>
+              <a:rPr lang="en-US" sz="2400" b="1" dirty="0" err="1">
+                <a:solidFill>
+                  <a:schemeClr val="accent1">
+                    <a:lumMod val="50000"/>
+                  </a:schemeClr>
+                </a:solidFill>
+                <a:latin typeface="Comic Sans MS" panose="030F0902030302020204" pitchFamily="66" charset="0"/>
+              </a:rPr>
+              <a:t>SellBack</a:t>
+            </a:r>
+            <a:r>
+              <a:rPr lang="en-US" sz="2400" b="1" dirty="0" err="1">
+                <a:solidFill>
+                  <a:schemeClr val="accent1">
+                    <a:lumMod val="60000"/>
+                    <a:lumOff val="40000"/>
+                  </a:schemeClr>
+                </a:solidFill>
+                <a:latin typeface="Comic Sans MS" panose="030F0902030302020204" pitchFamily="66" charset="0"/>
+              </a:rPr>
+              <a:t>Mart</a:t>
+            </a:r>
+            <a:endParaRPr lang="en-US" sz="1400" b="1" dirty="0">
+              <a:solidFill>
+                <a:schemeClr val="accent1">
+                  <a:lumMod val="60000"/>
+                  <a:lumOff val="40000"/>
+                </a:schemeClr>
+              </a:solidFill>
+              <a:latin typeface="Comic Sans MS" panose="030F0902030302020204" pitchFamily="66" charset="0"/>
+            </a:endParaRPr>
+          </a:p>
+        </p:txBody>
+      </p:sp>
+      <p:sp>
+        <p:nvSpPr>
+          <p:cNvPr id="14" name="Rectangle 13">
+            <a:extLst>
+              <a:ext uri="{FF2B5EF4-FFF2-40B4-BE49-F238E27FC236}">
+                <a16:creationId xmlns:a16="http://schemas.microsoft.com/office/drawing/2014/main" xmlns="" id="{6889F56C-0800-9F4E-BE33-281A675CE1DD}"/>
+              </a:ext>
+            </a:extLst>
+          </p:cNvPr>
+          <p:cNvSpPr/>
+          <p:nvPr/>
+        </p:nvSpPr>
+        <p:spPr>
+          <a:xfrm>
+            <a:off x="5481053" y="858402"/>
+            <a:ext cx="5527373" cy="344384"/>
+          </a:xfrm>
+          <a:prstGeom prst="rect">
+            <a:avLst/>
+          </a:prstGeom>
+          <a:solidFill>
+            <a:schemeClr val="tx1"/>
+          </a:solidFill>
+          <a:ln>
+            <a:noFill/>
+          </a:ln>
+        </p:spPr>
+        <p:style>
+          <a:lnRef idx="2">
+            <a:schemeClr val="accent1">
+              <a:shade val="50000"/>
+            </a:schemeClr>
+          </a:lnRef>
+          <a:fillRef idx="1">
+            <a:schemeClr val="accent1"/>
+          </a:fillRef>
+          <a:effectRef idx="0">
+            <a:schemeClr val="accent1"/>
+          </a:effectRef>
+          <a:fontRef idx="minor">
+            <a:schemeClr val="lt1"/>
+          </a:fontRef>
+        </p:style>
+        <p:txBody>
+          <a:bodyPr rtlCol="0" anchor="ctr"/>
+          <a:lstStyle/>
+          <a:p>
+            <a:pPr algn="r"/>
+            <a:r>
+              <a:rPr lang="en-US" sz="1400" dirty="0" smtClean="0">
+                <a:solidFill>
+                  <a:schemeClr val="bg2">
+                    <a:lumMod val="50000"/>
+                  </a:schemeClr>
+                </a:solidFill>
+                <a:latin typeface="Comic Sans MS" panose="030F0902030302020204" pitchFamily="66" charset="0"/>
+              </a:rPr>
+              <a:t>Home     </a:t>
+            </a:r>
+            <a:endParaRPr lang="en-US" sz="1400" dirty="0">
+              <a:solidFill>
+                <a:schemeClr val="bg2">
+                  <a:lumMod val="50000"/>
+                </a:schemeClr>
+              </a:solidFill>
+              <a:latin typeface="Comic Sans MS" panose="030F0902030302020204" pitchFamily="66" charset="0"/>
+            </a:endParaRPr>
           </a:p>
         </p:txBody>
       </p:sp>
@@ -17316,7 +17948,7 @@
           <p:cNvPr id="2" name="TextBox 1">
             <a:extLst>
               <a:ext uri="{FF2B5EF4-FFF2-40B4-BE49-F238E27FC236}">
-                <a16:creationId xmlns:a16="http://schemas.microsoft.com/office/drawing/2014/main" id="{F3573DF9-457D-7948-8B22-DB5337292FA7}"/>
+                <a16:creationId xmlns:a16="http://schemas.microsoft.com/office/drawing/2014/main" xmlns="" id="{F3573DF9-457D-7948-8B22-DB5337292FA7}"/>
               </a:ext>
             </a:extLst>
           </p:cNvPr>
@@ -17383,7 +18015,7 @@
           <p:cNvPr id="3" name="TextBox 2">
             <a:extLst>
               <a:ext uri="{FF2B5EF4-FFF2-40B4-BE49-F238E27FC236}">
-                <a16:creationId xmlns:a16="http://schemas.microsoft.com/office/drawing/2014/main" id="{49DF0299-C639-944C-9F0E-91BE71AC7E52}"/>
+                <a16:creationId xmlns:a16="http://schemas.microsoft.com/office/drawing/2014/main" xmlns="" id="{49DF0299-C639-944C-9F0E-91BE71AC7E52}"/>
               </a:ext>
             </a:extLst>
           </p:cNvPr>
@@ -17441,7 +18073,7 @@
           <p:cNvPr id="4" name="Rectangle 3">
             <a:extLst>
               <a:ext uri="{FF2B5EF4-FFF2-40B4-BE49-F238E27FC236}">
-                <a16:creationId xmlns:a16="http://schemas.microsoft.com/office/drawing/2014/main" id="{61CD5799-7FC2-F04C-ADCF-330CB97C8DA9}"/>
+                <a16:creationId xmlns:a16="http://schemas.microsoft.com/office/drawing/2014/main" xmlns="" id="{61CD5799-7FC2-F04C-ADCF-330CB97C8DA9}"/>
               </a:ext>
             </a:extLst>
           </p:cNvPr>
@@ -17500,7 +18132,7 @@
           <p:cNvPr id="13" name="Rounded Rectangle 12">
             <a:extLst>
               <a:ext uri="{FF2B5EF4-FFF2-40B4-BE49-F238E27FC236}">
-                <a16:creationId xmlns:a16="http://schemas.microsoft.com/office/drawing/2014/main" id="{1376ECFE-A6F2-6C42-A904-0E15AFF7920D}"/>
+                <a16:creationId xmlns:a16="http://schemas.microsoft.com/office/drawing/2014/main" xmlns="" id="{1376ECFE-A6F2-6C42-A904-0E15AFF7920D}"/>
               </a:ext>
             </a:extLst>
           </p:cNvPr>
@@ -17562,7 +18194,7 @@
           <p:cNvPr id="6" name="TextBox 5">
             <a:extLst>
               <a:ext uri="{FF2B5EF4-FFF2-40B4-BE49-F238E27FC236}">
-                <a16:creationId xmlns:a16="http://schemas.microsoft.com/office/drawing/2014/main" id="{485A72C5-8E2C-EB4F-8CE5-9B79A113D65B}"/>
+                <a16:creationId xmlns:a16="http://schemas.microsoft.com/office/drawing/2014/main" xmlns="" id="{485A72C5-8E2C-EB4F-8CE5-9B79A113D65B}"/>
               </a:ext>
             </a:extLst>
           </p:cNvPr>
@@ -17603,7 +18235,7 @@
           <p:cNvPr id="16" name="TextBox 15">
             <a:extLst>
               <a:ext uri="{FF2B5EF4-FFF2-40B4-BE49-F238E27FC236}">
-                <a16:creationId xmlns:a16="http://schemas.microsoft.com/office/drawing/2014/main" id="{466B05F8-0E11-B947-95C8-E2F317016D98}"/>
+                <a16:creationId xmlns:a16="http://schemas.microsoft.com/office/drawing/2014/main" xmlns="" id="{466B05F8-0E11-B947-95C8-E2F317016D98}"/>
               </a:ext>
             </a:extLst>
           </p:cNvPr>
@@ -17644,7 +18276,7 @@
           <p:cNvPr id="11" name="TextBox 10">
             <a:extLst>
               <a:ext uri="{FF2B5EF4-FFF2-40B4-BE49-F238E27FC236}">
-                <a16:creationId xmlns:a16="http://schemas.microsoft.com/office/drawing/2014/main" id="{56B0BE7E-3CC4-B842-A582-2649FDE8D68C}"/>
+                <a16:creationId xmlns:a16="http://schemas.microsoft.com/office/drawing/2014/main" xmlns="" id="{56B0BE7E-3CC4-B842-A582-2649FDE8D68C}"/>
               </a:ext>
             </a:extLst>
           </p:cNvPr>
@@ -17687,7 +18319,7 @@
           <p:cNvPr id="17" name="TextBox 16">
             <a:extLst>
               <a:ext uri="{FF2B5EF4-FFF2-40B4-BE49-F238E27FC236}">
-                <a16:creationId xmlns:a16="http://schemas.microsoft.com/office/drawing/2014/main" id="{587296F0-7B2D-2446-B98A-568455FB8764}"/>
+                <a16:creationId xmlns:a16="http://schemas.microsoft.com/office/drawing/2014/main" xmlns="" id="{587296F0-7B2D-2446-B98A-568455FB8764}"/>
               </a:ext>
             </a:extLst>
           </p:cNvPr>
@@ -17730,7 +18362,7 @@
           <p:cNvPr id="18" name="Rectangle 17">
             <a:extLst>
               <a:ext uri="{FF2B5EF4-FFF2-40B4-BE49-F238E27FC236}">
-                <a16:creationId xmlns:a16="http://schemas.microsoft.com/office/drawing/2014/main" id="{75B94B02-8E0E-974D-BF19-2D7ADE836944}"/>
+                <a16:creationId xmlns:a16="http://schemas.microsoft.com/office/drawing/2014/main" xmlns="" id="{75B94B02-8E0E-974D-BF19-2D7ADE836944}"/>
               </a:ext>
             </a:extLst>
           </p:cNvPr>
@@ -17774,6 +18406,169 @@
           <a:p>
             <a:pPr algn="ctr"/>
             <a:endParaRPr lang="en-US"/>
+          </a:p>
+        </p:txBody>
+      </p:sp>
+      <p:sp>
+        <p:nvSpPr>
+          <p:cNvPr id="14" name="Rectangle 13">
+            <a:extLst>
+              <a:ext uri="{FF2B5EF4-FFF2-40B4-BE49-F238E27FC236}">
+                <a16:creationId xmlns:a16="http://schemas.microsoft.com/office/drawing/2014/main" xmlns="" id="{8003D022-BA0D-A042-92B7-9C2E431128DB}"/>
+              </a:ext>
+            </a:extLst>
+          </p:cNvPr>
+          <p:cNvSpPr/>
+          <p:nvPr/>
+        </p:nvSpPr>
+        <p:spPr>
+          <a:xfrm>
+            <a:off x="1188497" y="869150"/>
+            <a:ext cx="9832769" cy="344384"/>
+          </a:xfrm>
+          <a:prstGeom prst="rect">
+            <a:avLst/>
+          </a:prstGeom>
+          <a:solidFill>
+            <a:schemeClr val="tx1"/>
+          </a:solidFill>
+          <a:ln>
+            <a:noFill/>
+          </a:ln>
+        </p:spPr>
+        <p:style>
+          <a:lnRef idx="2">
+            <a:schemeClr val="accent1">
+              <a:shade val="50000"/>
+            </a:schemeClr>
+          </a:lnRef>
+          <a:fillRef idx="1">
+            <a:schemeClr val="accent1"/>
+          </a:fillRef>
+          <a:effectRef idx="0">
+            <a:schemeClr val="accent1"/>
+          </a:effectRef>
+          <a:fontRef idx="minor">
+            <a:schemeClr val="lt1"/>
+          </a:fontRef>
+        </p:style>
+        <p:txBody>
+          <a:bodyPr rtlCol="0" anchor="ctr"/>
+          <a:lstStyle/>
+          <a:p>
+            <a:r>
+              <a:rPr lang="en-US" sz="1400" dirty="0">
+                <a:solidFill>
+                  <a:schemeClr val="accent1">
+                    <a:lumMod val="50000"/>
+                  </a:schemeClr>
+                </a:solidFill>
+                <a:latin typeface="Comic Sans MS" panose="030F0902030302020204" pitchFamily="66" charset="0"/>
+              </a:rPr>
+              <a:t> </a:t>
+            </a:r>
+            <a:r>
+              <a:rPr lang="en-US" sz="2400" b="1" dirty="0" err="1">
+                <a:solidFill>
+                  <a:schemeClr val="accent1">
+                    <a:lumMod val="50000"/>
+                  </a:schemeClr>
+                </a:solidFill>
+                <a:latin typeface="Comic Sans MS" panose="030F0902030302020204" pitchFamily="66" charset="0"/>
+              </a:rPr>
+              <a:t>SellBack</a:t>
+            </a:r>
+            <a:r>
+              <a:rPr lang="en-US" sz="2400" b="1" dirty="0" err="1">
+                <a:solidFill>
+                  <a:schemeClr val="accent1">
+                    <a:lumMod val="60000"/>
+                    <a:lumOff val="40000"/>
+                  </a:schemeClr>
+                </a:solidFill>
+                <a:latin typeface="Comic Sans MS" panose="030F0902030302020204" pitchFamily="66" charset="0"/>
+              </a:rPr>
+              <a:t>Mart</a:t>
+            </a:r>
+            <a:endParaRPr lang="en-US" sz="1400" b="1" dirty="0">
+              <a:solidFill>
+                <a:schemeClr val="accent1">
+                  <a:lumMod val="60000"/>
+                  <a:lumOff val="40000"/>
+                </a:schemeClr>
+              </a:solidFill>
+              <a:latin typeface="Comic Sans MS" panose="030F0902030302020204" pitchFamily="66" charset="0"/>
+            </a:endParaRPr>
+          </a:p>
+        </p:txBody>
+      </p:sp>
+      <p:sp>
+        <p:nvSpPr>
+          <p:cNvPr id="15" name="Rectangle 14">
+            <a:extLst>
+              <a:ext uri="{FF2B5EF4-FFF2-40B4-BE49-F238E27FC236}">
+                <a16:creationId xmlns:a16="http://schemas.microsoft.com/office/drawing/2014/main" xmlns="" id="{6889F56C-0800-9F4E-BE33-281A675CE1DD}"/>
+              </a:ext>
+            </a:extLst>
+          </p:cNvPr>
+          <p:cNvSpPr/>
+          <p:nvPr/>
+        </p:nvSpPr>
+        <p:spPr>
+          <a:xfrm>
+            <a:off x="5481053" y="858402"/>
+            <a:ext cx="5527373" cy="344384"/>
+          </a:xfrm>
+          <a:prstGeom prst="rect">
+            <a:avLst/>
+          </a:prstGeom>
+          <a:solidFill>
+            <a:schemeClr val="tx1"/>
+          </a:solidFill>
+          <a:ln>
+            <a:noFill/>
+          </a:ln>
+        </p:spPr>
+        <p:style>
+          <a:lnRef idx="2">
+            <a:schemeClr val="accent1">
+              <a:shade val="50000"/>
+            </a:schemeClr>
+          </a:lnRef>
+          <a:fillRef idx="1">
+            <a:schemeClr val="accent1"/>
+          </a:fillRef>
+          <a:effectRef idx="0">
+            <a:schemeClr val="accent1"/>
+          </a:effectRef>
+          <a:fontRef idx="minor">
+            <a:schemeClr val="lt1"/>
+          </a:fontRef>
+        </p:style>
+        <p:txBody>
+          <a:bodyPr rtlCol="0" anchor="ctr"/>
+          <a:lstStyle/>
+          <a:p>
+            <a:pPr algn="r"/>
+            <a:r>
+              <a:rPr lang="en-US" sz="1400" dirty="0" smtClean="0">
+                <a:solidFill>
+                  <a:schemeClr val="bg2">
+                    <a:lumMod val="50000"/>
+                  </a:schemeClr>
+                </a:solidFill>
+                <a:latin typeface="Comic Sans MS" panose="030F0902030302020204" pitchFamily="66" charset="0"/>
+              </a:rPr>
+              <a:t>Home     </a:t>
+            </a:r>
+            <a:endParaRPr lang="en-US" sz="1400" dirty="0">
+              <a:solidFill>
+                <a:schemeClr val="bg2">
+                  <a:lumMod val="50000"/>
+                </a:schemeClr>
+              </a:solidFill>
+              <a:latin typeface="Comic Sans MS" panose="030F0902030302020204" pitchFamily="66" charset="0"/>
+            </a:endParaRPr>
           </a:p>
         </p:txBody>
       </p:sp>
@@ -17812,7 +18607,7 @@
           <p:cNvPr id="2" name="TextBox 1">
             <a:extLst>
               <a:ext uri="{FF2B5EF4-FFF2-40B4-BE49-F238E27FC236}">
-                <a16:creationId xmlns:a16="http://schemas.microsoft.com/office/drawing/2014/main" id="{F3573DF9-457D-7948-8B22-DB5337292FA7}"/>
+                <a16:creationId xmlns:a16="http://schemas.microsoft.com/office/drawing/2014/main" xmlns="" id="{F3573DF9-457D-7948-8B22-DB5337292FA7}"/>
               </a:ext>
             </a:extLst>
           </p:cNvPr>
@@ -17879,7 +18674,7 @@
           <p:cNvPr id="3" name="TextBox 2">
             <a:extLst>
               <a:ext uri="{FF2B5EF4-FFF2-40B4-BE49-F238E27FC236}">
-                <a16:creationId xmlns:a16="http://schemas.microsoft.com/office/drawing/2014/main" id="{49DF0299-C639-944C-9F0E-91BE71AC7E52}"/>
+                <a16:creationId xmlns:a16="http://schemas.microsoft.com/office/drawing/2014/main" xmlns="" id="{49DF0299-C639-944C-9F0E-91BE71AC7E52}"/>
               </a:ext>
             </a:extLst>
           </p:cNvPr>
@@ -17919,7 +18714,7 @@
           <p:cNvPr id="4" name="Rectangle 3">
             <a:extLst>
               <a:ext uri="{FF2B5EF4-FFF2-40B4-BE49-F238E27FC236}">
-                <a16:creationId xmlns:a16="http://schemas.microsoft.com/office/drawing/2014/main" id="{61CD5799-7FC2-F04C-ADCF-330CB97C8DA9}"/>
+                <a16:creationId xmlns:a16="http://schemas.microsoft.com/office/drawing/2014/main" xmlns="" id="{61CD5799-7FC2-F04C-ADCF-330CB97C8DA9}"/>
               </a:ext>
             </a:extLst>
           </p:cNvPr>
@@ -17978,7 +18773,7 @@
           <p:cNvPr id="5" name="TextBox 4">
             <a:extLst>
               <a:ext uri="{FF2B5EF4-FFF2-40B4-BE49-F238E27FC236}">
-                <a16:creationId xmlns:a16="http://schemas.microsoft.com/office/drawing/2014/main" id="{221DED5B-F56B-0F43-A308-4F2DD034B5B7}"/>
+                <a16:creationId xmlns:a16="http://schemas.microsoft.com/office/drawing/2014/main" xmlns="" id="{221DED5B-F56B-0F43-A308-4F2DD034B5B7}"/>
               </a:ext>
             </a:extLst>
           </p:cNvPr>
@@ -18018,7 +18813,7 @@
           <p:cNvPr id="7" name="TextBox 6">
             <a:extLst>
               <a:ext uri="{FF2B5EF4-FFF2-40B4-BE49-F238E27FC236}">
-                <a16:creationId xmlns:a16="http://schemas.microsoft.com/office/drawing/2014/main" id="{C8E10E37-1019-8D4C-BA6F-9A6E9CF0D317}"/>
+                <a16:creationId xmlns:a16="http://schemas.microsoft.com/office/drawing/2014/main" xmlns="" id="{C8E10E37-1019-8D4C-BA6F-9A6E9CF0D317}"/>
               </a:ext>
             </a:extLst>
           </p:cNvPr>
@@ -18028,7 +18823,7 @@
         <p:spPr>
           <a:xfrm>
             <a:off x="1942013" y="1831383"/>
-            <a:ext cx="1602221" cy="4616648"/>
+            <a:ext cx="1295660" cy="3908762"/>
           </a:xfrm>
           <a:prstGeom prst="rect">
             <a:avLst/>
@@ -18068,6 +18863,23 @@
             </a:endParaRPr>
           </a:p>
           <a:p>
+            <a:endParaRPr lang="en-US" sz="1400" dirty="0" smtClean="0">
+              <a:solidFill>
+                <a:schemeClr val="bg1"/>
+              </a:solidFill>
+              <a:latin typeface="Comic Sans MS" panose="030F0902030302020204" pitchFamily="66" charset="0"/>
+            </a:endParaRPr>
+          </a:p>
+          <a:p>
+            <a:r>
+              <a:rPr lang="en-US" sz="1400" dirty="0" smtClean="0">
+                <a:solidFill>
+                  <a:schemeClr val="bg1"/>
+                </a:solidFill>
+                <a:latin typeface="Comic Sans MS" panose="030F0902030302020204" pitchFamily="66" charset="0"/>
+              </a:rPr>
+              <a:t>Department</a:t>
+            </a:r>
             <a:r>
               <a:rPr lang="en-US" sz="1400" dirty="0">
                 <a:solidFill>
@@ -18075,7 +18887,7 @@
                 </a:solidFill>
                 <a:latin typeface="Comic Sans MS" panose="030F0902030302020204" pitchFamily="66" charset="0"/>
               </a:rPr>
-              <a:t>Department*</a:t>
+              <a:t>*</a:t>
             </a:r>
           </a:p>
           <a:p>
@@ -18095,17 +18907,23 @@
             </a:endParaRPr>
           </a:p>
           <a:p>
-            <a:r>
-              <a:rPr lang="en-US" sz="1400" dirty="0">
-                <a:solidFill>
-                  <a:schemeClr val="bg1"/>
-                </a:solidFill>
-                <a:latin typeface="Comic Sans MS" panose="030F0902030302020204" pitchFamily="66" charset="0"/>
-              </a:rPr>
-              <a:t>Email</a:t>
-            </a:r>
-          </a:p>
-          <a:p>
+            <a:endParaRPr lang="en-US" sz="1400" dirty="0" smtClean="0">
+              <a:solidFill>
+                <a:schemeClr val="bg1"/>
+              </a:solidFill>
+              <a:latin typeface="Comic Sans MS" panose="030F0902030302020204" pitchFamily="66" charset="0"/>
+            </a:endParaRPr>
+          </a:p>
+          <a:p>
+            <a:r>
+              <a:rPr lang="en-US" sz="1400" dirty="0" smtClean="0">
+                <a:solidFill>
+                  <a:schemeClr val="bg1"/>
+                </a:solidFill>
+                <a:latin typeface="Comic Sans MS" panose="030F0902030302020204" pitchFamily="66" charset="0"/>
+              </a:rPr>
+              <a:t>Password</a:t>
+            </a:r>
             <a:endParaRPr lang="en-US" sz="1400" dirty="0">
               <a:solidFill>
                 <a:schemeClr val="bg1"/>
@@ -18122,17 +18940,6 @@
             </a:endParaRPr>
           </a:p>
           <a:p>
-            <a:r>
-              <a:rPr lang="en-US" sz="1400" dirty="0">
-                <a:solidFill>
-                  <a:schemeClr val="bg1"/>
-                </a:solidFill>
-                <a:latin typeface="Comic Sans MS" panose="030F0902030302020204" pitchFamily="66" charset="0"/>
-              </a:rPr>
-              <a:t>Password</a:t>
-            </a:r>
-          </a:p>
-          <a:p>
             <a:endParaRPr lang="en-US" sz="1400" dirty="0">
               <a:solidFill>
                 <a:schemeClr val="bg1"/>
@@ -18150,13 +18957,22 @@
           </a:p>
           <a:p>
             <a:r>
-              <a:rPr lang="en-US" sz="1400" dirty="0">
-                <a:solidFill>
-                  <a:schemeClr val="bg1"/>
-                </a:solidFill>
-                <a:latin typeface="Comic Sans MS" panose="030F0902030302020204" pitchFamily="66" charset="0"/>
-              </a:rPr>
-              <a:t>Repeat Password</a:t>
+              <a:rPr lang="en-US" sz="1000" dirty="0" smtClean="0">
+                <a:solidFill>
+                  <a:schemeClr val="bg1"/>
+                </a:solidFill>
+                <a:latin typeface="Comic Sans MS" panose="030F0902030302020204" pitchFamily="66" charset="0"/>
+              </a:rPr>
+              <a:t>* </a:t>
+            </a:r>
+            <a:r>
+              <a:rPr lang="en-US" sz="1000" dirty="0">
+                <a:solidFill>
+                  <a:schemeClr val="bg1"/>
+                </a:solidFill>
+                <a:latin typeface="Comic Sans MS" panose="030F0902030302020204" pitchFamily="66" charset="0"/>
+              </a:rPr>
+              <a:t>Optional field.</a:t>
             </a:r>
           </a:p>
           <a:p>
@@ -18176,33 +18992,6 @@
             </a:endParaRPr>
           </a:p>
           <a:p>
-            <a:r>
-              <a:rPr lang="en-US" sz="1000" dirty="0">
-                <a:solidFill>
-                  <a:schemeClr val="bg1"/>
-                </a:solidFill>
-                <a:latin typeface="Comic Sans MS" panose="030F0902030302020204" pitchFamily="66" charset="0"/>
-              </a:rPr>
-              <a:t>* Optional field.</a:t>
-            </a:r>
-          </a:p>
-          <a:p>
-            <a:endParaRPr lang="en-US" sz="1400" dirty="0">
-              <a:solidFill>
-                <a:schemeClr val="bg1"/>
-              </a:solidFill>
-              <a:latin typeface="Comic Sans MS" panose="030F0902030302020204" pitchFamily="66" charset="0"/>
-            </a:endParaRPr>
-          </a:p>
-          <a:p>
-            <a:endParaRPr lang="en-US" sz="1400" dirty="0">
-              <a:solidFill>
-                <a:schemeClr val="bg1"/>
-              </a:solidFill>
-              <a:latin typeface="Comic Sans MS" panose="030F0902030302020204" pitchFamily="66" charset="0"/>
-            </a:endParaRPr>
-          </a:p>
-          <a:p>
             <a:endParaRPr lang="en-US" sz="1400" u="sng" dirty="0">
               <a:solidFill>
                 <a:srgbClr val="0432FF"/>
@@ -18233,7 +19022,7 @@
           <p:cNvPr id="8" name="TextBox 7">
             <a:extLst>
               <a:ext uri="{FF2B5EF4-FFF2-40B4-BE49-F238E27FC236}">
-                <a16:creationId xmlns:a16="http://schemas.microsoft.com/office/drawing/2014/main" id="{32820AB9-7CA6-8F41-A812-9F4C46331562}"/>
+                <a16:creationId xmlns:a16="http://schemas.microsoft.com/office/drawing/2014/main" xmlns="" id="{32820AB9-7CA6-8F41-A812-9F4C46331562}"/>
               </a:ext>
             </a:extLst>
           </p:cNvPr>
@@ -18276,7 +19065,7 @@
           <p:cNvPr id="9" name="TextBox 8">
             <a:extLst>
               <a:ext uri="{FF2B5EF4-FFF2-40B4-BE49-F238E27FC236}">
-                <a16:creationId xmlns:a16="http://schemas.microsoft.com/office/drawing/2014/main" id="{32820AB9-7CA6-8F41-A812-9F4C46331562}"/>
+                <a16:creationId xmlns:a16="http://schemas.microsoft.com/office/drawing/2014/main" xmlns="" id="{32820AB9-7CA6-8F41-A812-9F4C46331562}"/>
               </a:ext>
             </a:extLst>
           </p:cNvPr>
@@ -18285,7 +19074,7 @@
         </p:nvSpPr>
         <p:spPr>
           <a:xfrm>
-            <a:off x="2018804" y="2736341"/>
+            <a:off x="2018804" y="3044117"/>
             <a:ext cx="3610099" cy="307777"/>
           </a:xfrm>
           <a:prstGeom prst="rect">
@@ -18319,7 +19108,7 @@
           <p:cNvPr id="10" name="TextBox 9">
             <a:extLst>
               <a:ext uri="{FF2B5EF4-FFF2-40B4-BE49-F238E27FC236}">
-                <a16:creationId xmlns:a16="http://schemas.microsoft.com/office/drawing/2014/main" id="{32820AB9-7CA6-8F41-A812-9F4C46331562}"/>
+                <a16:creationId xmlns:a16="http://schemas.microsoft.com/office/drawing/2014/main" xmlns="" id="{32820AB9-7CA6-8F41-A812-9F4C46331562}"/>
               </a:ext>
             </a:extLst>
           </p:cNvPr>
@@ -18328,8 +19117,8 @@
         </p:nvSpPr>
         <p:spPr>
           <a:xfrm>
-            <a:off x="1996413" y="3384820"/>
-            <a:ext cx="2151468" cy="307777"/>
+            <a:off x="6073781" y="2111092"/>
+            <a:ext cx="3671798" cy="307777"/>
           </a:xfrm>
           <a:prstGeom prst="rect">
             <a:avLst/>
@@ -18362,7 +19151,7 @@
           <p:cNvPr id="12" name="TextBox 11">
             <a:extLst>
               <a:ext uri="{FF2B5EF4-FFF2-40B4-BE49-F238E27FC236}">
-                <a16:creationId xmlns:a16="http://schemas.microsoft.com/office/drawing/2014/main" id="{32820AB9-7CA6-8F41-A812-9F4C46331562}"/>
+                <a16:creationId xmlns:a16="http://schemas.microsoft.com/office/drawing/2014/main" xmlns="" id="{32820AB9-7CA6-8F41-A812-9F4C46331562}"/>
               </a:ext>
             </a:extLst>
           </p:cNvPr>
@@ -18371,7 +19160,7 @@
         </p:nvSpPr>
         <p:spPr>
           <a:xfrm>
-            <a:off x="1996412" y="4064108"/>
+            <a:off x="6073781" y="3044529"/>
             <a:ext cx="3610099" cy="307777"/>
           </a:xfrm>
           <a:prstGeom prst="rect">
@@ -18405,7 +19194,7 @@
           <p:cNvPr id="13" name="Rounded Rectangle 12">
             <a:extLst>
               <a:ext uri="{FF2B5EF4-FFF2-40B4-BE49-F238E27FC236}">
-                <a16:creationId xmlns:a16="http://schemas.microsoft.com/office/drawing/2014/main" id="{1376ECFE-A6F2-6C42-A904-0E15AFF7920D}"/>
+                <a16:creationId xmlns:a16="http://schemas.microsoft.com/office/drawing/2014/main" xmlns="" id="{1376ECFE-A6F2-6C42-A904-0E15AFF7920D}"/>
               </a:ext>
             </a:extLst>
           </p:cNvPr>
@@ -18414,7 +19203,7 @@
         </p:nvSpPr>
         <p:spPr>
           <a:xfrm>
-            <a:off x="1996412" y="5645060"/>
+            <a:off x="1923798" y="5227798"/>
             <a:ext cx="2367645" cy="327860"/>
           </a:xfrm>
           <a:prstGeom prst="roundRect">
@@ -18467,7 +19256,7 @@
           <p:cNvPr id="14" name="TextBox 13">
             <a:extLst>
               <a:ext uri="{FF2B5EF4-FFF2-40B4-BE49-F238E27FC236}">
-                <a16:creationId xmlns:a16="http://schemas.microsoft.com/office/drawing/2014/main" id="{32820AB9-7CA6-8F41-A812-9F4C46331562}"/>
+                <a16:creationId xmlns:a16="http://schemas.microsoft.com/office/drawing/2014/main" xmlns="" id="{32820AB9-7CA6-8F41-A812-9F4C46331562}"/>
               </a:ext>
             </a:extLst>
           </p:cNvPr>
@@ -18476,7 +19265,7 @@
         </p:nvSpPr>
         <p:spPr>
           <a:xfrm>
-            <a:off x="1996412" y="4724608"/>
+            <a:off x="1996412" y="3780701"/>
             <a:ext cx="3610099" cy="307777"/>
           </a:xfrm>
           <a:prstGeom prst="rect">
@@ -18510,7 +19299,7 @@
           <p:cNvPr id="15" name="TextBox 14">
             <a:extLst>
               <a:ext uri="{FF2B5EF4-FFF2-40B4-BE49-F238E27FC236}">
-                <a16:creationId xmlns:a16="http://schemas.microsoft.com/office/drawing/2014/main" id="{32820AB9-7CA6-8F41-A812-9F4C46331562}"/>
+                <a16:creationId xmlns:a16="http://schemas.microsoft.com/office/drawing/2014/main" xmlns="" id="{32820AB9-7CA6-8F41-A812-9F4C46331562}"/>
               </a:ext>
             </a:extLst>
           </p:cNvPr>
@@ -18519,8 +19308,8 @@
         </p:nvSpPr>
         <p:spPr>
           <a:xfrm>
-            <a:off x="4147881" y="3384820"/>
-            <a:ext cx="1481023" cy="307777"/>
+            <a:off x="5748422" y="2431174"/>
+            <a:ext cx="5260004" cy="307777"/>
           </a:xfrm>
           <a:prstGeom prst="rect">
             <a:avLst/>
@@ -18538,22 +19327,376 @@
           <a:p>
             <a:pPr algn="l"/>
             <a:r>
+              <a:rPr lang="en-US" sz="1400" dirty="0" smtClean="0">
+                <a:solidFill>
+                  <a:schemeClr val="bg1"/>
+                </a:solidFill>
+                <a:latin typeface="Comic Sans MS" panose="030F0902030302020204" pitchFamily="66" charset="0"/>
+              </a:rPr>
+              <a:t>The email needs to </a:t>
+            </a:r>
+            <a:r>
+              <a:rPr lang="en-US" sz="1400" dirty="0" smtClean="0">
+                <a:solidFill>
+                  <a:schemeClr val="bg1"/>
+                </a:solidFill>
+                <a:latin typeface="Comic Sans MS" panose="030F0902030302020204" pitchFamily="66" charset="0"/>
+              </a:rPr>
+              <a:t>connected to the </a:t>
+            </a:r>
+            <a:r>
+              <a:rPr lang="en-US" sz="1400" dirty="0" err="1" smtClean="0">
+                <a:solidFill>
+                  <a:schemeClr val="bg1"/>
+                </a:solidFill>
+                <a:latin typeface="Comic Sans MS" panose="030F0902030302020204" pitchFamily="66" charset="0"/>
+              </a:rPr>
+              <a:t>UofM</a:t>
+            </a:r>
+            <a:r>
+              <a:rPr lang="en-US" sz="1400" dirty="0" smtClean="0">
+                <a:solidFill>
+                  <a:schemeClr val="bg1"/>
+                </a:solidFill>
+                <a:latin typeface="Comic Sans MS" panose="030F0902030302020204" pitchFamily="66" charset="0"/>
+              </a:rPr>
+              <a:t>:</a:t>
+            </a:r>
+            <a:r>
+              <a:rPr lang="en-US" sz="1400" dirty="0" smtClean="0">
+                <a:solidFill>
+                  <a:schemeClr val="bg1"/>
+                </a:solidFill>
+                <a:latin typeface="Comic Sans MS" panose="030F0902030302020204" pitchFamily="66" charset="0"/>
+              </a:rPr>
+              <a:t>@</a:t>
+            </a:r>
+            <a:r>
+              <a:rPr lang="en-US" sz="1400" dirty="0" err="1">
+                <a:solidFill>
+                  <a:schemeClr val="bg1"/>
+                </a:solidFill>
+                <a:latin typeface="Comic Sans MS" panose="030F0902030302020204" pitchFamily="66" charset="0"/>
+              </a:rPr>
+              <a:t>memphis.edu</a:t>
+            </a:r>
+            <a:endParaRPr lang="en-US" sz="1400" dirty="0">
+              <a:solidFill>
+                <a:schemeClr val="bg1"/>
+              </a:solidFill>
+              <a:latin typeface="Comic Sans MS" panose="030F0902030302020204" pitchFamily="66" charset="0"/>
+            </a:endParaRPr>
+          </a:p>
+        </p:txBody>
+      </p:sp>
+      <p:sp>
+        <p:nvSpPr>
+          <p:cNvPr id="16" name="Rectangle 15">
+            <a:extLst>
+              <a:ext uri="{FF2B5EF4-FFF2-40B4-BE49-F238E27FC236}">
+                <a16:creationId xmlns:a16="http://schemas.microsoft.com/office/drawing/2014/main" xmlns="" id="{8003D022-BA0D-A042-92B7-9C2E431128DB}"/>
+              </a:ext>
+            </a:extLst>
+          </p:cNvPr>
+          <p:cNvSpPr/>
+          <p:nvPr/>
+        </p:nvSpPr>
+        <p:spPr>
+          <a:xfrm>
+            <a:off x="1188497" y="869150"/>
+            <a:ext cx="9832769" cy="344384"/>
+          </a:xfrm>
+          <a:prstGeom prst="rect">
+            <a:avLst/>
+          </a:prstGeom>
+          <a:solidFill>
+            <a:schemeClr val="tx1"/>
+          </a:solidFill>
+          <a:ln>
+            <a:noFill/>
+          </a:ln>
+        </p:spPr>
+        <p:style>
+          <a:lnRef idx="2">
+            <a:schemeClr val="accent1">
+              <a:shade val="50000"/>
+            </a:schemeClr>
+          </a:lnRef>
+          <a:fillRef idx="1">
+            <a:schemeClr val="accent1"/>
+          </a:fillRef>
+          <a:effectRef idx="0">
+            <a:schemeClr val="accent1"/>
+          </a:effectRef>
+          <a:fontRef idx="minor">
+            <a:schemeClr val="lt1"/>
+          </a:fontRef>
+        </p:style>
+        <p:txBody>
+          <a:bodyPr rtlCol="0" anchor="ctr"/>
+          <a:lstStyle/>
+          <a:p>
+            <a:r>
               <a:rPr lang="en-US" sz="1400" dirty="0">
                 <a:solidFill>
-                  <a:schemeClr val="bg1"/>
-                </a:solidFill>
-                <a:latin typeface="Comic Sans MS" panose="030F0902030302020204" pitchFamily="66" charset="0"/>
-              </a:rPr>
-              <a:t>@</a:t>
-            </a:r>
-            <a:r>
-              <a:rPr lang="en-US" sz="1400" dirty="0" err="1">
-                <a:solidFill>
-                  <a:schemeClr val="bg1"/>
-                </a:solidFill>
-                <a:latin typeface="Comic Sans MS" panose="030F0902030302020204" pitchFamily="66" charset="0"/>
-              </a:rPr>
-              <a:t>memphis.edu</a:t>
+                  <a:schemeClr val="accent1">
+                    <a:lumMod val="50000"/>
+                  </a:schemeClr>
+                </a:solidFill>
+                <a:latin typeface="Comic Sans MS" panose="030F0902030302020204" pitchFamily="66" charset="0"/>
+              </a:rPr>
+              <a:t> </a:t>
+            </a:r>
+            <a:r>
+              <a:rPr lang="en-US" sz="2400" b="1" dirty="0" err="1">
+                <a:solidFill>
+                  <a:schemeClr val="accent1">
+                    <a:lumMod val="50000"/>
+                  </a:schemeClr>
+                </a:solidFill>
+                <a:latin typeface="Comic Sans MS" panose="030F0902030302020204" pitchFamily="66" charset="0"/>
+              </a:rPr>
+              <a:t>SellBack</a:t>
+            </a:r>
+            <a:r>
+              <a:rPr lang="en-US" sz="2400" b="1" dirty="0" err="1">
+                <a:solidFill>
+                  <a:schemeClr val="accent1">
+                    <a:lumMod val="60000"/>
+                    <a:lumOff val="40000"/>
+                  </a:schemeClr>
+                </a:solidFill>
+                <a:latin typeface="Comic Sans MS" panose="030F0902030302020204" pitchFamily="66" charset="0"/>
+              </a:rPr>
+              <a:t>Mart</a:t>
+            </a:r>
+            <a:endParaRPr lang="en-US" sz="1400" b="1" dirty="0">
+              <a:solidFill>
+                <a:schemeClr val="accent1">
+                  <a:lumMod val="60000"/>
+                  <a:lumOff val="40000"/>
+                </a:schemeClr>
+              </a:solidFill>
+              <a:latin typeface="Comic Sans MS" panose="030F0902030302020204" pitchFamily="66" charset="0"/>
+            </a:endParaRPr>
+          </a:p>
+        </p:txBody>
+      </p:sp>
+      <p:sp>
+        <p:nvSpPr>
+          <p:cNvPr id="17" name="Rectangle 16">
+            <a:extLst>
+              <a:ext uri="{FF2B5EF4-FFF2-40B4-BE49-F238E27FC236}">
+                <a16:creationId xmlns:a16="http://schemas.microsoft.com/office/drawing/2014/main" xmlns="" id="{6889F56C-0800-9F4E-BE33-281A675CE1DD}"/>
+              </a:ext>
+            </a:extLst>
+          </p:cNvPr>
+          <p:cNvSpPr/>
+          <p:nvPr/>
+        </p:nvSpPr>
+        <p:spPr>
+          <a:xfrm>
+            <a:off x="5481053" y="858402"/>
+            <a:ext cx="5527373" cy="344384"/>
+          </a:xfrm>
+          <a:prstGeom prst="rect">
+            <a:avLst/>
+          </a:prstGeom>
+          <a:solidFill>
+            <a:schemeClr val="tx1"/>
+          </a:solidFill>
+          <a:ln>
+            <a:noFill/>
+          </a:ln>
+        </p:spPr>
+        <p:style>
+          <a:lnRef idx="2">
+            <a:schemeClr val="accent1">
+              <a:shade val="50000"/>
+            </a:schemeClr>
+          </a:lnRef>
+          <a:fillRef idx="1">
+            <a:schemeClr val="accent1"/>
+          </a:fillRef>
+          <a:effectRef idx="0">
+            <a:schemeClr val="accent1"/>
+          </a:effectRef>
+          <a:fontRef idx="minor">
+            <a:schemeClr val="lt1"/>
+          </a:fontRef>
+        </p:style>
+        <p:txBody>
+          <a:bodyPr rtlCol="0" anchor="ctr"/>
+          <a:lstStyle/>
+          <a:p>
+            <a:pPr algn="r"/>
+            <a:r>
+              <a:rPr lang="en-US" sz="1400" dirty="0" smtClean="0">
+                <a:solidFill>
+                  <a:schemeClr val="bg2">
+                    <a:lumMod val="50000"/>
+                  </a:schemeClr>
+                </a:solidFill>
+                <a:latin typeface="Comic Sans MS" panose="030F0902030302020204" pitchFamily="66" charset="0"/>
+              </a:rPr>
+              <a:t>Home     </a:t>
+            </a:r>
+            <a:endParaRPr lang="en-US" sz="1400" dirty="0">
+              <a:solidFill>
+                <a:schemeClr val="bg2">
+                  <a:lumMod val="50000"/>
+                </a:schemeClr>
+              </a:solidFill>
+              <a:latin typeface="Comic Sans MS" panose="030F0902030302020204" pitchFamily="66" charset="0"/>
+            </a:endParaRPr>
+          </a:p>
+        </p:txBody>
+      </p:sp>
+      <p:sp>
+        <p:nvSpPr>
+          <p:cNvPr id="6" name="Rectangle 5"/>
+          <p:cNvSpPr/>
+          <p:nvPr/>
+        </p:nvSpPr>
+        <p:spPr>
+          <a:xfrm>
+            <a:off x="6073781" y="1793812"/>
+            <a:ext cx="627633" cy="307777"/>
+          </a:xfrm>
+          <a:prstGeom prst="rect">
+            <a:avLst/>
+          </a:prstGeom>
+        </p:spPr>
+        <p:txBody>
+          <a:bodyPr wrap="none">
+            <a:spAutoFit/>
+          </a:bodyPr>
+          <a:lstStyle/>
+          <a:p>
+            <a:r>
+              <a:rPr lang="en-US" sz="1400" dirty="0">
+                <a:solidFill>
+                  <a:schemeClr val="bg1"/>
+                </a:solidFill>
+                <a:latin typeface="Comic Sans MS" panose="030F0902030302020204" pitchFamily="66" charset="0"/>
+              </a:rPr>
+              <a:t>Email</a:t>
+            </a:r>
+            <a:endParaRPr lang="en-US" sz="1400" dirty="0">
+              <a:solidFill>
+                <a:schemeClr val="bg1"/>
+              </a:solidFill>
+              <a:latin typeface="Comic Sans MS" panose="030F0902030302020204" pitchFamily="66" charset="0"/>
+            </a:endParaRPr>
+          </a:p>
+        </p:txBody>
+      </p:sp>
+      <p:sp>
+        <p:nvSpPr>
+          <p:cNvPr id="18" name="TextBox 17">
+            <a:extLst>
+              <a:ext uri="{FF2B5EF4-FFF2-40B4-BE49-F238E27FC236}">
+                <a16:creationId xmlns:a16="http://schemas.microsoft.com/office/drawing/2014/main" xmlns="" id="{32820AB9-7CA6-8F41-A812-9F4C46331562}"/>
+              </a:ext>
+            </a:extLst>
+          </p:cNvPr>
+          <p:cNvSpPr txBox="1"/>
+          <p:nvPr/>
+        </p:nvSpPr>
+        <p:spPr>
+          <a:xfrm>
+            <a:off x="6073781" y="3775146"/>
+            <a:ext cx="3610099" cy="307777"/>
+          </a:xfrm>
+          <a:prstGeom prst="rect">
+            <a:avLst/>
+          </a:prstGeom>
+          <a:noFill/>
+          <a:ln>
+            <a:solidFill>
+              <a:schemeClr val="bg1"/>
+            </a:solidFill>
+          </a:ln>
+        </p:spPr>
+        <p:txBody>
+          <a:bodyPr wrap="square" rtlCol="0">
+            <a:spAutoFit/>
+          </a:bodyPr>
+          <a:lstStyle/>
+          <a:p>
+            <a:pPr algn="l"/>
+            <a:endParaRPr lang="en-US" sz="1400" dirty="0">
+              <a:solidFill>
+                <a:schemeClr val="bg1"/>
+              </a:solidFill>
+              <a:latin typeface="Comic Sans MS" panose="030F0902030302020204" pitchFamily="66" charset="0"/>
+            </a:endParaRPr>
+          </a:p>
+        </p:txBody>
+      </p:sp>
+      <p:sp>
+        <p:nvSpPr>
+          <p:cNvPr id="11" name="Rectangle 10"/>
+          <p:cNvSpPr/>
+          <p:nvPr/>
+        </p:nvSpPr>
+        <p:spPr>
+          <a:xfrm>
+            <a:off x="6073781" y="2736340"/>
+            <a:ext cx="688122" cy="307777"/>
+          </a:xfrm>
+          <a:prstGeom prst="rect">
+            <a:avLst/>
+          </a:prstGeom>
+        </p:spPr>
+        <p:txBody>
+          <a:bodyPr wrap="none">
+            <a:spAutoFit/>
+          </a:bodyPr>
+          <a:lstStyle/>
+          <a:p>
+            <a:r>
+              <a:rPr lang="en-US" sz="1400" dirty="0">
+                <a:solidFill>
+                  <a:schemeClr val="bg1"/>
+                </a:solidFill>
+                <a:latin typeface="Comic Sans MS" panose="030F0902030302020204" pitchFamily="66" charset="0"/>
+              </a:rPr>
+              <a:t>Major</a:t>
+            </a:r>
+            <a:endParaRPr lang="en-US" sz="1400" dirty="0"/>
+          </a:p>
+        </p:txBody>
+      </p:sp>
+      <p:sp>
+        <p:nvSpPr>
+          <p:cNvPr id="19" name="Rectangle 18"/>
+          <p:cNvSpPr/>
+          <p:nvPr/>
+        </p:nvSpPr>
+        <p:spPr>
+          <a:xfrm>
+            <a:off x="6073781" y="3467369"/>
+            <a:ext cx="1589397" cy="307777"/>
+          </a:xfrm>
+          <a:prstGeom prst="rect">
+            <a:avLst/>
+          </a:prstGeom>
+        </p:spPr>
+        <p:txBody>
+          <a:bodyPr wrap="none">
+            <a:spAutoFit/>
+          </a:bodyPr>
+          <a:lstStyle/>
+          <a:p>
+            <a:r>
+              <a:rPr lang="en-US" sz="1400" dirty="0">
+                <a:solidFill>
+                  <a:schemeClr val="bg1"/>
+                </a:solidFill>
+                <a:latin typeface="Comic Sans MS" panose="030F0902030302020204" pitchFamily="66" charset="0"/>
+              </a:rPr>
+              <a:t>Repeat Password</a:t>
             </a:r>
             <a:endParaRPr lang="en-US" sz="1400" dirty="0">
               <a:solidFill>
@@ -18599,7 +19742,7 @@
           <p:cNvPr id="2" name="TextBox 1">
             <a:extLst>
               <a:ext uri="{FF2B5EF4-FFF2-40B4-BE49-F238E27FC236}">
-                <a16:creationId xmlns:a16="http://schemas.microsoft.com/office/drawing/2014/main" id="{F3573DF9-457D-7948-8B22-DB5337292FA7}"/>
+                <a16:creationId xmlns:a16="http://schemas.microsoft.com/office/drawing/2014/main" xmlns="" id="{F3573DF9-457D-7948-8B22-DB5337292FA7}"/>
               </a:ext>
             </a:extLst>
           </p:cNvPr>
@@ -18645,7 +19788,7 @@
           <p:cNvPr id="3" name="TextBox 2">
             <a:extLst>
               <a:ext uri="{FF2B5EF4-FFF2-40B4-BE49-F238E27FC236}">
-                <a16:creationId xmlns:a16="http://schemas.microsoft.com/office/drawing/2014/main" id="{49DF0299-C639-944C-9F0E-91BE71AC7E52}"/>
+                <a16:creationId xmlns:a16="http://schemas.microsoft.com/office/drawing/2014/main" xmlns="" id="{49DF0299-C639-944C-9F0E-91BE71AC7E52}"/>
               </a:ext>
             </a:extLst>
           </p:cNvPr>
@@ -18700,7 +19843,7 @@
           <p:cNvPr id="4" name="Rectangle 3">
             <a:extLst>
               <a:ext uri="{FF2B5EF4-FFF2-40B4-BE49-F238E27FC236}">
-                <a16:creationId xmlns:a16="http://schemas.microsoft.com/office/drawing/2014/main" id="{61CD5799-7FC2-F04C-ADCF-330CB97C8DA9}"/>
+                <a16:creationId xmlns:a16="http://schemas.microsoft.com/office/drawing/2014/main" xmlns="" id="{61CD5799-7FC2-F04C-ADCF-330CB97C8DA9}"/>
               </a:ext>
             </a:extLst>
           </p:cNvPr>
@@ -18759,7 +19902,7 @@
           <p:cNvPr id="12" name="Rectangle 11">
             <a:extLst>
               <a:ext uri="{FF2B5EF4-FFF2-40B4-BE49-F238E27FC236}">
-                <a16:creationId xmlns:a16="http://schemas.microsoft.com/office/drawing/2014/main" id="{61CD5799-7FC2-F04C-ADCF-330CB97C8DA9}"/>
+                <a16:creationId xmlns:a16="http://schemas.microsoft.com/office/drawing/2014/main" xmlns="" id="{61CD5799-7FC2-F04C-ADCF-330CB97C8DA9}"/>
               </a:ext>
             </a:extLst>
           </p:cNvPr>
@@ -18818,7 +19961,7 @@
           <p:cNvPr id="14" name="Rectangle 13">
             <a:extLst>
               <a:ext uri="{FF2B5EF4-FFF2-40B4-BE49-F238E27FC236}">
-                <a16:creationId xmlns:a16="http://schemas.microsoft.com/office/drawing/2014/main" id="{6866C721-FE01-1B49-8B68-07C98D112373}"/>
+                <a16:creationId xmlns:a16="http://schemas.microsoft.com/office/drawing/2014/main" xmlns="" id="{6866C721-FE01-1B49-8B68-07C98D112373}"/>
               </a:ext>
             </a:extLst>
           </p:cNvPr>
@@ -18878,7 +20021,7 @@
           <p:cNvPr id="15" name="Rectangle 14">
             <a:extLst>
               <a:ext uri="{FF2B5EF4-FFF2-40B4-BE49-F238E27FC236}">
-                <a16:creationId xmlns:a16="http://schemas.microsoft.com/office/drawing/2014/main" id="{6866C721-FE01-1B49-8B68-07C98D112373}"/>
+                <a16:creationId xmlns:a16="http://schemas.microsoft.com/office/drawing/2014/main" xmlns="" id="{6866C721-FE01-1B49-8B68-07C98D112373}"/>
               </a:ext>
             </a:extLst>
           </p:cNvPr>
@@ -18937,7 +20080,7 @@
           <p:cNvPr id="20" name="Rectangle 19">
             <a:extLst>
               <a:ext uri="{FF2B5EF4-FFF2-40B4-BE49-F238E27FC236}">
-                <a16:creationId xmlns:a16="http://schemas.microsoft.com/office/drawing/2014/main" id="{6866C721-FE01-1B49-8B68-07C98D112373}"/>
+                <a16:creationId xmlns:a16="http://schemas.microsoft.com/office/drawing/2014/main" xmlns="" id="{6866C721-FE01-1B49-8B68-07C98D112373}"/>
               </a:ext>
             </a:extLst>
           </p:cNvPr>
@@ -19080,6 +20223,161 @@
                 <a:latin typeface="Comic Sans MS" panose="030F0902030302020204" pitchFamily="66" charset="0"/>
               </a:rPr>
               <a:t>-bar comes down</a:t>
+            </a:r>
+          </a:p>
+        </p:txBody>
+      </p:sp>
+      <p:sp>
+        <p:nvSpPr>
+          <p:cNvPr id="11" name="Rectangle 10">
+            <a:extLst>
+              <a:ext uri="{FF2B5EF4-FFF2-40B4-BE49-F238E27FC236}">
+                <a16:creationId xmlns:a16="http://schemas.microsoft.com/office/drawing/2014/main" xmlns="" id="{8003D022-BA0D-A042-92B7-9C2E431128DB}"/>
+              </a:ext>
+            </a:extLst>
+          </p:cNvPr>
+          <p:cNvSpPr/>
+          <p:nvPr/>
+        </p:nvSpPr>
+        <p:spPr>
+          <a:xfrm>
+            <a:off x="1188497" y="869150"/>
+            <a:ext cx="9832769" cy="344384"/>
+          </a:xfrm>
+          <a:prstGeom prst="rect">
+            <a:avLst/>
+          </a:prstGeom>
+          <a:solidFill>
+            <a:schemeClr val="tx1"/>
+          </a:solidFill>
+          <a:ln>
+            <a:noFill/>
+          </a:ln>
+        </p:spPr>
+        <p:style>
+          <a:lnRef idx="2">
+            <a:schemeClr val="accent1">
+              <a:shade val="50000"/>
+            </a:schemeClr>
+          </a:lnRef>
+          <a:fillRef idx="1">
+            <a:schemeClr val="accent1"/>
+          </a:fillRef>
+          <a:effectRef idx="0">
+            <a:schemeClr val="accent1"/>
+          </a:effectRef>
+          <a:fontRef idx="minor">
+            <a:schemeClr val="lt1"/>
+          </a:fontRef>
+        </p:style>
+        <p:txBody>
+          <a:bodyPr rtlCol="0" anchor="ctr"/>
+          <a:lstStyle/>
+          <a:p>
+            <a:r>
+              <a:rPr lang="en-US" sz="1400" dirty="0">
+                <a:solidFill>
+                  <a:schemeClr val="accent1">
+                    <a:lumMod val="50000"/>
+                  </a:schemeClr>
+                </a:solidFill>
+                <a:latin typeface="Comic Sans MS" panose="030F0902030302020204" pitchFamily="66" charset="0"/>
+              </a:rPr>
+              <a:t> </a:t>
+            </a:r>
+            <a:r>
+              <a:rPr lang="en-US" sz="2400" b="1" dirty="0" err="1">
+                <a:solidFill>
+                  <a:schemeClr val="accent1">
+                    <a:lumMod val="50000"/>
+                  </a:schemeClr>
+                </a:solidFill>
+                <a:latin typeface="Comic Sans MS" panose="030F0902030302020204" pitchFamily="66" charset="0"/>
+              </a:rPr>
+              <a:t>SellBack</a:t>
+            </a:r>
+            <a:r>
+              <a:rPr lang="en-US" sz="2400" b="1" dirty="0" err="1">
+                <a:solidFill>
+                  <a:schemeClr val="accent1">
+                    <a:lumMod val="60000"/>
+                    <a:lumOff val="40000"/>
+                  </a:schemeClr>
+                </a:solidFill>
+                <a:latin typeface="Comic Sans MS" panose="030F0902030302020204" pitchFamily="66" charset="0"/>
+              </a:rPr>
+              <a:t>Mart</a:t>
+            </a:r>
+            <a:endParaRPr lang="en-US" sz="1400" b="1" dirty="0">
+              <a:solidFill>
+                <a:schemeClr val="accent1">
+                  <a:lumMod val="60000"/>
+                  <a:lumOff val="40000"/>
+                </a:schemeClr>
+              </a:solidFill>
+              <a:latin typeface="Comic Sans MS" panose="030F0902030302020204" pitchFamily="66" charset="0"/>
+            </a:endParaRPr>
+          </a:p>
+        </p:txBody>
+      </p:sp>
+      <p:sp>
+        <p:nvSpPr>
+          <p:cNvPr id="13" name="Rectangle 12">
+            <a:extLst>
+              <a:ext uri="{FF2B5EF4-FFF2-40B4-BE49-F238E27FC236}">
+                <a16:creationId xmlns:a16="http://schemas.microsoft.com/office/drawing/2014/main" xmlns="" id="{6889F56C-0800-9F4E-BE33-281A675CE1DD}"/>
+              </a:ext>
+            </a:extLst>
+          </p:cNvPr>
+          <p:cNvSpPr/>
+          <p:nvPr/>
+        </p:nvSpPr>
+        <p:spPr>
+          <a:xfrm>
+            <a:off x="6911440" y="865442"/>
+            <a:ext cx="4044384" cy="344384"/>
+          </a:xfrm>
+          <a:prstGeom prst="rect">
+            <a:avLst/>
+          </a:prstGeom>
+          <a:solidFill>
+            <a:schemeClr val="tx1"/>
+          </a:solidFill>
+          <a:ln>
+            <a:noFill/>
+          </a:ln>
+        </p:spPr>
+        <p:style>
+          <a:lnRef idx="2">
+            <a:schemeClr val="accent1">
+              <a:shade val="50000"/>
+            </a:schemeClr>
+          </a:lnRef>
+          <a:fillRef idx="1">
+            <a:schemeClr val="accent1"/>
+          </a:fillRef>
+          <a:effectRef idx="0">
+            <a:schemeClr val="accent1"/>
+          </a:effectRef>
+          <a:fontRef idx="minor">
+            <a:schemeClr val="lt1"/>
+          </a:fontRef>
+        </p:style>
+        <p:txBody>
+          <a:bodyPr rtlCol="0" anchor="ctr"/>
+          <a:lstStyle/>
+          <a:p>
+            <a:pPr algn="r"/>
+            <a:r>
+              <a:rPr lang="en-US" sz="1400" dirty="0">
+                <a:solidFill>
+                  <a:schemeClr val="bg2">
+                    <a:lumMod val="50000"/>
+                  </a:schemeClr>
+                </a:solidFill>
+                <a:latin typeface="Comic Sans MS" panose="030F0902030302020204" pitchFamily="66" charset="0"/>
+              </a:rPr>
+              <a:t>Catalog     Users Profile    Username</a:t>
             </a:r>
           </a:p>
         </p:txBody>
@@ -19345,7 +20643,7 @@
           <p:cNvPr id="2" name="TextBox 1">
             <a:extLst>
               <a:ext uri="{FF2B5EF4-FFF2-40B4-BE49-F238E27FC236}">
-                <a16:creationId xmlns:a16="http://schemas.microsoft.com/office/drawing/2014/main" id="{221DED5B-F56B-0F43-A308-4F2DD034B5B7}"/>
+                <a16:creationId xmlns:a16="http://schemas.microsoft.com/office/drawing/2014/main" xmlns="" id="{221DED5B-F56B-0F43-A308-4F2DD034B5B7}"/>
               </a:ext>
             </a:extLst>
           </p:cNvPr>
@@ -19385,7 +20683,7 @@
           <p:cNvPr id="7" name="TextBox 6">
             <a:extLst>
               <a:ext uri="{FF2B5EF4-FFF2-40B4-BE49-F238E27FC236}">
-                <a16:creationId xmlns:a16="http://schemas.microsoft.com/office/drawing/2014/main" id="{F3573DF9-457D-7948-8B22-DB5337292FA7}"/>
+                <a16:creationId xmlns:a16="http://schemas.microsoft.com/office/drawing/2014/main" xmlns="" id="{F3573DF9-457D-7948-8B22-DB5337292FA7}"/>
               </a:ext>
             </a:extLst>
           </p:cNvPr>
@@ -19434,7 +20732,7 @@
           <p:cNvPr id="8" name="TextBox 7">
             <a:extLst>
               <a:ext uri="{FF2B5EF4-FFF2-40B4-BE49-F238E27FC236}">
-                <a16:creationId xmlns:a16="http://schemas.microsoft.com/office/drawing/2014/main" id="{49DF0299-C639-944C-9F0E-91BE71AC7E52}"/>
+                <a16:creationId xmlns:a16="http://schemas.microsoft.com/office/drawing/2014/main" xmlns="" id="{49DF0299-C639-944C-9F0E-91BE71AC7E52}"/>
               </a:ext>
             </a:extLst>
           </p:cNvPr>
@@ -19474,7 +20772,7 @@
           <p:cNvPr id="4" name="TextBox 3">
             <a:extLst>
               <a:ext uri="{FF2B5EF4-FFF2-40B4-BE49-F238E27FC236}">
-                <a16:creationId xmlns:a16="http://schemas.microsoft.com/office/drawing/2014/main" id="{32820AB9-7CA6-8F41-A812-9F4C46331562}"/>
+                <a16:creationId xmlns:a16="http://schemas.microsoft.com/office/drawing/2014/main" xmlns="" id="{32820AB9-7CA6-8F41-A812-9F4C46331562}"/>
               </a:ext>
             </a:extLst>
           </p:cNvPr>
@@ -19556,7 +20854,7 @@
           <p:cNvPr id="15" name="TextBox 14">
             <a:extLst>
               <a:ext uri="{FF2B5EF4-FFF2-40B4-BE49-F238E27FC236}">
-                <a16:creationId xmlns:a16="http://schemas.microsoft.com/office/drawing/2014/main" id="{50DC85BE-E0FE-1D4B-A268-B6DD16A293AE}"/>
+                <a16:creationId xmlns:a16="http://schemas.microsoft.com/office/drawing/2014/main" xmlns="" id="{50DC85BE-E0FE-1D4B-A268-B6DD16A293AE}"/>
               </a:ext>
             </a:extLst>
           </p:cNvPr>
@@ -19710,7 +21008,7 @@
           <p:cNvPr id="3" name="Rectangle 2">
             <a:extLst>
               <a:ext uri="{FF2B5EF4-FFF2-40B4-BE49-F238E27FC236}">
-                <a16:creationId xmlns:a16="http://schemas.microsoft.com/office/drawing/2014/main" id="{CC0D1823-74B5-5646-9898-CD48F15882BF}"/>
+                <a16:creationId xmlns:a16="http://schemas.microsoft.com/office/drawing/2014/main" xmlns="" id="{CC0D1823-74B5-5646-9898-CD48F15882BF}"/>
               </a:ext>
             </a:extLst>
           </p:cNvPr>
@@ -19759,7 +21057,7 @@
           <p:cNvPr id="20" name="TextBox 19">
             <a:extLst>
               <a:ext uri="{FF2B5EF4-FFF2-40B4-BE49-F238E27FC236}">
-                <a16:creationId xmlns:a16="http://schemas.microsoft.com/office/drawing/2014/main" id="{85F0BA12-0219-4A4C-9A23-F57F00470D4D}"/>
+                <a16:creationId xmlns:a16="http://schemas.microsoft.com/office/drawing/2014/main" xmlns="" id="{85F0BA12-0219-4A4C-9A23-F57F00470D4D}"/>
               </a:ext>
             </a:extLst>
           </p:cNvPr>
@@ -19841,7 +21139,7 @@
           <p:cNvPr id="21" name="Rectangle 20">
             <a:extLst>
               <a:ext uri="{FF2B5EF4-FFF2-40B4-BE49-F238E27FC236}">
-                <a16:creationId xmlns:a16="http://schemas.microsoft.com/office/drawing/2014/main" id="{4CAE4138-EFC2-CF46-A0D7-44C1DC22765E}"/>
+                <a16:creationId xmlns:a16="http://schemas.microsoft.com/office/drawing/2014/main" xmlns="" id="{4CAE4138-EFC2-CF46-A0D7-44C1DC22765E}"/>
               </a:ext>
             </a:extLst>
           </p:cNvPr>
@@ -19890,7 +21188,7 @@
           <p:cNvPr id="22" name="TextBox 21">
             <a:extLst>
               <a:ext uri="{FF2B5EF4-FFF2-40B4-BE49-F238E27FC236}">
-                <a16:creationId xmlns:a16="http://schemas.microsoft.com/office/drawing/2014/main" id="{F981B8C4-EA28-6948-AC1C-98FE575D3876}"/>
+                <a16:creationId xmlns:a16="http://schemas.microsoft.com/office/drawing/2014/main" xmlns="" id="{F981B8C4-EA28-6948-AC1C-98FE575D3876}"/>
               </a:ext>
             </a:extLst>
           </p:cNvPr>
@@ -19972,7 +21270,7 @@
           <p:cNvPr id="23" name="Rectangle 22">
             <a:extLst>
               <a:ext uri="{FF2B5EF4-FFF2-40B4-BE49-F238E27FC236}">
-                <a16:creationId xmlns:a16="http://schemas.microsoft.com/office/drawing/2014/main" id="{8F5D6354-EB96-A544-B9F6-AD8E466E039B}"/>
+                <a16:creationId xmlns:a16="http://schemas.microsoft.com/office/drawing/2014/main" xmlns="" id="{8F5D6354-EB96-A544-B9F6-AD8E466E039B}"/>
               </a:ext>
             </a:extLst>
           </p:cNvPr>
@@ -20021,7 +21319,7 @@
           <p:cNvPr id="24" name="TextBox 23">
             <a:extLst>
               <a:ext uri="{FF2B5EF4-FFF2-40B4-BE49-F238E27FC236}">
-                <a16:creationId xmlns:a16="http://schemas.microsoft.com/office/drawing/2014/main" id="{B8669C60-76C6-2140-B42C-6B1F4F2D42B4}"/>
+                <a16:creationId xmlns:a16="http://schemas.microsoft.com/office/drawing/2014/main" xmlns="" id="{B8669C60-76C6-2140-B42C-6B1F4F2D42B4}"/>
               </a:ext>
             </a:extLst>
           </p:cNvPr>
@@ -20103,7 +21401,7 @@
           <p:cNvPr id="25" name="Rectangle 24">
             <a:extLst>
               <a:ext uri="{FF2B5EF4-FFF2-40B4-BE49-F238E27FC236}">
-                <a16:creationId xmlns:a16="http://schemas.microsoft.com/office/drawing/2014/main" id="{0C512251-CAA5-034E-A6D4-7AC0D6A42D22}"/>
+                <a16:creationId xmlns:a16="http://schemas.microsoft.com/office/drawing/2014/main" xmlns="" id="{0C512251-CAA5-034E-A6D4-7AC0D6A42D22}"/>
               </a:ext>
             </a:extLst>
           </p:cNvPr>
@@ -20152,7 +21450,7 @@
           <p:cNvPr id="26" name="TextBox 25">
             <a:extLst>
               <a:ext uri="{FF2B5EF4-FFF2-40B4-BE49-F238E27FC236}">
-                <a16:creationId xmlns:a16="http://schemas.microsoft.com/office/drawing/2014/main" id="{2111CB14-445C-1148-A482-F6A0A40F244E}"/>
+                <a16:creationId xmlns:a16="http://schemas.microsoft.com/office/drawing/2014/main" xmlns="" id="{2111CB14-445C-1148-A482-F6A0A40F244E}"/>
               </a:ext>
             </a:extLst>
           </p:cNvPr>
@@ -20234,7 +21532,7 @@
           <p:cNvPr id="27" name="Rectangle 26">
             <a:extLst>
               <a:ext uri="{FF2B5EF4-FFF2-40B4-BE49-F238E27FC236}">
-                <a16:creationId xmlns:a16="http://schemas.microsoft.com/office/drawing/2014/main" id="{9810A590-E884-AF42-BE74-3F99FD01CCD1}"/>
+                <a16:creationId xmlns:a16="http://schemas.microsoft.com/office/drawing/2014/main" xmlns="" id="{9810A590-E884-AF42-BE74-3F99FD01CCD1}"/>
               </a:ext>
             </a:extLst>
           </p:cNvPr>
@@ -20283,7 +21581,7 @@
           <p:cNvPr id="30" name="TextBox 29">
             <a:extLst>
               <a:ext uri="{FF2B5EF4-FFF2-40B4-BE49-F238E27FC236}">
-                <a16:creationId xmlns:a16="http://schemas.microsoft.com/office/drawing/2014/main" id="{50DC85BE-E0FE-1D4B-A268-B6DD16A293AE}"/>
+                <a16:creationId xmlns:a16="http://schemas.microsoft.com/office/drawing/2014/main" xmlns="" id="{50DC85BE-E0FE-1D4B-A268-B6DD16A293AE}"/>
               </a:ext>
             </a:extLst>
           </p:cNvPr>
@@ -20416,7 +21714,7 @@
           <p:cNvPr id="28" name="TextBox 27">
             <a:extLst>
               <a:ext uri="{FF2B5EF4-FFF2-40B4-BE49-F238E27FC236}">
-                <a16:creationId xmlns:a16="http://schemas.microsoft.com/office/drawing/2014/main" id="{C80D794F-CECE-4842-82CD-7950608C0D33}"/>
+                <a16:creationId xmlns:a16="http://schemas.microsoft.com/office/drawing/2014/main" xmlns="" id="{C80D794F-CECE-4842-82CD-7950608C0D33}"/>
               </a:ext>
             </a:extLst>
           </p:cNvPr>
@@ -20498,7 +21796,7 @@
           <p:cNvPr id="29" name="Rectangle 28">
             <a:extLst>
               <a:ext uri="{FF2B5EF4-FFF2-40B4-BE49-F238E27FC236}">
-                <a16:creationId xmlns:a16="http://schemas.microsoft.com/office/drawing/2014/main" id="{6F105BD5-7104-B845-85CA-D6DC0CF9382F}"/>
+                <a16:creationId xmlns:a16="http://schemas.microsoft.com/office/drawing/2014/main" xmlns="" id="{6F105BD5-7104-B845-85CA-D6DC0CF9382F}"/>
               </a:ext>
             </a:extLst>
           </p:cNvPr>
@@ -20547,7 +21845,7 @@
           <p:cNvPr id="32" name="TextBox 31">
             <a:extLst>
               <a:ext uri="{FF2B5EF4-FFF2-40B4-BE49-F238E27FC236}">
-                <a16:creationId xmlns:a16="http://schemas.microsoft.com/office/drawing/2014/main" id="{50DC85BE-E0FE-1D4B-A268-B6DD16A293AE}"/>
+                <a16:creationId xmlns:a16="http://schemas.microsoft.com/office/drawing/2014/main" xmlns="" id="{50DC85BE-E0FE-1D4B-A268-B6DD16A293AE}"/>
               </a:ext>
             </a:extLst>
           </p:cNvPr>
@@ -20680,7 +21978,7 @@
           <p:cNvPr id="33" name="TextBox 32">
             <a:extLst>
               <a:ext uri="{FF2B5EF4-FFF2-40B4-BE49-F238E27FC236}">
-                <a16:creationId xmlns:a16="http://schemas.microsoft.com/office/drawing/2014/main" id="{50DC85BE-E0FE-1D4B-A268-B6DD16A293AE}"/>
+                <a16:creationId xmlns:a16="http://schemas.microsoft.com/office/drawing/2014/main" xmlns="" id="{50DC85BE-E0FE-1D4B-A268-B6DD16A293AE}"/>
               </a:ext>
             </a:extLst>
           </p:cNvPr>
@@ -20813,7 +22111,7 @@
           <p:cNvPr id="35" name="TextBox 34">
             <a:extLst>
               <a:ext uri="{FF2B5EF4-FFF2-40B4-BE49-F238E27FC236}">
-                <a16:creationId xmlns:a16="http://schemas.microsoft.com/office/drawing/2014/main" id="{50DC85BE-E0FE-1D4B-A268-B6DD16A293AE}"/>
+                <a16:creationId xmlns:a16="http://schemas.microsoft.com/office/drawing/2014/main" xmlns="" id="{50DC85BE-E0FE-1D4B-A268-B6DD16A293AE}"/>
               </a:ext>
             </a:extLst>
           </p:cNvPr>
@@ -20946,7 +22244,7 @@
           <p:cNvPr id="36" name="TextBox 35">
             <a:extLst>
               <a:ext uri="{FF2B5EF4-FFF2-40B4-BE49-F238E27FC236}">
-                <a16:creationId xmlns:a16="http://schemas.microsoft.com/office/drawing/2014/main" id="{50DC85BE-E0FE-1D4B-A268-B6DD16A293AE}"/>
+                <a16:creationId xmlns:a16="http://schemas.microsoft.com/office/drawing/2014/main" xmlns="" id="{50DC85BE-E0FE-1D4B-A268-B6DD16A293AE}"/>
               </a:ext>
             </a:extLst>
           </p:cNvPr>
@@ -21079,7 +22377,7 @@
           <p:cNvPr id="37" name="TextBox 36">
             <a:extLst>
               <a:ext uri="{FF2B5EF4-FFF2-40B4-BE49-F238E27FC236}">
-                <a16:creationId xmlns:a16="http://schemas.microsoft.com/office/drawing/2014/main" id="{50DC85BE-E0FE-1D4B-A268-B6DD16A293AE}"/>
+                <a16:creationId xmlns:a16="http://schemas.microsoft.com/office/drawing/2014/main" xmlns="" id="{50DC85BE-E0FE-1D4B-A268-B6DD16A293AE}"/>
               </a:ext>
             </a:extLst>
           </p:cNvPr>
@@ -21212,7 +22510,7 @@
           <p:cNvPr id="31" name="Rectangle 30">
             <a:extLst>
               <a:ext uri="{FF2B5EF4-FFF2-40B4-BE49-F238E27FC236}">
-                <a16:creationId xmlns:a16="http://schemas.microsoft.com/office/drawing/2014/main" id="{8003D022-BA0D-A042-92B7-9C2E431128DB}"/>
+                <a16:creationId xmlns:a16="http://schemas.microsoft.com/office/drawing/2014/main" xmlns="" id="{8003D022-BA0D-A042-92B7-9C2E431128DB}"/>
               </a:ext>
             </a:extLst>
           </p:cNvPr>
@@ -21305,7 +22603,7 @@
           <p:cNvPr id="38" name="Rectangle 37">
             <a:extLst>
               <a:ext uri="{FF2B5EF4-FFF2-40B4-BE49-F238E27FC236}">
-                <a16:creationId xmlns:a16="http://schemas.microsoft.com/office/drawing/2014/main" id="{6889F56C-0800-9F4E-BE33-281A675CE1DD}"/>
+                <a16:creationId xmlns:a16="http://schemas.microsoft.com/office/drawing/2014/main" xmlns="" id="{6889F56C-0800-9F4E-BE33-281A675CE1DD}"/>
               </a:ext>
             </a:extLst>
           </p:cNvPr>
@@ -21367,7 +22665,7 @@
           <p:cNvPr id="34" name="Rounded Rectangle 33">
             <a:extLst>
               <a:ext uri="{FF2B5EF4-FFF2-40B4-BE49-F238E27FC236}">
-                <a16:creationId xmlns:a16="http://schemas.microsoft.com/office/drawing/2014/main" id="{F5F45B85-C7C8-514B-861D-15555E404803}"/>
+                <a16:creationId xmlns:a16="http://schemas.microsoft.com/office/drawing/2014/main" xmlns="" id="{F5F45B85-C7C8-514B-861D-15555E404803}"/>
               </a:ext>
             </a:extLst>
           </p:cNvPr>
@@ -21459,7 +22757,7 @@
           <p:cNvPr id="2" name="TextBox 1">
             <a:extLst>
               <a:ext uri="{FF2B5EF4-FFF2-40B4-BE49-F238E27FC236}">
-                <a16:creationId xmlns:a16="http://schemas.microsoft.com/office/drawing/2014/main" id="{F3573DF9-457D-7948-8B22-DB5337292FA7}"/>
+                <a16:creationId xmlns:a16="http://schemas.microsoft.com/office/drawing/2014/main" xmlns="" id="{F3573DF9-457D-7948-8B22-DB5337292FA7}"/>
               </a:ext>
             </a:extLst>
           </p:cNvPr>
@@ -21526,7 +22824,7 @@
           <p:cNvPr id="3" name="TextBox 2">
             <a:extLst>
               <a:ext uri="{FF2B5EF4-FFF2-40B4-BE49-F238E27FC236}">
-                <a16:creationId xmlns:a16="http://schemas.microsoft.com/office/drawing/2014/main" id="{221DED5B-F56B-0F43-A308-4F2DD034B5B7}"/>
+                <a16:creationId xmlns:a16="http://schemas.microsoft.com/office/drawing/2014/main" xmlns="" id="{221DED5B-F56B-0F43-A308-4F2DD034B5B7}"/>
               </a:ext>
             </a:extLst>
           </p:cNvPr>
@@ -21566,7 +22864,7 @@
           <p:cNvPr id="5" name="TextBox 4">
             <a:extLst>
               <a:ext uri="{FF2B5EF4-FFF2-40B4-BE49-F238E27FC236}">
-                <a16:creationId xmlns:a16="http://schemas.microsoft.com/office/drawing/2014/main" id="{49DF0299-C639-944C-9F0E-91BE71AC7E52}"/>
+                <a16:creationId xmlns:a16="http://schemas.microsoft.com/office/drawing/2014/main" xmlns="" id="{49DF0299-C639-944C-9F0E-91BE71AC7E52}"/>
               </a:ext>
             </a:extLst>
           </p:cNvPr>
@@ -21805,7 +23103,7 @@
           <p:cNvPr id="8" name="TextBox 7">
             <a:extLst>
               <a:ext uri="{FF2B5EF4-FFF2-40B4-BE49-F238E27FC236}">
-                <a16:creationId xmlns:a16="http://schemas.microsoft.com/office/drawing/2014/main" id="{32820AB9-7CA6-8F41-A812-9F4C46331562}"/>
+                <a16:creationId xmlns:a16="http://schemas.microsoft.com/office/drawing/2014/main" xmlns="" id="{32820AB9-7CA6-8F41-A812-9F4C46331562}"/>
               </a:ext>
             </a:extLst>
           </p:cNvPr>
@@ -22028,7 +23326,7 @@
           <p:cNvPr id="9" name="TextBox 8">
             <a:extLst>
               <a:ext uri="{FF2B5EF4-FFF2-40B4-BE49-F238E27FC236}">
-                <a16:creationId xmlns:a16="http://schemas.microsoft.com/office/drawing/2014/main" id="{32820AB9-7CA6-8F41-A812-9F4C46331562}"/>
+                <a16:creationId xmlns:a16="http://schemas.microsoft.com/office/drawing/2014/main" xmlns="" id="{32820AB9-7CA6-8F41-A812-9F4C46331562}"/>
               </a:ext>
             </a:extLst>
           </p:cNvPr>
@@ -22251,7 +23549,7 @@
           <p:cNvPr id="10" name="TextBox 9">
             <a:extLst>
               <a:ext uri="{FF2B5EF4-FFF2-40B4-BE49-F238E27FC236}">
-                <a16:creationId xmlns:a16="http://schemas.microsoft.com/office/drawing/2014/main" id="{32820AB9-7CA6-8F41-A812-9F4C46331562}"/>
+                <a16:creationId xmlns:a16="http://schemas.microsoft.com/office/drawing/2014/main" xmlns="" id="{32820AB9-7CA6-8F41-A812-9F4C46331562}"/>
               </a:ext>
             </a:extLst>
           </p:cNvPr>
@@ -22314,7 +23612,7 @@
           <p:cNvPr id="11" name="TextBox 10">
             <a:extLst>
               <a:ext uri="{FF2B5EF4-FFF2-40B4-BE49-F238E27FC236}">
-                <a16:creationId xmlns:a16="http://schemas.microsoft.com/office/drawing/2014/main" id="{32820AB9-7CA6-8F41-A812-9F4C46331562}"/>
+                <a16:creationId xmlns:a16="http://schemas.microsoft.com/office/drawing/2014/main" xmlns="" id="{32820AB9-7CA6-8F41-A812-9F4C46331562}"/>
               </a:ext>
             </a:extLst>
           </p:cNvPr>
@@ -22370,7 +23668,7 @@
           <p:cNvPr id="12" name="TextBox 11">
             <a:extLst>
               <a:ext uri="{FF2B5EF4-FFF2-40B4-BE49-F238E27FC236}">
-                <a16:creationId xmlns:a16="http://schemas.microsoft.com/office/drawing/2014/main" id="{32820AB9-7CA6-8F41-A812-9F4C46331562}"/>
+                <a16:creationId xmlns:a16="http://schemas.microsoft.com/office/drawing/2014/main" xmlns="" id="{32820AB9-7CA6-8F41-A812-9F4C46331562}"/>
               </a:ext>
             </a:extLst>
           </p:cNvPr>
@@ -22426,7 +23724,7 @@
           <p:cNvPr id="13" name="TextBox 12">
             <a:extLst>
               <a:ext uri="{FF2B5EF4-FFF2-40B4-BE49-F238E27FC236}">
-                <a16:creationId xmlns:a16="http://schemas.microsoft.com/office/drawing/2014/main" id="{32820AB9-7CA6-8F41-A812-9F4C46331562}"/>
+                <a16:creationId xmlns:a16="http://schemas.microsoft.com/office/drawing/2014/main" xmlns="" id="{32820AB9-7CA6-8F41-A812-9F4C46331562}"/>
               </a:ext>
             </a:extLst>
           </p:cNvPr>
@@ -22482,7 +23780,7 @@
           <p:cNvPr id="14" name="TextBox 13">
             <a:extLst>
               <a:ext uri="{FF2B5EF4-FFF2-40B4-BE49-F238E27FC236}">
-                <a16:creationId xmlns:a16="http://schemas.microsoft.com/office/drawing/2014/main" id="{32820AB9-7CA6-8F41-A812-9F4C46331562}"/>
+                <a16:creationId xmlns:a16="http://schemas.microsoft.com/office/drawing/2014/main" xmlns="" id="{32820AB9-7CA6-8F41-A812-9F4C46331562}"/>
               </a:ext>
             </a:extLst>
           </p:cNvPr>
@@ -22538,7 +23836,7 @@
           <p:cNvPr id="15" name="TextBox 14">
             <a:extLst>
               <a:ext uri="{FF2B5EF4-FFF2-40B4-BE49-F238E27FC236}">
-                <a16:creationId xmlns:a16="http://schemas.microsoft.com/office/drawing/2014/main" id="{32820AB9-7CA6-8F41-A812-9F4C46331562}"/>
+                <a16:creationId xmlns:a16="http://schemas.microsoft.com/office/drawing/2014/main" xmlns="" id="{32820AB9-7CA6-8F41-A812-9F4C46331562}"/>
               </a:ext>
             </a:extLst>
           </p:cNvPr>
@@ -22594,7 +23892,7 @@
           <p:cNvPr id="16" name="TextBox 15">
             <a:extLst>
               <a:ext uri="{FF2B5EF4-FFF2-40B4-BE49-F238E27FC236}">
-                <a16:creationId xmlns:a16="http://schemas.microsoft.com/office/drawing/2014/main" id="{32820AB9-7CA6-8F41-A812-9F4C46331562}"/>
+                <a16:creationId xmlns:a16="http://schemas.microsoft.com/office/drawing/2014/main" xmlns="" id="{32820AB9-7CA6-8F41-A812-9F4C46331562}"/>
               </a:ext>
             </a:extLst>
           </p:cNvPr>
@@ -22650,7 +23948,7 @@
           <p:cNvPr id="17" name="TextBox 16">
             <a:extLst>
               <a:ext uri="{FF2B5EF4-FFF2-40B4-BE49-F238E27FC236}">
-                <a16:creationId xmlns:a16="http://schemas.microsoft.com/office/drawing/2014/main" id="{32820AB9-7CA6-8F41-A812-9F4C46331562}"/>
+                <a16:creationId xmlns:a16="http://schemas.microsoft.com/office/drawing/2014/main" xmlns="" id="{32820AB9-7CA6-8F41-A812-9F4C46331562}"/>
               </a:ext>
             </a:extLst>
           </p:cNvPr>
@@ -22727,7 +24025,7 @@
           <p:cNvPr id="18" name="TextBox 17">
             <a:extLst>
               <a:ext uri="{FF2B5EF4-FFF2-40B4-BE49-F238E27FC236}">
-                <a16:creationId xmlns:a16="http://schemas.microsoft.com/office/drawing/2014/main" id="{32820AB9-7CA6-8F41-A812-9F4C46331562}"/>
+                <a16:creationId xmlns:a16="http://schemas.microsoft.com/office/drawing/2014/main" xmlns="" id="{32820AB9-7CA6-8F41-A812-9F4C46331562}"/>
               </a:ext>
             </a:extLst>
           </p:cNvPr>
@@ -22770,7 +24068,7 @@
           <p:cNvPr id="20" name="TextBox 19">
             <a:extLst>
               <a:ext uri="{FF2B5EF4-FFF2-40B4-BE49-F238E27FC236}">
-                <a16:creationId xmlns:a16="http://schemas.microsoft.com/office/drawing/2014/main" id="{32820AB9-7CA6-8F41-A812-9F4C46331562}"/>
+                <a16:creationId xmlns:a16="http://schemas.microsoft.com/office/drawing/2014/main" xmlns="" id="{32820AB9-7CA6-8F41-A812-9F4C46331562}"/>
               </a:ext>
             </a:extLst>
           </p:cNvPr>
@@ -22815,7 +24113,7 @@
           <p:cNvPr id="21" name="TextBox 20">
             <a:extLst>
               <a:ext uri="{FF2B5EF4-FFF2-40B4-BE49-F238E27FC236}">
-                <a16:creationId xmlns:a16="http://schemas.microsoft.com/office/drawing/2014/main" id="{32820AB9-7CA6-8F41-A812-9F4C46331562}"/>
+                <a16:creationId xmlns:a16="http://schemas.microsoft.com/office/drawing/2014/main" xmlns="" id="{32820AB9-7CA6-8F41-A812-9F4C46331562}"/>
               </a:ext>
             </a:extLst>
           </p:cNvPr>
@@ -23011,7 +24309,7 @@
           <p:cNvPr id="22" name="TextBox 21">
             <a:extLst>
               <a:ext uri="{FF2B5EF4-FFF2-40B4-BE49-F238E27FC236}">
-                <a16:creationId xmlns:a16="http://schemas.microsoft.com/office/drawing/2014/main" id="{32820AB9-7CA6-8F41-A812-9F4C46331562}"/>
+                <a16:creationId xmlns:a16="http://schemas.microsoft.com/office/drawing/2014/main" xmlns="" id="{32820AB9-7CA6-8F41-A812-9F4C46331562}"/>
               </a:ext>
             </a:extLst>
           </p:cNvPr>
@@ -23173,7 +24471,7 @@
           <p:cNvPr id="23" name="TextBox 22">
             <a:extLst>
               <a:ext uri="{FF2B5EF4-FFF2-40B4-BE49-F238E27FC236}">
-                <a16:creationId xmlns:a16="http://schemas.microsoft.com/office/drawing/2014/main" id="{32820AB9-7CA6-8F41-A812-9F4C46331562}"/>
+                <a16:creationId xmlns:a16="http://schemas.microsoft.com/office/drawing/2014/main" xmlns="" id="{32820AB9-7CA6-8F41-A812-9F4C46331562}"/>
               </a:ext>
             </a:extLst>
           </p:cNvPr>
@@ -23348,7 +24646,7 @@
           <p:cNvPr id="28" name="Rectangle 27">
             <a:extLst>
               <a:ext uri="{FF2B5EF4-FFF2-40B4-BE49-F238E27FC236}">
-                <a16:creationId xmlns:a16="http://schemas.microsoft.com/office/drawing/2014/main" id="{D0A85072-49D9-B848-930D-DBF9B457E812}"/>
+                <a16:creationId xmlns:a16="http://schemas.microsoft.com/office/drawing/2014/main" xmlns="" id="{D0A85072-49D9-B848-930D-DBF9B457E812}"/>
               </a:ext>
             </a:extLst>
           </p:cNvPr>
@@ -23441,7 +24739,7 @@
           <p:cNvPr id="29" name="Rectangle 28">
             <a:extLst>
               <a:ext uri="{FF2B5EF4-FFF2-40B4-BE49-F238E27FC236}">
-                <a16:creationId xmlns:a16="http://schemas.microsoft.com/office/drawing/2014/main" id="{E407852D-7BF9-4049-A41E-B18848EC4D39}"/>
+                <a16:creationId xmlns:a16="http://schemas.microsoft.com/office/drawing/2014/main" xmlns="" id="{E407852D-7BF9-4049-A41E-B18848EC4D39}"/>
               </a:ext>
             </a:extLst>
           </p:cNvPr>
@@ -23533,7 +24831,7 @@
           <p:cNvPr id="2" name="TextBox 1">
             <a:extLst>
               <a:ext uri="{FF2B5EF4-FFF2-40B4-BE49-F238E27FC236}">
-                <a16:creationId xmlns:a16="http://schemas.microsoft.com/office/drawing/2014/main" id="{221DED5B-F56B-0F43-A308-4F2DD034B5B7}"/>
+                <a16:creationId xmlns:a16="http://schemas.microsoft.com/office/drawing/2014/main" xmlns="" id="{221DED5B-F56B-0F43-A308-4F2DD034B5B7}"/>
               </a:ext>
             </a:extLst>
           </p:cNvPr>
@@ -23573,7 +24871,7 @@
           <p:cNvPr id="7" name="TextBox 6">
             <a:extLst>
               <a:ext uri="{FF2B5EF4-FFF2-40B4-BE49-F238E27FC236}">
-                <a16:creationId xmlns:a16="http://schemas.microsoft.com/office/drawing/2014/main" id="{F3573DF9-457D-7948-8B22-DB5337292FA7}"/>
+                <a16:creationId xmlns:a16="http://schemas.microsoft.com/office/drawing/2014/main" xmlns="" id="{F3573DF9-457D-7948-8B22-DB5337292FA7}"/>
               </a:ext>
             </a:extLst>
           </p:cNvPr>
@@ -23622,7 +24920,7 @@
           <p:cNvPr id="8" name="TextBox 7">
             <a:extLst>
               <a:ext uri="{FF2B5EF4-FFF2-40B4-BE49-F238E27FC236}">
-                <a16:creationId xmlns:a16="http://schemas.microsoft.com/office/drawing/2014/main" id="{49DF0299-C639-944C-9F0E-91BE71AC7E52}"/>
+                <a16:creationId xmlns:a16="http://schemas.microsoft.com/office/drawing/2014/main" xmlns="" id="{49DF0299-C639-944C-9F0E-91BE71AC7E52}"/>
               </a:ext>
             </a:extLst>
           </p:cNvPr>
@@ -23662,7 +24960,7 @@
           <p:cNvPr id="10" name="TextBox 9">
             <a:extLst>
               <a:ext uri="{FF2B5EF4-FFF2-40B4-BE49-F238E27FC236}">
-                <a16:creationId xmlns:a16="http://schemas.microsoft.com/office/drawing/2014/main" id="{C8E10E37-1019-8D4C-BA6F-9A6E9CF0D317}"/>
+                <a16:creationId xmlns:a16="http://schemas.microsoft.com/office/drawing/2014/main" xmlns="" id="{C8E10E37-1019-8D4C-BA6F-9A6E9CF0D317}"/>
               </a:ext>
             </a:extLst>
           </p:cNvPr>
@@ -23885,7 +25183,7 @@
           <p:cNvPr id="4" name="TextBox 3">
             <a:extLst>
               <a:ext uri="{FF2B5EF4-FFF2-40B4-BE49-F238E27FC236}">
-                <a16:creationId xmlns:a16="http://schemas.microsoft.com/office/drawing/2014/main" id="{32820AB9-7CA6-8F41-A812-9F4C46331562}"/>
+                <a16:creationId xmlns:a16="http://schemas.microsoft.com/office/drawing/2014/main" xmlns="" id="{32820AB9-7CA6-8F41-A812-9F4C46331562}"/>
               </a:ext>
             </a:extLst>
           </p:cNvPr>
@@ -23928,7 +25226,7 @@
           <p:cNvPr id="11" name="TextBox 10">
             <a:extLst>
               <a:ext uri="{FF2B5EF4-FFF2-40B4-BE49-F238E27FC236}">
-                <a16:creationId xmlns:a16="http://schemas.microsoft.com/office/drawing/2014/main" id="{5880DF0C-DDBC-A243-8BC6-846ACCD4FA07}"/>
+                <a16:creationId xmlns:a16="http://schemas.microsoft.com/office/drawing/2014/main" xmlns="" id="{5880DF0C-DDBC-A243-8BC6-846ACCD4FA07}"/>
               </a:ext>
             </a:extLst>
           </p:cNvPr>
@@ -23971,7 +25269,7 @@
           <p:cNvPr id="12" name="TextBox 11">
             <a:extLst>
               <a:ext uri="{FF2B5EF4-FFF2-40B4-BE49-F238E27FC236}">
-                <a16:creationId xmlns:a16="http://schemas.microsoft.com/office/drawing/2014/main" id="{4B5CE2DA-6350-BC4D-A2FD-AD1AC0B9E0B5}"/>
+                <a16:creationId xmlns:a16="http://schemas.microsoft.com/office/drawing/2014/main" xmlns="" id="{4B5CE2DA-6350-BC4D-A2FD-AD1AC0B9E0B5}"/>
               </a:ext>
             </a:extLst>
           </p:cNvPr>
@@ -24014,7 +25312,7 @@
           <p:cNvPr id="13" name="TextBox 12">
             <a:extLst>
               <a:ext uri="{FF2B5EF4-FFF2-40B4-BE49-F238E27FC236}">
-                <a16:creationId xmlns:a16="http://schemas.microsoft.com/office/drawing/2014/main" id="{7CDBED8A-FB80-BD47-A4EA-1246C8D98E35}"/>
+                <a16:creationId xmlns:a16="http://schemas.microsoft.com/office/drawing/2014/main" xmlns="" id="{7CDBED8A-FB80-BD47-A4EA-1246C8D98E35}"/>
               </a:ext>
             </a:extLst>
           </p:cNvPr>
@@ -24057,7 +25355,7 @@
           <p:cNvPr id="14" name="TextBox 13">
             <a:extLst>
               <a:ext uri="{FF2B5EF4-FFF2-40B4-BE49-F238E27FC236}">
-                <a16:creationId xmlns:a16="http://schemas.microsoft.com/office/drawing/2014/main" id="{FE03B4FC-5EA8-DC43-8C63-28E23C611684}"/>
+                <a16:creationId xmlns:a16="http://schemas.microsoft.com/office/drawing/2014/main" xmlns="" id="{FE03B4FC-5EA8-DC43-8C63-28E23C611684}"/>
               </a:ext>
             </a:extLst>
           </p:cNvPr>
@@ -24100,7 +25398,7 @@
           <p:cNvPr id="5" name="Rounded Rectangle 4">
             <a:extLst>
               <a:ext uri="{FF2B5EF4-FFF2-40B4-BE49-F238E27FC236}">
-                <a16:creationId xmlns:a16="http://schemas.microsoft.com/office/drawing/2014/main" id="{1376ECFE-A6F2-6C42-A904-0E15AFF7920D}"/>
+                <a16:creationId xmlns:a16="http://schemas.microsoft.com/office/drawing/2014/main" xmlns="" id="{1376ECFE-A6F2-6C42-A904-0E15AFF7920D}"/>
               </a:ext>
             </a:extLst>
           </p:cNvPr>
@@ -24162,7 +25460,7 @@
           <p:cNvPr id="18" name="Rounded Rectangle 17">
             <a:extLst>
               <a:ext uri="{FF2B5EF4-FFF2-40B4-BE49-F238E27FC236}">
-                <a16:creationId xmlns:a16="http://schemas.microsoft.com/office/drawing/2014/main" id="{83B78C9C-D1C8-1B4C-9B11-20C389A35EAE}"/>
+                <a16:creationId xmlns:a16="http://schemas.microsoft.com/office/drawing/2014/main" xmlns="" id="{83B78C9C-D1C8-1B4C-9B11-20C389A35EAE}"/>
               </a:ext>
             </a:extLst>
           </p:cNvPr>
@@ -24224,7 +25522,7 @@
           <p:cNvPr id="3" name="Triangle 2">
             <a:extLst>
               <a:ext uri="{FF2B5EF4-FFF2-40B4-BE49-F238E27FC236}">
-                <a16:creationId xmlns:a16="http://schemas.microsoft.com/office/drawing/2014/main" id="{5F9400FE-0C26-6A4E-ACDE-0A649B57EB8F}"/>
+                <a16:creationId xmlns:a16="http://schemas.microsoft.com/office/drawing/2014/main" xmlns="" id="{5F9400FE-0C26-6A4E-ACDE-0A649B57EB8F}"/>
               </a:ext>
             </a:extLst>
           </p:cNvPr>
@@ -24273,7 +25571,7 @@
           <p:cNvPr id="19" name="TextBox 18">
             <a:extLst>
               <a:ext uri="{FF2B5EF4-FFF2-40B4-BE49-F238E27FC236}">
-                <a16:creationId xmlns:a16="http://schemas.microsoft.com/office/drawing/2014/main" id="{C59CDDF8-D1B9-5346-85B5-D3C73EB35176}"/>
+                <a16:creationId xmlns:a16="http://schemas.microsoft.com/office/drawing/2014/main" xmlns="" id="{C59CDDF8-D1B9-5346-85B5-D3C73EB35176}"/>
               </a:ext>
             </a:extLst>
           </p:cNvPr>
@@ -24319,7 +25617,7 @@
           <p:cNvPr id="20" name="Triangle 19">
             <a:extLst>
               <a:ext uri="{FF2B5EF4-FFF2-40B4-BE49-F238E27FC236}">
-                <a16:creationId xmlns:a16="http://schemas.microsoft.com/office/drawing/2014/main" id="{B2C79898-88DE-854C-87C5-E714E45E8FFA}"/>
+                <a16:creationId xmlns:a16="http://schemas.microsoft.com/office/drawing/2014/main" xmlns="" id="{B2C79898-88DE-854C-87C5-E714E45E8FFA}"/>
               </a:ext>
             </a:extLst>
           </p:cNvPr>
@@ -24368,7 +25666,7 @@
           <p:cNvPr id="22" name="TextBox 21">
             <a:extLst>
               <a:ext uri="{FF2B5EF4-FFF2-40B4-BE49-F238E27FC236}">
-                <a16:creationId xmlns:a16="http://schemas.microsoft.com/office/drawing/2014/main" id="{36399FF9-6457-BC40-BF02-314054BA4BBF}"/>
+                <a16:creationId xmlns:a16="http://schemas.microsoft.com/office/drawing/2014/main" xmlns="" id="{36399FF9-6457-BC40-BF02-314054BA4BBF}"/>
               </a:ext>
             </a:extLst>
           </p:cNvPr>
@@ -24414,7 +25712,7 @@
           <p:cNvPr id="32" name="Straight Arrow Connector 31">
             <a:extLst>
               <a:ext uri="{FF2B5EF4-FFF2-40B4-BE49-F238E27FC236}">
-                <a16:creationId xmlns:a16="http://schemas.microsoft.com/office/drawing/2014/main" id="{384FBB7B-8473-E04A-89B1-1D0EF7D0B7A8}"/>
+                <a16:creationId xmlns:a16="http://schemas.microsoft.com/office/drawing/2014/main" xmlns="" id="{384FBB7B-8473-E04A-89B1-1D0EF7D0B7A8}"/>
               </a:ext>
             </a:extLst>
           </p:cNvPr>
@@ -24453,7 +25751,7 @@
           <p:cNvPr id="33" name="Rectangle 32">
             <a:extLst>
               <a:ext uri="{FF2B5EF4-FFF2-40B4-BE49-F238E27FC236}">
-                <a16:creationId xmlns:a16="http://schemas.microsoft.com/office/drawing/2014/main" id="{36754BCA-73D3-1044-80F9-B5544A77D27A}"/>
+                <a16:creationId xmlns:a16="http://schemas.microsoft.com/office/drawing/2014/main" xmlns="" id="{36754BCA-73D3-1044-80F9-B5544A77D27A}"/>
               </a:ext>
             </a:extLst>
           </p:cNvPr>
@@ -24512,7 +25810,7 @@
           <p:cNvPr id="6" name="TextBox 5">
             <a:extLst>
               <a:ext uri="{FF2B5EF4-FFF2-40B4-BE49-F238E27FC236}">
-                <a16:creationId xmlns:a16="http://schemas.microsoft.com/office/drawing/2014/main" id="{D008EF41-D199-8A44-8B22-E819BF49433F}"/>
+                <a16:creationId xmlns:a16="http://schemas.microsoft.com/office/drawing/2014/main" xmlns="" id="{D008EF41-D199-8A44-8B22-E819BF49433F}"/>
               </a:ext>
             </a:extLst>
           </p:cNvPr>
@@ -24553,7 +25851,7 @@
           <p:cNvPr id="24" name="TextBox 23">
             <a:extLst>
               <a:ext uri="{FF2B5EF4-FFF2-40B4-BE49-F238E27FC236}">
-                <a16:creationId xmlns:a16="http://schemas.microsoft.com/office/drawing/2014/main" id="{BB4D0155-E7C1-0E4E-A421-43E3B40E1EE1}"/>
+                <a16:creationId xmlns:a16="http://schemas.microsoft.com/office/drawing/2014/main" xmlns="" id="{BB4D0155-E7C1-0E4E-A421-43E3B40E1EE1}"/>
               </a:ext>
             </a:extLst>
           </p:cNvPr>
@@ -24594,7 +25892,7 @@
           <p:cNvPr id="25" name="Rounded Rectangle 24">
             <a:extLst>
               <a:ext uri="{FF2B5EF4-FFF2-40B4-BE49-F238E27FC236}">
-                <a16:creationId xmlns:a16="http://schemas.microsoft.com/office/drawing/2014/main" id="{5C7F78A5-117A-CB44-B9B5-B30992C15CDD}"/>
+                <a16:creationId xmlns:a16="http://schemas.microsoft.com/office/drawing/2014/main" xmlns="" id="{5C7F78A5-117A-CB44-B9B5-B30992C15CDD}"/>
               </a:ext>
             </a:extLst>
           </p:cNvPr>
@@ -24656,7 +25954,7 @@
           <p:cNvPr id="26" name="Rectangle 25">
             <a:extLst>
               <a:ext uri="{FF2B5EF4-FFF2-40B4-BE49-F238E27FC236}">
-                <a16:creationId xmlns:a16="http://schemas.microsoft.com/office/drawing/2014/main" id="{816F7272-CDBA-8C4B-8FE7-15C1FF6845BF}"/>
+                <a16:creationId xmlns:a16="http://schemas.microsoft.com/office/drawing/2014/main" xmlns="" id="{816F7272-CDBA-8C4B-8FE7-15C1FF6845BF}"/>
               </a:ext>
             </a:extLst>
           </p:cNvPr>
@@ -24749,7 +26047,7 @@
           <p:cNvPr id="27" name="Rectangle 26">
             <a:extLst>
               <a:ext uri="{FF2B5EF4-FFF2-40B4-BE49-F238E27FC236}">
-                <a16:creationId xmlns:a16="http://schemas.microsoft.com/office/drawing/2014/main" id="{97DCF38F-321F-6B4E-97DD-0ED3FE4EAE82}"/>
+                <a16:creationId xmlns:a16="http://schemas.microsoft.com/office/drawing/2014/main" xmlns="" id="{97DCF38F-321F-6B4E-97DD-0ED3FE4EAE82}"/>
               </a:ext>
             </a:extLst>
           </p:cNvPr>
@@ -25093,7 +26391,7 @@
   <a:extraClrSchemeLst/>
   <a:extLst>
     <a:ext uri="{05A4C25C-085E-4340-85A3-A5531E510DB2}">
-      <thm15:themeFamily xmlns:thm15="http://schemas.microsoft.com/office/thememl/2012/main" name="Office Theme" id="{62F939B6-93AF-4DB8-9C6B-D6C7DFDC589F}" vid="{4F46216B-77A9-411A-B9D3-5023FCB70208}"/>
+      <thm15:themeFamily xmlns:thm15="http://schemas.microsoft.com/office/thememl/2012/main" xmlns="" name="Office Theme" id="{62F939B6-93AF-4DB8-9C6B-D6C7DFDC589F}" vid="{4F46216B-77A9-411A-B9D3-5023FCB70208}"/>
     </a:ext>
   </a:extLst>
 </a:theme>

</xml_diff>